<commit_message>
updated XG Boost model
</commit_message>
<xml_diff>
--- a/Project 2 - Group 4.pptx
+++ b/Project 2 - Group 4.pptx
@@ -7,13 +7,14 @@
   <p:sldIdLst>
     <p:sldId id="257" r:id="rId2"/>
     <p:sldId id="260" r:id="rId3"/>
-    <p:sldId id="261" r:id="rId4"/>
+    <p:sldId id="268" r:id="rId4"/>
     <p:sldId id="262" r:id="rId5"/>
     <p:sldId id="263" r:id="rId6"/>
     <p:sldId id="264" r:id="rId7"/>
     <p:sldId id="265" r:id="rId8"/>
     <p:sldId id="266" r:id="rId9"/>
     <p:sldId id="267" r:id="rId10"/>
+    <p:sldId id="269" r:id="rId11"/>
   </p:sldIdLst>
   <p:sldSz cx="12192000" cy="6858000"/>
   <p:notesSz cx="6858000" cy="9144000"/>
@@ -364,7 +365,7 @@
           <a:p>
             <a:fld id="{9184DA70-C731-4C70-880D-CCD4705E623C}" type="datetime1">
               <a:rPr lang="en-US" smtClean="0"/>
-              <a:t>9/23/2020</a:t>
+              <a:t>9/26/2020</a:t>
             </a:fld>
             <a:endParaRPr lang="en-US" dirty="0"/>
           </a:p>
@@ -552,7 +553,7 @@
           <a:p>
             <a:fld id="{B612A279-0833-481D-8C56-F67FD0AC6C50}" type="datetime1">
               <a:rPr lang="en-US" smtClean="0"/>
-              <a:t>9/23/2020</a:t>
+              <a:t>9/26/2020</a:t>
             </a:fld>
             <a:endParaRPr lang="en-US" dirty="0"/>
           </a:p>
@@ -794,7 +795,7 @@
           <a:p>
             <a:fld id="{6587DA83-5663-4C9C-B9AA-0B40A3DAFF81}" type="datetime1">
               <a:rPr lang="en-US" smtClean="0"/>
-              <a:t>9/23/2020</a:t>
+              <a:t>9/26/2020</a:t>
             </a:fld>
             <a:endParaRPr lang="en-US" dirty="0"/>
           </a:p>
@@ -982,7 +983,7 @@
           <a:p>
             <a:fld id="{4BE1D723-8F53-4F53-90B0-1982A396982E}" type="datetime1">
               <a:rPr lang="en-US" smtClean="0"/>
-              <a:t>9/23/2020</a:t>
+              <a:t>9/26/2020</a:t>
             </a:fld>
             <a:endParaRPr lang="en-US" dirty="0"/>
           </a:p>
@@ -1355,7 +1356,7 @@
           <a:p>
             <a:fld id="{97669AF7-7BEB-44E4-9852-375E34362B5B}" type="datetime1">
               <a:rPr lang="en-US" smtClean="0"/>
-              <a:t>9/23/2020</a:t>
+              <a:t>9/26/2020</a:t>
             </a:fld>
             <a:endParaRPr lang="en-US" dirty="0"/>
           </a:p>
@@ -1610,7 +1611,7 @@
           <a:p>
             <a:fld id="{BAAAC38D-0552-4C82-B593-E6124DFADBE2}" type="datetime1">
               <a:rPr lang="en-US" smtClean="0"/>
-              <a:t>9/23/2020</a:t>
+              <a:t>9/26/2020</a:t>
             </a:fld>
             <a:endParaRPr lang="en-US" dirty="0"/>
           </a:p>
@@ -2007,7 +2008,7 @@
           <a:p>
             <a:fld id="{D9DF0F1C-5577-4ACB-BB62-DF8F3C494C7E}" type="datetime1">
               <a:rPr lang="en-US" smtClean="0"/>
-              <a:t>9/23/2020</a:t>
+              <a:t>9/26/2020</a:t>
             </a:fld>
             <a:endParaRPr lang="en-US" dirty="0"/>
           </a:p>
@@ -2143,7 +2144,7 @@
           <a:p>
             <a:fld id="{1775B394-D9F9-4F0C-B15D-605F45CB9E9F}" type="datetime1">
               <a:rPr lang="en-US" smtClean="0"/>
-              <a:t>9/23/2020</a:t>
+              <a:t>9/26/2020</a:t>
             </a:fld>
             <a:endParaRPr lang="en-US" dirty="0"/>
           </a:p>
@@ -2300,7 +2301,7 @@
           <a:p>
             <a:fld id="{39667345-2558-425A-8533-9BFDBCE15005}" type="datetime1">
               <a:rPr lang="en-US" smtClean="0"/>
-              <a:t>9/23/2020</a:t>
+              <a:t>9/26/2020</a:t>
             </a:fld>
             <a:endParaRPr lang="en-US" dirty="0"/>
           </a:p>
@@ -2629,7 +2630,7 @@
           <a:p>
             <a:fld id="{92BEA474-078D-4E9B-9B14-09A87B19DC46}" type="datetime1">
               <a:rPr lang="en-US" smtClean="0"/>
-              <a:t>9/23/2020</a:t>
+              <a:t>9/26/2020</a:t>
             </a:fld>
             <a:endParaRPr lang="en-US" dirty="0"/>
           </a:p>
@@ -2979,7 +2980,7 @@
           <a:p>
             <a:fld id="{4907D986-8816-4272-A432-0437A28A9828}" type="datetime1">
               <a:rPr lang="en-US" smtClean="0"/>
-              <a:t>9/23/2020</a:t>
+              <a:t>9/26/2020</a:t>
             </a:fld>
             <a:endParaRPr lang="en-US" dirty="0"/>
           </a:p>
@@ -3240,7 +3241,7 @@
           <a:p>
             <a:fld id="{62D6E202-B606-4609-B914-27C9371A1F6D}" type="datetime1">
               <a:rPr lang="en-US" smtClean="0"/>
-              <a:t>9/23/2020</a:t>
+              <a:t>9/26/2020</a:t>
             </a:fld>
             <a:endParaRPr lang="en-US" dirty="0"/>
           </a:p>
@@ -4070,6 +4071,97 @@
 </p:sld>
 </file>
 
+<file path=ppt/slides/slide10.xml><?xml version="1.0" encoding="utf-8"?>
+<p:sld xmlns:a="http://schemas.openxmlformats.org/drawingml/2006/main" xmlns:r="http://schemas.openxmlformats.org/officeDocument/2006/relationships" xmlns:p="http://schemas.openxmlformats.org/presentationml/2006/main">
+  <p:cSld>
+    <p:spTree>
+      <p:nvGrpSpPr>
+        <p:cNvPr id="1" name=""/>
+        <p:cNvGrpSpPr/>
+        <p:nvPr/>
+      </p:nvGrpSpPr>
+      <p:grpSpPr>
+        <a:xfrm>
+          <a:off x="0" y="0"/>
+          <a:ext cx="0" cy="0"/>
+          <a:chOff x="0" y="0"/>
+          <a:chExt cx="0" cy="0"/>
+        </a:xfrm>
+      </p:grpSpPr>
+      <p:sp>
+        <p:nvSpPr>
+          <p:cNvPr id="3" name="Title 7">
+            <a:extLst>
+              <a:ext uri="{FF2B5EF4-FFF2-40B4-BE49-F238E27FC236}">
+                <a16:creationId xmlns:a16="http://schemas.microsoft.com/office/drawing/2014/main" id="{A6D3D4A7-07AA-4522-A777-14384247F0A7}"/>
+              </a:ext>
+            </a:extLst>
+          </p:cNvPr>
+          <p:cNvSpPr txBox="1">
+            <a:spLocks/>
+          </p:cNvSpPr>
+          <p:nvPr/>
+        </p:nvSpPr>
+        <p:spPr>
+          <a:xfrm>
+            <a:off x="5244168" y="2633869"/>
+            <a:ext cx="2044528" cy="1089991"/>
+          </a:xfrm>
+          <a:prstGeom prst="rect">
+            <a:avLst/>
+          </a:prstGeom>
+        </p:spPr>
+        <p:txBody>
+          <a:bodyPr vert="horz" lIns="91440" tIns="45720" rIns="91440" bIns="45720" rtlCol="0" anchor="b">
+            <a:normAutofit/>
+          </a:bodyPr>
+          <a:lstStyle>
+            <a:lvl1pPr algn="l" defTabSz="914400" rtl="0" eaLnBrk="1" latinLnBrk="0" hangingPunct="1">
+              <a:lnSpc>
+                <a:spcPct val="90000"/>
+              </a:lnSpc>
+              <a:spcBef>
+                <a:spcPct val="0"/>
+              </a:spcBef>
+              <a:buNone/>
+              <a:defRPr sz="3600" b="0" i="0" kern="1200" spc="-50" baseline="0">
+                <a:solidFill>
+                  <a:srgbClr val="FFFFFF"/>
+                </a:solidFill>
+                <a:latin typeface="+mj-lt"/>
+                <a:ea typeface="+mj-ea"/>
+                <a:cs typeface="+mj-cs"/>
+              </a:defRPr>
+            </a:lvl1pPr>
+          </a:lstStyle>
+          <a:p>
+            <a:pPr algn="l"/>
+            <a:r>
+              <a:rPr lang="en-US" sz="6600" b="0" i="0" dirty="0">
+                <a:solidFill>
+                  <a:schemeClr val="tx1"/>
+                </a:solidFill>
+                <a:effectLst/>
+                <a:latin typeface="-apple-system"/>
+              </a:rPr>
+              <a:t>Q&amp;A</a:t>
+            </a:r>
+          </a:p>
+        </p:txBody>
+      </p:sp>
+    </p:spTree>
+    <p:extLst>
+      <p:ext uri="{BB962C8B-B14F-4D97-AF65-F5344CB8AC3E}">
+        <p14:creationId xmlns:p14="http://schemas.microsoft.com/office/powerpoint/2010/main" val="84142269"/>
+      </p:ext>
+    </p:extLst>
+  </p:cSld>
+  <p:clrMapOvr>
+    <a:masterClrMapping/>
+  </p:clrMapOvr>
+</p:sld>
+</file>
+
 <file path=ppt/slides/slide2.xml><?xml version="1.0" encoding="utf-8"?>
 <p:sld xmlns:a="http://schemas.openxmlformats.org/drawingml/2006/main" xmlns:r="http://schemas.openxmlformats.org/officeDocument/2006/relationships" xmlns:p="http://schemas.openxmlformats.org/presentationml/2006/main">
   <p:cSld>
@@ -4696,10 +4788,10 @@
       </p:grpSpPr>
       <p:sp>
         <p:nvSpPr>
-          <p:cNvPr id="2" name="Picture Placeholder 1">
+          <p:cNvPr id="2" name="Title 1">
             <a:extLst>
               <a:ext uri="{FF2B5EF4-FFF2-40B4-BE49-F238E27FC236}">
-                <a16:creationId xmlns:a16="http://schemas.microsoft.com/office/drawing/2014/main" id="{B941B915-0BBE-4779-A4C9-DA8375B7EF7E}"/>
+                <a16:creationId xmlns:a16="http://schemas.microsoft.com/office/drawing/2014/main" id="{66C66C3D-D740-442D-8E05-7FA499A836C1}"/>
               </a:ext>
             </a:extLst>
           </p:cNvPr>
@@ -4707,83 +4799,13 @@
             <a:spLocks noGrp="1"/>
           </p:cNvSpPr>
           <p:nvPr>
-            <p:ph type="pic" idx="1"/>
-          </p:nvPr>
-        </p:nvSpPr>
-        <p:spPr/>
-      </p:sp>
-      <p:sp>
-        <p:nvSpPr>
-          <p:cNvPr id="3" name="Title 2">
-            <a:extLst>
-              <a:ext uri="{FF2B5EF4-FFF2-40B4-BE49-F238E27FC236}">
-                <a16:creationId xmlns:a16="http://schemas.microsoft.com/office/drawing/2014/main" id="{4CFA61B0-5635-4DDC-A619-51E6B8F15EAC}"/>
-              </a:ext>
-            </a:extLst>
-          </p:cNvPr>
-          <p:cNvSpPr>
-            <a:spLocks noGrp="1"/>
-          </p:cNvSpPr>
-          <p:nvPr>
             <p:ph type="title"/>
           </p:nvPr>
         </p:nvSpPr>
         <p:spPr>
           <a:xfrm>
-            <a:off x="0" y="4578350"/>
-            <a:ext cx="10113645" cy="1786968"/>
-          </a:xfrm>
-        </p:spPr>
-        <p:txBody>
-          <a:bodyPr/>
-          <a:lstStyle/>
-          <a:p>
-            <a:pPr marL="457200" indent="-457200"/>
-            <a:br>
-              <a:rPr lang="en-US" sz="3600" dirty="0"/>
-            </a:br>
-            <a:r>
-              <a:rPr lang="en-US" sz="3600" dirty="0"/>
-              <a:t>Question 1</a:t>
-            </a:r>
-            <a:br>
-              <a:rPr lang="en-US" sz="3600" dirty="0"/>
-            </a:br>
-            <a:r>
-              <a:rPr lang="en-US" sz="3600" dirty="0"/>
-              <a:t>Question 2</a:t>
-            </a:r>
-            <a:br>
-              <a:rPr lang="en-US" sz="3600" dirty="0"/>
-            </a:br>
-            <a:r>
-              <a:rPr lang="en-US" sz="3600" dirty="0"/>
-              <a:t>Question 3</a:t>
-            </a:r>
-            <a:endParaRPr lang="en-CA" dirty="0"/>
-          </a:p>
-        </p:txBody>
-      </p:sp>
-      <p:sp>
-        <p:nvSpPr>
-          <p:cNvPr id="5" name="Title 2">
-            <a:extLst>
-              <a:ext uri="{FF2B5EF4-FFF2-40B4-BE49-F238E27FC236}">
-                <a16:creationId xmlns:a16="http://schemas.microsoft.com/office/drawing/2014/main" id="{8F8A7E3C-BE56-49D2-A201-8190AB2A86E3}"/>
-              </a:ext>
-            </a:extLst>
-          </p:cNvPr>
-          <p:cNvSpPr>
-            <a:spLocks noGrp="1"/>
-          </p:cNvSpPr>
-          <p:nvPr>
-            <p:ph type="title"/>
-          </p:nvPr>
-        </p:nvSpPr>
-        <p:spPr>
-          <a:xfrm>
-            <a:off x="6095998" y="463213"/>
-            <a:ext cx="5126184" cy="901834"/>
+            <a:off x="643466" y="786384"/>
+            <a:ext cx="3517567" cy="1546000"/>
           </a:xfrm>
         </p:spPr>
         <p:txBody>
@@ -4793,16 +4815,157 @@
           <a:lstStyle/>
           <a:p>
             <a:r>
-              <a:rPr lang="en-US" sz="3200" dirty="0"/>
-              <a:t>Objectives</a:t>
-            </a:r>
+              <a:rPr lang="en-CA" sz="4000" b="1" dirty="0"/>
+              <a:t>Model Summary</a:t>
+            </a:r>
+            <a:br>
+              <a:rPr lang="en-CA" sz="4000" dirty="0"/>
+            </a:br>
+            <a:endParaRPr lang="en-CA" sz="4000" dirty="0"/>
+          </a:p>
+        </p:txBody>
+      </p:sp>
+      <p:sp>
+        <p:nvSpPr>
+          <p:cNvPr id="3" name="Content Placeholder 2">
+            <a:extLst>
+              <a:ext uri="{FF2B5EF4-FFF2-40B4-BE49-F238E27FC236}">
+                <a16:creationId xmlns:a16="http://schemas.microsoft.com/office/drawing/2014/main" id="{723B0F60-545D-4AEC-B5CC-E6AD61AD23F5}"/>
+              </a:ext>
+            </a:extLst>
+          </p:cNvPr>
+          <p:cNvSpPr>
+            <a:spLocks noGrp="1"/>
+          </p:cNvSpPr>
+          <p:nvPr>
+            <p:ph idx="1"/>
+          </p:nvPr>
+        </p:nvSpPr>
+        <p:spPr/>
+        <p:txBody>
+          <a:bodyPr/>
+          <a:lstStyle/>
+          <a:p>
+            <a:endParaRPr lang="en-CA"/>
+          </a:p>
+        </p:txBody>
+      </p:sp>
+      <p:sp>
+        <p:nvSpPr>
+          <p:cNvPr id="4" name="Text Placeholder 3">
+            <a:extLst>
+              <a:ext uri="{FF2B5EF4-FFF2-40B4-BE49-F238E27FC236}">
+                <a16:creationId xmlns:a16="http://schemas.microsoft.com/office/drawing/2014/main" id="{77C772A2-1719-4DB2-B52A-3DEB9EDE685E}"/>
+              </a:ext>
+            </a:extLst>
+          </p:cNvPr>
+          <p:cNvSpPr>
+            <a:spLocks noGrp="1"/>
+          </p:cNvSpPr>
+          <p:nvPr>
+            <p:ph type="body" sz="half" idx="2"/>
+          </p:nvPr>
+        </p:nvSpPr>
+        <p:spPr>
+          <a:xfrm>
+            <a:off x="643465" y="2001078"/>
+            <a:ext cx="3517567" cy="4106477"/>
+          </a:xfrm>
+        </p:spPr>
+        <p:txBody>
+          <a:bodyPr/>
+          <a:lstStyle/>
+          <a:p>
+            <a:pPr marL="285750" indent="-285750">
+              <a:buFontTx/>
+              <a:buChar char="-"/>
+            </a:pPr>
+            <a:r>
+              <a:rPr lang="en-CA" dirty="0"/>
+              <a:t>LSTM</a:t>
+            </a:r>
+          </a:p>
+          <a:p>
+            <a:pPr marL="285750" indent="-285750">
+              <a:buFontTx/>
+              <a:buChar char="-"/>
+            </a:pPr>
+            <a:r>
+              <a:rPr lang="en-CA" dirty="0"/>
+              <a:t>Random Forest Model</a:t>
+            </a:r>
+          </a:p>
+          <a:p>
+            <a:pPr marL="285750" indent="-285750">
+              <a:buFontTx/>
+              <a:buChar char="-"/>
+            </a:pPr>
+            <a:r>
+              <a:rPr lang="en-CA" dirty="0"/>
+              <a:t>XG Boost</a:t>
+            </a:r>
+          </a:p>
+        </p:txBody>
+      </p:sp>
+      <p:sp>
+        <p:nvSpPr>
+          <p:cNvPr id="5" name="Title 2">
+            <a:extLst>
+              <a:ext uri="{FF2B5EF4-FFF2-40B4-BE49-F238E27FC236}">
+                <a16:creationId xmlns:a16="http://schemas.microsoft.com/office/drawing/2014/main" id="{CEB7A092-682E-4FA5-A15C-1BFB6C6706DA}"/>
+              </a:ext>
+            </a:extLst>
+          </p:cNvPr>
+          <p:cNvSpPr txBox="1">
+            <a:spLocks/>
+          </p:cNvSpPr>
+          <p:nvPr/>
+        </p:nvSpPr>
+        <p:spPr>
+          <a:xfrm>
+            <a:off x="6095998" y="463213"/>
+            <a:ext cx="5126184" cy="517448"/>
+          </a:xfrm>
+          <a:prstGeom prst="rect">
+            <a:avLst/>
+          </a:prstGeom>
+        </p:spPr>
+        <p:txBody>
+          <a:bodyPr vert="horz" lIns="91440" tIns="45720" rIns="91440" bIns="45720" rtlCol="0" anchor="b">
+            <a:noAutofit/>
+          </a:bodyPr>
+          <a:lstStyle>
+            <a:lvl1pPr algn="l" defTabSz="914400" rtl="0" eaLnBrk="1" latinLnBrk="0" hangingPunct="1">
+              <a:lnSpc>
+                <a:spcPct val="90000"/>
+              </a:lnSpc>
+              <a:spcBef>
+                <a:spcPct val="0"/>
+              </a:spcBef>
+              <a:buNone/>
+              <a:defRPr sz="3600" b="0" i="0" kern="1200" spc="-50" baseline="0">
+                <a:solidFill>
+                  <a:srgbClr val="FFFFFF"/>
+                </a:solidFill>
+                <a:latin typeface="+mj-lt"/>
+                <a:ea typeface="+mj-ea"/>
+                <a:cs typeface="+mj-cs"/>
+              </a:defRPr>
+            </a:lvl1pPr>
+          </a:lstStyle>
+          <a:p>
+            <a:endParaRPr lang="en-US" sz="3200" b="1" dirty="0">
+              <a:solidFill>
+                <a:schemeClr val="tx1"/>
+              </a:solidFill>
+            </a:endParaRPr>
           </a:p>
         </p:txBody>
       </p:sp>
     </p:spTree>
     <p:extLst>
       <p:ext uri="{BB962C8B-B14F-4D97-AF65-F5344CB8AC3E}">
-        <p14:creationId xmlns:p14="http://schemas.microsoft.com/office/powerpoint/2010/main" val="349064980"/>
+        <p14:creationId xmlns:p14="http://schemas.microsoft.com/office/powerpoint/2010/main" val="2980760909"/>
       </p:ext>
     </p:extLst>
   </p:cSld>
@@ -5535,7 +5698,7 @@
         </p:spPr>
         <p:txBody>
           <a:bodyPr vert="horz" lIns="91440" tIns="45720" rIns="91440" bIns="45720" rtlCol="0" anchor="b">
-            <a:normAutofit/>
+            <a:normAutofit fontScale="85000" lnSpcReduction="10000"/>
           </a:bodyPr>
           <a:lstStyle>
             <a:lvl1pPr algn="l" defTabSz="914400" rtl="0" eaLnBrk="1" latinLnBrk="0" hangingPunct="1">
@@ -5563,7 +5726,7 @@
                   <a:schemeClr val="tx1"/>
                 </a:solidFill>
               </a:rPr>
-              <a:t>Data Used (Reason Why)</a:t>
+              <a:t>Data Used (Problem/issues during data prep and model training)</a:t>
             </a:r>
           </a:p>
         </p:txBody>
@@ -6728,6 +6891,111 @@
           </a:prstGeom>
         </p:spPr>
       </p:pic>
+      <p:sp>
+        <p:nvSpPr>
+          <p:cNvPr id="6" name="Title 7">
+            <a:extLst>
+              <a:ext uri="{FF2B5EF4-FFF2-40B4-BE49-F238E27FC236}">
+                <a16:creationId xmlns:a16="http://schemas.microsoft.com/office/drawing/2014/main" id="{734C553F-1313-4473-9256-A5C64163FAB3}"/>
+              </a:ext>
+            </a:extLst>
+          </p:cNvPr>
+          <p:cNvSpPr txBox="1">
+            <a:spLocks/>
+          </p:cNvSpPr>
+          <p:nvPr/>
+        </p:nvSpPr>
+        <p:spPr>
+          <a:xfrm>
+            <a:off x="5767754" y="1557820"/>
+            <a:ext cx="6043246" cy="2550353"/>
+          </a:xfrm>
+          <a:prstGeom prst="rect">
+            <a:avLst/>
+          </a:prstGeom>
+        </p:spPr>
+        <p:txBody>
+          <a:bodyPr vert="horz" lIns="91440" tIns="45720" rIns="91440" bIns="45720" rtlCol="0" anchor="b">
+            <a:normAutofit/>
+          </a:bodyPr>
+          <a:lstStyle>
+            <a:lvl1pPr algn="l" defTabSz="914400" rtl="0" eaLnBrk="1" latinLnBrk="0" hangingPunct="1">
+              <a:lnSpc>
+                <a:spcPct val="90000"/>
+              </a:lnSpc>
+              <a:spcBef>
+                <a:spcPct val="0"/>
+              </a:spcBef>
+              <a:buNone/>
+              <a:defRPr sz="3600" b="0" i="0" kern="1200" spc="-50" baseline="0">
+                <a:solidFill>
+                  <a:srgbClr val="FFFFFF"/>
+                </a:solidFill>
+                <a:latin typeface="+mj-lt"/>
+                <a:ea typeface="+mj-ea"/>
+                <a:cs typeface="+mj-cs"/>
+              </a:defRPr>
+            </a:lvl1pPr>
+          </a:lstStyle>
+          <a:p>
+            <a:r>
+              <a:rPr lang="en-US" sz="1600" b="0" i="0" dirty="0">
+                <a:solidFill>
+                  <a:schemeClr val="tx1"/>
+                </a:solidFill>
+                <a:effectLst/>
+                <a:latin typeface="-apple-system"/>
+              </a:rPr>
+              <a:t>Was the model sufficient for the predictive task? </a:t>
+            </a:r>
+          </a:p>
+          <a:p>
+            <a:endParaRPr lang="en-US" sz="1600" dirty="0">
+              <a:solidFill>
+                <a:schemeClr val="tx1"/>
+              </a:solidFill>
+              <a:latin typeface="-apple-system"/>
+            </a:endParaRPr>
+          </a:p>
+          <a:p>
+            <a:r>
+              <a:rPr lang="en-US" sz="1600" b="0" i="0" dirty="0">
+                <a:solidFill>
+                  <a:schemeClr val="tx1"/>
+                </a:solidFill>
+                <a:effectLst/>
+                <a:latin typeface="-apple-system"/>
+              </a:rPr>
+              <a:t>If not, why not? </a:t>
+            </a:r>
+          </a:p>
+          <a:p>
+            <a:endParaRPr lang="en-US" sz="1600" dirty="0">
+              <a:solidFill>
+                <a:schemeClr val="tx1"/>
+              </a:solidFill>
+              <a:latin typeface="-apple-system"/>
+            </a:endParaRPr>
+          </a:p>
+          <a:p>
+            <a:r>
+              <a:rPr lang="en-US" sz="1600" b="0" i="0" dirty="0">
+                <a:solidFill>
+                  <a:schemeClr val="tx1"/>
+                </a:solidFill>
+                <a:effectLst/>
+                <a:latin typeface="-apple-system"/>
+              </a:rPr>
+              <a:t>What inferences or general conclusions can you draw from your model performance?</a:t>
+            </a:r>
+            <a:endParaRPr lang="en-US" sz="3200" dirty="0">
+              <a:solidFill>
+                <a:schemeClr val="tx1"/>
+              </a:solidFill>
+            </a:endParaRPr>
+          </a:p>
+        </p:txBody>
+      </p:sp>
     </p:spTree>
     <p:extLst>
       <p:ext uri="{BB962C8B-B14F-4D97-AF65-F5344CB8AC3E}">
@@ -7025,7 +7293,7 @@
                   <a:schemeClr val="tx1"/>
                 </a:solidFill>
               </a:rPr>
-              <a:t>Implications of findings</a:t>
+              <a:t>Postmortem</a:t>
             </a:r>
           </a:p>
         </p:txBody>
@@ -7103,6 +7371,99 @@
           </a:prstGeom>
         </p:spPr>
       </p:pic>
+      <p:sp>
+        <p:nvSpPr>
+          <p:cNvPr id="6" name="Title 7">
+            <a:extLst>
+              <a:ext uri="{FF2B5EF4-FFF2-40B4-BE49-F238E27FC236}">
+                <a16:creationId xmlns:a16="http://schemas.microsoft.com/office/drawing/2014/main" id="{59D7F82C-E012-4FC2-B040-7AEEA04F676B}"/>
+              </a:ext>
+            </a:extLst>
+          </p:cNvPr>
+          <p:cNvSpPr txBox="1">
+            <a:spLocks/>
+          </p:cNvSpPr>
+          <p:nvPr/>
+        </p:nvSpPr>
+        <p:spPr>
+          <a:xfrm>
+            <a:off x="5694740" y="1769855"/>
+            <a:ext cx="6043246" cy="2722631"/>
+          </a:xfrm>
+          <a:prstGeom prst="rect">
+            <a:avLst/>
+          </a:prstGeom>
+        </p:spPr>
+        <p:txBody>
+          <a:bodyPr vert="horz" lIns="91440" tIns="45720" rIns="91440" bIns="45720" rtlCol="0" anchor="b">
+            <a:normAutofit lnSpcReduction="10000"/>
+          </a:bodyPr>
+          <a:lstStyle>
+            <a:lvl1pPr algn="l" defTabSz="914400" rtl="0" eaLnBrk="1" latinLnBrk="0" hangingPunct="1">
+              <a:lnSpc>
+                <a:spcPct val="90000"/>
+              </a:lnSpc>
+              <a:spcBef>
+                <a:spcPct val="0"/>
+              </a:spcBef>
+              <a:buNone/>
+              <a:defRPr sz="3600" b="0" i="0" kern="1200" spc="-50" baseline="0">
+                <a:solidFill>
+                  <a:srgbClr val="FFFFFF"/>
+                </a:solidFill>
+                <a:latin typeface="+mj-lt"/>
+                <a:ea typeface="+mj-ea"/>
+                <a:cs typeface="+mj-cs"/>
+              </a:defRPr>
+            </a:lvl1pPr>
+          </a:lstStyle>
+          <a:p>
+            <a:pPr algn="l">
+              <a:buFont typeface="Arial" panose="020B0604020202020204" pitchFamily="34" charset="0"/>
+              <a:buChar char="•"/>
+            </a:pPr>
+            <a:r>
+              <a:rPr lang="en-US" sz="2800" b="0" i="0" dirty="0">
+                <a:solidFill>
+                  <a:schemeClr val="tx1"/>
+                </a:solidFill>
+                <a:effectLst/>
+                <a:latin typeface="-apple-system"/>
+              </a:rPr>
+              <a:t>Discuss any difficulties that arose, and how you dealt with them.</a:t>
+            </a:r>
+          </a:p>
+          <a:p>
+            <a:pPr algn="l">
+              <a:buFont typeface="Arial" panose="020B0604020202020204" pitchFamily="34" charset="0"/>
+              <a:buChar char="•"/>
+            </a:pPr>
+            <a:endParaRPr lang="en-US" sz="2800" b="0" i="0" dirty="0">
+              <a:solidFill>
+                <a:schemeClr val="tx1"/>
+              </a:solidFill>
+              <a:effectLst/>
+              <a:latin typeface="-apple-system"/>
+            </a:endParaRPr>
+          </a:p>
+          <a:p>
+            <a:pPr algn="l">
+              <a:buFont typeface="Arial" panose="020B0604020202020204" pitchFamily="34" charset="0"/>
+              <a:buChar char="•"/>
+            </a:pPr>
+            <a:r>
+              <a:rPr lang="en-US" sz="2800" b="0" i="0" dirty="0">
+                <a:solidFill>
+                  <a:schemeClr val="tx1"/>
+                </a:solidFill>
+                <a:effectLst/>
+                <a:latin typeface="-apple-system"/>
+              </a:rPr>
+              <a:t>Discuss any additional questions or problems that you didn't have time to answer: What would you research next, if you had two more weeks?</a:t>
+            </a:r>
+          </a:p>
+        </p:txBody>
+      </p:sp>
     </p:spTree>
     <p:extLst>
       <p:ext uri="{BB962C8B-B14F-4D97-AF65-F5344CB8AC3E}">

</xml_diff>

<commit_message>
added graphs for 3 models
</commit_message>
<xml_diff>
--- a/Project 2 - Group 4.pptx
+++ b/Project 2 - Group 4.pptx
@@ -4821,12 +4821,20 @@
         <p:spPr>
           <a:xfrm>
             <a:off x="643465" y="2199858"/>
-            <a:ext cx="3517567" cy="2968487"/>
-          </a:xfrm>
-        </p:spPr>
-        <p:txBody>
-          <a:bodyPr/>
+            <a:ext cx="3517567" cy="3697359"/>
+          </a:xfrm>
+        </p:spPr>
+        <p:txBody>
+          <a:bodyPr>
+            <a:normAutofit lnSpcReduction="10000"/>
+          </a:bodyPr>
           <a:lstStyle/>
+          <a:p>
+            <a:r>
+              <a:rPr lang="en-CA" sz="2100" b="1" dirty="0"/>
+              <a:t>Regressor Approach</a:t>
+            </a:r>
+          </a:p>
           <a:p>
             <a:pPr marL="285750" indent="-285750">
               <a:buFontTx/>
@@ -4863,6 +4871,12 @@
               <a:buChar char="-"/>
             </a:pPr>
             <a:endParaRPr lang="en-CA" dirty="0"/>
+          </a:p>
+          <a:p>
+            <a:r>
+              <a:rPr lang="en-CA" sz="2100" b="1" dirty="0"/>
+              <a:t>Classification Approach</a:t>
+            </a:r>
           </a:p>
           <a:p>
             <a:pPr marL="285750" indent="-285750">
@@ -6097,10 +6111,10 @@
       </p:grpSpPr>
       <p:sp>
         <p:nvSpPr>
-          <p:cNvPr id="2" name="Text Placeholder 3">
-            <a:extLst>
-              <a:ext uri="{FF2B5EF4-FFF2-40B4-BE49-F238E27FC236}">
-                <a16:creationId xmlns:a16="http://schemas.microsoft.com/office/drawing/2014/main" id="{30DC66C4-6C3F-45ED-A950-A55681BAC970}"/>
+          <p:cNvPr id="12" name="Title 7">
+            <a:extLst>
+              <a:ext uri="{FF2B5EF4-FFF2-40B4-BE49-F238E27FC236}">
+                <a16:creationId xmlns:a16="http://schemas.microsoft.com/office/drawing/2014/main" id="{71520384-A28C-4951-BA9F-337FAB2E7F09}"/>
               </a:ext>
             </a:extLst>
           </p:cNvPr>
@@ -6111,230 +6125,16 @@
         </p:nvSpPr>
         <p:spPr>
           <a:xfrm>
-            <a:off x="5767754" y="1243259"/>
-            <a:ext cx="5897218" cy="5074498"/>
+            <a:off x="5462953" y="331304"/>
+            <a:ext cx="7086855" cy="535592"/>
           </a:xfrm>
           <a:prstGeom prst="rect">
             <a:avLst/>
           </a:prstGeom>
         </p:spPr>
         <p:txBody>
-          <a:bodyPr vert="horz" lIns="91440" tIns="45720" rIns="91440" bIns="45720" rtlCol="0" anchor="ctr">
-            <a:normAutofit/>
-          </a:bodyPr>
-          <a:lstStyle>
-            <a:lvl1pPr marL="0" indent="0" algn="l" defTabSz="914400" rtl="0" eaLnBrk="1" latinLnBrk="0" hangingPunct="1">
-              <a:lnSpc>
-                <a:spcPct val="100000"/>
-              </a:lnSpc>
-              <a:spcBef>
-                <a:spcPts val="1000"/>
-              </a:spcBef>
-              <a:buFont typeface="Arial" panose="020B0604020202020204" pitchFamily="34" charset="0"/>
-              <a:buNone/>
-              <a:defRPr sz="2400" kern="1200" spc="600">
-                <a:solidFill>
-                  <a:schemeClr val="tx1">
-                    <a:tint val="75000"/>
-                  </a:schemeClr>
-                </a:solidFill>
-                <a:latin typeface="+mn-lt"/>
-                <a:ea typeface="+mn-ea"/>
-                <a:cs typeface="+mn-cs"/>
-              </a:defRPr>
-            </a:lvl1pPr>
-            <a:lvl2pPr marL="457200" indent="0" algn="l" defTabSz="914400" rtl="0" eaLnBrk="1" latinLnBrk="0" hangingPunct="1">
-              <a:lnSpc>
-                <a:spcPct val="150000"/>
-              </a:lnSpc>
-              <a:spcBef>
-                <a:spcPts val="500"/>
-              </a:spcBef>
-              <a:buFont typeface="Arial" panose="020B0604020202020204" pitchFamily="34" charset="0"/>
-              <a:buNone/>
-              <a:defRPr sz="2000" kern="1200">
-                <a:solidFill>
-                  <a:schemeClr val="tx1">
-                    <a:tint val="75000"/>
-                  </a:schemeClr>
-                </a:solidFill>
-                <a:latin typeface="+mn-lt"/>
-                <a:ea typeface="+mn-ea"/>
-                <a:cs typeface="+mn-cs"/>
-              </a:defRPr>
-            </a:lvl2pPr>
-            <a:lvl3pPr marL="914400" indent="0" algn="l" defTabSz="914400" rtl="0" eaLnBrk="1" latinLnBrk="0" hangingPunct="1">
-              <a:lnSpc>
-                <a:spcPct val="150000"/>
-              </a:lnSpc>
-              <a:spcBef>
-                <a:spcPts val="500"/>
-              </a:spcBef>
-              <a:buFont typeface="Arial" panose="020B0604020202020204" pitchFamily="34" charset="0"/>
-              <a:buNone/>
-              <a:defRPr sz="1800" kern="1200">
-                <a:solidFill>
-                  <a:schemeClr val="tx1">
-                    <a:tint val="75000"/>
-                  </a:schemeClr>
-                </a:solidFill>
-                <a:latin typeface="+mn-lt"/>
-                <a:ea typeface="+mn-ea"/>
-                <a:cs typeface="+mn-cs"/>
-              </a:defRPr>
-            </a:lvl3pPr>
-            <a:lvl4pPr marL="1371600" indent="0" algn="l" defTabSz="914400" rtl="0" eaLnBrk="1" latinLnBrk="0" hangingPunct="1">
-              <a:lnSpc>
-                <a:spcPct val="150000"/>
-              </a:lnSpc>
-              <a:spcBef>
-                <a:spcPts val="500"/>
-              </a:spcBef>
-              <a:buFont typeface="Arial" panose="020B0604020202020204" pitchFamily="34" charset="0"/>
-              <a:buNone/>
-              <a:defRPr sz="1600" kern="1200">
-                <a:solidFill>
-                  <a:schemeClr val="tx1">
-                    <a:tint val="75000"/>
-                  </a:schemeClr>
-                </a:solidFill>
-                <a:latin typeface="+mn-lt"/>
-                <a:ea typeface="+mn-ea"/>
-                <a:cs typeface="+mn-cs"/>
-              </a:defRPr>
-            </a:lvl4pPr>
-            <a:lvl5pPr marL="1828800" indent="0" algn="l" defTabSz="914400" rtl="0" eaLnBrk="1" latinLnBrk="0" hangingPunct="1">
-              <a:lnSpc>
-                <a:spcPct val="150000"/>
-              </a:lnSpc>
-              <a:spcBef>
-                <a:spcPts val="500"/>
-              </a:spcBef>
-              <a:buFont typeface="Arial" panose="020B0604020202020204" pitchFamily="34" charset="0"/>
-              <a:buNone/>
-              <a:defRPr sz="1600" kern="1200">
-                <a:solidFill>
-                  <a:schemeClr val="tx1">
-                    <a:tint val="75000"/>
-                  </a:schemeClr>
-                </a:solidFill>
-                <a:latin typeface="+mn-lt"/>
-                <a:ea typeface="+mn-ea"/>
-                <a:cs typeface="+mn-cs"/>
-              </a:defRPr>
-            </a:lvl5pPr>
-            <a:lvl6pPr marL="2286000" indent="0" algn="l" defTabSz="914400" rtl="0" eaLnBrk="1" latinLnBrk="0" hangingPunct="1">
-              <a:lnSpc>
-                <a:spcPct val="90000"/>
-              </a:lnSpc>
-              <a:spcBef>
-                <a:spcPts val="500"/>
-              </a:spcBef>
-              <a:buFont typeface="Arial" panose="020B0604020202020204" pitchFamily="34" charset="0"/>
-              <a:buNone/>
-              <a:defRPr sz="1600" kern="1200">
-                <a:solidFill>
-                  <a:schemeClr val="tx1">
-                    <a:tint val="75000"/>
-                  </a:schemeClr>
-                </a:solidFill>
-                <a:latin typeface="+mn-lt"/>
-                <a:ea typeface="+mn-ea"/>
-                <a:cs typeface="+mn-cs"/>
-              </a:defRPr>
-            </a:lvl6pPr>
-            <a:lvl7pPr marL="2743200" indent="0" algn="l" defTabSz="914400" rtl="0" eaLnBrk="1" latinLnBrk="0" hangingPunct="1">
-              <a:lnSpc>
-                <a:spcPct val="90000"/>
-              </a:lnSpc>
-              <a:spcBef>
-                <a:spcPts val="500"/>
-              </a:spcBef>
-              <a:buFont typeface="Arial" panose="020B0604020202020204" pitchFamily="34" charset="0"/>
-              <a:buNone/>
-              <a:defRPr sz="1600" kern="1200">
-                <a:solidFill>
-                  <a:schemeClr val="tx1">
-                    <a:tint val="75000"/>
-                  </a:schemeClr>
-                </a:solidFill>
-                <a:latin typeface="+mn-lt"/>
-                <a:ea typeface="+mn-ea"/>
-                <a:cs typeface="+mn-cs"/>
-              </a:defRPr>
-            </a:lvl7pPr>
-            <a:lvl8pPr marL="3200400" indent="0" algn="l" defTabSz="914400" rtl="0" eaLnBrk="1" latinLnBrk="0" hangingPunct="1">
-              <a:lnSpc>
-                <a:spcPct val="90000"/>
-              </a:lnSpc>
-              <a:spcBef>
-                <a:spcPts val="500"/>
-              </a:spcBef>
-              <a:buFont typeface="Arial" panose="020B0604020202020204" pitchFamily="34" charset="0"/>
-              <a:buNone/>
-              <a:defRPr sz="1600" kern="1200">
-                <a:solidFill>
-                  <a:schemeClr val="tx1">
-                    <a:tint val="75000"/>
-                  </a:schemeClr>
-                </a:solidFill>
-                <a:latin typeface="+mn-lt"/>
-                <a:ea typeface="+mn-ea"/>
-                <a:cs typeface="+mn-cs"/>
-              </a:defRPr>
-            </a:lvl8pPr>
-            <a:lvl9pPr marL="3657600" indent="0" algn="l" defTabSz="914400" rtl="0" eaLnBrk="1" latinLnBrk="0" hangingPunct="1">
-              <a:lnSpc>
-                <a:spcPct val="90000"/>
-              </a:lnSpc>
-              <a:spcBef>
-                <a:spcPts val="500"/>
-              </a:spcBef>
-              <a:buFont typeface="Arial" panose="020B0604020202020204" pitchFamily="34" charset="0"/>
-              <a:buNone/>
-              <a:defRPr sz="1600" kern="1200">
-                <a:solidFill>
-                  <a:schemeClr val="tx1">
-                    <a:tint val="75000"/>
-                  </a:schemeClr>
-                </a:solidFill>
-                <a:latin typeface="+mn-lt"/>
-                <a:ea typeface="+mn-ea"/>
-                <a:cs typeface="+mn-cs"/>
-              </a:defRPr>
-            </a:lvl9pPr>
-          </a:lstStyle>
-          <a:p>
-            <a:endParaRPr lang="en-CA" dirty="0"/>
-          </a:p>
-        </p:txBody>
-      </p:sp>
-      <p:sp>
-        <p:nvSpPr>
-          <p:cNvPr id="12" name="Title 7">
-            <a:extLst>
-              <a:ext uri="{FF2B5EF4-FFF2-40B4-BE49-F238E27FC236}">
-                <a16:creationId xmlns:a16="http://schemas.microsoft.com/office/drawing/2014/main" id="{71520384-A28C-4951-BA9F-337FAB2E7F09}"/>
-              </a:ext>
-            </a:extLst>
-          </p:cNvPr>
-          <p:cNvSpPr txBox="1">
-            <a:spLocks/>
-          </p:cNvSpPr>
-          <p:nvPr/>
-        </p:nvSpPr>
-        <p:spPr>
-          <a:xfrm>
-            <a:off x="5767754" y="365125"/>
-            <a:ext cx="6043246" cy="872832"/>
-          </a:xfrm>
-          <a:prstGeom prst="rect">
-            <a:avLst/>
-          </a:prstGeom>
-        </p:spPr>
-        <p:txBody>
           <a:bodyPr vert="horz" lIns="91440" tIns="45720" rIns="91440" bIns="45720" rtlCol="0" anchor="b">
-            <a:normAutofit fontScale="92500" lnSpcReduction="10000"/>
+            <a:normAutofit fontScale="92500"/>
           </a:bodyPr>
           <a:lstStyle>
             <a:lvl1pPr algn="l" defTabSz="914400" rtl="0" eaLnBrk="1" latinLnBrk="0" hangingPunct="1">
@@ -6440,6 +6240,258 @@
           </a:prstGeom>
         </p:spPr>
       </p:pic>
+      <p:pic>
+        <p:nvPicPr>
+          <p:cNvPr id="6" name="Picture 5">
+            <a:extLst>
+              <a:ext uri="{FF2B5EF4-FFF2-40B4-BE49-F238E27FC236}">
+                <a16:creationId xmlns:a16="http://schemas.microsoft.com/office/drawing/2014/main" id="{DF633E80-FBE6-4735-925E-466BF78423A1}"/>
+              </a:ext>
+            </a:extLst>
+          </p:cNvPr>
+          <p:cNvPicPr>
+            <a:picLocks noChangeAspect="1"/>
+          </p:cNvPicPr>
+          <p:nvPr/>
+        </p:nvPicPr>
+        <p:blipFill rotWithShape="1">
+          <a:blip r:embed="rId4">
+            <a:extLst>
+              <a:ext uri="{28A0092B-C50C-407E-A947-70E740481C1C}">
+                <a14:useLocalDpi xmlns:a14="http://schemas.microsoft.com/office/drawing/2010/main" val="0"/>
+              </a:ext>
+            </a:extLst>
+          </a:blip>
+          <a:srcRect r="10797"/>
+          <a:stretch/>
+        </p:blipFill>
+        <p:spPr>
+          <a:xfrm>
+            <a:off x="6894189" y="1173431"/>
+            <a:ext cx="4993265" cy="1738659"/>
+          </a:xfrm>
+          <a:prstGeom prst="rect">
+            <a:avLst/>
+          </a:prstGeom>
+        </p:spPr>
+      </p:pic>
+      <p:pic>
+        <p:nvPicPr>
+          <p:cNvPr id="8" name="Picture 7">
+            <a:extLst>
+              <a:ext uri="{FF2B5EF4-FFF2-40B4-BE49-F238E27FC236}">
+                <a16:creationId xmlns:a16="http://schemas.microsoft.com/office/drawing/2014/main" id="{2E4BA76B-5C6C-4F23-A317-EFE35EA7C339}"/>
+              </a:ext>
+            </a:extLst>
+          </p:cNvPr>
+          <p:cNvPicPr>
+            <a:picLocks noChangeAspect="1"/>
+          </p:cNvPicPr>
+          <p:nvPr/>
+        </p:nvPicPr>
+        <p:blipFill rotWithShape="1">
+          <a:blip r:embed="rId5">
+            <a:extLst>
+              <a:ext uri="{28A0092B-C50C-407E-A947-70E740481C1C}">
+                <a14:useLocalDpi xmlns:a14="http://schemas.microsoft.com/office/drawing/2010/main" val="0"/>
+              </a:ext>
+            </a:extLst>
+          </a:blip>
+          <a:srcRect r="9555"/>
+          <a:stretch/>
+        </p:blipFill>
+        <p:spPr>
+          <a:xfrm>
+            <a:off x="7050157" y="4986814"/>
+            <a:ext cx="4837297" cy="1738659"/>
+          </a:xfrm>
+          <a:prstGeom prst="rect">
+            <a:avLst/>
+          </a:prstGeom>
+        </p:spPr>
+      </p:pic>
+      <p:pic>
+        <p:nvPicPr>
+          <p:cNvPr id="10" name="Picture 9">
+            <a:extLst>
+              <a:ext uri="{FF2B5EF4-FFF2-40B4-BE49-F238E27FC236}">
+                <a16:creationId xmlns:a16="http://schemas.microsoft.com/office/drawing/2014/main" id="{8934CEDD-4B5F-4B5E-823A-4C65F35CC981}"/>
+              </a:ext>
+            </a:extLst>
+          </p:cNvPr>
+          <p:cNvPicPr>
+            <a:picLocks noChangeAspect="1"/>
+          </p:cNvPicPr>
+          <p:nvPr/>
+        </p:nvPicPr>
+        <p:blipFill rotWithShape="1">
+          <a:blip r:embed="rId6">
+            <a:extLst>
+              <a:ext uri="{28A0092B-C50C-407E-A947-70E740481C1C}">
+                <a14:useLocalDpi xmlns:a14="http://schemas.microsoft.com/office/drawing/2010/main" val="0"/>
+              </a:ext>
+            </a:extLst>
+          </a:blip>
+          <a:srcRect r="9323"/>
+          <a:stretch/>
+        </p:blipFill>
+        <p:spPr>
+          <a:xfrm>
+            <a:off x="6894188" y="3112340"/>
+            <a:ext cx="5152039" cy="1667142"/>
+          </a:xfrm>
+          <a:prstGeom prst="rect">
+            <a:avLst/>
+          </a:prstGeom>
+        </p:spPr>
+      </p:pic>
+      <p:sp>
+        <p:nvSpPr>
+          <p:cNvPr id="11" name="Rectangle: Rounded Corners 10">
+            <a:extLst>
+              <a:ext uri="{FF2B5EF4-FFF2-40B4-BE49-F238E27FC236}">
+                <a16:creationId xmlns:a16="http://schemas.microsoft.com/office/drawing/2014/main" id="{AA9C5549-6874-4819-9E71-8D7066FD0251}"/>
+              </a:ext>
+            </a:extLst>
+          </p:cNvPr>
+          <p:cNvSpPr/>
+          <p:nvPr/>
+        </p:nvSpPr>
+        <p:spPr>
+          <a:xfrm>
+            <a:off x="5247861" y="1563757"/>
+            <a:ext cx="1646327" cy="795130"/>
+          </a:xfrm>
+          <a:prstGeom prst="roundRect">
+            <a:avLst/>
+          </a:prstGeom>
+        </p:spPr>
+        <p:style>
+          <a:lnRef idx="2">
+            <a:schemeClr val="accent1">
+              <a:shade val="50000"/>
+            </a:schemeClr>
+          </a:lnRef>
+          <a:fillRef idx="1">
+            <a:schemeClr val="accent1"/>
+          </a:fillRef>
+          <a:effectRef idx="0">
+            <a:schemeClr val="accent1"/>
+          </a:effectRef>
+          <a:fontRef idx="minor">
+            <a:schemeClr val="lt1"/>
+          </a:fontRef>
+        </p:style>
+        <p:txBody>
+          <a:bodyPr rtlCol="0" anchor="ctr"/>
+          <a:lstStyle/>
+          <a:p>
+            <a:pPr algn="ctr"/>
+            <a:r>
+              <a:rPr lang="en-CA" dirty="0"/>
+              <a:t>XG Boost</a:t>
+            </a:r>
+          </a:p>
+        </p:txBody>
+      </p:sp>
+      <p:sp>
+        <p:nvSpPr>
+          <p:cNvPr id="13" name="Rectangle: Rounded Corners 12">
+            <a:extLst>
+              <a:ext uri="{FF2B5EF4-FFF2-40B4-BE49-F238E27FC236}">
+                <a16:creationId xmlns:a16="http://schemas.microsoft.com/office/drawing/2014/main" id="{B08D3A23-581A-42A5-BD56-1ACF65988A4E}"/>
+              </a:ext>
+            </a:extLst>
+          </p:cNvPr>
+          <p:cNvSpPr/>
+          <p:nvPr/>
+        </p:nvSpPr>
+        <p:spPr>
+          <a:xfrm>
+            <a:off x="5247861" y="5183855"/>
+            <a:ext cx="1646327" cy="795130"/>
+          </a:xfrm>
+          <a:prstGeom prst="roundRect">
+            <a:avLst/>
+          </a:prstGeom>
+        </p:spPr>
+        <p:style>
+          <a:lnRef idx="2">
+            <a:schemeClr val="accent1">
+              <a:shade val="50000"/>
+            </a:schemeClr>
+          </a:lnRef>
+          <a:fillRef idx="1">
+            <a:schemeClr val="accent1"/>
+          </a:fillRef>
+          <a:effectRef idx="0">
+            <a:schemeClr val="accent1"/>
+          </a:effectRef>
+          <a:fontRef idx="minor">
+            <a:schemeClr val="lt1"/>
+          </a:fontRef>
+        </p:style>
+        <p:txBody>
+          <a:bodyPr rtlCol="0" anchor="ctr"/>
+          <a:lstStyle/>
+          <a:p>
+            <a:pPr algn="ctr"/>
+            <a:r>
+              <a:rPr lang="en-CA" dirty="0"/>
+              <a:t>RF Regressor</a:t>
+            </a:r>
+          </a:p>
+        </p:txBody>
+      </p:sp>
+      <p:sp>
+        <p:nvSpPr>
+          <p:cNvPr id="14" name="Rectangle: Rounded Corners 13">
+            <a:extLst>
+              <a:ext uri="{FF2B5EF4-FFF2-40B4-BE49-F238E27FC236}">
+                <a16:creationId xmlns:a16="http://schemas.microsoft.com/office/drawing/2014/main" id="{2BE4F148-A39F-4375-B102-740C8A119CA2}"/>
+              </a:ext>
+            </a:extLst>
+          </p:cNvPr>
+          <p:cNvSpPr/>
+          <p:nvPr/>
+        </p:nvSpPr>
+        <p:spPr>
+          <a:xfrm>
+            <a:off x="5247861" y="3311869"/>
+            <a:ext cx="1646327" cy="795130"/>
+          </a:xfrm>
+          <a:prstGeom prst="roundRect">
+            <a:avLst/>
+          </a:prstGeom>
+        </p:spPr>
+        <p:style>
+          <a:lnRef idx="2">
+            <a:schemeClr val="accent1">
+              <a:shade val="50000"/>
+            </a:schemeClr>
+          </a:lnRef>
+          <a:fillRef idx="1">
+            <a:schemeClr val="accent1"/>
+          </a:fillRef>
+          <a:effectRef idx="0">
+            <a:schemeClr val="accent1"/>
+          </a:effectRef>
+          <a:fontRef idx="minor">
+            <a:schemeClr val="lt1"/>
+          </a:fontRef>
+        </p:style>
+        <p:txBody>
+          <a:bodyPr rtlCol="0" anchor="ctr"/>
+          <a:lstStyle/>
+          <a:p>
+            <a:pPr algn="ctr"/>
+            <a:r>
+              <a:rPr lang="en-CA" dirty="0"/>
+              <a:t>LSTM</a:t>
+            </a:r>
+          </a:p>
+        </p:txBody>
+      </p:sp>
     </p:spTree>
     <p:extLst>
       <p:ext uri="{BB962C8B-B14F-4D97-AF65-F5344CB8AC3E}">

</xml_diff>

<commit_message>
updated ppt and updated images
</commit_message>
<xml_diff>
--- a/Project 2 - Group 4.pptx
+++ b/Project 2 - Group 4.pptx
@@ -7,11 +7,11 @@
   <p:sldIdLst>
     <p:sldId id="257" r:id="rId2"/>
     <p:sldId id="260" r:id="rId3"/>
-    <p:sldId id="268" r:id="rId4"/>
-    <p:sldId id="262" r:id="rId5"/>
-    <p:sldId id="263" r:id="rId6"/>
-    <p:sldId id="265" r:id="rId7"/>
-    <p:sldId id="266" r:id="rId8"/>
+    <p:sldId id="262" r:id="rId4"/>
+    <p:sldId id="268" r:id="rId5"/>
+    <p:sldId id="270" r:id="rId6"/>
+    <p:sldId id="266" r:id="rId7"/>
+    <p:sldId id="263" r:id="rId8"/>
     <p:sldId id="267" r:id="rId9"/>
     <p:sldId id="269" r:id="rId10"/>
   </p:sldIdLst>
@@ -364,7 +364,7 @@
           <a:p>
             <a:fld id="{9184DA70-C731-4C70-880D-CCD4705E623C}" type="datetime1">
               <a:rPr lang="en-US" smtClean="0"/>
-              <a:t>9/29/2020</a:t>
+              <a:t>10/1/2020</a:t>
             </a:fld>
             <a:endParaRPr lang="en-US" dirty="0"/>
           </a:p>
@@ -552,7 +552,7 @@
           <a:p>
             <a:fld id="{B612A279-0833-481D-8C56-F67FD0AC6C50}" type="datetime1">
               <a:rPr lang="en-US" smtClean="0"/>
-              <a:t>9/29/2020</a:t>
+              <a:t>10/1/2020</a:t>
             </a:fld>
             <a:endParaRPr lang="en-US" dirty="0"/>
           </a:p>
@@ -794,7 +794,7 @@
           <a:p>
             <a:fld id="{6587DA83-5663-4C9C-B9AA-0B40A3DAFF81}" type="datetime1">
               <a:rPr lang="en-US" smtClean="0"/>
-              <a:t>9/29/2020</a:t>
+              <a:t>10/1/2020</a:t>
             </a:fld>
             <a:endParaRPr lang="en-US" dirty="0"/>
           </a:p>
@@ -982,7 +982,7 @@
           <a:p>
             <a:fld id="{4BE1D723-8F53-4F53-90B0-1982A396982E}" type="datetime1">
               <a:rPr lang="en-US" smtClean="0"/>
-              <a:t>9/29/2020</a:t>
+              <a:t>10/1/2020</a:t>
             </a:fld>
             <a:endParaRPr lang="en-US" dirty="0"/>
           </a:p>
@@ -1355,7 +1355,7 @@
           <a:p>
             <a:fld id="{97669AF7-7BEB-44E4-9852-375E34362B5B}" type="datetime1">
               <a:rPr lang="en-US" smtClean="0"/>
-              <a:t>9/29/2020</a:t>
+              <a:t>10/1/2020</a:t>
             </a:fld>
             <a:endParaRPr lang="en-US" dirty="0"/>
           </a:p>
@@ -1610,7 +1610,7 @@
           <a:p>
             <a:fld id="{BAAAC38D-0552-4C82-B593-E6124DFADBE2}" type="datetime1">
               <a:rPr lang="en-US" smtClean="0"/>
-              <a:t>9/29/2020</a:t>
+              <a:t>10/1/2020</a:t>
             </a:fld>
             <a:endParaRPr lang="en-US" dirty="0"/>
           </a:p>
@@ -2007,7 +2007,7 @@
           <a:p>
             <a:fld id="{D9DF0F1C-5577-4ACB-BB62-DF8F3C494C7E}" type="datetime1">
               <a:rPr lang="en-US" smtClean="0"/>
-              <a:t>9/29/2020</a:t>
+              <a:t>10/1/2020</a:t>
             </a:fld>
             <a:endParaRPr lang="en-US" dirty="0"/>
           </a:p>
@@ -2143,7 +2143,7 @@
           <a:p>
             <a:fld id="{1775B394-D9F9-4F0C-B15D-605F45CB9E9F}" type="datetime1">
               <a:rPr lang="en-US" smtClean="0"/>
-              <a:t>9/29/2020</a:t>
+              <a:t>10/1/2020</a:t>
             </a:fld>
             <a:endParaRPr lang="en-US" dirty="0"/>
           </a:p>
@@ -2300,7 +2300,7 @@
           <a:p>
             <a:fld id="{39667345-2558-425A-8533-9BFDBCE15005}" type="datetime1">
               <a:rPr lang="en-US" smtClean="0"/>
-              <a:t>9/29/2020</a:t>
+              <a:t>10/1/2020</a:t>
             </a:fld>
             <a:endParaRPr lang="en-US" dirty="0"/>
           </a:p>
@@ -2629,7 +2629,7 @@
           <a:p>
             <a:fld id="{92BEA474-078D-4E9B-9B14-09A87B19DC46}" type="datetime1">
               <a:rPr lang="en-US" smtClean="0"/>
-              <a:t>9/29/2020</a:t>
+              <a:t>10/1/2020</a:t>
             </a:fld>
             <a:endParaRPr lang="en-US" dirty="0"/>
           </a:p>
@@ -2979,7 +2979,7 @@
           <a:p>
             <a:fld id="{4907D986-8816-4272-A432-0437A28A9828}" type="datetime1">
               <a:rPr lang="en-US" smtClean="0"/>
-              <a:t>9/29/2020</a:t>
+              <a:t>10/1/2020</a:t>
             </a:fld>
             <a:endParaRPr lang="en-US" dirty="0"/>
           </a:p>
@@ -3240,7 +3240,7 @@
           <a:p>
             <a:fld id="{62D6E202-B606-4609-B914-27C9371A1F6D}" type="datetime1">
               <a:rPr lang="en-US" smtClean="0"/>
-              <a:t>9/29/2020</a:t>
+              <a:t>10/1/2020</a:t>
             </a:fld>
             <a:endParaRPr lang="en-US" dirty="0"/>
           </a:p>
@@ -3860,8 +3860,8 @@
           <a:lstStyle/>
           <a:p>
             <a:r>
-              <a:rPr lang="en-US" sz="5000" dirty="0"/>
-              <a:t>Sentiment Analysis of Twitter Data for predicting Apple stock price movements</a:t>
+              <a:rPr lang="en-US" sz="5400" dirty="0"/>
+              <a:t>Sentiment Analysis of Twitter Data for predicting Apple stock price</a:t>
             </a:r>
           </a:p>
         </p:txBody>
@@ -4087,6 +4087,51 @@
           <a:chExt cx="0" cy="0"/>
         </a:xfrm>
       </p:grpSpPr>
+      <p:pic>
+        <p:nvPicPr>
+          <p:cNvPr id="1026" name="Picture 2" descr="Apple (Canada)">
+            <a:extLst>
+              <a:ext uri="{FF2B5EF4-FFF2-40B4-BE49-F238E27FC236}">
+                <a16:creationId xmlns:a16="http://schemas.microsoft.com/office/drawing/2014/main" id="{D35FB8F2-5F32-4B67-9C72-C3670493FB5F}"/>
+              </a:ext>
+            </a:extLst>
+          </p:cNvPr>
+          <p:cNvPicPr>
+            <a:picLocks noChangeAspect="1" noChangeArrowheads="1"/>
+          </p:cNvPicPr>
+          <p:nvPr/>
+        </p:nvPicPr>
+        <p:blipFill rotWithShape="1">
+          <a:blip r:embed="rId2">
+            <a:extLst>
+              <a:ext uri="{28A0092B-C50C-407E-A947-70E740481C1C}">
+                <a14:useLocalDpi xmlns:a14="http://schemas.microsoft.com/office/drawing/2010/main" val="0"/>
+              </a:ext>
+            </a:extLst>
+          </a:blip>
+          <a:srcRect l="33655" t="17503" r="34783" b="18059"/>
+          <a:stretch/>
+        </p:blipFill>
+        <p:spPr bwMode="auto">
+          <a:xfrm>
+            <a:off x="11224590" y="1476667"/>
+            <a:ext cx="649353" cy="696020"/>
+          </a:xfrm>
+          <a:prstGeom prst="rect">
+            <a:avLst/>
+          </a:prstGeom>
+          <a:noFill/>
+          <a:extLst>
+            <a:ext uri="{909E8E84-426E-40DD-AFC4-6F175D3DCCD1}">
+              <a14:hiddenFill xmlns:a14="http://schemas.microsoft.com/office/drawing/2010/main">
+                <a:solidFill>
+                  <a:srgbClr val="FFFFFF"/>
+                </a:solidFill>
+              </a14:hiddenFill>
+            </a:ext>
+          </a:extLst>
+        </p:spPr>
+      </p:pic>
       <p:sp>
         <p:nvSpPr>
           <p:cNvPr id="6" name="Title 2">
@@ -4105,7 +4150,7 @@
         </p:nvSpPr>
         <p:spPr>
           <a:xfrm>
-            <a:off x="6095997" y="540243"/>
+            <a:off x="6095997" y="2983156"/>
             <a:ext cx="5251451" cy="779376"/>
           </a:xfrm>
         </p:spPr>
@@ -4116,12 +4161,12 @@
           <a:lstStyle/>
           <a:p>
             <a:r>
-              <a:rPr lang="en-US" sz="3200" dirty="0">
+              <a:rPr lang="en-US" sz="3200" b="1" dirty="0">
                 <a:solidFill>
                   <a:schemeClr val="tx1"/>
                 </a:solidFill>
               </a:rPr>
-              <a:t>SUMMARY</a:t>
+              <a:t>WHY Twitter?</a:t>
             </a:r>
           </a:p>
         </p:txBody>
@@ -4142,7 +4187,7 @@
         </p:nvSpPr>
         <p:spPr>
           <a:xfrm>
-            <a:off x="6095997" y="3720322"/>
+            <a:off x="6095997" y="437669"/>
             <a:ext cx="5453270" cy="696020"/>
           </a:xfrm>
           <a:prstGeom prst="rect">
@@ -4174,10 +4219,10 @@
           </a:lstStyle>
           <a:p>
             <a:r>
-              <a:rPr lang="en-US" sz="3300" dirty="0"/>
+              <a:rPr lang="en-US" sz="3300" b="1" dirty="0"/>
               <a:t>Core Message</a:t>
             </a:r>
-            <a:endParaRPr lang="en-US" sz="3600" dirty="0"/>
+            <a:endParaRPr lang="en-US" sz="3600" b="1" dirty="0"/>
           </a:p>
         </p:txBody>
       </p:sp>
@@ -4197,8 +4242,8 @@
         </p:nvSpPr>
         <p:spPr>
           <a:xfrm>
-            <a:off x="6095997" y="4101190"/>
-            <a:ext cx="5897218" cy="2122057"/>
+            <a:off x="6095997" y="925602"/>
+            <a:ext cx="5897218" cy="1770898"/>
           </a:xfrm>
           <a:prstGeom prst="rect">
             <a:avLst/>
@@ -4391,42 +4436,57 @@
             </a:lvl9pPr>
           </a:lstStyle>
           <a:p>
-            <a:r>
-              <a:rPr lang="en-CA" dirty="0">
+            <a:pPr>
+              <a:spcBef>
+                <a:spcPts val="0"/>
+              </a:spcBef>
+            </a:pPr>
+            <a:r>
+              <a:rPr lang="en-CA" sz="3200" spc="0" dirty="0">
                 <a:solidFill>
                   <a:schemeClr val="tx1"/>
                 </a:solidFill>
+                <a:latin typeface="Times New Roman" panose="02020603050405020304" pitchFamily="18" charset="0"/>
+                <a:cs typeface="Times New Roman" panose="02020603050405020304" pitchFamily="18" charset="0"/>
               </a:rPr>
               <a:t>To </a:t>
             </a:r>
             <a:r>
-              <a:rPr lang="en-US" dirty="0">
+              <a:rPr lang="en-US" sz="3200" spc="0" dirty="0">
                 <a:solidFill>
                   <a:schemeClr val="tx1"/>
                 </a:solidFill>
+                <a:latin typeface="Times New Roman" panose="02020603050405020304" pitchFamily="18" charset="0"/>
+                <a:cs typeface="Times New Roman" panose="02020603050405020304" pitchFamily="18" charset="0"/>
               </a:rPr>
-              <a:t>analyze how Twitter sentiment affects the movement in price of Apple stock (“</a:t>
-            </a:r>
-            <a:r>
-              <a:rPr lang="en-US" b="1" dirty="0">
+              <a:t>analyze how Twitter sentiment affects the price of Apple stock (“</a:t>
+            </a:r>
+            <a:r>
+              <a:rPr lang="en-US" sz="3200" b="1" spc="0" dirty="0">
                 <a:solidFill>
                   <a:schemeClr val="tx1"/>
                 </a:solidFill>
+                <a:latin typeface="Times New Roman" panose="02020603050405020304" pitchFamily="18" charset="0"/>
+                <a:cs typeface="Times New Roman" panose="02020603050405020304" pitchFamily="18" charset="0"/>
               </a:rPr>
-              <a:t>APPL</a:t>
-            </a:r>
-            <a:r>
-              <a:rPr lang="en-US" dirty="0">
+              <a:t>AAPL</a:t>
+            </a:r>
+            <a:r>
+              <a:rPr lang="en-US" sz="3200" spc="0" dirty="0">
                 <a:solidFill>
                   <a:schemeClr val="tx1"/>
                 </a:solidFill>
+                <a:latin typeface="Times New Roman" panose="02020603050405020304" pitchFamily="18" charset="0"/>
+                <a:cs typeface="Times New Roman" panose="02020603050405020304" pitchFamily="18" charset="0"/>
               </a:rPr>
               <a:t>”)</a:t>
             </a:r>
-            <a:endParaRPr lang="en-CA" dirty="0">
+            <a:endParaRPr lang="en-CA" sz="3200" spc="0" dirty="0">
               <a:solidFill>
                 <a:schemeClr val="tx1"/>
               </a:solidFill>
+              <a:latin typeface="Times New Roman" panose="02020603050405020304" pitchFamily="18" charset="0"/>
+              <a:cs typeface="Times New Roman" panose="02020603050405020304" pitchFamily="18" charset="0"/>
             </a:endParaRPr>
           </a:p>
         </p:txBody>
@@ -4447,8 +4507,8 @@
         </p:nvSpPr>
         <p:spPr>
           <a:xfrm>
-            <a:off x="6095997" y="1243259"/>
-            <a:ext cx="5897218" cy="2122057"/>
+            <a:off x="6109249" y="3757941"/>
+            <a:ext cx="5897218" cy="1770898"/>
           </a:xfrm>
           <a:prstGeom prst="rect">
             <a:avLst/>
@@ -4642,34 +4702,15 @@
           </a:lstStyle>
           <a:p>
             <a:r>
-              <a:rPr lang="en-CA" dirty="0">
+              <a:rPr lang="en-US" sz="3200" spc="0" dirty="0">
                 <a:solidFill>
                   <a:schemeClr val="tx1"/>
                 </a:solidFill>
+                <a:latin typeface="Times New Roman" panose="02020603050405020304" pitchFamily="18" charset="0"/>
+                <a:cs typeface="Times New Roman" panose="02020603050405020304" pitchFamily="18" charset="0"/>
               </a:rPr>
-              <a:t>This project analyzes </a:t>
-            </a:r>
-            <a:r>
-              <a:rPr lang="en-US" dirty="0">
-                <a:solidFill>
-                  <a:schemeClr val="tx1"/>
-                </a:solidFill>
-              </a:rPr>
-              <a:t>whether social media, representative of public sentiment affects the movement in stock price</a:t>
-            </a:r>
-            <a:r>
-              <a:rPr lang="en-CA" dirty="0">
-                <a:solidFill>
-                  <a:schemeClr val="tx1"/>
-                </a:solidFill>
-              </a:rPr>
-              <a:t> </a:t>
-            </a:r>
-            <a:endParaRPr lang="en-US" dirty="0">
-              <a:solidFill>
-                <a:schemeClr val="tx1"/>
-              </a:solidFill>
-            </a:endParaRPr>
+              <a:t>Twitter is a rich source of real-time information regarding current societal trends and opinions.</a:t>
+            </a:r>
           </a:p>
         </p:txBody>
       </p:sp>
@@ -4688,7 +4729,7 @@
           <p:nvPr/>
         </p:nvPicPr>
         <p:blipFill rotWithShape="1">
-          <a:blip r:embed="rId2">
+          <a:blip r:embed="rId3">
             <a:extLst>
               <a:ext uri="{28A0092B-C50C-407E-A947-70E740481C1C}">
                 <a14:useLocalDpi xmlns:a14="http://schemas.microsoft.com/office/drawing/2010/main" val="0"/>
@@ -4706,6 +4747,53 @@
           <a:prstGeom prst="rect">
             <a:avLst/>
           </a:prstGeom>
+        </p:spPr>
+      </p:pic>
+      <p:pic>
+        <p:nvPicPr>
+          <p:cNvPr id="1028" name="Picture 4" descr="Twitter (@Twitter) | Twitter">
+            <a:extLst>
+              <a:ext uri="{FF2B5EF4-FFF2-40B4-BE49-F238E27FC236}">
+                <a16:creationId xmlns:a16="http://schemas.microsoft.com/office/drawing/2014/main" id="{D5408E74-C283-4ADC-837B-8CFBFA4A3796}"/>
+              </a:ext>
+            </a:extLst>
+          </p:cNvPr>
+          <p:cNvPicPr>
+            <a:picLocks noChangeAspect="1" noChangeArrowheads="1"/>
+          </p:cNvPicPr>
+          <p:nvPr/>
+        </p:nvPicPr>
+        <p:blipFill>
+          <a:blip r:embed="rId4">
+            <a:extLst>
+              <a:ext uri="{28A0092B-C50C-407E-A947-70E740481C1C}">
+                <a14:useLocalDpi xmlns:a14="http://schemas.microsoft.com/office/drawing/2010/main" val="0"/>
+              </a:ext>
+            </a:extLst>
+          </a:blip>
+          <a:srcRect/>
+          <a:stretch>
+            <a:fillRect/>
+          </a:stretch>
+        </p:blipFill>
+        <p:spPr bwMode="auto">
+          <a:xfrm>
+            <a:off x="10672261" y="5381333"/>
+            <a:ext cx="1334206" cy="1334206"/>
+          </a:xfrm>
+          <a:prstGeom prst="rect">
+            <a:avLst/>
+          </a:prstGeom>
+          <a:noFill/>
+          <a:extLst>
+            <a:ext uri="{909E8E84-426E-40DD-AFC4-6F175D3DCCD1}">
+              <a14:hiddenFill xmlns:a14="http://schemas.microsoft.com/office/drawing/2010/main">
+                <a:solidFill>
+                  <a:srgbClr val="FFFFFF"/>
+                </a:solidFill>
+              </a14:hiddenFill>
+            </a:ext>
+          </a:extLst>
         </p:spPr>
       </p:pic>
     </p:spTree>
@@ -4740,172 +4828,10 @@
       </p:grpSpPr>
       <p:sp>
         <p:nvSpPr>
-          <p:cNvPr id="2" name="Title 1">
-            <a:extLst>
-              <a:ext uri="{FF2B5EF4-FFF2-40B4-BE49-F238E27FC236}">
-                <a16:creationId xmlns:a16="http://schemas.microsoft.com/office/drawing/2014/main" id="{66C66C3D-D740-442D-8E05-7FA499A836C1}"/>
-              </a:ext>
-            </a:extLst>
-          </p:cNvPr>
-          <p:cNvSpPr>
-            <a:spLocks noGrp="1"/>
-          </p:cNvSpPr>
-          <p:nvPr>
-            <p:ph type="title"/>
-          </p:nvPr>
-        </p:nvSpPr>
-        <p:spPr>
-          <a:xfrm>
-            <a:off x="643466" y="786384"/>
-            <a:ext cx="3517567" cy="1546000"/>
-          </a:xfrm>
-        </p:spPr>
-        <p:txBody>
-          <a:bodyPr>
-            <a:noAutofit/>
-          </a:bodyPr>
-          <a:lstStyle/>
-          <a:p>
-            <a:r>
-              <a:rPr lang="en-CA" sz="4000" b="1" dirty="0"/>
-              <a:t>Model Summary</a:t>
-            </a:r>
-            <a:br>
-              <a:rPr lang="en-CA" sz="4000" dirty="0"/>
-            </a:br>
-            <a:endParaRPr lang="en-CA" sz="4000" dirty="0"/>
-          </a:p>
-        </p:txBody>
-      </p:sp>
-      <p:sp>
-        <p:nvSpPr>
-          <p:cNvPr id="3" name="Content Placeholder 2">
-            <a:extLst>
-              <a:ext uri="{FF2B5EF4-FFF2-40B4-BE49-F238E27FC236}">
-                <a16:creationId xmlns:a16="http://schemas.microsoft.com/office/drawing/2014/main" id="{723B0F60-545D-4AEC-B5CC-E6AD61AD23F5}"/>
-              </a:ext>
-            </a:extLst>
-          </p:cNvPr>
-          <p:cNvSpPr>
-            <a:spLocks noGrp="1"/>
-          </p:cNvSpPr>
-          <p:nvPr>
-            <p:ph idx="1"/>
-          </p:nvPr>
-        </p:nvSpPr>
-        <p:spPr/>
-        <p:txBody>
-          <a:bodyPr/>
-          <a:lstStyle/>
-          <a:p>
-            <a:endParaRPr lang="en-CA" dirty="0"/>
-          </a:p>
-        </p:txBody>
-      </p:sp>
-      <p:sp>
-        <p:nvSpPr>
-          <p:cNvPr id="4" name="Text Placeholder 3">
-            <a:extLst>
-              <a:ext uri="{FF2B5EF4-FFF2-40B4-BE49-F238E27FC236}">
-                <a16:creationId xmlns:a16="http://schemas.microsoft.com/office/drawing/2014/main" id="{77C772A2-1719-4DB2-B52A-3DEB9EDE685E}"/>
-              </a:ext>
-            </a:extLst>
-          </p:cNvPr>
-          <p:cNvSpPr>
-            <a:spLocks noGrp="1"/>
-          </p:cNvSpPr>
-          <p:nvPr>
-            <p:ph type="body" sz="half" idx="2"/>
-          </p:nvPr>
-        </p:nvSpPr>
-        <p:spPr>
-          <a:xfrm>
-            <a:off x="643465" y="2199858"/>
-            <a:ext cx="3517567" cy="3697359"/>
-          </a:xfrm>
-        </p:spPr>
-        <p:txBody>
-          <a:bodyPr>
-            <a:normAutofit lnSpcReduction="10000"/>
-          </a:bodyPr>
-          <a:lstStyle/>
-          <a:p>
-            <a:r>
-              <a:rPr lang="en-CA" sz="2100" b="1" dirty="0"/>
-              <a:t>Regressor Approach</a:t>
-            </a:r>
-          </a:p>
-          <a:p>
-            <a:pPr marL="285750" indent="-285750">
-              <a:buFontTx/>
-              <a:buChar char="-"/>
-            </a:pPr>
-            <a:r>
-              <a:rPr lang="en-CA" dirty="0"/>
-              <a:t>LSTM</a:t>
-            </a:r>
-          </a:p>
-          <a:p>
-            <a:pPr marL="285750" indent="-285750">
-              <a:buFontTx/>
-              <a:buChar char="-"/>
-            </a:pPr>
-            <a:r>
-              <a:rPr lang="en-CA" dirty="0"/>
-              <a:t>Random Forest Regressor</a:t>
-            </a:r>
-          </a:p>
-          <a:p>
-            <a:pPr marL="285750" indent="-285750">
-              <a:buFontTx/>
-              <a:buChar char="-"/>
-            </a:pPr>
-            <a:r>
-              <a:rPr lang="en-CA" dirty="0"/>
-              <a:t>XG Boost</a:t>
-            </a:r>
-          </a:p>
-          <a:p>
-            <a:pPr marL="285750" indent="-285750">
-              <a:buFontTx/>
-              <a:buChar char="-"/>
-            </a:pPr>
-            <a:endParaRPr lang="en-CA" dirty="0"/>
-          </a:p>
-          <a:p>
-            <a:r>
-              <a:rPr lang="en-CA" sz="2100" b="1" dirty="0"/>
-              <a:t>Classification Approach</a:t>
-            </a:r>
-          </a:p>
-          <a:p>
-            <a:pPr marL="285750" indent="-285750">
-              <a:buFontTx/>
-              <a:buChar char="-"/>
-            </a:pPr>
-            <a:r>
-              <a:rPr lang="en-CA" dirty="0"/>
-              <a:t>Random Forest Classifier</a:t>
-            </a:r>
-          </a:p>
-          <a:p>
-            <a:pPr marL="285750" indent="-285750">
-              <a:buFontTx/>
-              <a:buChar char="-"/>
-            </a:pPr>
-            <a:r>
-              <a:rPr lang="en-CA" dirty="0"/>
-              <a:t>Gradient Booster</a:t>
-            </a:r>
-          </a:p>
-        </p:txBody>
-      </p:sp>
-      <p:sp>
-        <p:nvSpPr>
-          <p:cNvPr id="5" name="Title 2">
-            <a:extLst>
-              <a:ext uri="{FF2B5EF4-FFF2-40B4-BE49-F238E27FC236}">
-                <a16:creationId xmlns:a16="http://schemas.microsoft.com/office/drawing/2014/main" id="{CEB7A092-682E-4FA5-A15C-1BFB6C6706DA}"/>
+          <p:cNvPr id="2" name="Text Placeholder 3">
+            <a:extLst>
+              <a:ext uri="{FF2B5EF4-FFF2-40B4-BE49-F238E27FC236}">
+                <a16:creationId xmlns:a16="http://schemas.microsoft.com/office/drawing/2014/main" id="{30DC66C4-6C3F-45ED-A950-A55681BAC970}"/>
               </a:ext>
             </a:extLst>
           </p:cNvPr>
@@ -4916,16 +4842,383 @@
         </p:nvSpPr>
         <p:spPr>
           <a:xfrm>
-            <a:off x="6095998" y="463213"/>
-            <a:ext cx="5126184" cy="517448"/>
+            <a:off x="5367893" y="1418377"/>
+            <a:ext cx="6731342" cy="5074498"/>
           </a:xfrm>
           <a:prstGeom prst="rect">
             <a:avLst/>
           </a:prstGeom>
         </p:spPr>
         <p:txBody>
+          <a:bodyPr vert="horz" lIns="91440" tIns="45720" rIns="91440" bIns="45720" rtlCol="0" anchor="ctr">
+            <a:normAutofit/>
+          </a:bodyPr>
+          <a:lstStyle>
+            <a:lvl1pPr marL="0" indent="0" algn="l" defTabSz="914400" rtl="0" eaLnBrk="1" latinLnBrk="0" hangingPunct="1">
+              <a:lnSpc>
+                <a:spcPct val="100000"/>
+              </a:lnSpc>
+              <a:spcBef>
+                <a:spcPts val="1000"/>
+              </a:spcBef>
+              <a:buFont typeface="Arial" panose="020B0604020202020204" pitchFamily="34" charset="0"/>
+              <a:buNone/>
+              <a:defRPr sz="2400" kern="1200" spc="600">
+                <a:solidFill>
+                  <a:schemeClr val="tx1">
+                    <a:tint val="75000"/>
+                  </a:schemeClr>
+                </a:solidFill>
+                <a:latin typeface="+mn-lt"/>
+                <a:ea typeface="+mn-ea"/>
+                <a:cs typeface="+mn-cs"/>
+              </a:defRPr>
+            </a:lvl1pPr>
+            <a:lvl2pPr marL="457200" indent="0" algn="l" defTabSz="914400" rtl="0" eaLnBrk="1" latinLnBrk="0" hangingPunct="1">
+              <a:lnSpc>
+                <a:spcPct val="150000"/>
+              </a:lnSpc>
+              <a:spcBef>
+                <a:spcPts val="500"/>
+              </a:spcBef>
+              <a:buFont typeface="Arial" panose="020B0604020202020204" pitchFamily="34" charset="0"/>
+              <a:buNone/>
+              <a:defRPr sz="2000" kern="1200">
+                <a:solidFill>
+                  <a:schemeClr val="tx1">
+                    <a:tint val="75000"/>
+                  </a:schemeClr>
+                </a:solidFill>
+                <a:latin typeface="+mn-lt"/>
+                <a:ea typeface="+mn-ea"/>
+                <a:cs typeface="+mn-cs"/>
+              </a:defRPr>
+            </a:lvl2pPr>
+            <a:lvl3pPr marL="914400" indent="0" algn="l" defTabSz="914400" rtl="0" eaLnBrk="1" latinLnBrk="0" hangingPunct="1">
+              <a:lnSpc>
+                <a:spcPct val="150000"/>
+              </a:lnSpc>
+              <a:spcBef>
+                <a:spcPts val="500"/>
+              </a:spcBef>
+              <a:buFont typeface="Arial" panose="020B0604020202020204" pitchFamily="34" charset="0"/>
+              <a:buNone/>
+              <a:defRPr sz="1800" kern="1200">
+                <a:solidFill>
+                  <a:schemeClr val="tx1">
+                    <a:tint val="75000"/>
+                  </a:schemeClr>
+                </a:solidFill>
+                <a:latin typeface="+mn-lt"/>
+                <a:ea typeface="+mn-ea"/>
+                <a:cs typeface="+mn-cs"/>
+              </a:defRPr>
+            </a:lvl3pPr>
+            <a:lvl4pPr marL="1371600" indent="0" algn="l" defTabSz="914400" rtl="0" eaLnBrk="1" latinLnBrk="0" hangingPunct="1">
+              <a:lnSpc>
+                <a:spcPct val="150000"/>
+              </a:lnSpc>
+              <a:spcBef>
+                <a:spcPts val="500"/>
+              </a:spcBef>
+              <a:buFont typeface="Arial" panose="020B0604020202020204" pitchFamily="34" charset="0"/>
+              <a:buNone/>
+              <a:defRPr sz="1600" kern="1200">
+                <a:solidFill>
+                  <a:schemeClr val="tx1">
+                    <a:tint val="75000"/>
+                  </a:schemeClr>
+                </a:solidFill>
+                <a:latin typeface="+mn-lt"/>
+                <a:ea typeface="+mn-ea"/>
+                <a:cs typeface="+mn-cs"/>
+              </a:defRPr>
+            </a:lvl4pPr>
+            <a:lvl5pPr marL="1828800" indent="0" algn="l" defTabSz="914400" rtl="0" eaLnBrk="1" latinLnBrk="0" hangingPunct="1">
+              <a:lnSpc>
+                <a:spcPct val="150000"/>
+              </a:lnSpc>
+              <a:spcBef>
+                <a:spcPts val="500"/>
+              </a:spcBef>
+              <a:buFont typeface="Arial" panose="020B0604020202020204" pitchFamily="34" charset="0"/>
+              <a:buNone/>
+              <a:defRPr sz="1600" kern="1200">
+                <a:solidFill>
+                  <a:schemeClr val="tx1">
+                    <a:tint val="75000"/>
+                  </a:schemeClr>
+                </a:solidFill>
+                <a:latin typeface="+mn-lt"/>
+                <a:ea typeface="+mn-ea"/>
+                <a:cs typeface="+mn-cs"/>
+              </a:defRPr>
+            </a:lvl5pPr>
+            <a:lvl6pPr marL="2286000" indent="0" algn="l" defTabSz="914400" rtl="0" eaLnBrk="1" latinLnBrk="0" hangingPunct="1">
+              <a:lnSpc>
+                <a:spcPct val="90000"/>
+              </a:lnSpc>
+              <a:spcBef>
+                <a:spcPts val="500"/>
+              </a:spcBef>
+              <a:buFont typeface="Arial" panose="020B0604020202020204" pitchFamily="34" charset="0"/>
+              <a:buNone/>
+              <a:defRPr sz="1600" kern="1200">
+                <a:solidFill>
+                  <a:schemeClr val="tx1">
+                    <a:tint val="75000"/>
+                  </a:schemeClr>
+                </a:solidFill>
+                <a:latin typeface="+mn-lt"/>
+                <a:ea typeface="+mn-ea"/>
+                <a:cs typeface="+mn-cs"/>
+              </a:defRPr>
+            </a:lvl6pPr>
+            <a:lvl7pPr marL="2743200" indent="0" algn="l" defTabSz="914400" rtl="0" eaLnBrk="1" latinLnBrk="0" hangingPunct="1">
+              <a:lnSpc>
+                <a:spcPct val="90000"/>
+              </a:lnSpc>
+              <a:spcBef>
+                <a:spcPts val="500"/>
+              </a:spcBef>
+              <a:buFont typeface="Arial" panose="020B0604020202020204" pitchFamily="34" charset="0"/>
+              <a:buNone/>
+              <a:defRPr sz="1600" kern="1200">
+                <a:solidFill>
+                  <a:schemeClr val="tx1">
+                    <a:tint val="75000"/>
+                  </a:schemeClr>
+                </a:solidFill>
+                <a:latin typeface="+mn-lt"/>
+                <a:ea typeface="+mn-ea"/>
+                <a:cs typeface="+mn-cs"/>
+              </a:defRPr>
+            </a:lvl7pPr>
+            <a:lvl8pPr marL="3200400" indent="0" algn="l" defTabSz="914400" rtl="0" eaLnBrk="1" latinLnBrk="0" hangingPunct="1">
+              <a:lnSpc>
+                <a:spcPct val="90000"/>
+              </a:lnSpc>
+              <a:spcBef>
+                <a:spcPts val="500"/>
+              </a:spcBef>
+              <a:buFont typeface="Arial" panose="020B0604020202020204" pitchFamily="34" charset="0"/>
+              <a:buNone/>
+              <a:defRPr sz="1600" kern="1200">
+                <a:solidFill>
+                  <a:schemeClr val="tx1">
+                    <a:tint val="75000"/>
+                  </a:schemeClr>
+                </a:solidFill>
+                <a:latin typeface="+mn-lt"/>
+                <a:ea typeface="+mn-ea"/>
+                <a:cs typeface="+mn-cs"/>
+              </a:defRPr>
+            </a:lvl8pPr>
+            <a:lvl9pPr marL="3657600" indent="0" algn="l" defTabSz="914400" rtl="0" eaLnBrk="1" latinLnBrk="0" hangingPunct="1">
+              <a:lnSpc>
+                <a:spcPct val="90000"/>
+              </a:lnSpc>
+              <a:spcBef>
+                <a:spcPts val="500"/>
+              </a:spcBef>
+              <a:buFont typeface="Arial" panose="020B0604020202020204" pitchFamily="34" charset="0"/>
+              <a:buNone/>
+              <a:defRPr sz="1600" kern="1200">
+                <a:solidFill>
+                  <a:schemeClr val="tx1">
+                    <a:tint val="75000"/>
+                  </a:schemeClr>
+                </a:solidFill>
+                <a:latin typeface="+mn-lt"/>
+                <a:ea typeface="+mn-ea"/>
+                <a:cs typeface="+mn-cs"/>
+              </a:defRPr>
+            </a:lvl9pPr>
+          </a:lstStyle>
+          <a:p>
+            <a:r>
+              <a:rPr lang="en-CA" b="1" spc="0" dirty="0">
+                <a:solidFill>
+                  <a:schemeClr val="tx1"/>
+                </a:solidFill>
+                <a:latin typeface="Times New Roman" panose="02020603050405020304" pitchFamily="18" charset="0"/>
+                <a:cs typeface="Times New Roman" panose="02020603050405020304" pitchFamily="18" charset="0"/>
+              </a:rPr>
+              <a:t>Twitter Data: </a:t>
+            </a:r>
+            <a:r>
+              <a:rPr lang="en-CA" spc="0" dirty="0">
+                <a:solidFill>
+                  <a:schemeClr val="tx1"/>
+                </a:solidFill>
+                <a:latin typeface="Times New Roman" panose="02020603050405020304" pitchFamily="18" charset="0"/>
+                <a:cs typeface="Times New Roman" panose="02020603050405020304" pitchFamily="18" charset="0"/>
+              </a:rPr>
+              <a:t>Data from Kaggle </a:t>
+            </a:r>
+            <a:r>
+              <a:rPr lang="en-CA" sz="1900" i="1" spc="0" dirty="0">
+                <a:solidFill>
+                  <a:schemeClr val="tx1"/>
+                </a:solidFill>
+                <a:latin typeface="Times New Roman" panose="02020603050405020304" pitchFamily="18" charset="0"/>
+                <a:cs typeface="Times New Roman" panose="02020603050405020304" pitchFamily="18" charset="0"/>
+              </a:rPr>
+              <a:t>(</a:t>
+            </a:r>
+            <a:r>
+              <a:rPr lang="en-CA" sz="1900" i="1" spc="0" dirty="0">
+                <a:solidFill>
+                  <a:schemeClr val="tx1"/>
+                </a:solidFill>
+                <a:latin typeface="Times New Roman" panose="02020603050405020304" pitchFamily="18" charset="0"/>
+                <a:cs typeface="Times New Roman" panose="02020603050405020304" pitchFamily="18" charset="0"/>
+                <a:hlinkClick r:id="rId2"/>
+              </a:rPr>
+              <a:t>https://www.kaggle.com/nadun94/twitter-sentiments-aapl-stock</a:t>
+            </a:r>
+            <a:r>
+              <a:rPr lang="en-CA" sz="1900" i="1" spc="0" dirty="0">
+                <a:solidFill>
+                  <a:schemeClr val="tx1"/>
+                </a:solidFill>
+                <a:latin typeface="Times New Roman" panose="02020603050405020304" pitchFamily="18" charset="0"/>
+                <a:cs typeface="Times New Roman" panose="02020603050405020304" pitchFamily="18" charset="0"/>
+              </a:rPr>
+              <a:t>)</a:t>
+            </a:r>
+          </a:p>
+          <a:p>
+            <a:br>
+              <a:rPr lang="en-CA" spc="0" dirty="0">
+                <a:solidFill>
+                  <a:schemeClr val="tx1"/>
+                </a:solidFill>
+                <a:latin typeface="Times New Roman" panose="02020603050405020304" pitchFamily="18" charset="0"/>
+                <a:cs typeface="Times New Roman" panose="02020603050405020304" pitchFamily="18" charset="0"/>
+              </a:rPr>
+            </a:br>
+            <a:r>
+              <a:rPr lang="en-CA" b="1" spc="0" dirty="0">
+                <a:solidFill>
+                  <a:schemeClr val="tx1"/>
+                </a:solidFill>
+                <a:latin typeface="Times New Roman" panose="02020603050405020304" pitchFamily="18" charset="0"/>
+                <a:cs typeface="Times New Roman" panose="02020603050405020304" pitchFamily="18" charset="0"/>
+              </a:rPr>
+              <a:t>Stock Data: </a:t>
+            </a:r>
+            <a:r>
+              <a:rPr lang="en-CA" spc="0" dirty="0">
+                <a:solidFill>
+                  <a:schemeClr val="tx1"/>
+                </a:solidFill>
+                <a:latin typeface="Times New Roman" panose="02020603050405020304" pitchFamily="18" charset="0"/>
+                <a:cs typeface="Times New Roman" panose="02020603050405020304" pitchFamily="18" charset="0"/>
+              </a:rPr>
+              <a:t>Stock Price of Apple from Yahoo Finance.</a:t>
+            </a:r>
+          </a:p>
+          <a:p>
+            <a:br>
+              <a:rPr lang="en-CA" spc="0" dirty="0">
+                <a:solidFill>
+                  <a:schemeClr val="tx1"/>
+                </a:solidFill>
+                <a:latin typeface="Times New Roman" panose="02020603050405020304" pitchFamily="18" charset="0"/>
+                <a:cs typeface="Times New Roman" panose="02020603050405020304" pitchFamily="18" charset="0"/>
+              </a:rPr>
+            </a:br>
+            <a:r>
+              <a:rPr lang="en-CA" b="1" spc="0" dirty="0">
+                <a:solidFill>
+                  <a:schemeClr val="tx1"/>
+                </a:solidFill>
+                <a:latin typeface="Times New Roman" panose="02020603050405020304" pitchFamily="18" charset="0"/>
+                <a:cs typeface="Times New Roman" panose="02020603050405020304" pitchFamily="18" charset="0"/>
+              </a:rPr>
+              <a:t>Machine Learning Models: </a:t>
+            </a:r>
+            <a:r>
+              <a:rPr lang="en-CA" spc="0" dirty="0">
+                <a:solidFill>
+                  <a:schemeClr val="tx1"/>
+                </a:solidFill>
+                <a:latin typeface="Times New Roman" panose="02020603050405020304" pitchFamily="18" charset="0"/>
+                <a:cs typeface="Times New Roman" panose="02020603050405020304" pitchFamily="18" charset="0"/>
+              </a:rPr>
+              <a:t>Time Series Models, LSTM and XG Boost to fit the data and compare performance between models.</a:t>
+            </a:r>
+          </a:p>
+          <a:p>
+            <a:br>
+              <a:rPr lang="en-CA" spc="0" dirty="0">
+                <a:solidFill>
+                  <a:schemeClr val="tx1"/>
+                </a:solidFill>
+                <a:latin typeface="Times New Roman" panose="02020603050405020304" pitchFamily="18" charset="0"/>
+                <a:cs typeface="Times New Roman" panose="02020603050405020304" pitchFamily="18" charset="0"/>
+              </a:rPr>
+            </a:br>
+            <a:r>
+              <a:rPr lang="en-CA" b="1" spc="0" dirty="0">
+                <a:solidFill>
+                  <a:schemeClr val="tx1"/>
+                </a:solidFill>
+                <a:latin typeface="Times New Roman" panose="02020603050405020304" pitchFamily="18" charset="0"/>
+                <a:cs typeface="Times New Roman" panose="02020603050405020304" pitchFamily="18" charset="0"/>
+              </a:rPr>
+              <a:t>Data Visualization: </a:t>
+            </a:r>
+            <a:r>
+              <a:rPr lang="en-CA" spc="0" dirty="0" err="1">
+                <a:solidFill>
+                  <a:schemeClr val="tx1"/>
+                </a:solidFill>
+                <a:latin typeface="Times New Roman" panose="02020603050405020304" pitchFamily="18" charset="0"/>
+                <a:cs typeface="Times New Roman" panose="02020603050405020304" pitchFamily="18" charset="0"/>
+              </a:rPr>
+              <a:t>hvPlot</a:t>
+            </a:r>
+            <a:r>
+              <a:rPr lang="en-CA" spc="0" dirty="0">
+                <a:solidFill>
+                  <a:schemeClr val="tx1"/>
+                </a:solidFill>
+                <a:latin typeface="Times New Roman" panose="02020603050405020304" pitchFamily="18" charset="0"/>
+                <a:cs typeface="Times New Roman" panose="02020603050405020304" pitchFamily="18" charset="0"/>
+              </a:rPr>
+              <a:t> and Matplotlib. </a:t>
+            </a:r>
+          </a:p>
+        </p:txBody>
+      </p:sp>
+      <p:sp>
+        <p:nvSpPr>
+          <p:cNvPr id="12" name="Title 7">
+            <a:extLst>
+              <a:ext uri="{FF2B5EF4-FFF2-40B4-BE49-F238E27FC236}">
+                <a16:creationId xmlns:a16="http://schemas.microsoft.com/office/drawing/2014/main" id="{71520384-A28C-4951-BA9F-337FAB2E7F09}"/>
+              </a:ext>
+            </a:extLst>
+          </p:cNvPr>
+          <p:cNvSpPr txBox="1">
+            <a:spLocks/>
+          </p:cNvSpPr>
+          <p:nvPr/>
+        </p:nvSpPr>
+        <p:spPr>
+          <a:xfrm>
+            <a:off x="5658932" y="365125"/>
+            <a:ext cx="6043246" cy="872832"/>
+          </a:xfrm>
+          <a:prstGeom prst="rect">
+            <a:avLst/>
+          </a:prstGeom>
+        </p:spPr>
+        <p:txBody>
           <a:bodyPr vert="horz" lIns="91440" tIns="45720" rIns="91440" bIns="45720" rtlCol="0" anchor="b">
-            <a:noAutofit/>
+            <a:normAutofit/>
           </a:bodyPr>
           <a:lstStyle>
             <a:lvl1pPr algn="l" defTabSz="914400" rtl="0" eaLnBrk="1" latinLnBrk="0" hangingPunct="1">
@@ -4947,18 +5240,278 @@
             </a:lvl1pPr>
           </a:lstStyle>
           <a:p>
-            <a:endParaRPr lang="en-US" sz="3200" b="1" dirty="0">
-              <a:solidFill>
-                <a:schemeClr val="tx1"/>
-              </a:solidFill>
-            </a:endParaRPr>
-          </a:p>
-        </p:txBody>
-      </p:sp>
+            <a:r>
+              <a:rPr lang="en-US" sz="3200" b="1" dirty="0">
+                <a:solidFill>
+                  <a:schemeClr val="tx1"/>
+                </a:solidFill>
+              </a:rPr>
+              <a:t>Data &amp; Models</a:t>
+            </a:r>
+          </a:p>
+        </p:txBody>
+      </p:sp>
+      <p:pic>
+        <p:nvPicPr>
+          <p:cNvPr id="5" name="Picture 4" descr="A picture containing building, sitting, bench, side&#10;&#10;Description automatically generated">
+            <a:extLst>
+              <a:ext uri="{FF2B5EF4-FFF2-40B4-BE49-F238E27FC236}">
+                <a16:creationId xmlns:a16="http://schemas.microsoft.com/office/drawing/2014/main" id="{EF50BE56-9B5A-4B58-9D9C-6A37AA16177D}"/>
+              </a:ext>
+            </a:extLst>
+          </p:cNvPr>
+          <p:cNvPicPr>
+            <a:picLocks noChangeAspect="1"/>
+          </p:cNvPicPr>
+          <p:nvPr/>
+        </p:nvPicPr>
+        <p:blipFill rotWithShape="1">
+          <a:blip r:embed="rId3">
+            <a:extLst>
+              <a:ext uri="{28A0092B-C50C-407E-A947-70E740481C1C}">
+                <a14:useLocalDpi xmlns:a14="http://schemas.microsoft.com/office/drawing/2010/main" val="0"/>
+              </a:ext>
+            </a:extLst>
+          </a:blip>
+          <a:srcRect/>
+          <a:stretch/>
+        </p:blipFill>
+        <p:spPr>
+          <a:xfrm>
+            <a:off x="-1" y="1"/>
+            <a:ext cx="4635315" cy="6857999"/>
+          </a:xfrm>
+          <a:prstGeom prst="rect">
+            <a:avLst/>
+          </a:prstGeom>
+        </p:spPr>
+      </p:pic>
+      <p:pic>
+        <p:nvPicPr>
+          <p:cNvPr id="15" name="Picture 14">
+            <a:extLst>
+              <a:ext uri="{FF2B5EF4-FFF2-40B4-BE49-F238E27FC236}">
+                <a16:creationId xmlns:a16="http://schemas.microsoft.com/office/drawing/2014/main" id="{22DE3B4E-C3D8-496C-B87F-B35CFB4D3BF2}"/>
+              </a:ext>
+              <a:ext uri="{C183D7F6-B498-43B3-948B-1728B52AA6E4}">
+                <adec:decorative xmlns:adec="http://schemas.microsoft.com/office/drawing/2017/decorative" val="1"/>
+              </a:ext>
+            </a:extLst>
+          </p:cNvPr>
+          <p:cNvPicPr>
+            <a:picLocks noChangeAspect="1"/>
+          </p:cNvPicPr>
+          <p:nvPr/>
+        </p:nvPicPr>
+        <p:blipFill rotWithShape="1">
+          <a:blip r:embed="rId4">
+            <a:extLst>
+              <a:ext uri="{28A0092B-C50C-407E-A947-70E740481C1C}">
+                <a14:useLocalDpi xmlns:a14="http://schemas.microsoft.com/office/drawing/2010/main" val="0"/>
+              </a:ext>
+            </a:extLst>
+          </a:blip>
+          <a:srcRect/>
+          <a:stretch/>
+        </p:blipFill>
+        <p:spPr>
+          <a:xfrm>
+            <a:off x="-1" y="10"/>
+            <a:ext cx="4635315" cy="6857990"/>
+          </a:xfrm>
+          <a:prstGeom prst="rect">
+            <a:avLst/>
+          </a:prstGeom>
+        </p:spPr>
+      </p:pic>
+      <p:pic>
+        <p:nvPicPr>
+          <p:cNvPr id="3" name="Picture 2" descr="Apple (Canada)">
+            <a:extLst>
+              <a:ext uri="{FF2B5EF4-FFF2-40B4-BE49-F238E27FC236}">
+                <a16:creationId xmlns:a16="http://schemas.microsoft.com/office/drawing/2014/main" id="{BC565D91-4050-42EE-92D2-E67B06F387D6}"/>
+              </a:ext>
+            </a:extLst>
+          </p:cNvPr>
+          <p:cNvPicPr>
+            <a:picLocks noChangeAspect="1" noChangeArrowheads="1"/>
+          </p:cNvPicPr>
+          <p:nvPr/>
+        </p:nvPicPr>
+        <p:blipFill rotWithShape="1">
+          <a:blip r:embed="rId5">
+            <a:extLst>
+              <a:ext uri="{28A0092B-C50C-407E-A947-70E740481C1C}">
+                <a14:useLocalDpi xmlns:a14="http://schemas.microsoft.com/office/drawing/2010/main" val="0"/>
+              </a:ext>
+            </a:extLst>
+          </a:blip>
+          <a:srcRect l="33655" t="17503" r="34783" b="18059"/>
+          <a:stretch/>
+        </p:blipFill>
+        <p:spPr bwMode="auto">
+          <a:xfrm>
+            <a:off x="4898443" y="3036564"/>
+            <a:ext cx="469450" cy="503188"/>
+          </a:xfrm>
+          <a:prstGeom prst="rect">
+            <a:avLst/>
+          </a:prstGeom>
+          <a:noFill/>
+          <a:extLst>
+            <a:ext uri="{909E8E84-426E-40DD-AFC4-6F175D3DCCD1}">
+              <a14:hiddenFill xmlns:a14="http://schemas.microsoft.com/office/drawing/2010/main">
+                <a:solidFill>
+                  <a:srgbClr val="FFFFFF"/>
+                </a:solidFill>
+              </a14:hiddenFill>
+            </a:ext>
+          </a:extLst>
+        </p:spPr>
+      </p:pic>
+      <p:pic>
+        <p:nvPicPr>
+          <p:cNvPr id="4" name="Picture 4" descr="Twitter (@Twitter) | Twitter">
+            <a:extLst>
+              <a:ext uri="{FF2B5EF4-FFF2-40B4-BE49-F238E27FC236}">
+                <a16:creationId xmlns:a16="http://schemas.microsoft.com/office/drawing/2014/main" id="{FAF52CEE-7AB9-499C-8174-EB2EA846A4CB}"/>
+              </a:ext>
+            </a:extLst>
+          </p:cNvPr>
+          <p:cNvPicPr>
+            <a:picLocks noChangeAspect="1" noChangeArrowheads="1"/>
+          </p:cNvPicPr>
+          <p:nvPr/>
+        </p:nvPicPr>
+        <p:blipFill>
+          <a:blip r:embed="rId6">
+            <a:extLst>
+              <a:ext uri="{28A0092B-C50C-407E-A947-70E740481C1C}">
+                <a14:useLocalDpi xmlns:a14="http://schemas.microsoft.com/office/drawing/2010/main" val="0"/>
+              </a:ext>
+            </a:extLst>
+          </a:blip>
+          <a:srcRect/>
+          <a:stretch>
+            <a:fillRect/>
+          </a:stretch>
+        </p:blipFill>
+        <p:spPr bwMode="auto">
+          <a:xfrm>
+            <a:off x="5005275" y="1862647"/>
+            <a:ext cx="311032" cy="311032"/>
+          </a:xfrm>
+          <a:prstGeom prst="rect">
+            <a:avLst/>
+          </a:prstGeom>
+          <a:noFill/>
+          <a:extLst>
+            <a:ext uri="{909E8E84-426E-40DD-AFC4-6F175D3DCCD1}">
+              <a14:hiddenFill xmlns:a14="http://schemas.microsoft.com/office/drawing/2010/main">
+                <a:solidFill>
+                  <a:srgbClr val="FFFFFF"/>
+                </a:solidFill>
+              </a14:hiddenFill>
+            </a:ext>
+          </a:extLst>
+        </p:spPr>
+      </p:pic>
+      <p:pic>
+        <p:nvPicPr>
+          <p:cNvPr id="2050" name="Picture 2" descr="How Machine Learning Models Fail in the Real World">
+            <a:extLst>
+              <a:ext uri="{FF2B5EF4-FFF2-40B4-BE49-F238E27FC236}">
+                <a16:creationId xmlns:a16="http://schemas.microsoft.com/office/drawing/2014/main" id="{8CEADF08-6AA4-4955-962D-099AA935E39E}"/>
+              </a:ext>
+            </a:extLst>
+          </p:cNvPr>
+          <p:cNvPicPr>
+            <a:picLocks noChangeAspect="1" noChangeArrowheads="1"/>
+          </p:cNvPicPr>
+          <p:nvPr/>
+        </p:nvPicPr>
+        <p:blipFill rotWithShape="1">
+          <a:blip r:embed="rId7">
+            <a:extLst>
+              <a:ext uri="{28A0092B-C50C-407E-A947-70E740481C1C}">
+                <a14:useLocalDpi xmlns:a14="http://schemas.microsoft.com/office/drawing/2010/main" val="0"/>
+              </a:ext>
+            </a:extLst>
+          </a:blip>
+          <a:srcRect l="27160" r="25652"/>
+          <a:stretch/>
+        </p:blipFill>
+        <p:spPr bwMode="auto">
+          <a:xfrm>
+            <a:off x="5005275" y="4402637"/>
+            <a:ext cx="317645" cy="353399"/>
+          </a:xfrm>
+          <a:prstGeom prst="rect">
+            <a:avLst/>
+          </a:prstGeom>
+          <a:noFill/>
+          <a:extLst>
+            <a:ext uri="{909E8E84-426E-40DD-AFC4-6F175D3DCCD1}">
+              <a14:hiddenFill xmlns:a14="http://schemas.microsoft.com/office/drawing/2010/main">
+                <a:solidFill>
+                  <a:srgbClr val="FFFFFF"/>
+                </a:solidFill>
+              </a14:hiddenFill>
+            </a:ext>
+          </a:extLst>
+        </p:spPr>
+      </p:pic>
+      <p:pic>
+        <p:nvPicPr>
+          <p:cNvPr id="2052" name="Picture 4" descr="Top 5 Data Visualization Tools of 2018—And They're Free">
+            <a:extLst>
+              <a:ext uri="{FF2B5EF4-FFF2-40B4-BE49-F238E27FC236}">
+                <a16:creationId xmlns:a16="http://schemas.microsoft.com/office/drawing/2014/main" id="{2DAE0F3D-26B6-4FC7-B7A5-59C73C81106A}"/>
+              </a:ext>
+            </a:extLst>
+          </p:cNvPr>
+          <p:cNvPicPr>
+            <a:picLocks noChangeAspect="1" noChangeArrowheads="1"/>
+          </p:cNvPicPr>
+          <p:nvPr/>
+        </p:nvPicPr>
+        <p:blipFill>
+          <a:blip r:embed="rId8">
+            <a:extLst>
+              <a:ext uri="{28A0092B-C50C-407E-A947-70E740481C1C}">
+                <a14:useLocalDpi xmlns:a14="http://schemas.microsoft.com/office/drawing/2010/main" val="0"/>
+              </a:ext>
+            </a:extLst>
+          </a:blip>
+          <a:srcRect/>
+          <a:stretch>
+            <a:fillRect/>
+          </a:stretch>
+        </p:blipFill>
+        <p:spPr bwMode="auto">
+          <a:xfrm>
+            <a:off x="4958256" y="5950225"/>
+            <a:ext cx="349824" cy="389200"/>
+          </a:xfrm>
+          <a:prstGeom prst="rect">
+            <a:avLst/>
+          </a:prstGeom>
+          <a:noFill/>
+          <a:extLst>
+            <a:ext uri="{909E8E84-426E-40DD-AFC4-6F175D3DCCD1}">
+              <a14:hiddenFill xmlns:a14="http://schemas.microsoft.com/office/drawing/2010/main">
+                <a:solidFill>
+                  <a:srgbClr val="FFFFFF"/>
+                </a:solidFill>
+              </a14:hiddenFill>
+            </a:ext>
+          </a:extLst>
+        </p:spPr>
+      </p:pic>
     </p:spTree>
     <p:extLst>
       <p:ext uri="{BB962C8B-B14F-4D97-AF65-F5344CB8AC3E}">
-        <p14:creationId xmlns:p14="http://schemas.microsoft.com/office/powerpoint/2010/main" val="2980760909"/>
+        <p14:creationId xmlns:p14="http://schemas.microsoft.com/office/powerpoint/2010/main" val="461665159"/>
       </p:ext>
     </p:extLst>
   </p:cSld>
@@ -4987,10 +5540,78 @@
       </p:grpSpPr>
       <p:sp>
         <p:nvSpPr>
-          <p:cNvPr id="2" name="Text Placeholder 3">
-            <a:extLst>
-              <a:ext uri="{FF2B5EF4-FFF2-40B4-BE49-F238E27FC236}">
-                <a16:creationId xmlns:a16="http://schemas.microsoft.com/office/drawing/2014/main" id="{30DC66C4-6C3F-45ED-A950-A55681BAC970}"/>
+          <p:cNvPr id="4" name="Text Placeholder 3">
+            <a:extLst>
+              <a:ext uri="{FF2B5EF4-FFF2-40B4-BE49-F238E27FC236}">
+                <a16:creationId xmlns:a16="http://schemas.microsoft.com/office/drawing/2014/main" id="{77C772A2-1719-4DB2-B52A-3DEB9EDE685E}"/>
+              </a:ext>
+            </a:extLst>
+          </p:cNvPr>
+          <p:cNvSpPr>
+            <a:spLocks noGrp="1"/>
+          </p:cNvSpPr>
+          <p:nvPr>
+            <p:ph type="body" sz="half" idx="2"/>
+          </p:nvPr>
+        </p:nvSpPr>
+        <p:spPr>
+          <a:xfrm>
+            <a:off x="371060" y="2028200"/>
+            <a:ext cx="3517567" cy="3697359"/>
+          </a:xfrm>
+        </p:spPr>
+        <p:txBody>
+          <a:bodyPr>
+            <a:normAutofit/>
+          </a:bodyPr>
+          <a:lstStyle/>
+          <a:p>
+            <a:pPr marL="285750" indent="-285750">
+              <a:buFontTx/>
+              <a:buChar char="-"/>
+            </a:pPr>
+            <a:r>
+              <a:rPr lang="en-CA" sz="2000" dirty="0">
+                <a:latin typeface="Times New Roman" panose="02020603050405020304" pitchFamily="18" charset="0"/>
+                <a:cs typeface="Times New Roman" panose="02020603050405020304" pitchFamily="18" charset="0"/>
+              </a:rPr>
+              <a:t>LSTM</a:t>
+            </a:r>
+          </a:p>
+          <a:p>
+            <a:pPr marL="285750" indent="-285750">
+              <a:buFontTx/>
+              <a:buChar char="-"/>
+            </a:pPr>
+            <a:r>
+              <a:rPr lang="en-CA" sz="2000" dirty="0">
+                <a:latin typeface="Times New Roman" panose="02020603050405020304" pitchFamily="18" charset="0"/>
+                <a:cs typeface="Times New Roman" panose="02020603050405020304" pitchFamily="18" charset="0"/>
+              </a:rPr>
+              <a:t>Random Forest Regressor</a:t>
+            </a:r>
+          </a:p>
+          <a:p>
+            <a:pPr marL="285750" indent="-285750">
+              <a:buFontTx/>
+              <a:buChar char="-"/>
+            </a:pPr>
+            <a:r>
+              <a:rPr lang="en-CA" sz="2000" dirty="0">
+                <a:latin typeface="Times New Roman" panose="02020603050405020304" pitchFamily="18" charset="0"/>
+                <a:cs typeface="Times New Roman" panose="02020603050405020304" pitchFamily="18" charset="0"/>
+              </a:rPr>
+              <a:t>XG Boost</a:t>
+            </a:r>
+          </a:p>
+        </p:txBody>
+      </p:sp>
+      <p:sp>
+        <p:nvSpPr>
+          <p:cNvPr id="5" name="Title 2">
+            <a:extLst>
+              <a:ext uri="{FF2B5EF4-FFF2-40B4-BE49-F238E27FC236}">
+                <a16:creationId xmlns:a16="http://schemas.microsoft.com/office/drawing/2014/main" id="{CEB7A092-682E-4FA5-A15C-1BFB6C6706DA}"/>
               </a:ext>
             </a:extLst>
           </p:cNvPr>
@@ -5001,336 +5622,16 @@
         </p:nvSpPr>
         <p:spPr>
           <a:xfrm>
-            <a:off x="5658932" y="1418377"/>
-            <a:ext cx="6152068" cy="5074498"/>
+            <a:off x="6095998" y="463213"/>
+            <a:ext cx="5126184" cy="517448"/>
           </a:xfrm>
           <a:prstGeom prst="rect">
             <a:avLst/>
           </a:prstGeom>
         </p:spPr>
         <p:txBody>
-          <a:bodyPr vert="horz" lIns="91440" tIns="45720" rIns="91440" bIns="45720" rtlCol="0" anchor="ctr">
-            <a:normAutofit fontScale="92500" lnSpcReduction="20000"/>
-          </a:bodyPr>
-          <a:lstStyle>
-            <a:lvl1pPr marL="0" indent="0" algn="l" defTabSz="914400" rtl="0" eaLnBrk="1" latinLnBrk="0" hangingPunct="1">
-              <a:lnSpc>
-                <a:spcPct val="100000"/>
-              </a:lnSpc>
-              <a:spcBef>
-                <a:spcPts val="1000"/>
-              </a:spcBef>
-              <a:buFont typeface="Arial" panose="020B0604020202020204" pitchFamily="34" charset="0"/>
-              <a:buNone/>
-              <a:defRPr sz="2400" kern="1200" spc="600">
-                <a:solidFill>
-                  <a:schemeClr val="tx1">
-                    <a:tint val="75000"/>
-                  </a:schemeClr>
-                </a:solidFill>
-                <a:latin typeface="+mn-lt"/>
-                <a:ea typeface="+mn-ea"/>
-                <a:cs typeface="+mn-cs"/>
-              </a:defRPr>
-            </a:lvl1pPr>
-            <a:lvl2pPr marL="457200" indent="0" algn="l" defTabSz="914400" rtl="0" eaLnBrk="1" latinLnBrk="0" hangingPunct="1">
-              <a:lnSpc>
-                <a:spcPct val="150000"/>
-              </a:lnSpc>
-              <a:spcBef>
-                <a:spcPts val="500"/>
-              </a:spcBef>
-              <a:buFont typeface="Arial" panose="020B0604020202020204" pitchFamily="34" charset="0"/>
-              <a:buNone/>
-              <a:defRPr sz="2000" kern="1200">
-                <a:solidFill>
-                  <a:schemeClr val="tx1">
-                    <a:tint val="75000"/>
-                  </a:schemeClr>
-                </a:solidFill>
-                <a:latin typeface="+mn-lt"/>
-                <a:ea typeface="+mn-ea"/>
-                <a:cs typeface="+mn-cs"/>
-              </a:defRPr>
-            </a:lvl2pPr>
-            <a:lvl3pPr marL="914400" indent="0" algn="l" defTabSz="914400" rtl="0" eaLnBrk="1" latinLnBrk="0" hangingPunct="1">
-              <a:lnSpc>
-                <a:spcPct val="150000"/>
-              </a:lnSpc>
-              <a:spcBef>
-                <a:spcPts val="500"/>
-              </a:spcBef>
-              <a:buFont typeface="Arial" panose="020B0604020202020204" pitchFamily="34" charset="0"/>
-              <a:buNone/>
-              <a:defRPr sz="1800" kern="1200">
-                <a:solidFill>
-                  <a:schemeClr val="tx1">
-                    <a:tint val="75000"/>
-                  </a:schemeClr>
-                </a:solidFill>
-                <a:latin typeface="+mn-lt"/>
-                <a:ea typeface="+mn-ea"/>
-                <a:cs typeface="+mn-cs"/>
-              </a:defRPr>
-            </a:lvl3pPr>
-            <a:lvl4pPr marL="1371600" indent="0" algn="l" defTabSz="914400" rtl="0" eaLnBrk="1" latinLnBrk="0" hangingPunct="1">
-              <a:lnSpc>
-                <a:spcPct val="150000"/>
-              </a:lnSpc>
-              <a:spcBef>
-                <a:spcPts val="500"/>
-              </a:spcBef>
-              <a:buFont typeface="Arial" panose="020B0604020202020204" pitchFamily="34" charset="0"/>
-              <a:buNone/>
-              <a:defRPr sz="1600" kern="1200">
-                <a:solidFill>
-                  <a:schemeClr val="tx1">
-                    <a:tint val="75000"/>
-                  </a:schemeClr>
-                </a:solidFill>
-                <a:latin typeface="+mn-lt"/>
-                <a:ea typeface="+mn-ea"/>
-                <a:cs typeface="+mn-cs"/>
-              </a:defRPr>
-            </a:lvl4pPr>
-            <a:lvl5pPr marL="1828800" indent="0" algn="l" defTabSz="914400" rtl="0" eaLnBrk="1" latinLnBrk="0" hangingPunct="1">
-              <a:lnSpc>
-                <a:spcPct val="150000"/>
-              </a:lnSpc>
-              <a:spcBef>
-                <a:spcPts val="500"/>
-              </a:spcBef>
-              <a:buFont typeface="Arial" panose="020B0604020202020204" pitchFamily="34" charset="0"/>
-              <a:buNone/>
-              <a:defRPr sz="1600" kern="1200">
-                <a:solidFill>
-                  <a:schemeClr val="tx1">
-                    <a:tint val="75000"/>
-                  </a:schemeClr>
-                </a:solidFill>
-                <a:latin typeface="+mn-lt"/>
-                <a:ea typeface="+mn-ea"/>
-                <a:cs typeface="+mn-cs"/>
-              </a:defRPr>
-            </a:lvl5pPr>
-            <a:lvl6pPr marL="2286000" indent="0" algn="l" defTabSz="914400" rtl="0" eaLnBrk="1" latinLnBrk="0" hangingPunct="1">
-              <a:lnSpc>
-                <a:spcPct val="90000"/>
-              </a:lnSpc>
-              <a:spcBef>
-                <a:spcPts val="500"/>
-              </a:spcBef>
-              <a:buFont typeface="Arial" panose="020B0604020202020204" pitchFamily="34" charset="0"/>
-              <a:buNone/>
-              <a:defRPr sz="1600" kern="1200">
-                <a:solidFill>
-                  <a:schemeClr val="tx1">
-                    <a:tint val="75000"/>
-                  </a:schemeClr>
-                </a:solidFill>
-                <a:latin typeface="+mn-lt"/>
-                <a:ea typeface="+mn-ea"/>
-                <a:cs typeface="+mn-cs"/>
-              </a:defRPr>
-            </a:lvl6pPr>
-            <a:lvl7pPr marL="2743200" indent="0" algn="l" defTabSz="914400" rtl="0" eaLnBrk="1" latinLnBrk="0" hangingPunct="1">
-              <a:lnSpc>
-                <a:spcPct val="90000"/>
-              </a:lnSpc>
-              <a:spcBef>
-                <a:spcPts val="500"/>
-              </a:spcBef>
-              <a:buFont typeface="Arial" panose="020B0604020202020204" pitchFamily="34" charset="0"/>
-              <a:buNone/>
-              <a:defRPr sz="1600" kern="1200">
-                <a:solidFill>
-                  <a:schemeClr val="tx1">
-                    <a:tint val="75000"/>
-                  </a:schemeClr>
-                </a:solidFill>
-                <a:latin typeface="+mn-lt"/>
-                <a:ea typeface="+mn-ea"/>
-                <a:cs typeface="+mn-cs"/>
-              </a:defRPr>
-            </a:lvl7pPr>
-            <a:lvl8pPr marL="3200400" indent="0" algn="l" defTabSz="914400" rtl="0" eaLnBrk="1" latinLnBrk="0" hangingPunct="1">
-              <a:lnSpc>
-                <a:spcPct val="90000"/>
-              </a:lnSpc>
-              <a:spcBef>
-                <a:spcPts val="500"/>
-              </a:spcBef>
-              <a:buFont typeface="Arial" panose="020B0604020202020204" pitchFamily="34" charset="0"/>
-              <a:buNone/>
-              <a:defRPr sz="1600" kern="1200">
-                <a:solidFill>
-                  <a:schemeClr val="tx1">
-                    <a:tint val="75000"/>
-                  </a:schemeClr>
-                </a:solidFill>
-                <a:latin typeface="+mn-lt"/>
-                <a:ea typeface="+mn-ea"/>
-                <a:cs typeface="+mn-cs"/>
-              </a:defRPr>
-            </a:lvl8pPr>
-            <a:lvl9pPr marL="3657600" indent="0" algn="l" defTabSz="914400" rtl="0" eaLnBrk="1" latinLnBrk="0" hangingPunct="1">
-              <a:lnSpc>
-                <a:spcPct val="90000"/>
-              </a:lnSpc>
-              <a:spcBef>
-                <a:spcPts val="500"/>
-              </a:spcBef>
-              <a:buFont typeface="Arial" panose="020B0604020202020204" pitchFamily="34" charset="0"/>
-              <a:buNone/>
-              <a:defRPr sz="1600" kern="1200">
-                <a:solidFill>
-                  <a:schemeClr val="tx1">
-                    <a:tint val="75000"/>
-                  </a:schemeClr>
-                </a:solidFill>
-                <a:latin typeface="+mn-lt"/>
-                <a:ea typeface="+mn-ea"/>
-                <a:cs typeface="+mn-cs"/>
-              </a:defRPr>
-            </a:lvl9pPr>
-          </a:lstStyle>
-          <a:p>
-            <a:r>
-              <a:rPr lang="en-CA" b="1" dirty="0">
-                <a:solidFill>
-                  <a:schemeClr val="tx1"/>
-                </a:solidFill>
-              </a:rPr>
-              <a:t>Twitter Data: </a:t>
-            </a:r>
-            <a:r>
-              <a:rPr lang="en-CA" dirty="0">
-                <a:solidFill>
-                  <a:schemeClr val="tx1"/>
-                </a:solidFill>
-              </a:rPr>
-              <a:t>Data from Kaggle</a:t>
-            </a:r>
-            <a:r>
-              <a:rPr lang="en-CA" sz="1900" dirty="0">
-                <a:solidFill>
-                  <a:schemeClr val="tx1"/>
-                </a:solidFill>
-              </a:rPr>
-              <a:t>(https://www.kaggle.com/nadun94/twitter-sentiments-aapl-stock)</a:t>
-            </a:r>
-          </a:p>
-          <a:p>
-            <a:br>
-              <a:rPr lang="en-CA" dirty="0">
-                <a:solidFill>
-                  <a:schemeClr val="tx1"/>
-                </a:solidFill>
-              </a:rPr>
-            </a:br>
-            <a:r>
-              <a:rPr lang="en-CA" b="1" dirty="0">
-                <a:solidFill>
-                  <a:schemeClr val="tx1"/>
-                </a:solidFill>
-              </a:rPr>
-              <a:t>Stock Data: </a:t>
-            </a:r>
-            <a:r>
-              <a:rPr lang="en-CA" dirty="0">
-                <a:solidFill>
-                  <a:schemeClr val="tx1"/>
-                </a:solidFill>
-              </a:rPr>
-              <a:t>Stock Prices of Apple from Yahoo Finance.</a:t>
-            </a:r>
-          </a:p>
-          <a:p>
-            <a:br>
-              <a:rPr lang="en-CA" dirty="0">
-                <a:solidFill>
-                  <a:schemeClr val="tx1"/>
-                </a:solidFill>
-              </a:rPr>
-            </a:br>
-            <a:r>
-              <a:rPr lang="en-CA" b="1" dirty="0">
-                <a:solidFill>
-                  <a:schemeClr val="tx1"/>
-                </a:solidFill>
-              </a:rPr>
-              <a:t>Machine Learning Models: </a:t>
-            </a:r>
-            <a:r>
-              <a:rPr lang="en-CA" dirty="0">
-                <a:solidFill>
-                  <a:schemeClr val="tx1"/>
-                </a:solidFill>
-              </a:rPr>
-              <a:t>Time Series Models, LSTM and XG Boost to fit the data and compare performance between models.</a:t>
-            </a:r>
-          </a:p>
-          <a:p>
-            <a:br>
-              <a:rPr lang="en-CA" dirty="0">
-                <a:solidFill>
-                  <a:schemeClr val="tx1"/>
-                </a:solidFill>
-              </a:rPr>
-            </a:br>
-            <a:r>
-              <a:rPr lang="en-CA" b="1" dirty="0">
-                <a:solidFill>
-                  <a:schemeClr val="tx1"/>
-                </a:solidFill>
-              </a:rPr>
-              <a:t>Data Visualization: </a:t>
-            </a:r>
-            <a:r>
-              <a:rPr lang="en-CA" dirty="0" err="1">
-                <a:solidFill>
-                  <a:schemeClr val="tx1"/>
-                </a:solidFill>
-              </a:rPr>
-              <a:t>hvPlot</a:t>
-            </a:r>
-            <a:r>
-              <a:rPr lang="en-CA" dirty="0">
-                <a:solidFill>
-                  <a:schemeClr val="tx1"/>
-                </a:solidFill>
-              </a:rPr>
-              <a:t> and Matplotlib. </a:t>
-            </a:r>
-          </a:p>
-        </p:txBody>
-      </p:sp>
-      <p:sp>
-        <p:nvSpPr>
-          <p:cNvPr id="12" name="Title 7">
-            <a:extLst>
-              <a:ext uri="{FF2B5EF4-FFF2-40B4-BE49-F238E27FC236}">
-                <a16:creationId xmlns:a16="http://schemas.microsoft.com/office/drawing/2014/main" id="{71520384-A28C-4951-BA9F-337FAB2E7F09}"/>
-              </a:ext>
-            </a:extLst>
-          </p:cNvPr>
-          <p:cNvSpPr txBox="1">
-            <a:spLocks/>
-          </p:cNvSpPr>
-          <p:nvPr/>
-        </p:nvSpPr>
-        <p:spPr>
-          <a:xfrm>
-            <a:off x="5767754" y="365125"/>
-            <a:ext cx="6043246" cy="872832"/>
-          </a:xfrm>
-          <a:prstGeom prst="rect">
-            <a:avLst/>
-          </a:prstGeom>
-        </p:spPr>
-        <p:txBody>
           <a:bodyPr vert="horz" lIns="91440" tIns="45720" rIns="91440" bIns="45720" rtlCol="0" anchor="b">
-            <a:normAutofit/>
+            <a:noAutofit/>
           </a:bodyPr>
           <a:lstStyle>
             <a:lvl1pPr algn="l" defTabSz="914400" rtl="0" eaLnBrk="1" latinLnBrk="0" hangingPunct="1">
@@ -5352,23 +5653,20 @@
             </a:lvl1pPr>
           </a:lstStyle>
           <a:p>
-            <a:r>
-              <a:rPr lang="en-US" sz="3200" dirty="0">
-                <a:solidFill>
-                  <a:schemeClr val="tx1"/>
-                </a:solidFill>
-              </a:rPr>
-              <a:t>Data Used</a:t>
-            </a:r>
+            <a:endParaRPr lang="en-US" sz="3200" b="1" dirty="0">
+              <a:solidFill>
+                <a:schemeClr val="tx1"/>
+              </a:solidFill>
+            </a:endParaRPr>
           </a:p>
         </p:txBody>
       </p:sp>
       <p:pic>
         <p:nvPicPr>
-          <p:cNvPr id="5" name="Picture 4" descr="A picture containing building, sitting, bench, side&#10;&#10;Description automatically generated">
-            <a:extLst>
-              <a:ext uri="{FF2B5EF4-FFF2-40B4-BE49-F238E27FC236}">
-                <a16:creationId xmlns:a16="http://schemas.microsoft.com/office/drawing/2014/main" id="{EF50BE56-9B5A-4B58-9D9C-6A37AA16177D}"/>
+          <p:cNvPr id="7" name="Picture 6">
+            <a:extLst>
+              <a:ext uri="{FF2B5EF4-FFF2-40B4-BE49-F238E27FC236}">
+                <a16:creationId xmlns:a16="http://schemas.microsoft.com/office/drawing/2014/main" id="{FE7F4F54-F15B-47B3-B8DC-51929CE80D26}"/>
               </a:ext>
             </a:extLst>
           </p:cNvPr>
@@ -5385,13 +5683,13 @@
               </a:ext>
             </a:extLst>
           </a:blip>
-          <a:srcRect/>
+          <a:srcRect r="10797"/>
           <a:stretch/>
         </p:blipFill>
         <p:spPr>
           <a:xfrm>
-            <a:off x="-1" y="1"/>
-            <a:ext cx="4635315" cy="6857999"/>
+            <a:off x="6668902" y="842745"/>
+            <a:ext cx="4993265" cy="1738659"/>
           </a:xfrm>
           <a:prstGeom prst="rect">
             <a:avLst/>
@@ -5400,13 +5698,10 @@
       </p:pic>
       <p:pic>
         <p:nvPicPr>
-          <p:cNvPr id="15" name="Picture 14">
-            <a:extLst>
-              <a:ext uri="{FF2B5EF4-FFF2-40B4-BE49-F238E27FC236}">
-                <a16:creationId xmlns:a16="http://schemas.microsoft.com/office/drawing/2014/main" id="{22DE3B4E-C3D8-496C-B87F-B35CFB4D3BF2}"/>
-              </a:ext>
-              <a:ext uri="{C183D7F6-B498-43B3-948B-1728B52AA6E4}">
-                <adec:decorative xmlns:adec="http://schemas.microsoft.com/office/drawing/2017/decorative" val="1"/>
+          <p:cNvPr id="9" name="Picture 8">
+            <a:extLst>
+              <a:ext uri="{FF2B5EF4-FFF2-40B4-BE49-F238E27FC236}">
+                <a16:creationId xmlns:a16="http://schemas.microsoft.com/office/drawing/2014/main" id="{CE9A210C-9782-4475-A42E-3F28030B0CFB}"/>
               </a:ext>
             </a:extLst>
           </p:cNvPr>
@@ -5423,23 +5718,255 @@
               </a:ext>
             </a:extLst>
           </a:blip>
-          <a:srcRect/>
+          <a:srcRect r="9555"/>
           <a:stretch/>
         </p:blipFill>
         <p:spPr>
           <a:xfrm>
-            <a:off x="-1" y="10"/>
-            <a:ext cx="4635315" cy="6857990"/>
+            <a:off x="6824870" y="4656128"/>
+            <a:ext cx="4837297" cy="1738659"/>
           </a:xfrm>
           <a:prstGeom prst="rect">
             <a:avLst/>
           </a:prstGeom>
         </p:spPr>
       </p:pic>
+      <p:pic>
+        <p:nvPicPr>
+          <p:cNvPr id="11" name="Picture 10">
+            <a:extLst>
+              <a:ext uri="{FF2B5EF4-FFF2-40B4-BE49-F238E27FC236}">
+                <a16:creationId xmlns:a16="http://schemas.microsoft.com/office/drawing/2014/main" id="{05E9590C-45AE-45EC-83B9-A4263781992E}"/>
+              </a:ext>
+            </a:extLst>
+          </p:cNvPr>
+          <p:cNvPicPr>
+            <a:picLocks noChangeAspect="1"/>
+          </p:cNvPicPr>
+          <p:nvPr/>
+        </p:nvPicPr>
+        <p:blipFill rotWithShape="1">
+          <a:blip r:embed="rId4">
+            <a:extLst>
+              <a:ext uri="{28A0092B-C50C-407E-A947-70E740481C1C}">
+                <a14:useLocalDpi xmlns:a14="http://schemas.microsoft.com/office/drawing/2010/main" val="0"/>
+              </a:ext>
+            </a:extLst>
+          </a:blip>
+          <a:srcRect r="9323"/>
+          <a:stretch/>
+        </p:blipFill>
+        <p:spPr>
+          <a:xfrm>
+            <a:off x="6668901" y="2781654"/>
+            <a:ext cx="5152039" cy="1667142"/>
+          </a:xfrm>
+          <a:prstGeom prst="rect">
+            <a:avLst/>
+          </a:prstGeom>
+        </p:spPr>
+      </p:pic>
+      <p:sp>
+        <p:nvSpPr>
+          <p:cNvPr id="13" name="Rectangle: Rounded Corners 12">
+            <a:extLst>
+              <a:ext uri="{FF2B5EF4-FFF2-40B4-BE49-F238E27FC236}">
+                <a16:creationId xmlns:a16="http://schemas.microsoft.com/office/drawing/2014/main" id="{A0DF0249-1BAC-446B-8F40-07A273B0B734}"/>
+              </a:ext>
+            </a:extLst>
+          </p:cNvPr>
+          <p:cNvSpPr/>
+          <p:nvPr/>
+        </p:nvSpPr>
+        <p:spPr>
+          <a:xfrm>
+            <a:off x="5022574" y="1233071"/>
+            <a:ext cx="1646327" cy="795130"/>
+          </a:xfrm>
+          <a:prstGeom prst="roundRect">
+            <a:avLst/>
+          </a:prstGeom>
+        </p:spPr>
+        <p:style>
+          <a:lnRef idx="2">
+            <a:schemeClr val="accent1">
+              <a:shade val="50000"/>
+            </a:schemeClr>
+          </a:lnRef>
+          <a:fillRef idx="1">
+            <a:schemeClr val="accent1"/>
+          </a:fillRef>
+          <a:effectRef idx="0">
+            <a:schemeClr val="accent1"/>
+          </a:effectRef>
+          <a:fontRef idx="minor">
+            <a:schemeClr val="lt1"/>
+          </a:fontRef>
+        </p:style>
+        <p:txBody>
+          <a:bodyPr rtlCol="0" anchor="ctr"/>
+          <a:lstStyle/>
+          <a:p>
+            <a:pPr algn="ctr"/>
+            <a:r>
+              <a:rPr lang="en-CA" dirty="0"/>
+              <a:t>XG Boost</a:t>
+            </a:r>
+          </a:p>
+        </p:txBody>
+      </p:sp>
+      <p:sp>
+        <p:nvSpPr>
+          <p:cNvPr id="15" name="Rectangle: Rounded Corners 14">
+            <a:extLst>
+              <a:ext uri="{FF2B5EF4-FFF2-40B4-BE49-F238E27FC236}">
+                <a16:creationId xmlns:a16="http://schemas.microsoft.com/office/drawing/2014/main" id="{62D53B84-F555-41E6-AFAE-CB7AF94F6842}"/>
+              </a:ext>
+            </a:extLst>
+          </p:cNvPr>
+          <p:cNvSpPr/>
+          <p:nvPr/>
+        </p:nvSpPr>
+        <p:spPr>
+          <a:xfrm>
+            <a:off x="5022574" y="4853169"/>
+            <a:ext cx="1646327" cy="795130"/>
+          </a:xfrm>
+          <a:prstGeom prst="roundRect">
+            <a:avLst/>
+          </a:prstGeom>
+        </p:spPr>
+        <p:style>
+          <a:lnRef idx="2">
+            <a:schemeClr val="accent1">
+              <a:shade val="50000"/>
+            </a:schemeClr>
+          </a:lnRef>
+          <a:fillRef idx="1">
+            <a:schemeClr val="accent1"/>
+          </a:fillRef>
+          <a:effectRef idx="0">
+            <a:schemeClr val="accent1"/>
+          </a:effectRef>
+          <a:fontRef idx="minor">
+            <a:schemeClr val="lt1"/>
+          </a:fontRef>
+        </p:style>
+        <p:txBody>
+          <a:bodyPr rtlCol="0" anchor="ctr"/>
+          <a:lstStyle/>
+          <a:p>
+            <a:pPr algn="ctr"/>
+            <a:r>
+              <a:rPr lang="en-CA" dirty="0"/>
+              <a:t>RF Regressor</a:t>
+            </a:r>
+          </a:p>
+        </p:txBody>
+      </p:sp>
+      <p:sp>
+        <p:nvSpPr>
+          <p:cNvPr id="17" name="Rectangle: Rounded Corners 16">
+            <a:extLst>
+              <a:ext uri="{FF2B5EF4-FFF2-40B4-BE49-F238E27FC236}">
+                <a16:creationId xmlns:a16="http://schemas.microsoft.com/office/drawing/2014/main" id="{2CC559C2-5898-40C3-AED3-D359CCB5A7AD}"/>
+              </a:ext>
+            </a:extLst>
+          </p:cNvPr>
+          <p:cNvSpPr/>
+          <p:nvPr/>
+        </p:nvSpPr>
+        <p:spPr>
+          <a:xfrm>
+            <a:off x="5022574" y="2981183"/>
+            <a:ext cx="1646327" cy="795130"/>
+          </a:xfrm>
+          <a:prstGeom prst="roundRect">
+            <a:avLst/>
+          </a:prstGeom>
+        </p:spPr>
+        <p:style>
+          <a:lnRef idx="2">
+            <a:schemeClr val="accent1">
+              <a:shade val="50000"/>
+            </a:schemeClr>
+          </a:lnRef>
+          <a:fillRef idx="1">
+            <a:schemeClr val="accent1"/>
+          </a:fillRef>
+          <a:effectRef idx="0">
+            <a:schemeClr val="accent1"/>
+          </a:effectRef>
+          <a:fontRef idx="minor">
+            <a:schemeClr val="lt1"/>
+          </a:fontRef>
+        </p:style>
+        <p:txBody>
+          <a:bodyPr rtlCol="0" anchor="ctr"/>
+          <a:lstStyle/>
+          <a:p>
+            <a:pPr algn="ctr"/>
+            <a:r>
+              <a:rPr lang="en-CA" dirty="0"/>
+              <a:t>LSTM</a:t>
+            </a:r>
+          </a:p>
+        </p:txBody>
+      </p:sp>
+      <p:sp>
+        <p:nvSpPr>
+          <p:cNvPr id="22" name="Title 1">
+            <a:extLst>
+              <a:ext uri="{FF2B5EF4-FFF2-40B4-BE49-F238E27FC236}">
+                <a16:creationId xmlns:a16="http://schemas.microsoft.com/office/drawing/2014/main" id="{14D99E45-BAE0-4C5B-ABA8-C4F54F3434E4}"/>
+              </a:ext>
+            </a:extLst>
+          </p:cNvPr>
+          <p:cNvSpPr>
+            <a:spLocks noGrp="1"/>
+          </p:cNvSpPr>
+          <p:nvPr>
+            <p:ph type="title"/>
+          </p:nvPr>
+        </p:nvSpPr>
+        <p:spPr>
+          <a:xfrm>
+            <a:off x="-106018" y="1388783"/>
+            <a:ext cx="4816430" cy="1278835"/>
+          </a:xfrm>
+        </p:spPr>
+        <p:txBody>
+          <a:bodyPr>
+            <a:noAutofit/>
+          </a:bodyPr>
+          <a:lstStyle/>
+          <a:p>
+            <a:pPr algn="ctr"/>
+            <a:r>
+              <a:rPr lang="en-CA" sz="4000" b="1" dirty="0"/>
+              <a:t>Model Summary</a:t>
+            </a:r>
+            <a:br>
+              <a:rPr lang="en-CA" sz="4000" b="1" dirty="0"/>
+            </a:br>
+            <a:r>
+              <a:rPr lang="en-CA" sz="2400" b="1" dirty="0"/>
+              <a:t>&lt;Regression Approach&gt;</a:t>
+            </a:r>
+            <a:br>
+              <a:rPr lang="en-CA" sz="4000" b="1" dirty="0"/>
+            </a:br>
+            <a:br>
+              <a:rPr lang="en-CA" sz="4000" dirty="0"/>
+            </a:br>
+            <a:endParaRPr lang="en-CA" sz="4000" dirty="0"/>
+          </a:p>
+        </p:txBody>
+      </p:sp>
     </p:spTree>
     <p:extLst>
       <p:ext uri="{BB962C8B-B14F-4D97-AF65-F5344CB8AC3E}">
-        <p14:creationId xmlns:p14="http://schemas.microsoft.com/office/powerpoint/2010/main" val="461665159"/>
+        <p14:creationId xmlns:p14="http://schemas.microsoft.com/office/powerpoint/2010/main" val="2980760909"/>
       </p:ext>
     </p:extLst>
   </p:cSld>
@@ -5468,10 +5995,115 @@
       </p:grpSpPr>
       <p:sp>
         <p:nvSpPr>
-          <p:cNvPr id="2" name="Text Placeholder 3">
-            <a:extLst>
-              <a:ext uri="{FF2B5EF4-FFF2-40B4-BE49-F238E27FC236}">
-                <a16:creationId xmlns:a16="http://schemas.microsoft.com/office/drawing/2014/main" id="{30DC66C4-6C3F-45ED-A950-A55681BAC970}"/>
+          <p:cNvPr id="2" name="Title 1">
+            <a:extLst>
+              <a:ext uri="{FF2B5EF4-FFF2-40B4-BE49-F238E27FC236}">
+                <a16:creationId xmlns:a16="http://schemas.microsoft.com/office/drawing/2014/main" id="{66C66C3D-D740-442D-8E05-7FA499A836C1}"/>
+              </a:ext>
+            </a:extLst>
+          </p:cNvPr>
+          <p:cNvSpPr>
+            <a:spLocks noGrp="1"/>
+          </p:cNvSpPr>
+          <p:nvPr>
+            <p:ph type="title"/>
+          </p:nvPr>
+        </p:nvSpPr>
+        <p:spPr>
+          <a:xfrm>
+            <a:off x="-106018" y="1133061"/>
+            <a:ext cx="4816430" cy="1546000"/>
+          </a:xfrm>
+        </p:spPr>
+        <p:txBody>
+          <a:bodyPr>
+            <a:noAutofit/>
+          </a:bodyPr>
+          <a:lstStyle/>
+          <a:p>
+            <a:pPr algn="ctr"/>
+            <a:r>
+              <a:rPr lang="en-CA" sz="4000" b="1" dirty="0"/>
+              <a:t>Model Summary</a:t>
+            </a:r>
+            <a:br>
+              <a:rPr lang="en-CA" sz="4000" b="1" dirty="0"/>
+            </a:br>
+            <a:r>
+              <a:rPr lang="en-CA" sz="2400" b="1" dirty="0"/>
+              <a:t>&lt;Classification Approach&gt;</a:t>
+            </a:r>
+            <a:br>
+              <a:rPr lang="en-CA" sz="4000" b="1" dirty="0"/>
+            </a:br>
+            <a:br>
+              <a:rPr lang="en-CA" sz="4000" dirty="0"/>
+            </a:br>
+            <a:endParaRPr lang="en-CA" sz="4000" dirty="0"/>
+          </a:p>
+        </p:txBody>
+      </p:sp>
+      <p:sp>
+        <p:nvSpPr>
+          <p:cNvPr id="4" name="Text Placeholder 3">
+            <a:extLst>
+              <a:ext uri="{FF2B5EF4-FFF2-40B4-BE49-F238E27FC236}">
+                <a16:creationId xmlns:a16="http://schemas.microsoft.com/office/drawing/2014/main" id="{77C772A2-1719-4DB2-B52A-3DEB9EDE685E}"/>
+              </a:ext>
+            </a:extLst>
+          </p:cNvPr>
+          <p:cNvSpPr>
+            <a:spLocks noGrp="1"/>
+          </p:cNvSpPr>
+          <p:nvPr>
+            <p:ph type="body" sz="half" idx="2"/>
+          </p:nvPr>
+        </p:nvSpPr>
+        <p:spPr>
+          <a:xfrm>
+            <a:off x="298909" y="1906061"/>
+            <a:ext cx="3517567" cy="3697359"/>
+          </a:xfrm>
+        </p:spPr>
+        <p:txBody>
+          <a:bodyPr>
+            <a:normAutofit/>
+          </a:bodyPr>
+          <a:lstStyle/>
+          <a:p>
+            <a:pPr marL="285750" indent="-285750">
+              <a:buFontTx/>
+              <a:buChar char="-"/>
+            </a:pPr>
+            <a:r>
+              <a:rPr lang="en-CA" sz="2000" dirty="0">
+                <a:latin typeface="Times New Roman" panose="02020603050405020304" pitchFamily="18" charset="0"/>
+                <a:cs typeface="Times New Roman" panose="02020603050405020304" pitchFamily="18" charset="0"/>
+              </a:rPr>
+              <a:t>Random Forest Classifier</a:t>
+            </a:r>
+          </a:p>
+          <a:p>
+            <a:pPr marL="285750" indent="-285750">
+              <a:buFontTx/>
+              <a:buChar char="-"/>
+            </a:pPr>
+            <a:r>
+              <a:rPr lang="en-CA" sz="2000" dirty="0">
+                <a:latin typeface="Times New Roman" panose="02020603050405020304" pitchFamily="18" charset="0"/>
+                <a:cs typeface="Times New Roman" panose="02020603050405020304" pitchFamily="18" charset="0"/>
+              </a:rPr>
+              <a:t>Gradient Booster</a:t>
+            </a:r>
+          </a:p>
+        </p:txBody>
+      </p:sp>
+      <p:sp>
+        <p:nvSpPr>
+          <p:cNvPr id="5" name="Title 2">
+            <a:extLst>
+              <a:ext uri="{FF2B5EF4-FFF2-40B4-BE49-F238E27FC236}">
+                <a16:creationId xmlns:a16="http://schemas.microsoft.com/office/drawing/2014/main" id="{CEB7A092-682E-4FA5-A15C-1BFB6C6706DA}"/>
               </a:ext>
             </a:extLst>
           </p:cNvPr>
@@ -5482,230 +6114,16 @@
         </p:nvSpPr>
         <p:spPr>
           <a:xfrm>
-            <a:off x="5767754" y="1243259"/>
-            <a:ext cx="5897218" cy="5074498"/>
+            <a:off x="6095998" y="463213"/>
+            <a:ext cx="5126184" cy="517448"/>
           </a:xfrm>
           <a:prstGeom prst="rect">
             <a:avLst/>
           </a:prstGeom>
         </p:spPr>
         <p:txBody>
-          <a:bodyPr vert="horz" lIns="91440" tIns="45720" rIns="91440" bIns="45720" rtlCol="0" anchor="ctr">
-            <a:normAutofit/>
-          </a:bodyPr>
-          <a:lstStyle>
-            <a:lvl1pPr marL="0" indent="0" algn="l" defTabSz="914400" rtl="0" eaLnBrk="1" latinLnBrk="0" hangingPunct="1">
-              <a:lnSpc>
-                <a:spcPct val="100000"/>
-              </a:lnSpc>
-              <a:spcBef>
-                <a:spcPts val="1000"/>
-              </a:spcBef>
-              <a:buFont typeface="Arial" panose="020B0604020202020204" pitchFamily="34" charset="0"/>
-              <a:buNone/>
-              <a:defRPr sz="2400" kern="1200" spc="600">
-                <a:solidFill>
-                  <a:schemeClr val="tx1">
-                    <a:tint val="75000"/>
-                  </a:schemeClr>
-                </a:solidFill>
-                <a:latin typeface="+mn-lt"/>
-                <a:ea typeface="+mn-ea"/>
-                <a:cs typeface="+mn-cs"/>
-              </a:defRPr>
-            </a:lvl1pPr>
-            <a:lvl2pPr marL="457200" indent="0" algn="l" defTabSz="914400" rtl="0" eaLnBrk="1" latinLnBrk="0" hangingPunct="1">
-              <a:lnSpc>
-                <a:spcPct val="150000"/>
-              </a:lnSpc>
-              <a:spcBef>
-                <a:spcPts val="500"/>
-              </a:spcBef>
-              <a:buFont typeface="Arial" panose="020B0604020202020204" pitchFamily="34" charset="0"/>
-              <a:buNone/>
-              <a:defRPr sz="2000" kern="1200">
-                <a:solidFill>
-                  <a:schemeClr val="tx1">
-                    <a:tint val="75000"/>
-                  </a:schemeClr>
-                </a:solidFill>
-                <a:latin typeface="+mn-lt"/>
-                <a:ea typeface="+mn-ea"/>
-                <a:cs typeface="+mn-cs"/>
-              </a:defRPr>
-            </a:lvl2pPr>
-            <a:lvl3pPr marL="914400" indent="0" algn="l" defTabSz="914400" rtl="0" eaLnBrk="1" latinLnBrk="0" hangingPunct="1">
-              <a:lnSpc>
-                <a:spcPct val="150000"/>
-              </a:lnSpc>
-              <a:spcBef>
-                <a:spcPts val="500"/>
-              </a:spcBef>
-              <a:buFont typeface="Arial" panose="020B0604020202020204" pitchFamily="34" charset="0"/>
-              <a:buNone/>
-              <a:defRPr sz="1800" kern="1200">
-                <a:solidFill>
-                  <a:schemeClr val="tx1">
-                    <a:tint val="75000"/>
-                  </a:schemeClr>
-                </a:solidFill>
-                <a:latin typeface="+mn-lt"/>
-                <a:ea typeface="+mn-ea"/>
-                <a:cs typeface="+mn-cs"/>
-              </a:defRPr>
-            </a:lvl3pPr>
-            <a:lvl4pPr marL="1371600" indent="0" algn="l" defTabSz="914400" rtl="0" eaLnBrk="1" latinLnBrk="0" hangingPunct="1">
-              <a:lnSpc>
-                <a:spcPct val="150000"/>
-              </a:lnSpc>
-              <a:spcBef>
-                <a:spcPts val="500"/>
-              </a:spcBef>
-              <a:buFont typeface="Arial" panose="020B0604020202020204" pitchFamily="34" charset="0"/>
-              <a:buNone/>
-              <a:defRPr sz="1600" kern="1200">
-                <a:solidFill>
-                  <a:schemeClr val="tx1">
-                    <a:tint val="75000"/>
-                  </a:schemeClr>
-                </a:solidFill>
-                <a:latin typeface="+mn-lt"/>
-                <a:ea typeface="+mn-ea"/>
-                <a:cs typeface="+mn-cs"/>
-              </a:defRPr>
-            </a:lvl4pPr>
-            <a:lvl5pPr marL="1828800" indent="0" algn="l" defTabSz="914400" rtl="0" eaLnBrk="1" latinLnBrk="0" hangingPunct="1">
-              <a:lnSpc>
-                <a:spcPct val="150000"/>
-              </a:lnSpc>
-              <a:spcBef>
-                <a:spcPts val="500"/>
-              </a:spcBef>
-              <a:buFont typeface="Arial" panose="020B0604020202020204" pitchFamily="34" charset="0"/>
-              <a:buNone/>
-              <a:defRPr sz="1600" kern="1200">
-                <a:solidFill>
-                  <a:schemeClr val="tx1">
-                    <a:tint val="75000"/>
-                  </a:schemeClr>
-                </a:solidFill>
-                <a:latin typeface="+mn-lt"/>
-                <a:ea typeface="+mn-ea"/>
-                <a:cs typeface="+mn-cs"/>
-              </a:defRPr>
-            </a:lvl5pPr>
-            <a:lvl6pPr marL="2286000" indent="0" algn="l" defTabSz="914400" rtl="0" eaLnBrk="1" latinLnBrk="0" hangingPunct="1">
-              <a:lnSpc>
-                <a:spcPct val="90000"/>
-              </a:lnSpc>
-              <a:spcBef>
-                <a:spcPts val="500"/>
-              </a:spcBef>
-              <a:buFont typeface="Arial" panose="020B0604020202020204" pitchFamily="34" charset="0"/>
-              <a:buNone/>
-              <a:defRPr sz="1600" kern="1200">
-                <a:solidFill>
-                  <a:schemeClr val="tx1">
-                    <a:tint val="75000"/>
-                  </a:schemeClr>
-                </a:solidFill>
-                <a:latin typeface="+mn-lt"/>
-                <a:ea typeface="+mn-ea"/>
-                <a:cs typeface="+mn-cs"/>
-              </a:defRPr>
-            </a:lvl6pPr>
-            <a:lvl7pPr marL="2743200" indent="0" algn="l" defTabSz="914400" rtl="0" eaLnBrk="1" latinLnBrk="0" hangingPunct="1">
-              <a:lnSpc>
-                <a:spcPct val="90000"/>
-              </a:lnSpc>
-              <a:spcBef>
-                <a:spcPts val="500"/>
-              </a:spcBef>
-              <a:buFont typeface="Arial" panose="020B0604020202020204" pitchFamily="34" charset="0"/>
-              <a:buNone/>
-              <a:defRPr sz="1600" kern="1200">
-                <a:solidFill>
-                  <a:schemeClr val="tx1">
-                    <a:tint val="75000"/>
-                  </a:schemeClr>
-                </a:solidFill>
-                <a:latin typeface="+mn-lt"/>
-                <a:ea typeface="+mn-ea"/>
-                <a:cs typeface="+mn-cs"/>
-              </a:defRPr>
-            </a:lvl7pPr>
-            <a:lvl8pPr marL="3200400" indent="0" algn="l" defTabSz="914400" rtl="0" eaLnBrk="1" latinLnBrk="0" hangingPunct="1">
-              <a:lnSpc>
-                <a:spcPct val="90000"/>
-              </a:lnSpc>
-              <a:spcBef>
-                <a:spcPts val="500"/>
-              </a:spcBef>
-              <a:buFont typeface="Arial" panose="020B0604020202020204" pitchFamily="34" charset="0"/>
-              <a:buNone/>
-              <a:defRPr sz="1600" kern="1200">
-                <a:solidFill>
-                  <a:schemeClr val="tx1">
-                    <a:tint val="75000"/>
-                  </a:schemeClr>
-                </a:solidFill>
-                <a:latin typeface="+mn-lt"/>
-                <a:ea typeface="+mn-ea"/>
-                <a:cs typeface="+mn-cs"/>
-              </a:defRPr>
-            </a:lvl8pPr>
-            <a:lvl9pPr marL="3657600" indent="0" algn="l" defTabSz="914400" rtl="0" eaLnBrk="1" latinLnBrk="0" hangingPunct="1">
-              <a:lnSpc>
-                <a:spcPct val="90000"/>
-              </a:lnSpc>
-              <a:spcBef>
-                <a:spcPts val="500"/>
-              </a:spcBef>
-              <a:buFont typeface="Arial" panose="020B0604020202020204" pitchFamily="34" charset="0"/>
-              <a:buNone/>
-              <a:defRPr sz="1600" kern="1200">
-                <a:solidFill>
-                  <a:schemeClr val="tx1">
-                    <a:tint val="75000"/>
-                  </a:schemeClr>
-                </a:solidFill>
-                <a:latin typeface="+mn-lt"/>
-                <a:ea typeface="+mn-ea"/>
-                <a:cs typeface="+mn-cs"/>
-              </a:defRPr>
-            </a:lvl9pPr>
-          </a:lstStyle>
-          <a:p>
-            <a:endParaRPr lang="en-CA" dirty="0"/>
-          </a:p>
-        </p:txBody>
-      </p:sp>
-      <p:sp>
-        <p:nvSpPr>
-          <p:cNvPr id="12" name="Title 7">
-            <a:extLst>
-              <a:ext uri="{FF2B5EF4-FFF2-40B4-BE49-F238E27FC236}">
-                <a16:creationId xmlns:a16="http://schemas.microsoft.com/office/drawing/2014/main" id="{71520384-A28C-4951-BA9F-337FAB2E7F09}"/>
-              </a:ext>
-            </a:extLst>
-          </p:cNvPr>
-          <p:cNvSpPr txBox="1">
-            <a:spLocks/>
-          </p:cNvSpPr>
-          <p:nvPr/>
-        </p:nvSpPr>
-        <p:spPr>
-          <a:xfrm>
-            <a:off x="5767754" y="365125"/>
-            <a:ext cx="6043246" cy="872832"/>
-          </a:xfrm>
-          <a:prstGeom prst="rect">
-            <a:avLst/>
-          </a:prstGeom>
-        </p:spPr>
-        <p:txBody>
           <a:bodyPr vert="horz" lIns="91440" tIns="45720" rIns="91440" bIns="45720" rtlCol="0" anchor="b">
-            <a:normAutofit fontScale="92500" lnSpcReduction="10000"/>
+            <a:noAutofit/>
           </a:bodyPr>
           <a:lstStyle>
             <a:lvl1pPr algn="l" defTabSz="914400" rtl="0" eaLnBrk="1" latinLnBrk="0" hangingPunct="1">
@@ -5727,23 +6145,20 @@
             </a:lvl1pPr>
           </a:lstStyle>
           <a:p>
-            <a:r>
-              <a:rPr lang="en-US" sz="3200" dirty="0">
-                <a:solidFill>
-                  <a:schemeClr val="tx1"/>
-                </a:solidFill>
-              </a:rPr>
-              <a:t>Problem/issues during data prep and model training</a:t>
-            </a:r>
+            <a:endParaRPr lang="en-US" sz="3200" b="1" dirty="0">
+              <a:solidFill>
+                <a:schemeClr val="tx1"/>
+              </a:solidFill>
+            </a:endParaRPr>
           </a:p>
         </p:txBody>
       </p:sp>
       <p:pic>
         <p:nvPicPr>
-          <p:cNvPr id="3" name="Picture 2" descr="A picture containing building, sitting, bench, side&#10;&#10;Description automatically generated">
-            <a:extLst>
-              <a:ext uri="{FF2B5EF4-FFF2-40B4-BE49-F238E27FC236}">
-                <a16:creationId xmlns:a16="http://schemas.microsoft.com/office/drawing/2014/main" id="{788E7E6C-7BAB-4265-984D-EB6A24770407}"/>
+          <p:cNvPr id="6" name="Picture 5">
+            <a:extLst>
+              <a:ext uri="{FF2B5EF4-FFF2-40B4-BE49-F238E27FC236}">
+                <a16:creationId xmlns:a16="http://schemas.microsoft.com/office/drawing/2014/main" id="{8AFF7F27-CC2C-4F1C-B834-F8DF066E1139}"/>
               </a:ext>
             </a:extLst>
           </p:cNvPr>
@@ -5752,21 +6167,16 @@
           </p:cNvPicPr>
           <p:nvPr/>
         </p:nvPicPr>
-        <p:blipFill rotWithShape="1">
-          <a:blip r:embed="rId2">
-            <a:extLst>
-              <a:ext uri="{28A0092B-C50C-407E-A947-70E740481C1C}">
-                <a14:useLocalDpi xmlns:a14="http://schemas.microsoft.com/office/drawing/2010/main" val="0"/>
-              </a:ext>
-            </a:extLst>
-          </a:blip>
-          <a:srcRect/>
-          <a:stretch/>
+        <p:blipFill>
+          <a:blip r:embed="rId2"/>
+          <a:stretch>
+            <a:fillRect/>
+          </a:stretch>
         </p:blipFill>
         <p:spPr>
           <a:xfrm>
-            <a:off x="-1" y="1"/>
-            <a:ext cx="4635315" cy="6857999"/>
+            <a:off x="5400468" y="980661"/>
+            <a:ext cx="6272467" cy="2332618"/>
           </a:xfrm>
           <a:prstGeom prst="rect">
             <a:avLst/>
@@ -5775,314 +6185,152 @@
       </p:pic>
       <p:sp>
         <p:nvSpPr>
-          <p:cNvPr id="5" name="Content Placeholder 2">
-            <a:extLst>
-              <a:ext uri="{FF2B5EF4-FFF2-40B4-BE49-F238E27FC236}">
-                <a16:creationId xmlns:a16="http://schemas.microsoft.com/office/drawing/2014/main" id="{9396B28C-E282-4965-8115-657015BD3054}"/>
-              </a:ext>
-            </a:extLst>
-          </p:cNvPr>
-          <p:cNvSpPr>
-            <a:spLocks noGrp="1"/>
-          </p:cNvSpPr>
-          <p:nvPr>
-            <p:ph idx="1"/>
-          </p:nvPr>
+          <p:cNvPr id="8" name="Rectangle: Rounded Corners 7">
+            <a:extLst>
+              <a:ext uri="{FF2B5EF4-FFF2-40B4-BE49-F238E27FC236}">
+                <a16:creationId xmlns:a16="http://schemas.microsoft.com/office/drawing/2014/main" id="{9A206776-BEA9-4043-B9ED-44860CB0041F}"/>
+              </a:ext>
+            </a:extLst>
+          </p:cNvPr>
+          <p:cNvSpPr/>
+          <p:nvPr/>
         </p:nvSpPr>
         <p:spPr>
           <a:xfrm>
-            <a:off x="5736628" y="1342886"/>
-            <a:ext cx="5928344" cy="5515114"/>
-          </a:xfrm>
-        </p:spPr>
-        <p:txBody>
-          <a:bodyPr>
-            <a:normAutofit/>
-          </a:bodyPr>
+            <a:off x="4833165" y="291475"/>
+            <a:ext cx="7282805" cy="573979"/>
+          </a:xfrm>
+          <a:prstGeom prst="roundRect">
+            <a:avLst/>
+          </a:prstGeom>
+          <a:solidFill>
+            <a:schemeClr val="bg1">
+              <a:lumMod val="65000"/>
+            </a:schemeClr>
+          </a:solidFill>
+          <a:ln>
+            <a:noFill/>
+          </a:ln>
+        </p:spPr>
+        <p:style>
+          <a:lnRef idx="2">
+            <a:schemeClr val="accent1">
+              <a:shade val="50000"/>
+            </a:schemeClr>
+          </a:lnRef>
+          <a:fillRef idx="1">
+            <a:schemeClr val="accent1"/>
+          </a:fillRef>
+          <a:effectRef idx="0">
+            <a:schemeClr val="accent1"/>
+          </a:effectRef>
+          <a:fontRef idx="minor">
+            <a:schemeClr val="lt1"/>
+          </a:fontRef>
+        </p:style>
+        <p:txBody>
+          <a:bodyPr rtlCol="0" anchor="ctr"/>
           <a:lstStyle/>
           <a:p>
-            <a:r>
-              <a:rPr lang="en-CA" b="1" dirty="0">
-                <a:solidFill>
-                  <a:schemeClr val="tx1"/>
-                </a:solidFill>
-              </a:rPr>
-              <a:t>Data preparation:</a:t>
-            </a:r>
-          </a:p>
-          <a:p>
-            <a:r>
-              <a:rPr lang="en-CA" dirty="0">
-                <a:solidFill>
-                  <a:schemeClr val="tx1"/>
-                </a:solidFill>
-              </a:rPr>
-              <a:t>1) Getting APPL stock data</a:t>
-            </a:r>
-          </a:p>
-          <a:p>
-            <a:endParaRPr lang="en-CA" dirty="0">
-              <a:solidFill>
-                <a:schemeClr val="tx1"/>
-              </a:solidFill>
-            </a:endParaRPr>
-          </a:p>
-          <a:p>
-            <a:r>
-              <a:rPr lang="en-CA" dirty="0">
-                <a:solidFill>
-                  <a:schemeClr val="tx1"/>
-                </a:solidFill>
-              </a:rPr>
-              <a:t>2) Getting Twitter Data using </a:t>
-            </a:r>
-            <a:r>
-              <a:rPr lang="en-CA" dirty="0" err="1">
-                <a:solidFill>
-                  <a:schemeClr val="tx1"/>
-                </a:solidFill>
-              </a:rPr>
-              <a:t>Tweepy</a:t>
-            </a:r>
-            <a:r>
-              <a:rPr lang="en-CA" dirty="0">
-                <a:solidFill>
-                  <a:schemeClr val="tx1"/>
-                </a:solidFill>
-              </a:rPr>
-              <a:t> Library </a:t>
-            </a:r>
-          </a:p>
-          <a:p>
-            <a:endParaRPr lang="en-CA" dirty="0">
-              <a:solidFill>
-                <a:schemeClr val="tx1"/>
-              </a:solidFill>
-            </a:endParaRPr>
-          </a:p>
-          <a:p>
-            <a:r>
-              <a:rPr lang="en-CA" dirty="0">
-                <a:solidFill>
-                  <a:schemeClr val="tx1"/>
-                </a:solidFill>
-              </a:rPr>
-              <a:t>3) Getting Twitter Data with “</a:t>
-            </a:r>
-            <a:r>
-              <a:rPr lang="en-CA" dirty="0" err="1">
-                <a:solidFill>
-                  <a:schemeClr val="tx1"/>
-                </a:solidFill>
-              </a:rPr>
-              <a:t>ts_polarity</a:t>
-            </a:r>
-            <a:r>
-              <a:rPr lang="en-CA" dirty="0">
-                <a:solidFill>
-                  <a:schemeClr val="tx1"/>
-                </a:solidFill>
-              </a:rPr>
-              <a:t>” and “</a:t>
-            </a:r>
-            <a:r>
-              <a:rPr lang="en-CA" dirty="0" err="1">
-                <a:solidFill>
-                  <a:schemeClr val="tx1"/>
-                </a:solidFill>
-              </a:rPr>
-              <a:t>twitter_volume</a:t>
-            </a:r>
-            <a:r>
-              <a:rPr lang="en-CA" dirty="0">
-                <a:solidFill>
-                  <a:schemeClr val="tx1"/>
-                </a:solidFill>
-              </a:rPr>
-              <a:t>”</a:t>
-            </a:r>
-            <a:endParaRPr lang="en-CA" b="1" dirty="0">
-              <a:solidFill>
-                <a:schemeClr val="tx1"/>
-              </a:solidFill>
-            </a:endParaRPr>
-          </a:p>
-          <a:p>
-            <a:endParaRPr lang="en-CA" sz="100" b="1" dirty="0"/>
-          </a:p>
-          <a:p>
-            <a:r>
-              <a:rPr lang="en-CA" b="1" dirty="0"/>
-              <a:t>Model Training:</a:t>
-            </a:r>
-          </a:p>
-          <a:p>
-            <a:r>
-              <a:rPr lang="en-CA" dirty="0"/>
-              <a:t>1) Selecting ideal window size</a:t>
-            </a:r>
-          </a:p>
-          <a:p>
-            <a:r>
-              <a:rPr lang="en-CA" dirty="0"/>
-              <a:t>2) </a:t>
-            </a:r>
-            <a:r>
-              <a:rPr lang="en-CA" dirty="0" err="1"/>
-              <a:t>window_data</a:t>
-            </a:r>
-            <a:r>
-              <a:rPr lang="en-CA" dirty="0"/>
-              <a:t> function</a:t>
-            </a:r>
-          </a:p>
-          <a:p>
-            <a:r>
-              <a:rPr lang="en-CA" dirty="0"/>
-              <a:t>3) Model fitting</a:t>
+            <a:pPr algn="ctr"/>
+            <a:r>
+              <a:rPr lang="en-CA" sz="2400" b="1" dirty="0"/>
+              <a:t>RF Classifier</a:t>
+            </a:r>
+          </a:p>
+        </p:txBody>
+      </p:sp>
+      <p:sp>
+        <p:nvSpPr>
+          <p:cNvPr id="10" name="Rectangle: Rounded Corners 9">
+            <a:extLst>
+              <a:ext uri="{FF2B5EF4-FFF2-40B4-BE49-F238E27FC236}">
+                <a16:creationId xmlns:a16="http://schemas.microsoft.com/office/drawing/2014/main" id="{72FB6A26-7B97-47B9-9704-B96EB326FA91}"/>
+              </a:ext>
+            </a:extLst>
+          </p:cNvPr>
+          <p:cNvSpPr/>
+          <p:nvPr/>
+        </p:nvSpPr>
+        <p:spPr>
+          <a:xfrm>
+            <a:off x="4833164" y="3754740"/>
+            <a:ext cx="7282805" cy="596177"/>
+          </a:xfrm>
+          <a:prstGeom prst="roundRect">
+            <a:avLst/>
+          </a:prstGeom>
+          <a:solidFill>
+            <a:schemeClr val="bg1">
+              <a:lumMod val="65000"/>
+            </a:schemeClr>
+          </a:solidFill>
+          <a:ln>
+            <a:noFill/>
+          </a:ln>
+        </p:spPr>
+        <p:style>
+          <a:lnRef idx="2">
+            <a:schemeClr val="accent1">
+              <a:shade val="50000"/>
+            </a:schemeClr>
+          </a:lnRef>
+          <a:fillRef idx="1">
+            <a:schemeClr val="accent1"/>
+          </a:fillRef>
+          <a:effectRef idx="0">
+            <a:schemeClr val="accent1"/>
+          </a:effectRef>
+          <a:fontRef idx="minor">
+            <a:schemeClr val="lt1"/>
+          </a:fontRef>
+        </p:style>
+        <p:txBody>
+          <a:bodyPr rtlCol="0" anchor="ctr"/>
+          <a:lstStyle/>
+          <a:p>
+            <a:pPr algn="ctr"/>
+            <a:r>
+              <a:rPr lang="en-CA" sz="2400" b="1" dirty="0"/>
+              <a:t>Gradient Booster</a:t>
             </a:r>
           </a:p>
         </p:txBody>
       </p:sp>
       <p:pic>
         <p:nvPicPr>
-          <p:cNvPr id="1026" name="Picture 2" descr="THUMBS-UP (noun) definition and synonyms | Macmillan Dictionary">
-            <a:extLst>
-              <a:ext uri="{FF2B5EF4-FFF2-40B4-BE49-F238E27FC236}">
-                <a16:creationId xmlns:a16="http://schemas.microsoft.com/office/drawing/2014/main" id="{53E0F85B-0440-4319-AEDD-25F30BB63251}"/>
+          <p:cNvPr id="12" name="Picture 11">
+            <a:extLst>
+              <a:ext uri="{FF2B5EF4-FFF2-40B4-BE49-F238E27FC236}">
+                <a16:creationId xmlns:a16="http://schemas.microsoft.com/office/drawing/2014/main" id="{3B2A146F-C143-417F-8A94-99D06E63587B}"/>
               </a:ext>
             </a:extLst>
           </p:cNvPr>
           <p:cNvPicPr>
-            <a:picLocks noChangeAspect="1" noChangeArrowheads="1"/>
+            <a:picLocks noChangeAspect="1"/>
           </p:cNvPicPr>
           <p:nvPr/>
         </p:nvPicPr>
-        <p:blipFill rotWithShape="1">
-          <a:blip r:embed="rId3">
-            <a:extLst>
-              <a:ext uri="{28A0092B-C50C-407E-A947-70E740481C1C}">
-                <a14:useLocalDpi xmlns:a14="http://schemas.microsoft.com/office/drawing/2010/main" val="0"/>
-              </a:ext>
-            </a:extLst>
-          </a:blip>
-          <a:srcRect l="18710" r="15484"/>
-          <a:stretch/>
+        <p:blipFill>
+          <a:blip r:embed="rId3"/>
+          <a:stretch>
+            <a:fillRect/>
+          </a:stretch>
         </p:blipFill>
-        <p:spPr bwMode="auto">
-          <a:xfrm>
-            <a:off x="10538790" y="1357225"/>
-            <a:ext cx="1351723" cy="1091233"/>
+        <p:spPr>
+          <a:xfrm>
+            <a:off x="5658119" y="4426226"/>
+            <a:ext cx="5845644" cy="2246243"/>
           </a:xfrm>
           <a:prstGeom prst="rect">
             <a:avLst/>
           </a:prstGeom>
-          <a:noFill/>
-          <a:extLst>
-            <a:ext uri="{909E8E84-426E-40DD-AFC4-6F175D3DCCD1}">
-              <a14:hiddenFill xmlns:a14="http://schemas.microsoft.com/office/drawing/2010/main">
-                <a:solidFill>
-                  <a:srgbClr val="FFFFFF"/>
-                </a:solidFill>
-              </a14:hiddenFill>
-            </a:ext>
-          </a:extLst>
-        </p:spPr>
-      </p:pic>
-      <p:pic>
-        <p:nvPicPr>
-          <p:cNvPr id="7" name="Picture 2" descr="THUMBS-UP (noun) definition and synonyms | Macmillan Dictionary">
-            <a:extLst>
-              <a:ext uri="{FF2B5EF4-FFF2-40B4-BE49-F238E27FC236}">
-                <a16:creationId xmlns:a16="http://schemas.microsoft.com/office/drawing/2014/main" id="{6D0921AB-6D98-4DA0-90E0-836B63AB2805}"/>
-              </a:ext>
-            </a:extLst>
-          </p:cNvPr>
-          <p:cNvPicPr>
-            <a:picLocks noChangeAspect="1" noChangeArrowheads="1"/>
-          </p:cNvPicPr>
-          <p:nvPr/>
-        </p:nvPicPr>
-        <p:blipFill rotWithShape="1">
-          <a:blip r:embed="rId3">
-            <a:extLst>
-              <a:ext uri="{28A0092B-C50C-407E-A947-70E740481C1C}">
-                <a14:useLocalDpi xmlns:a14="http://schemas.microsoft.com/office/drawing/2010/main" val="0"/>
-              </a:ext>
-            </a:extLst>
-          </a:blip>
-          <a:srcRect l="18065" r="16129"/>
-          <a:stretch/>
-        </p:blipFill>
-        <p:spPr bwMode="auto">
-          <a:xfrm rot="10800000">
-            <a:off x="10459278" y="2619445"/>
-            <a:ext cx="1351722" cy="1091233"/>
-          </a:xfrm>
-          <a:prstGeom prst="rect">
-            <a:avLst/>
-          </a:prstGeom>
-          <a:noFill/>
-          <a:extLst>
-            <a:ext uri="{909E8E84-426E-40DD-AFC4-6F175D3DCCD1}">
-              <a14:hiddenFill xmlns:a14="http://schemas.microsoft.com/office/drawing/2010/main">
-                <a:solidFill>
-                  <a:srgbClr val="FFFFFF"/>
-                </a:solidFill>
-              </a14:hiddenFill>
-            </a:ext>
-          </a:extLst>
-        </p:spPr>
-      </p:pic>
-      <p:pic>
-        <p:nvPicPr>
-          <p:cNvPr id="8" name="Picture 2" descr="THUMBS-UP (noun) definition and synonyms | Macmillan Dictionary">
-            <a:extLst>
-              <a:ext uri="{FF2B5EF4-FFF2-40B4-BE49-F238E27FC236}">
-                <a16:creationId xmlns:a16="http://schemas.microsoft.com/office/drawing/2014/main" id="{B3431708-0C28-4CCE-BB65-09990EA0A9EC}"/>
-              </a:ext>
-            </a:extLst>
-          </p:cNvPr>
-          <p:cNvPicPr>
-            <a:picLocks noChangeAspect="1" noChangeArrowheads="1"/>
-          </p:cNvPicPr>
-          <p:nvPr/>
-        </p:nvPicPr>
-        <p:blipFill rotWithShape="1">
-          <a:blip r:embed="rId3">
-            <a:extLst>
-              <a:ext uri="{28A0092B-C50C-407E-A947-70E740481C1C}">
-                <a14:useLocalDpi xmlns:a14="http://schemas.microsoft.com/office/drawing/2010/main" val="0"/>
-              </a:ext>
-            </a:extLst>
-          </a:blip>
-          <a:srcRect l="18710" r="15484"/>
-          <a:stretch/>
-        </p:blipFill>
-        <p:spPr bwMode="auto">
-          <a:xfrm>
-            <a:off x="10538790" y="3725016"/>
-            <a:ext cx="1351723" cy="1091233"/>
-          </a:xfrm>
-          <a:prstGeom prst="rect">
-            <a:avLst/>
-          </a:prstGeom>
-          <a:noFill/>
-          <a:extLst>
-            <a:ext uri="{909E8E84-426E-40DD-AFC4-6F175D3DCCD1}">
-              <a14:hiddenFill xmlns:a14="http://schemas.microsoft.com/office/drawing/2010/main">
-                <a:solidFill>
-                  <a:srgbClr val="FFFFFF"/>
-                </a:solidFill>
-              </a14:hiddenFill>
-            </a:ext>
-          </a:extLst>
         </p:spPr>
       </p:pic>
     </p:spTree>
     <p:extLst>
       <p:ext uri="{BB962C8B-B14F-4D97-AF65-F5344CB8AC3E}">
-        <p14:creationId xmlns:p14="http://schemas.microsoft.com/office/powerpoint/2010/main" val="2151820144"/>
+        <p14:creationId xmlns:p14="http://schemas.microsoft.com/office/powerpoint/2010/main" val="1093545827"/>
       </p:ext>
     </p:extLst>
   </p:cSld>
@@ -6111,10 +6359,10 @@
       </p:grpSpPr>
       <p:sp>
         <p:nvSpPr>
-          <p:cNvPr id="12" name="Title 7">
-            <a:extLst>
-              <a:ext uri="{FF2B5EF4-FFF2-40B4-BE49-F238E27FC236}">
-                <a16:creationId xmlns:a16="http://schemas.microsoft.com/office/drawing/2014/main" id="{71520384-A28C-4951-BA9F-337FAB2E7F09}"/>
+          <p:cNvPr id="2" name="Text Placeholder 3">
+            <a:extLst>
+              <a:ext uri="{FF2B5EF4-FFF2-40B4-BE49-F238E27FC236}">
+                <a16:creationId xmlns:a16="http://schemas.microsoft.com/office/drawing/2014/main" id="{30DC66C4-6C3F-45ED-A950-A55681BAC970}"/>
               </a:ext>
             </a:extLst>
           </p:cNvPr>
@@ -6125,16 +6373,230 @@
         </p:nvSpPr>
         <p:spPr>
           <a:xfrm>
-            <a:off x="5462953" y="331304"/>
-            <a:ext cx="7086855" cy="535592"/>
+            <a:off x="5767754" y="1243259"/>
+            <a:ext cx="5897218" cy="5074498"/>
           </a:xfrm>
           <a:prstGeom prst="rect">
             <a:avLst/>
           </a:prstGeom>
         </p:spPr>
         <p:txBody>
+          <a:bodyPr vert="horz" lIns="91440" tIns="45720" rIns="91440" bIns="45720" rtlCol="0" anchor="ctr">
+            <a:normAutofit/>
+          </a:bodyPr>
+          <a:lstStyle>
+            <a:lvl1pPr marL="0" indent="0" algn="l" defTabSz="914400" rtl="0" eaLnBrk="1" latinLnBrk="0" hangingPunct="1">
+              <a:lnSpc>
+                <a:spcPct val="100000"/>
+              </a:lnSpc>
+              <a:spcBef>
+                <a:spcPts val="1000"/>
+              </a:spcBef>
+              <a:buFont typeface="Arial" panose="020B0604020202020204" pitchFamily="34" charset="0"/>
+              <a:buNone/>
+              <a:defRPr sz="2400" kern="1200" spc="600">
+                <a:solidFill>
+                  <a:schemeClr val="tx1">
+                    <a:tint val="75000"/>
+                  </a:schemeClr>
+                </a:solidFill>
+                <a:latin typeface="+mn-lt"/>
+                <a:ea typeface="+mn-ea"/>
+                <a:cs typeface="+mn-cs"/>
+              </a:defRPr>
+            </a:lvl1pPr>
+            <a:lvl2pPr marL="457200" indent="0" algn="l" defTabSz="914400" rtl="0" eaLnBrk="1" latinLnBrk="0" hangingPunct="1">
+              <a:lnSpc>
+                <a:spcPct val="150000"/>
+              </a:lnSpc>
+              <a:spcBef>
+                <a:spcPts val="500"/>
+              </a:spcBef>
+              <a:buFont typeface="Arial" panose="020B0604020202020204" pitchFamily="34" charset="0"/>
+              <a:buNone/>
+              <a:defRPr sz="2000" kern="1200">
+                <a:solidFill>
+                  <a:schemeClr val="tx1">
+                    <a:tint val="75000"/>
+                  </a:schemeClr>
+                </a:solidFill>
+                <a:latin typeface="+mn-lt"/>
+                <a:ea typeface="+mn-ea"/>
+                <a:cs typeface="+mn-cs"/>
+              </a:defRPr>
+            </a:lvl2pPr>
+            <a:lvl3pPr marL="914400" indent="0" algn="l" defTabSz="914400" rtl="0" eaLnBrk="1" latinLnBrk="0" hangingPunct="1">
+              <a:lnSpc>
+                <a:spcPct val="150000"/>
+              </a:lnSpc>
+              <a:spcBef>
+                <a:spcPts val="500"/>
+              </a:spcBef>
+              <a:buFont typeface="Arial" panose="020B0604020202020204" pitchFamily="34" charset="0"/>
+              <a:buNone/>
+              <a:defRPr sz="1800" kern="1200">
+                <a:solidFill>
+                  <a:schemeClr val="tx1">
+                    <a:tint val="75000"/>
+                  </a:schemeClr>
+                </a:solidFill>
+                <a:latin typeface="+mn-lt"/>
+                <a:ea typeface="+mn-ea"/>
+                <a:cs typeface="+mn-cs"/>
+              </a:defRPr>
+            </a:lvl3pPr>
+            <a:lvl4pPr marL="1371600" indent="0" algn="l" defTabSz="914400" rtl="0" eaLnBrk="1" latinLnBrk="0" hangingPunct="1">
+              <a:lnSpc>
+                <a:spcPct val="150000"/>
+              </a:lnSpc>
+              <a:spcBef>
+                <a:spcPts val="500"/>
+              </a:spcBef>
+              <a:buFont typeface="Arial" panose="020B0604020202020204" pitchFamily="34" charset="0"/>
+              <a:buNone/>
+              <a:defRPr sz="1600" kern="1200">
+                <a:solidFill>
+                  <a:schemeClr val="tx1">
+                    <a:tint val="75000"/>
+                  </a:schemeClr>
+                </a:solidFill>
+                <a:latin typeface="+mn-lt"/>
+                <a:ea typeface="+mn-ea"/>
+                <a:cs typeface="+mn-cs"/>
+              </a:defRPr>
+            </a:lvl4pPr>
+            <a:lvl5pPr marL="1828800" indent="0" algn="l" defTabSz="914400" rtl="0" eaLnBrk="1" latinLnBrk="0" hangingPunct="1">
+              <a:lnSpc>
+                <a:spcPct val="150000"/>
+              </a:lnSpc>
+              <a:spcBef>
+                <a:spcPts val="500"/>
+              </a:spcBef>
+              <a:buFont typeface="Arial" panose="020B0604020202020204" pitchFamily="34" charset="0"/>
+              <a:buNone/>
+              <a:defRPr sz="1600" kern="1200">
+                <a:solidFill>
+                  <a:schemeClr val="tx1">
+                    <a:tint val="75000"/>
+                  </a:schemeClr>
+                </a:solidFill>
+                <a:latin typeface="+mn-lt"/>
+                <a:ea typeface="+mn-ea"/>
+                <a:cs typeface="+mn-cs"/>
+              </a:defRPr>
+            </a:lvl5pPr>
+            <a:lvl6pPr marL="2286000" indent="0" algn="l" defTabSz="914400" rtl="0" eaLnBrk="1" latinLnBrk="0" hangingPunct="1">
+              <a:lnSpc>
+                <a:spcPct val="90000"/>
+              </a:lnSpc>
+              <a:spcBef>
+                <a:spcPts val="500"/>
+              </a:spcBef>
+              <a:buFont typeface="Arial" panose="020B0604020202020204" pitchFamily="34" charset="0"/>
+              <a:buNone/>
+              <a:defRPr sz="1600" kern="1200">
+                <a:solidFill>
+                  <a:schemeClr val="tx1">
+                    <a:tint val="75000"/>
+                  </a:schemeClr>
+                </a:solidFill>
+                <a:latin typeface="+mn-lt"/>
+                <a:ea typeface="+mn-ea"/>
+                <a:cs typeface="+mn-cs"/>
+              </a:defRPr>
+            </a:lvl6pPr>
+            <a:lvl7pPr marL="2743200" indent="0" algn="l" defTabSz="914400" rtl="0" eaLnBrk="1" latinLnBrk="0" hangingPunct="1">
+              <a:lnSpc>
+                <a:spcPct val="90000"/>
+              </a:lnSpc>
+              <a:spcBef>
+                <a:spcPts val="500"/>
+              </a:spcBef>
+              <a:buFont typeface="Arial" panose="020B0604020202020204" pitchFamily="34" charset="0"/>
+              <a:buNone/>
+              <a:defRPr sz="1600" kern="1200">
+                <a:solidFill>
+                  <a:schemeClr val="tx1">
+                    <a:tint val="75000"/>
+                  </a:schemeClr>
+                </a:solidFill>
+                <a:latin typeface="+mn-lt"/>
+                <a:ea typeface="+mn-ea"/>
+                <a:cs typeface="+mn-cs"/>
+              </a:defRPr>
+            </a:lvl7pPr>
+            <a:lvl8pPr marL="3200400" indent="0" algn="l" defTabSz="914400" rtl="0" eaLnBrk="1" latinLnBrk="0" hangingPunct="1">
+              <a:lnSpc>
+                <a:spcPct val="90000"/>
+              </a:lnSpc>
+              <a:spcBef>
+                <a:spcPts val="500"/>
+              </a:spcBef>
+              <a:buFont typeface="Arial" panose="020B0604020202020204" pitchFamily="34" charset="0"/>
+              <a:buNone/>
+              <a:defRPr sz="1600" kern="1200">
+                <a:solidFill>
+                  <a:schemeClr val="tx1">
+                    <a:tint val="75000"/>
+                  </a:schemeClr>
+                </a:solidFill>
+                <a:latin typeface="+mn-lt"/>
+                <a:ea typeface="+mn-ea"/>
+                <a:cs typeface="+mn-cs"/>
+              </a:defRPr>
+            </a:lvl8pPr>
+            <a:lvl9pPr marL="3657600" indent="0" algn="l" defTabSz="914400" rtl="0" eaLnBrk="1" latinLnBrk="0" hangingPunct="1">
+              <a:lnSpc>
+                <a:spcPct val="90000"/>
+              </a:lnSpc>
+              <a:spcBef>
+                <a:spcPts val="500"/>
+              </a:spcBef>
+              <a:buFont typeface="Arial" panose="020B0604020202020204" pitchFamily="34" charset="0"/>
+              <a:buNone/>
+              <a:defRPr sz="1600" kern="1200">
+                <a:solidFill>
+                  <a:schemeClr val="tx1">
+                    <a:tint val="75000"/>
+                  </a:schemeClr>
+                </a:solidFill>
+                <a:latin typeface="+mn-lt"/>
+                <a:ea typeface="+mn-ea"/>
+                <a:cs typeface="+mn-cs"/>
+              </a:defRPr>
+            </a:lvl9pPr>
+          </a:lstStyle>
+          <a:p>
+            <a:endParaRPr lang="en-CA" dirty="0"/>
+          </a:p>
+        </p:txBody>
+      </p:sp>
+      <p:sp>
+        <p:nvSpPr>
+          <p:cNvPr id="12" name="Title 7">
+            <a:extLst>
+              <a:ext uri="{FF2B5EF4-FFF2-40B4-BE49-F238E27FC236}">
+                <a16:creationId xmlns:a16="http://schemas.microsoft.com/office/drawing/2014/main" id="{71520384-A28C-4951-BA9F-337FAB2E7F09}"/>
+              </a:ext>
+            </a:extLst>
+          </p:cNvPr>
+          <p:cNvSpPr txBox="1">
+            <a:spLocks/>
+          </p:cNvSpPr>
+          <p:nvPr/>
+        </p:nvSpPr>
+        <p:spPr>
+          <a:xfrm>
+            <a:off x="5767754" y="365125"/>
+            <a:ext cx="6043246" cy="872832"/>
+          </a:xfrm>
+          <a:prstGeom prst="rect">
+            <a:avLst/>
+          </a:prstGeom>
+        </p:spPr>
+        <p:txBody>
           <a:bodyPr vert="horz" lIns="91440" tIns="45720" rIns="91440" bIns="45720" rtlCol="0" anchor="b">
-            <a:normAutofit fontScale="92500"/>
+            <a:normAutofit fontScale="92500" lnSpcReduction="10000"/>
           </a:bodyPr>
           <a:lstStyle>
             <a:lvl1pPr algn="l" defTabSz="914400" rtl="0" eaLnBrk="1" latinLnBrk="0" hangingPunct="1">
@@ -6162,7 +6624,7 @@
                   <a:schemeClr val="tx1"/>
                 </a:solidFill>
               </a:rPr>
-              <a:t>Model Training Process/Techniques</a:t>
+              <a:t>Summary/Conclusions/Predictions</a:t>
             </a:r>
           </a:p>
         </p:txBody>
@@ -6172,7 +6634,7 @@
           <p:cNvPr id="3" name="Picture 2" descr="A picture containing building, sitting, bench, side&#10;&#10;Description automatically generated">
             <a:extLst>
               <a:ext uri="{FF2B5EF4-FFF2-40B4-BE49-F238E27FC236}">
-                <a16:creationId xmlns:a16="http://schemas.microsoft.com/office/drawing/2014/main" id="{E2D62E66-70A8-4BA5-9858-62A3672EE471}"/>
+                <a16:creationId xmlns:a16="http://schemas.microsoft.com/office/drawing/2014/main" id="{DAFFDFD8-67E9-4196-B37D-AA4BF9DA9420}"/>
               </a:ext>
             </a:extLst>
           </p:cNvPr>
@@ -6207,7 +6669,7 @@
           <p:cNvPr id="5" name="Picture 4">
             <a:extLst>
               <a:ext uri="{FF2B5EF4-FFF2-40B4-BE49-F238E27FC236}">
-                <a16:creationId xmlns:a16="http://schemas.microsoft.com/office/drawing/2014/main" id="{7C842528-3AAA-4594-9D63-6E0F1CCAE2D9}"/>
+                <a16:creationId xmlns:a16="http://schemas.microsoft.com/office/drawing/2014/main" id="{FB3CF1FB-3253-49D1-B031-65D3E4C4CF66}"/>
               </a:ext>
               <a:ext uri="{C183D7F6-B498-43B3-948B-1728B52AA6E4}">
                 <adec:decorative xmlns:adec="http://schemas.microsoft.com/office/drawing/2017/decorative" val="1"/>
@@ -6240,262 +6702,111 @@
           </a:prstGeom>
         </p:spPr>
       </p:pic>
-      <p:pic>
-        <p:nvPicPr>
-          <p:cNvPr id="6" name="Picture 5">
-            <a:extLst>
-              <a:ext uri="{FF2B5EF4-FFF2-40B4-BE49-F238E27FC236}">
-                <a16:creationId xmlns:a16="http://schemas.microsoft.com/office/drawing/2014/main" id="{DF633E80-FBE6-4735-925E-466BF78423A1}"/>
-              </a:ext>
-            </a:extLst>
-          </p:cNvPr>
-          <p:cNvPicPr>
-            <a:picLocks noChangeAspect="1"/>
-          </p:cNvPicPr>
+      <p:sp>
+        <p:nvSpPr>
+          <p:cNvPr id="6" name="Title 7">
+            <a:extLst>
+              <a:ext uri="{FF2B5EF4-FFF2-40B4-BE49-F238E27FC236}">
+                <a16:creationId xmlns:a16="http://schemas.microsoft.com/office/drawing/2014/main" id="{734C553F-1313-4473-9256-A5C64163FAB3}"/>
+              </a:ext>
+            </a:extLst>
+          </p:cNvPr>
+          <p:cNvSpPr txBox="1">
+            <a:spLocks/>
+          </p:cNvSpPr>
           <p:nvPr/>
-        </p:nvPicPr>
-        <p:blipFill rotWithShape="1">
-          <a:blip r:embed="rId4">
-            <a:extLst>
-              <a:ext uri="{28A0092B-C50C-407E-A947-70E740481C1C}">
-                <a14:useLocalDpi xmlns:a14="http://schemas.microsoft.com/office/drawing/2010/main" val="0"/>
-              </a:ext>
-            </a:extLst>
-          </a:blip>
-          <a:srcRect r="10797"/>
-          <a:stretch/>
-        </p:blipFill>
+        </p:nvSpPr>
         <p:spPr>
           <a:xfrm>
-            <a:off x="6894189" y="1173431"/>
-            <a:ext cx="4993265" cy="1738659"/>
+            <a:off x="5767754" y="1557820"/>
+            <a:ext cx="6043246" cy="3438250"/>
           </a:xfrm>
           <a:prstGeom prst="rect">
             <a:avLst/>
           </a:prstGeom>
         </p:spPr>
-      </p:pic>
-      <p:pic>
-        <p:nvPicPr>
-          <p:cNvPr id="8" name="Picture 7">
-            <a:extLst>
-              <a:ext uri="{FF2B5EF4-FFF2-40B4-BE49-F238E27FC236}">
-                <a16:creationId xmlns:a16="http://schemas.microsoft.com/office/drawing/2014/main" id="{2E4BA76B-5C6C-4F23-A317-EFE35EA7C339}"/>
-              </a:ext>
-            </a:extLst>
-          </p:cNvPr>
-          <p:cNvPicPr>
-            <a:picLocks noChangeAspect="1"/>
-          </p:cNvPicPr>
-          <p:nvPr/>
-        </p:nvPicPr>
-        <p:blipFill rotWithShape="1">
-          <a:blip r:embed="rId5">
-            <a:extLst>
-              <a:ext uri="{28A0092B-C50C-407E-A947-70E740481C1C}">
-                <a14:useLocalDpi xmlns:a14="http://schemas.microsoft.com/office/drawing/2010/main" val="0"/>
-              </a:ext>
-            </a:extLst>
-          </a:blip>
-          <a:srcRect r="9555"/>
-          <a:stretch/>
-        </p:blipFill>
-        <p:spPr>
-          <a:xfrm>
-            <a:off x="7050157" y="4986814"/>
-            <a:ext cx="4837297" cy="1738659"/>
-          </a:xfrm>
-          <a:prstGeom prst="rect">
-            <a:avLst/>
-          </a:prstGeom>
-        </p:spPr>
-      </p:pic>
-      <p:pic>
-        <p:nvPicPr>
-          <p:cNvPr id="10" name="Picture 9">
-            <a:extLst>
-              <a:ext uri="{FF2B5EF4-FFF2-40B4-BE49-F238E27FC236}">
-                <a16:creationId xmlns:a16="http://schemas.microsoft.com/office/drawing/2014/main" id="{8934CEDD-4B5F-4B5E-823A-4C65F35CC981}"/>
-              </a:ext>
-            </a:extLst>
-          </p:cNvPr>
-          <p:cNvPicPr>
-            <a:picLocks noChangeAspect="1"/>
-          </p:cNvPicPr>
-          <p:nvPr/>
-        </p:nvPicPr>
-        <p:blipFill rotWithShape="1">
-          <a:blip r:embed="rId6">
-            <a:extLst>
-              <a:ext uri="{28A0092B-C50C-407E-A947-70E740481C1C}">
-                <a14:useLocalDpi xmlns:a14="http://schemas.microsoft.com/office/drawing/2010/main" val="0"/>
-              </a:ext>
-            </a:extLst>
-          </a:blip>
-          <a:srcRect r="9323"/>
-          <a:stretch/>
-        </p:blipFill>
-        <p:spPr>
-          <a:xfrm>
-            <a:off x="6894188" y="3112340"/>
-            <a:ext cx="5152039" cy="1667142"/>
-          </a:xfrm>
-          <a:prstGeom prst="rect">
-            <a:avLst/>
-          </a:prstGeom>
-        </p:spPr>
-      </p:pic>
-      <p:sp>
-        <p:nvSpPr>
-          <p:cNvPr id="11" name="Rectangle: Rounded Corners 10">
-            <a:extLst>
-              <a:ext uri="{FF2B5EF4-FFF2-40B4-BE49-F238E27FC236}">
-                <a16:creationId xmlns:a16="http://schemas.microsoft.com/office/drawing/2014/main" id="{AA9C5549-6874-4819-9E71-8D7066FD0251}"/>
-              </a:ext>
-            </a:extLst>
-          </p:cNvPr>
-          <p:cNvSpPr/>
-          <p:nvPr/>
-        </p:nvSpPr>
-        <p:spPr>
-          <a:xfrm>
-            <a:off x="5247861" y="1563757"/>
-            <a:ext cx="1646327" cy="795130"/>
-          </a:xfrm>
-          <a:prstGeom prst="roundRect">
-            <a:avLst/>
-          </a:prstGeom>
-        </p:spPr>
-        <p:style>
-          <a:lnRef idx="2">
-            <a:schemeClr val="accent1">
-              <a:shade val="50000"/>
-            </a:schemeClr>
-          </a:lnRef>
-          <a:fillRef idx="1">
-            <a:schemeClr val="accent1"/>
-          </a:fillRef>
-          <a:effectRef idx="0">
-            <a:schemeClr val="accent1"/>
-          </a:effectRef>
-          <a:fontRef idx="minor">
-            <a:schemeClr val="lt1"/>
-          </a:fontRef>
-        </p:style>
-        <p:txBody>
-          <a:bodyPr rtlCol="0" anchor="ctr"/>
-          <a:lstStyle/>
-          <a:p>
-            <a:pPr algn="ctr"/>
-            <a:r>
-              <a:rPr lang="en-CA" dirty="0"/>
-              <a:t>XG Boost</a:t>
-            </a:r>
-          </a:p>
-        </p:txBody>
-      </p:sp>
-      <p:sp>
-        <p:nvSpPr>
-          <p:cNvPr id="13" name="Rectangle: Rounded Corners 12">
-            <a:extLst>
-              <a:ext uri="{FF2B5EF4-FFF2-40B4-BE49-F238E27FC236}">
-                <a16:creationId xmlns:a16="http://schemas.microsoft.com/office/drawing/2014/main" id="{B08D3A23-581A-42A5-BD56-1ACF65988A4E}"/>
-              </a:ext>
-            </a:extLst>
-          </p:cNvPr>
-          <p:cNvSpPr/>
-          <p:nvPr/>
-        </p:nvSpPr>
-        <p:spPr>
-          <a:xfrm>
-            <a:off x="5247861" y="5183855"/>
-            <a:ext cx="1646327" cy="795130"/>
-          </a:xfrm>
-          <a:prstGeom prst="roundRect">
-            <a:avLst/>
-          </a:prstGeom>
-        </p:spPr>
-        <p:style>
-          <a:lnRef idx="2">
-            <a:schemeClr val="accent1">
-              <a:shade val="50000"/>
-            </a:schemeClr>
-          </a:lnRef>
-          <a:fillRef idx="1">
-            <a:schemeClr val="accent1"/>
-          </a:fillRef>
-          <a:effectRef idx="0">
-            <a:schemeClr val="accent1"/>
-          </a:effectRef>
-          <a:fontRef idx="minor">
-            <a:schemeClr val="lt1"/>
-          </a:fontRef>
-        </p:style>
-        <p:txBody>
-          <a:bodyPr rtlCol="0" anchor="ctr"/>
-          <a:lstStyle/>
-          <a:p>
-            <a:pPr algn="ctr"/>
-            <a:r>
-              <a:rPr lang="en-CA" dirty="0"/>
-              <a:t>RF Regressor</a:t>
-            </a:r>
-          </a:p>
-        </p:txBody>
-      </p:sp>
-      <p:sp>
-        <p:nvSpPr>
-          <p:cNvPr id="14" name="Rectangle: Rounded Corners 13">
-            <a:extLst>
-              <a:ext uri="{FF2B5EF4-FFF2-40B4-BE49-F238E27FC236}">
-                <a16:creationId xmlns:a16="http://schemas.microsoft.com/office/drawing/2014/main" id="{2BE4F148-A39F-4375-B102-740C8A119CA2}"/>
-              </a:ext>
-            </a:extLst>
-          </p:cNvPr>
-          <p:cNvSpPr/>
-          <p:nvPr/>
-        </p:nvSpPr>
-        <p:spPr>
-          <a:xfrm>
-            <a:off x="5247861" y="3311869"/>
-            <a:ext cx="1646327" cy="795130"/>
-          </a:xfrm>
-          <a:prstGeom prst="roundRect">
-            <a:avLst/>
-          </a:prstGeom>
-        </p:spPr>
-        <p:style>
-          <a:lnRef idx="2">
-            <a:schemeClr val="accent1">
-              <a:shade val="50000"/>
-            </a:schemeClr>
-          </a:lnRef>
-          <a:fillRef idx="1">
-            <a:schemeClr val="accent1"/>
-          </a:fillRef>
-          <a:effectRef idx="0">
-            <a:schemeClr val="accent1"/>
-          </a:effectRef>
-          <a:fontRef idx="minor">
-            <a:schemeClr val="lt1"/>
-          </a:fontRef>
-        </p:style>
-        <p:txBody>
-          <a:bodyPr rtlCol="0" anchor="ctr"/>
-          <a:lstStyle/>
-          <a:p>
-            <a:pPr algn="ctr"/>
-            <a:r>
-              <a:rPr lang="en-CA" dirty="0"/>
-              <a:t>LSTM</a:t>
-            </a:r>
+        <p:txBody>
+          <a:bodyPr vert="horz" lIns="91440" tIns="45720" rIns="91440" bIns="45720" rtlCol="0" anchor="b">
+            <a:normAutofit/>
+          </a:bodyPr>
+          <a:lstStyle>
+            <a:lvl1pPr algn="l" defTabSz="914400" rtl="0" eaLnBrk="1" latinLnBrk="0" hangingPunct="1">
+              <a:lnSpc>
+                <a:spcPct val="90000"/>
+              </a:lnSpc>
+              <a:spcBef>
+                <a:spcPct val="0"/>
+              </a:spcBef>
+              <a:buNone/>
+              <a:defRPr sz="3600" b="0" i="0" kern="1200" spc="-50" baseline="0">
+                <a:solidFill>
+                  <a:srgbClr val="FFFFFF"/>
+                </a:solidFill>
+                <a:latin typeface="+mj-lt"/>
+                <a:ea typeface="+mj-ea"/>
+                <a:cs typeface="+mj-cs"/>
+              </a:defRPr>
+            </a:lvl1pPr>
+          </a:lstStyle>
+          <a:p>
+            <a:r>
+              <a:rPr lang="en-US" sz="2800" b="0" i="0" dirty="0">
+                <a:solidFill>
+                  <a:schemeClr val="tx1"/>
+                </a:solidFill>
+                <a:effectLst/>
+                <a:latin typeface="-apple-system"/>
+              </a:rPr>
+              <a:t>Was the model sufficient for the predictive task? </a:t>
+            </a:r>
+          </a:p>
+          <a:p>
+            <a:endParaRPr lang="en-US" sz="2800" dirty="0">
+              <a:solidFill>
+                <a:schemeClr val="tx1"/>
+              </a:solidFill>
+              <a:latin typeface="-apple-system"/>
+            </a:endParaRPr>
+          </a:p>
+          <a:p>
+            <a:endParaRPr lang="en-US" sz="2800" dirty="0">
+              <a:solidFill>
+                <a:schemeClr val="tx1"/>
+              </a:solidFill>
+              <a:latin typeface="-apple-system"/>
+            </a:endParaRPr>
+          </a:p>
+          <a:p>
+            <a:endParaRPr lang="en-US" sz="2800" dirty="0">
+              <a:solidFill>
+                <a:schemeClr val="tx1"/>
+              </a:solidFill>
+              <a:latin typeface="-apple-system"/>
+            </a:endParaRPr>
+          </a:p>
+          <a:p>
+            <a:r>
+              <a:rPr lang="en-US" sz="2800" b="0" i="0" dirty="0">
+                <a:solidFill>
+                  <a:schemeClr val="tx1"/>
+                </a:solidFill>
+                <a:effectLst/>
+                <a:latin typeface="-apple-system"/>
+              </a:rPr>
+              <a:t>What inferences or general conclusions can you draw from your model performance?</a:t>
+            </a:r>
+            <a:endParaRPr lang="en-US" sz="4800" dirty="0">
+              <a:solidFill>
+                <a:schemeClr val="tx1"/>
+              </a:solidFill>
+            </a:endParaRPr>
           </a:p>
         </p:txBody>
       </p:sp>
     </p:spTree>
     <p:extLst>
       <p:ext uri="{BB962C8B-B14F-4D97-AF65-F5344CB8AC3E}">
-        <p14:creationId xmlns:p14="http://schemas.microsoft.com/office/powerpoint/2010/main" val="680088034"/>
+        <p14:creationId xmlns:p14="http://schemas.microsoft.com/office/powerpoint/2010/main" val="1586109917"/>
       </p:ext>
     </p:extLst>
   </p:cSld>
@@ -6752,7 +7063,7 @@
         </p:nvSpPr>
         <p:spPr>
           <a:xfrm>
-            <a:off x="5767754" y="365125"/>
+            <a:off x="5767754" y="268191"/>
             <a:ext cx="6043246" cy="872832"/>
           </a:xfrm>
           <a:prstGeom prst="rect">
@@ -6761,7 +7072,7 @@
         </p:spPr>
         <p:txBody>
           <a:bodyPr vert="horz" lIns="91440" tIns="45720" rIns="91440" bIns="45720" rtlCol="0" anchor="b">
-            <a:normAutofit fontScale="92500" lnSpcReduction="10000"/>
+            <a:normAutofit fontScale="85000" lnSpcReduction="10000"/>
           </a:bodyPr>
           <a:lstStyle>
             <a:lvl1pPr algn="l" defTabSz="914400" rtl="0" eaLnBrk="1" latinLnBrk="0" hangingPunct="1">
@@ -6784,12 +7095,12 @@
           </a:lstStyle>
           <a:p>
             <a:r>
-              <a:rPr lang="en-US" sz="3200" dirty="0">
+              <a:rPr lang="en-US" sz="3200" b="1" dirty="0">
                 <a:solidFill>
                   <a:schemeClr val="tx1"/>
                 </a:solidFill>
               </a:rPr>
-              <a:t>Summary/Conclusions/Predictions</a:t>
+              <a:t>Problems/Issues during data preparation and model training</a:t>
             </a:r>
           </a:p>
         </p:txBody>
@@ -6799,7 +7110,7 @@
           <p:cNvPr id="3" name="Picture 2" descr="A picture containing building, sitting, bench, side&#10;&#10;Description automatically generated">
             <a:extLst>
               <a:ext uri="{FF2B5EF4-FFF2-40B4-BE49-F238E27FC236}">
-                <a16:creationId xmlns:a16="http://schemas.microsoft.com/office/drawing/2014/main" id="{DAFFDFD8-67E9-4196-B37D-AA4BF9DA9420}"/>
+                <a16:creationId xmlns:a16="http://schemas.microsoft.com/office/drawing/2014/main" id="{788E7E6C-7BAB-4265-984D-EB6A24770407}"/>
               </a:ext>
             </a:extLst>
           </p:cNvPr>
@@ -6829,20 +7140,246 @@
           </a:prstGeom>
         </p:spPr>
       </p:pic>
+      <p:sp>
+        <p:nvSpPr>
+          <p:cNvPr id="5" name="Content Placeholder 2">
+            <a:extLst>
+              <a:ext uri="{FF2B5EF4-FFF2-40B4-BE49-F238E27FC236}">
+                <a16:creationId xmlns:a16="http://schemas.microsoft.com/office/drawing/2014/main" id="{9396B28C-E282-4965-8115-657015BD3054}"/>
+              </a:ext>
+            </a:extLst>
+          </p:cNvPr>
+          <p:cNvSpPr>
+            <a:spLocks noGrp="1"/>
+          </p:cNvSpPr>
+          <p:nvPr>
+            <p:ph idx="1"/>
+          </p:nvPr>
+        </p:nvSpPr>
+        <p:spPr>
+          <a:xfrm>
+            <a:off x="5736628" y="1342886"/>
+            <a:ext cx="5928344" cy="5515114"/>
+          </a:xfrm>
+        </p:spPr>
+        <p:txBody>
+          <a:bodyPr>
+            <a:normAutofit/>
+          </a:bodyPr>
+          <a:lstStyle/>
+          <a:p>
+            <a:r>
+              <a:rPr lang="en-CA" sz="2400" b="1" dirty="0">
+                <a:solidFill>
+                  <a:schemeClr val="tx1"/>
+                </a:solidFill>
+                <a:latin typeface="Times New Roman" panose="02020603050405020304" pitchFamily="18" charset="0"/>
+                <a:cs typeface="Times New Roman" panose="02020603050405020304" pitchFamily="18" charset="0"/>
+              </a:rPr>
+              <a:t>Data preparation:</a:t>
+            </a:r>
+          </a:p>
+          <a:p>
+            <a:r>
+              <a:rPr lang="en-CA" sz="2000" dirty="0">
+                <a:solidFill>
+                  <a:schemeClr val="tx1"/>
+                </a:solidFill>
+                <a:latin typeface="Times New Roman" panose="02020603050405020304" pitchFamily="18" charset="0"/>
+                <a:cs typeface="Times New Roman" panose="02020603050405020304" pitchFamily="18" charset="0"/>
+              </a:rPr>
+              <a:t>1) Getting AAPL stock data</a:t>
+            </a:r>
+          </a:p>
+          <a:p>
+            <a:endParaRPr lang="en-CA" sz="1000" dirty="0">
+              <a:solidFill>
+                <a:schemeClr val="tx1"/>
+              </a:solidFill>
+              <a:latin typeface="Times New Roman" panose="02020603050405020304" pitchFamily="18" charset="0"/>
+              <a:cs typeface="Times New Roman" panose="02020603050405020304" pitchFamily="18" charset="0"/>
+            </a:endParaRPr>
+          </a:p>
+          <a:p>
+            <a:r>
+              <a:rPr lang="en-CA" sz="2000" dirty="0">
+                <a:solidFill>
+                  <a:schemeClr val="tx1"/>
+                </a:solidFill>
+                <a:latin typeface="Times New Roman" panose="02020603050405020304" pitchFamily="18" charset="0"/>
+                <a:cs typeface="Times New Roman" panose="02020603050405020304" pitchFamily="18" charset="0"/>
+              </a:rPr>
+              <a:t>2) Getting Twitter Data with “</a:t>
+            </a:r>
+            <a:r>
+              <a:rPr lang="en-CA" sz="2000" dirty="0" err="1">
+                <a:solidFill>
+                  <a:schemeClr val="tx1"/>
+                </a:solidFill>
+                <a:latin typeface="Times New Roman" panose="02020603050405020304" pitchFamily="18" charset="0"/>
+                <a:cs typeface="Times New Roman" panose="02020603050405020304" pitchFamily="18" charset="0"/>
+              </a:rPr>
+              <a:t>ts_polarity</a:t>
+            </a:r>
+            <a:r>
+              <a:rPr lang="en-CA" sz="2000" dirty="0">
+                <a:solidFill>
+                  <a:schemeClr val="tx1"/>
+                </a:solidFill>
+                <a:latin typeface="Times New Roman" panose="02020603050405020304" pitchFamily="18" charset="0"/>
+                <a:cs typeface="Times New Roman" panose="02020603050405020304" pitchFamily="18" charset="0"/>
+              </a:rPr>
+              <a:t>” and “</a:t>
+            </a:r>
+            <a:r>
+              <a:rPr lang="en-CA" sz="2000" dirty="0" err="1">
+                <a:solidFill>
+                  <a:schemeClr val="tx1"/>
+                </a:solidFill>
+                <a:latin typeface="Times New Roman" panose="02020603050405020304" pitchFamily="18" charset="0"/>
+                <a:cs typeface="Times New Roman" panose="02020603050405020304" pitchFamily="18" charset="0"/>
+              </a:rPr>
+              <a:t>twitter_volume</a:t>
+            </a:r>
+            <a:r>
+              <a:rPr lang="en-CA" sz="2000" dirty="0">
+                <a:solidFill>
+                  <a:schemeClr val="tx1"/>
+                </a:solidFill>
+                <a:latin typeface="Times New Roman" panose="02020603050405020304" pitchFamily="18" charset="0"/>
+                <a:cs typeface="Times New Roman" panose="02020603050405020304" pitchFamily="18" charset="0"/>
+              </a:rPr>
+              <a:t>”</a:t>
+            </a:r>
+          </a:p>
+          <a:p>
+            <a:endParaRPr lang="en-CA" sz="1100" b="1" dirty="0">
+              <a:solidFill>
+                <a:schemeClr val="tx1"/>
+              </a:solidFill>
+              <a:latin typeface="Times New Roman" panose="02020603050405020304" pitchFamily="18" charset="0"/>
+              <a:cs typeface="Times New Roman" panose="02020603050405020304" pitchFamily="18" charset="0"/>
+            </a:endParaRPr>
+          </a:p>
+          <a:p>
+            <a:r>
+              <a:rPr lang="en-CA" sz="2000" dirty="0">
+                <a:solidFill>
+                  <a:schemeClr val="tx1"/>
+                </a:solidFill>
+                <a:latin typeface="Times New Roman" panose="02020603050405020304" pitchFamily="18" charset="0"/>
+                <a:cs typeface="Times New Roman" panose="02020603050405020304" pitchFamily="18" charset="0"/>
+              </a:rPr>
+              <a:t>3) Getting Twitter Data using </a:t>
+            </a:r>
+            <a:r>
+              <a:rPr lang="en-CA" sz="2000" dirty="0" err="1">
+                <a:solidFill>
+                  <a:schemeClr val="tx1"/>
+                </a:solidFill>
+                <a:latin typeface="Times New Roman" panose="02020603050405020304" pitchFamily="18" charset="0"/>
+                <a:cs typeface="Times New Roman" panose="02020603050405020304" pitchFamily="18" charset="0"/>
+              </a:rPr>
+              <a:t>Tweepy</a:t>
+            </a:r>
+            <a:r>
+              <a:rPr lang="en-CA" sz="2000" dirty="0">
+                <a:solidFill>
+                  <a:schemeClr val="tx1"/>
+                </a:solidFill>
+                <a:latin typeface="Times New Roman" panose="02020603050405020304" pitchFamily="18" charset="0"/>
+                <a:cs typeface="Times New Roman" panose="02020603050405020304" pitchFamily="18" charset="0"/>
+              </a:rPr>
+              <a:t> Library </a:t>
+            </a:r>
+          </a:p>
+          <a:p>
+            <a:pPr marL="0" indent="0">
+              <a:buNone/>
+            </a:pPr>
+            <a:endParaRPr lang="en-CA" sz="100" b="1" dirty="0"/>
+          </a:p>
+          <a:p>
+            <a:r>
+              <a:rPr lang="en-CA" sz="2400" b="1" dirty="0">
+                <a:solidFill>
+                  <a:schemeClr val="tx1"/>
+                </a:solidFill>
+                <a:latin typeface="Times New Roman" panose="02020603050405020304" pitchFamily="18" charset="0"/>
+                <a:cs typeface="Times New Roman" panose="02020603050405020304" pitchFamily="18" charset="0"/>
+              </a:rPr>
+              <a:t>Model Training: (???)</a:t>
+            </a:r>
+          </a:p>
+          <a:p>
+            <a:r>
+              <a:rPr lang="en-CA" sz="2000" b="1" dirty="0">
+                <a:solidFill>
+                  <a:srgbClr val="FF0000"/>
+                </a:solidFill>
+                <a:latin typeface="Times New Roman" panose="02020603050405020304" pitchFamily="18" charset="0"/>
+                <a:cs typeface="Times New Roman" panose="02020603050405020304" pitchFamily="18" charset="0"/>
+              </a:rPr>
+              <a:t>1) Selecting proper/ideal window size</a:t>
+            </a:r>
+          </a:p>
+          <a:p>
+            <a:r>
+              <a:rPr lang="en-CA" sz="2000" b="1" dirty="0">
+                <a:solidFill>
+                  <a:srgbClr val="FF0000"/>
+                </a:solidFill>
+                <a:latin typeface="Times New Roman" panose="02020603050405020304" pitchFamily="18" charset="0"/>
+                <a:cs typeface="Times New Roman" panose="02020603050405020304" pitchFamily="18" charset="0"/>
+              </a:rPr>
+              <a:t>2) </a:t>
+            </a:r>
+            <a:r>
+              <a:rPr lang="en-CA" sz="2000" b="1" dirty="0" err="1">
+                <a:solidFill>
+                  <a:srgbClr val="FF0000"/>
+                </a:solidFill>
+                <a:latin typeface="Times New Roman" panose="02020603050405020304" pitchFamily="18" charset="0"/>
+                <a:cs typeface="Times New Roman" panose="02020603050405020304" pitchFamily="18" charset="0"/>
+              </a:rPr>
+              <a:t>window_data</a:t>
+            </a:r>
+            <a:r>
+              <a:rPr lang="en-CA" sz="2000" b="1" dirty="0">
+                <a:solidFill>
+                  <a:srgbClr val="FF0000"/>
+                </a:solidFill>
+                <a:latin typeface="Times New Roman" panose="02020603050405020304" pitchFamily="18" charset="0"/>
+                <a:cs typeface="Times New Roman" panose="02020603050405020304" pitchFamily="18" charset="0"/>
+              </a:rPr>
+              <a:t> function</a:t>
+            </a:r>
+          </a:p>
+          <a:p>
+            <a:r>
+              <a:rPr lang="en-CA" sz="2000" b="1" dirty="0">
+                <a:solidFill>
+                  <a:srgbClr val="FF0000"/>
+                </a:solidFill>
+                <a:latin typeface="Times New Roman" panose="02020603050405020304" pitchFamily="18" charset="0"/>
+                <a:cs typeface="Times New Roman" panose="02020603050405020304" pitchFamily="18" charset="0"/>
+              </a:rPr>
+              <a:t>3) Model fitting</a:t>
+            </a:r>
+          </a:p>
+        </p:txBody>
+      </p:sp>
       <p:pic>
         <p:nvPicPr>
-          <p:cNvPr id="5" name="Picture 4">
-            <a:extLst>
-              <a:ext uri="{FF2B5EF4-FFF2-40B4-BE49-F238E27FC236}">
-                <a16:creationId xmlns:a16="http://schemas.microsoft.com/office/drawing/2014/main" id="{FB3CF1FB-3253-49D1-B031-65D3E4C4CF66}"/>
-              </a:ext>
-              <a:ext uri="{C183D7F6-B498-43B3-948B-1728B52AA6E4}">
-                <adec:decorative xmlns:adec="http://schemas.microsoft.com/office/drawing/2017/decorative" val="1"/>
+          <p:cNvPr id="1026" name="Picture 2" descr="THUMBS-UP (noun) definition and synonyms | Macmillan Dictionary">
+            <a:extLst>
+              <a:ext uri="{FF2B5EF4-FFF2-40B4-BE49-F238E27FC236}">
+                <a16:creationId xmlns:a16="http://schemas.microsoft.com/office/drawing/2014/main" id="{53E0F85B-0440-4319-AEDD-25F30BB63251}"/>
               </a:ext>
             </a:extLst>
           </p:cNvPr>
           <p:cNvPicPr>
-            <a:picLocks noChangeAspect="1"/>
+            <a:picLocks noChangeAspect="1" noChangeArrowheads="1"/>
           </p:cNvPicPr>
           <p:nvPr/>
         </p:nvPicPr>
@@ -6854,124 +7391,123 @@
               </a:ext>
             </a:extLst>
           </a:blip>
-          <a:srcRect/>
+          <a:srcRect l="18710" r="15484"/>
           <a:stretch/>
         </p:blipFill>
-        <p:spPr>
-          <a:xfrm>
-            <a:off x="-1" y="10"/>
-            <a:ext cx="4635315" cy="6857990"/>
+        <p:spPr bwMode="auto">
+          <a:xfrm>
+            <a:off x="10538790" y="1357225"/>
+            <a:ext cx="1351723" cy="1091233"/>
           </a:xfrm>
           <a:prstGeom prst="rect">
             <a:avLst/>
           </a:prstGeom>
+          <a:noFill/>
+          <a:extLst>
+            <a:ext uri="{909E8E84-426E-40DD-AFC4-6F175D3DCCD1}">
+              <a14:hiddenFill xmlns:a14="http://schemas.microsoft.com/office/drawing/2010/main">
+                <a:solidFill>
+                  <a:srgbClr val="FFFFFF"/>
+                </a:solidFill>
+              </a14:hiddenFill>
+            </a:ext>
+          </a:extLst>
         </p:spPr>
       </p:pic>
-      <p:sp>
-        <p:nvSpPr>
-          <p:cNvPr id="6" name="Title 7">
-            <a:extLst>
-              <a:ext uri="{FF2B5EF4-FFF2-40B4-BE49-F238E27FC236}">
-                <a16:creationId xmlns:a16="http://schemas.microsoft.com/office/drawing/2014/main" id="{734C553F-1313-4473-9256-A5C64163FAB3}"/>
-              </a:ext>
-            </a:extLst>
-          </p:cNvPr>
-          <p:cNvSpPr txBox="1">
-            <a:spLocks/>
-          </p:cNvSpPr>
+      <p:pic>
+        <p:nvPicPr>
+          <p:cNvPr id="7" name="Picture 2" descr="THUMBS-UP (noun) definition and synonyms | Macmillan Dictionary">
+            <a:extLst>
+              <a:ext uri="{FF2B5EF4-FFF2-40B4-BE49-F238E27FC236}">
+                <a16:creationId xmlns:a16="http://schemas.microsoft.com/office/drawing/2014/main" id="{6D0921AB-6D98-4DA0-90E0-836B63AB2805}"/>
+              </a:ext>
+            </a:extLst>
+          </p:cNvPr>
+          <p:cNvPicPr>
+            <a:picLocks noChangeAspect="1" noChangeArrowheads="1"/>
+          </p:cNvPicPr>
           <p:nvPr/>
-        </p:nvSpPr>
-        <p:spPr>
-          <a:xfrm>
-            <a:off x="5767754" y="1557820"/>
-            <a:ext cx="6043246" cy="3438250"/>
+        </p:nvPicPr>
+        <p:blipFill rotWithShape="1">
+          <a:blip r:embed="rId3">
+            <a:extLst>
+              <a:ext uri="{28A0092B-C50C-407E-A947-70E740481C1C}">
+                <a14:useLocalDpi xmlns:a14="http://schemas.microsoft.com/office/drawing/2010/main" val="0"/>
+              </a:ext>
+            </a:extLst>
+          </a:blip>
+          <a:srcRect l="18065" r="16129"/>
+          <a:stretch/>
+        </p:blipFill>
+        <p:spPr bwMode="auto">
+          <a:xfrm rot="10800000">
+            <a:off x="10459278" y="3726412"/>
+            <a:ext cx="1351722" cy="1091233"/>
           </a:xfrm>
           <a:prstGeom prst="rect">
             <a:avLst/>
           </a:prstGeom>
-        </p:spPr>
-        <p:txBody>
-          <a:bodyPr vert="horz" lIns="91440" tIns="45720" rIns="91440" bIns="45720" rtlCol="0" anchor="b">
-            <a:normAutofit/>
-          </a:bodyPr>
-          <a:lstStyle>
-            <a:lvl1pPr algn="l" defTabSz="914400" rtl="0" eaLnBrk="1" latinLnBrk="0" hangingPunct="1">
-              <a:lnSpc>
-                <a:spcPct val="90000"/>
-              </a:lnSpc>
-              <a:spcBef>
-                <a:spcPct val="0"/>
-              </a:spcBef>
-              <a:buNone/>
-              <a:defRPr sz="3600" b="0" i="0" kern="1200" spc="-50" baseline="0">
+          <a:noFill/>
+          <a:extLst>
+            <a:ext uri="{909E8E84-426E-40DD-AFC4-6F175D3DCCD1}">
+              <a14:hiddenFill xmlns:a14="http://schemas.microsoft.com/office/drawing/2010/main">
                 <a:solidFill>
                   <a:srgbClr val="FFFFFF"/>
                 </a:solidFill>
-                <a:latin typeface="+mj-lt"/>
-                <a:ea typeface="+mj-ea"/>
-                <a:cs typeface="+mj-cs"/>
-              </a:defRPr>
-            </a:lvl1pPr>
-          </a:lstStyle>
-          <a:p>
-            <a:r>
-              <a:rPr lang="en-US" sz="2800" b="0" i="0" dirty="0">
-                <a:solidFill>
-                  <a:schemeClr val="tx1"/>
-                </a:solidFill>
-                <a:effectLst/>
-                <a:latin typeface="-apple-system"/>
-              </a:rPr>
-              <a:t>Was the model sufficient for the predictive task? </a:t>
-            </a:r>
-          </a:p>
-          <a:p>
-            <a:endParaRPr lang="en-US" sz="2800" dirty="0">
-              <a:solidFill>
-                <a:schemeClr val="tx1"/>
-              </a:solidFill>
-              <a:latin typeface="-apple-system"/>
-            </a:endParaRPr>
-          </a:p>
-          <a:p>
-            <a:endParaRPr lang="en-US" sz="2800" dirty="0">
-              <a:solidFill>
-                <a:schemeClr val="tx1"/>
-              </a:solidFill>
-              <a:latin typeface="-apple-system"/>
-            </a:endParaRPr>
-          </a:p>
-          <a:p>
-            <a:endParaRPr lang="en-US" sz="2800" dirty="0">
-              <a:solidFill>
-                <a:schemeClr val="tx1"/>
-              </a:solidFill>
-              <a:latin typeface="-apple-system"/>
-            </a:endParaRPr>
-          </a:p>
-          <a:p>
-            <a:r>
-              <a:rPr lang="en-US" sz="2800" b="0" i="0" dirty="0">
-                <a:solidFill>
-                  <a:schemeClr val="tx1"/>
-                </a:solidFill>
-                <a:effectLst/>
-                <a:latin typeface="-apple-system"/>
-              </a:rPr>
-              <a:t>What inferences or general conclusions can you draw from your model performance?</a:t>
-            </a:r>
-            <a:endParaRPr lang="en-US" sz="4800" dirty="0">
-              <a:solidFill>
-                <a:schemeClr val="tx1"/>
-              </a:solidFill>
-            </a:endParaRPr>
-          </a:p>
-        </p:txBody>
-      </p:sp>
+              </a14:hiddenFill>
+            </a:ext>
+          </a:extLst>
+        </p:spPr>
+      </p:pic>
+      <p:pic>
+        <p:nvPicPr>
+          <p:cNvPr id="8" name="Picture 2" descr="THUMBS-UP (noun) definition and synonyms | Macmillan Dictionary">
+            <a:extLst>
+              <a:ext uri="{FF2B5EF4-FFF2-40B4-BE49-F238E27FC236}">
+                <a16:creationId xmlns:a16="http://schemas.microsoft.com/office/drawing/2014/main" id="{B3431708-0C28-4CCE-BB65-09990EA0A9EC}"/>
+              </a:ext>
+            </a:extLst>
+          </p:cNvPr>
+          <p:cNvPicPr>
+            <a:picLocks noChangeAspect="1" noChangeArrowheads="1"/>
+          </p:cNvPicPr>
+          <p:nvPr/>
+        </p:nvPicPr>
+        <p:blipFill rotWithShape="1">
+          <a:blip r:embed="rId3">
+            <a:extLst>
+              <a:ext uri="{28A0092B-C50C-407E-A947-70E740481C1C}">
+                <a14:useLocalDpi xmlns:a14="http://schemas.microsoft.com/office/drawing/2010/main" val="0"/>
+              </a:ext>
+            </a:extLst>
+          </a:blip>
+          <a:srcRect l="18710" r="15484"/>
+          <a:stretch/>
+        </p:blipFill>
+        <p:spPr bwMode="auto">
+          <a:xfrm>
+            <a:off x="10515342" y="2450518"/>
+            <a:ext cx="1351723" cy="1091233"/>
+          </a:xfrm>
+          <a:prstGeom prst="rect">
+            <a:avLst/>
+          </a:prstGeom>
+          <a:noFill/>
+          <a:extLst>
+            <a:ext uri="{909E8E84-426E-40DD-AFC4-6F175D3DCCD1}">
+              <a14:hiddenFill xmlns:a14="http://schemas.microsoft.com/office/drawing/2010/main">
+                <a:solidFill>
+                  <a:srgbClr val="FFFFFF"/>
+                </a:solidFill>
+              </a14:hiddenFill>
+            </a:ext>
+          </a:extLst>
+        </p:spPr>
+      </p:pic>
     </p:spTree>
     <p:extLst>
       <p:ext uri="{BB962C8B-B14F-4D97-AF65-F5344CB8AC3E}">
-        <p14:creationId xmlns:p14="http://schemas.microsoft.com/office/powerpoint/2010/main" val="1586109917"/>
+        <p14:creationId xmlns:p14="http://schemas.microsoft.com/office/powerpoint/2010/main" val="2151820144"/>
       </p:ext>
     </p:extLst>
   </p:cSld>
@@ -7260,7 +7796,7 @@
           </a:lstStyle>
           <a:p>
             <a:r>
-              <a:rPr lang="en-US" sz="4800" dirty="0">
+              <a:rPr lang="en-US" sz="4000" b="1" dirty="0">
                 <a:solidFill>
                   <a:schemeClr val="tx1"/>
                 </a:solidFill>
@@ -7359,8 +7895,8 @@
         </p:nvSpPr>
         <p:spPr>
           <a:xfrm>
-            <a:off x="5694740" y="2084377"/>
-            <a:ext cx="6043246" cy="4233380"/>
+            <a:off x="5694740" y="1606352"/>
+            <a:ext cx="6043246" cy="5074497"/>
           </a:xfrm>
           <a:prstGeom prst="rect">
             <a:avLst/>
@@ -7368,7 +7904,7 @@
         </p:spPr>
         <p:txBody>
           <a:bodyPr vert="horz" lIns="91440" tIns="45720" rIns="91440" bIns="45720" rtlCol="0" anchor="b">
-            <a:normAutofit lnSpcReduction="10000"/>
+            <a:normAutofit fontScale="92500" lnSpcReduction="20000"/>
           </a:bodyPr>
           <a:lstStyle>
             <a:lvl1pPr algn="l" defTabSz="914400" rtl="0" eaLnBrk="1" latinLnBrk="0" hangingPunct="1">
@@ -7392,26 +7928,35 @@
           <a:p>
             <a:pPr algn="l"/>
             <a:r>
-              <a:rPr lang="en-US" sz="2800" dirty="0">
+              <a:rPr lang="en-US" sz="2800" b="1" dirty="0">
                 <a:solidFill>
                   <a:schemeClr val="tx1"/>
                 </a:solidFill>
-                <a:latin typeface="-apple-system"/>
+                <a:latin typeface="Times New Roman" panose="02020603050405020304" pitchFamily="18" charset="0"/>
+                <a:cs typeface="Times New Roman" panose="02020603050405020304" pitchFamily="18" charset="0"/>
               </a:rPr>
               <a:t>Any Difficulties?</a:t>
             </a:r>
           </a:p>
           <a:p>
-            <a:pPr algn="l"/>
+            <a:pPr algn="l">
+              <a:spcBef>
+                <a:spcPts val="600"/>
+              </a:spcBef>
+            </a:pPr>
             <a:endParaRPr lang="en-US" sz="2800" dirty="0">
               <a:solidFill>
                 <a:schemeClr val="tx1"/>
               </a:solidFill>
-              <a:latin typeface="-apple-system"/>
+              <a:latin typeface="Times New Roman" panose="02020603050405020304" pitchFamily="18" charset="0"/>
+              <a:cs typeface="Times New Roman" panose="02020603050405020304" pitchFamily="18" charset="0"/>
             </a:endParaRPr>
           </a:p>
           <a:p>
             <a:pPr marL="457200" indent="-457200" algn="l">
+              <a:spcBef>
+                <a:spcPts val="600"/>
+              </a:spcBef>
               <a:buFontTx/>
               <a:buChar char="-"/>
             </a:pPr>
@@ -7421,28 +7966,37 @@
                   <a:schemeClr val="tx1"/>
                 </a:solidFill>
                 <a:effectLst/>
-                <a:latin typeface="-apple-system"/>
+                <a:latin typeface="Times New Roman" panose="02020603050405020304" pitchFamily="18" charset="0"/>
+                <a:cs typeface="Times New Roman" panose="02020603050405020304" pitchFamily="18" charset="0"/>
               </a:rPr>
-              <a:t>Finding Data</a:t>
+              <a:t>Finding Twitter Data</a:t>
             </a:r>
           </a:p>
           <a:p>
             <a:pPr marL="457200" indent="-457200" algn="l">
+              <a:spcBef>
+                <a:spcPts val="600"/>
+              </a:spcBef>
               <a:buFontTx/>
               <a:buChar char="-"/>
             </a:pPr>
             <a:r>
-              <a:rPr lang="en-US" sz="2800" dirty="0">
+              <a:rPr lang="en-US" sz="2800" b="0" i="0" dirty="0">
                 <a:solidFill>
                   <a:schemeClr val="tx1"/>
                 </a:solidFill>
-                <a:latin typeface="-apple-system"/>
+                <a:effectLst/>
+                <a:latin typeface="Times New Roman" panose="02020603050405020304" pitchFamily="18" charset="0"/>
+                <a:cs typeface="Times New Roman" panose="02020603050405020304" pitchFamily="18" charset="0"/>
               </a:rPr>
-              <a:t>Data Cleaning</a:t>
+              <a:t>Machine Learning Models</a:t>
             </a:r>
           </a:p>
           <a:p>
             <a:pPr marL="457200" indent="-457200" algn="l">
+              <a:spcBef>
+                <a:spcPts val="600"/>
+              </a:spcBef>
               <a:buFontTx/>
               <a:buChar char="-"/>
             </a:pPr>
@@ -7452,10 +8006,28 @@
                   <a:schemeClr val="tx1"/>
                 </a:solidFill>
                 <a:effectLst/>
-                <a:latin typeface="-apple-system"/>
+                <a:latin typeface="Times New Roman" panose="02020603050405020304" pitchFamily="18" charset="0"/>
+                <a:cs typeface="Times New Roman" panose="02020603050405020304" pitchFamily="18" charset="0"/>
               </a:rPr>
-              <a:t>Machine Learning Models</a:t>
-            </a:r>
+              <a:t>Visualization</a:t>
+            </a:r>
+          </a:p>
+          <a:p>
+            <a:pPr marL="457200" indent="-457200" algn="l">
+              <a:spcBef>
+                <a:spcPts val="600"/>
+              </a:spcBef>
+              <a:buFontTx/>
+              <a:buChar char="-"/>
+            </a:pPr>
+            <a:endParaRPr lang="en-US" sz="2800" b="0" i="0" dirty="0">
+              <a:solidFill>
+                <a:schemeClr val="tx1"/>
+              </a:solidFill>
+              <a:effectLst/>
+              <a:latin typeface="Times New Roman" panose="02020603050405020304" pitchFamily="18" charset="0"/>
+              <a:cs typeface="Times New Roman" panose="02020603050405020304" pitchFamily="18" charset="0"/>
+            </a:endParaRPr>
           </a:p>
           <a:p>
             <a:pPr algn="l">
@@ -7467,20 +8039,22 @@
                 <a:schemeClr val="tx1"/>
               </a:solidFill>
               <a:effectLst/>
-              <a:latin typeface="-apple-system"/>
+              <a:latin typeface="Times New Roman" panose="02020603050405020304" pitchFamily="18" charset="0"/>
+              <a:cs typeface="Times New Roman" panose="02020603050405020304" pitchFamily="18" charset="0"/>
             </a:endParaRPr>
           </a:p>
           <a:p>
             <a:pPr algn="l"/>
             <a:r>
-              <a:rPr lang="en-US" sz="2800" b="0" i="0" dirty="0">
+              <a:rPr lang="en-US" sz="2800" b="1" i="0" dirty="0">
                 <a:solidFill>
                   <a:schemeClr val="tx1"/>
                 </a:solidFill>
                 <a:effectLst/>
-                <a:latin typeface="-apple-system"/>
+                <a:latin typeface="Times New Roman" panose="02020603050405020304" pitchFamily="18" charset="0"/>
+                <a:cs typeface="Times New Roman" panose="02020603050405020304" pitchFamily="18" charset="0"/>
               </a:rPr>
-              <a:t>What would you research next, if you had two more weeks?</a:t>
+              <a:t>If we had 2 more weeks!!</a:t>
             </a:r>
           </a:p>
           <a:p>
@@ -7489,35 +8063,34 @@
               <a:solidFill>
                 <a:schemeClr val="tx1"/>
               </a:solidFill>
-              <a:latin typeface="-apple-system"/>
+              <a:latin typeface="Times New Roman" panose="02020603050405020304" pitchFamily="18" charset="0"/>
+              <a:cs typeface="Times New Roman" panose="02020603050405020304" pitchFamily="18" charset="0"/>
             </a:endParaRPr>
           </a:p>
           <a:p>
             <a:pPr marL="457200" indent="-457200" algn="l">
+              <a:spcBef>
+                <a:spcPts val="600"/>
+              </a:spcBef>
               <a:buFontTx/>
               <a:buChar char="-"/>
             </a:pPr>
             <a:r>
-              <a:rPr lang="en-US" sz="2800" dirty="0" err="1">
+              <a:rPr lang="en-US" sz="2800" dirty="0">
                 <a:solidFill>
                   <a:schemeClr val="tx1"/>
                 </a:solidFill>
-                <a:latin typeface="-apple-system"/>
+                <a:latin typeface="Times New Roman" panose="02020603050405020304" pitchFamily="18" charset="0"/>
+                <a:cs typeface="Times New Roman" panose="02020603050405020304" pitchFamily="18" charset="0"/>
               </a:rPr>
-              <a:t>Tweepy</a:t>
-            </a:r>
-            <a:r>
-              <a:rPr lang="en-US" sz="2800" dirty="0">
-                <a:solidFill>
-                  <a:schemeClr val="tx1"/>
-                </a:solidFill>
-                <a:latin typeface="-apple-system"/>
-              </a:rPr>
-              <a:t> API/Library</a:t>
+              <a:t>Tweepy API/Library</a:t>
             </a:r>
           </a:p>
           <a:p>
             <a:pPr marL="457200" indent="-457200" algn="l">
+              <a:spcBef>
+                <a:spcPts val="600"/>
+              </a:spcBef>
               <a:buFontTx/>
               <a:buChar char="-"/>
             </a:pPr>
@@ -7526,13 +8099,17 @@
                 <a:solidFill>
                   <a:schemeClr val="tx1"/>
                 </a:solidFill>
-                <a:latin typeface="-apple-system"/>
+                <a:latin typeface="Times New Roman" panose="02020603050405020304" pitchFamily="18" charset="0"/>
+                <a:cs typeface="Times New Roman" panose="02020603050405020304" pitchFamily="18" charset="0"/>
               </a:rPr>
-              <a:t>More Machine Learning Models</a:t>
+              <a:t>News API headlines besides Twitter</a:t>
             </a:r>
           </a:p>
           <a:p>
             <a:pPr marL="457200" indent="-457200" algn="l">
+              <a:spcBef>
+                <a:spcPts val="600"/>
+              </a:spcBef>
               <a:buFontTx/>
               <a:buChar char="-"/>
             </a:pPr>
@@ -7541,7 +8118,46 @@
                 <a:solidFill>
                   <a:schemeClr val="tx1"/>
                 </a:solidFill>
-                <a:latin typeface="-apple-system"/>
+                <a:latin typeface="Times New Roman" panose="02020603050405020304" pitchFamily="18" charset="0"/>
+                <a:cs typeface="Times New Roman" panose="02020603050405020304" pitchFamily="18" charset="0"/>
+              </a:rPr>
+              <a:t>New API/Libraries</a:t>
+            </a:r>
+          </a:p>
+          <a:p>
+            <a:pPr marL="457200" indent="-457200" algn="l">
+              <a:spcBef>
+                <a:spcPts val="600"/>
+              </a:spcBef>
+              <a:buFontTx/>
+              <a:buChar char="-"/>
+            </a:pPr>
+            <a:r>
+              <a:rPr lang="en-US" sz="2800" dirty="0">
+                <a:solidFill>
+                  <a:schemeClr val="tx1"/>
+                </a:solidFill>
+                <a:latin typeface="Times New Roman" panose="02020603050405020304" pitchFamily="18" charset="0"/>
+                <a:cs typeface="Times New Roman" panose="02020603050405020304" pitchFamily="18" charset="0"/>
+              </a:rPr>
+              <a:t>More Machine Learning Models</a:t>
+            </a:r>
+          </a:p>
+          <a:p>
+            <a:pPr marL="457200" indent="-457200" algn="l">
+              <a:spcBef>
+                <a:spcPts val="600"/>
+              </a:spcBef>
+              <a:buFontTx/>
+              <a:buChar char="-"/>
+            </a:pPr>
+            <a:r>
+              <a:rPr lang="en-US" sz="2800" dirty="0">
+                <a:solidFill>
+                  <a:schemeClr val="tx1"/>
+                </a:solidFill>
+                <a:latin typeface="Times New Roman" panose="02020603050405020304" pitchFamily="18" charset="0"/>
+                <a:cs typeface="Times New Roman" panose="02020603050405020304" pitchFamily="18" charset="0"/>
               </a:rPr>
               <a:t>More visualizations</a:t>
             </a:r>
@@ -7590,67 +8206,53 @@
           <a:chExt cx="0" cy="0"/>
         </a:xfrm>
       </p:grpSpPr>
-      <p:sp>
-        <p:nvSpPr>
-          <p:cNvPr id="3" name="Title 7">
-            <a:extLst>
-              <a:ext uri="{FF2B5EF4-FFF2-40B4-BE49-F238E27FC236}">
-                <a16:creationId xmlns:a16="http://schemas.microsoft.com/office/drawing/2014/main" id="{A6D3D4A7-07AA-4522-A777-14384247F0A7}"/>
-              </a:ext>
-            </a:extLst>
-          </p:cNvPr>
-          <p:cNvSpPr txBox="1">
-            <a:spLocks/>
-          </p:cNvSpPr>
+      <p:pic>
+        <p:nvPicPr>
+          <p:cNvPr id="3074" name="Picture 2" descr="How to Make Compelling Q&amp;A Videos to Build Trust in Your Brand">
+            <a:extLst>
+              <a:ext uri="{FF2B5EF4-FFF2-40B4-BE49-F238E27FC236}">
+                <a16:creationId xmlns:a16="http://schemas.microsoft.com/office/drawing/2014/main" id="{26B8D7CC-F7BF-4B94-98A2-AEEA587E5A55}"/>
+              </a:ext>
+            </a:extLst>
+          </p:cNvPr>
+          <p:cNvPicPr>
+            <a:picLocks noChangeAspect="1" noChangeArrowheads="1"/>
+          </p:cNvPicPr>
           <p:nvPr/>
-        </p:nvSpPr>
-        <p:spPr>
-          <a:xfrm>
-            <a:off x="5244168" y="2633869"/>
-            <a:ext cx="2044528" cy="1089991"/>
+        </p:nvPicPr>
+        <p:blipFill>
+          <a:blip r:embed="rId2">
+            <a:extLst>
+              <a:ext uri="{28A0092B-C50C-407E-A947-70E740481C1C}">
+                <a14:useLocalDpi xmlns:a14="http://schemas.microsoft.com/office/drawing/2010/main" val="0"/>
+              </a:ext>
+            </a:extLst>
+          </a:blip>
+          <a:srcRect/>
+          <a:stretch>
+            <a:fillRect/>
+          </a:stretch>
+        </p:blipFill>
+        <p:spPr bwMode="auto">
+          <a:xfrm>
+            <a:off x="2418521" y="1385996"/>
+            <a:ext cx="7354957" cy="3867284"/>
           </a:xfrm>
           <a:prstGeom prst="rect">
             <a:avLst/>
           </a:prstGeom>
-        </p:spPr>
-        <p:txBody>
-          <a:bodyPr vert="horz" lIns="91440" tIns="45720" rIns="91440" bIns="45720" rtlCol="0" anchor="b">
-            <a:normAutofit/>
-          </a:bodyPr>
-          <a:lstStyle>
-            <a:lvl1pPr algn="l" defTabSz="914400" rtl="0" eaLnBrk="1" latinLnBrk="0" hangingPunct="1">
-              <a:lnSpc>
-                <a:spcPct val="90000"/>
-              </a:lnSpc>
-              <a:spcBef>
-                <a:spcPct val="0"/>
-              </a:spcBef>
-              <a:buNone/>
-              <a:defRPr sz="3600" b="0" i="0" kern="1200" spc="-50" baseline="0">
+          <a:noFill/>
+          <a:extLst>
+            <a:ext uri="{909E8E84-426E-40DD-AFC4-6F175D3DCCD1}">
+              <a14:hiddenFill xmlns:a14="http://schemas.microsoft.com/office/drawing/2010/main">
                 <a:solidFill>
                   <a:srgbClr val="FFFFFF"/>
                 </a:solidFill>
-                <a:latin typeface="+mj-lt"/>
-                <a:ea typeface="+mj-ea"/>
-                <a:cs typeface="+mj-cs"/>
-              </a:defRPr>
-            </a:lvl1pPr>
-          </a:lstStyle>
-          <a:p>
-            <a:pPr algn="l"/>
-            <a:r>
-              <a:rPr lang="en-US" sz="6600" b="0" i="0" dirty="0">
-                <a:solidFill>
-                  <a:schemeClr val="tx1"/>
-                </a:solidFill>
-                <a:effectLst/>
-                <a:latin typeface="-apple-system"/>
-              </a:rPr>
-              <a:t>Q&amp;A</a:t>
-            </a:r>
-          </a:p>
-        </p:txBody>
-      </p:sp>
+              </a14:hiddenFill>
+            </a:ext>
+          </a:extLst>
+        </p:spPr>
+      </p:pic>
     </p:spTree>
     <p:extLst>
       <p:ext uri="{BB962C8B-B14F-4D97-AF65-F5344CB8AC3E}">

</xml_diff>

<commit_message>
Updates to ppt and README
</commit_message>
<xml_diff>
--- a/Project 2 - Group 4.pptx
+++ b/Project 2 - Group 4.pptx
@@ -144,7 +144,7 @@
           <p:cNvPr id="10" name="Rectangle 9">
             <a:extLst>
               <a:ext uri="{FF2B5EF4-FFF2-40B4-BE49-F238E27FC236}">
-                <a16:creationId xmlns:a16="http://schemas.microsoft.com/office/drawing/2014/main" id="{39E3965E-AC41-4711-9D10-E25ABB132D86}"/>
+                <a16:creationId xmlns="" xmlns:a16="http://schemas.microsoft.com/office/drawing/2014/main" id="{39E3965E-AC41-4711-9D10-E25ABB132D86}"/>
               </a:ext>
             </a:extLst>
           </p:cNvPr>
@@ -304,7 +304,7 @@
           <p:cNvPr id="9" name="Straight Connector 8">
             <a:extLst>
               <a:ext uri="{FF2B5EF4-FFF2-40B4-BE49-F238E27FC236}">
-                <a16:creationId xmlns:a16="http://schemas.microsoft.com/office/drawing/2014/main" id="{1F5DC8C3-BA5F-4EED-BB9A-A14272BD82A1}"/>
+                <a16:creationId xmlns="" xmlns:a16="http://schemas.microsoft.com/office/drawing/2014/main" id="{1F5DC8C3-BA5F-4EED-BB9A-A14272BD82A1}"/>
               </a:ext>
             </a:extLst>
           </p:cNvPr>
@@ -348,7 +348,7 @@
           <p:cNvPr id="4" name="Date Placeholder 3">
             <a:extLst>
               <a:ext uri="{FF2B5EF4-FFF2-40B4-BE49-F238E27FC236}">
-                <a16:creationId xmlns:a16="http://schemas.microsoft.com/office/drawing/2014/main" id="{9925CCF1-92C0-4AF3-BFAF-4921631915AB}"/>
+                <a16:creationId xmlns="" xmlns:a16="http://schemas.microsoft.com/office/drawing/2014/main" id="{9925CCF1-92C0-4AF3-BFAF-4921631915AB}"/>
               </a:ext>
             </a:extLst>
           </p:cNvPr>
@@ -366,7 +366,7 @@
           <a:p>
             <a:fld id="{9184DA70-C731-4C70-880D-CCD4705E623C}" type="datetime1">
               <a:rPr lang="en-US" smtClean="0"/>
-              <a:t>10/1/2020</a:t>
+              <a:t>10/2/2020</a:t>
             </a:fld>
             <a:endParaRPr lang="en-US" dirty="0"/>
           </a:p>
@@ -377,7 +377,7 @@
           <p:cNvPr id="5" name="Footer Placeholder 4">
             <a:extLst>
               <a:ext uri="{FF2B5EF4-FFF2-40B4-BE49-F238E27FC236}">
-                <a16:creationId xmlns:a16="http://schemas.microsoft.com/office/drawing/2014/main" id="{051A78A9-3DFF-4937-A9F2-5D8CF495F367}"/>
+                <a16:creationId xmlns="" xmlns:a16="http://schemas.microsoft.com/office/drawing/2014/main" id="{051A78A9-3DFF-4937-A9F2-5D8CF495F367}"/>
               </a:ext>
             </a:extLst>
           </p:cNvPr>
@@ -402,7 +402,7 @@
           <p:cNvPr id="6" name="Slide Number Placeholder 5">
             <a:extLst>
               <a:ext uri="{FF2B5EF4-FFF2-40B4-BE49-F238E27FC236}">
-                <a16:creationId xmlns:a16="http://schemas.microsoft.com/office/drawing/2014/main" id="{5FAEB271-5CC0-4759-BC6E-8BE53AB227C0}"/>
+                <a16:creationId xmlns="" xmlns:a16="http://schemas.microsoft.com/office/drawing/2014/main" id="{5FAEB271-5CC0-4759-BC6E-8BE53AB227C0}"/>
               </a:ext>
             </a:extLst>
           </p:cNvPr>
@@ -536,7 +536,7 @@
           <p:cNvPr id="7" name="Date Placeholder 6">
             <a:extLst>
               <a:ext uri="{FF2B5EF4-FFF2-40B4-BE49-F238E27FC236}">
-                <a16:creationId xmlns:a16="http://schemas.microsoft.com/office/drawing/2014/main" id="{7D5506EE-1026-4F35-9ACC-BD05BE0F9B36}"/>
+                <a16:creationId xmlns="" xmlns:a16="http://schemas.microsoft.com/office/drawing/2014/main" id="{7D5506EE-1026-4F35-9ACC-BD05BE0F9B36}"/>
               </a:ext>
             </a:extLst>
           </p:cNvPr>
@@ -554,7 +554,7 @@
           <a:p>
             <a:fld id="{B612A279-0833-481D-8C56-F67FD0AC6C50}" type="datetime1">
               <a:rPr lang="en-US" smtClean="0"/>
-              <a:t>10/1/2020</a:t>
+              <a:t>10/2/2020</a:t>
             </a:fld>
             <a:endParaRPr lang="en-US" dirty="0"/>
           </a:p>
@@ -565,7 +565,7 @@
           <p:cNvPr id="8" name="Footer Placeholder 7">
             <a:extLst>
               <a:ext uri="{FF2B5EF4-FFF2-40B4-BE49-F238E27FC236}">
-                <a16:creationId xmlns:a16="http://schemas.microsoft.com/office/drawing/2014/main" id="{B7696E5F-8D95-4450-AE52-5438E6EDE2BF}"/>
+                <a16:creationId xmlns="" xmlns:a16="http://schemas.microsoft.com/office/drawing/2014/main" id="{B7696E5F-8D95-4450-AE52-5438E6EDE2BF}"/>
               </a:ext>
             </a:extLst>
           </p:cNvPr>
@@ -590,7 +590,7 @@
           <p:cNvPr id="9" name="Slide Number Placeholder 8">
             <a:extLst>
               <a:ext uri="{FF2B5EF4-FFF2-40B4-BE49-F238E27FC236}">
-                <a16:creationId xmlns:a16="http://schemas.microsoft.com/office/drawing/2014/main" id="{999B2253-74CC-409E-BEB0-F8EFCFCB5629}"/>
+                <a16:creationId xmlns="" xmlns:a16="http://schemas.microsoft.com/office/drawing/2014/main" id="{999B2253-74CC-409E-BEB0-F8EFCFCB5629}"/>
               </a:ext>
             </a:extLst>
           </p:cNvPr>
@@ -649,7 +649,7 @@
           <p:cNvPr id="9" name="Rectangle 8">
             <a:extLst>
               <a:ext uri="{FF2B5EF4-FFF2-40B4-BE49-F238E27FC236}">
-                <a16:creationId xmlns:a16="http://schemas.microsoft.com/office/drawing/2014/main" id="{E1B68A5B-D9FA-424B-A4EB-30E7223836B3}"/>
+                <a16:creationId xmlns="" xmlns:a16="http://schemas.microsoft.com/office/drawing/2014/main" id="{E1B68A5B-D9FA-424B-A4EB-30E7223836B3}"/>
               </a:ext>
             </a:extLst>
           </p:cNvPr>
@@ -778,7 +778,7 @@
           <p:cNvPr id="7" name="Date Placeholder 6">
             <a:extLst>
               <a:ext uri="{FF2B5EF4-FFF2-40B4-BE49-F238E27FC236}">
-                <a16:creationId xmlns:a16="http://schemas.microsoft.com/office/drawing/2014/main" id="{AF33D6B0-F070-45C4-A472-19F432BE3932}"/>
+                <a16:creationId xmlns="" xmlns:a16="http://schemas.microsoft.com/office/drawing/2014/main" id="{AF33D6B0-F070-45C4-A472-19F432BE3932}"/>
               </a:ext>
             </a:extLst>
           </p:cNvPr>
@@ -796,7 +796,7 @@
           <a:p>
             <a:fld id="{6587DA83-5663-4C9C-B9AA-0B40A3DAFF81}" type="datetime1">
               <a:rPr lang="en-US" smtClean="0"/>
-              <a:t>10/1/2020</a:t>
+              <a:t>10/2/2020</a:t>
             </a:fld>
             <a:endParaRPr lang="en-US" dirty="0"/>
           </a:p>
@@ -807,7 +807,7 @@
           <p:cNvPr id="8" name="Footer Placeholder 7">
             <a:extLst>
               <a:ext uri="{FF2B5EF4-FFF2-40B4-BE49-F238E27FC236}">
-                <a16:creationId xmlns:a16="http://schemas.microsoft.com/office/drawing/2014/main" id="{9975399F-DAB2-410D-967F-ED17E6F796E7}"/>
+                <a16:creationId xmlns="" xmlns:a16="http://schemas.microsoft.com/office/drawing/2014/main" id="{9975399F-DAB2-410D-967F-ED17E6F796E7}"/>
               </a:ext>
             </a:extLst>
           </p:cNvPr>
@@ -832,7 +832,7 @@
           <p:cNvPr id="10" name="Slide Number Placeholder 9">
             <a:extLst>
               <a:ext uri="{FF2B5EF4-FFF2-40B4-BE49-F238E27FC236}">
-                <a16:creationId xmlns:a16="http://schemas.microsoft.com/office/drawing/2014/main" id="{F762A46F-6BE5-4D12-9412-5CA7672EA8EC}"/>
+                <a16:creationId xmlns="" xmlns:a16="http://schemas.microsoft.com/office/drawing/2014/main" id="{F762A46F-6BE5-4D12-9412-5CA7672EA8EC}"/>
               </a:ext>
             </a:extLst>
           </p:cNvPr>
@@ -966,7 +966,7 @@
           <p:cNvPr id="7" name="Date Placeholder 6">
             <a:extLst>
               <a:ext uri="{FF2B5EF4-FFF2-40B4-BE49-F238E27FC236}">
-                <a16:creationId xmlns:a16="http://schemas.microsoft.com/office/drawing/2014/main" id="{354D8B55-9EA8-4B81-8E84-9B93B0A27559}"/>
+                <a16:creationId xmlns="" xmlns:a16="http://schemas.microsoft.com/office/drawing/2014/main" id="{354D8B55-9EA8-4B81-8E84-9B93B0A27559}"/>
               </a:ext>
             </a:extLst>
           </p:cNvPr>
@@ -984,7 +984,7 @@
           <a:p>
             <a:fld id="{4BE1D723-8F53-4F53-90B0-1982A396982E}" type="datetime1">
               <a:rPr lang="en-US" smtClean="0"/>
-              <a:t>10/1/2020</a:t>
+              <a:t>10/2/2020</a:t>
             </a:fld>
             <a:endParaRPr lang="en-US" dirty="0"/>
           </a:p>
@@ -995,7 +995,7 @@
           <p:cNvPr id="8" name="Footer Placeholder 7">
             <a:extLst>
               <a:ext uri="{FF2B5EF4-FFF2-40B4-BE49-F238E27FC236}">
-                <a16:creationId xmlns:a16="http://schemas.microsoft.com/office/drawing/2014/main" id="{062CA021-2578-47CB-822C-BDDFF7223B28}"/>
+                <a16:creationId xmlns="" xmlns:a16="http://schemas.microsoft.com/office/drawing/2014/main" id="{062CA021-2578-47CB-822C-BDDFF7223B28}"/>
               </a:ext>
             </a:extLst>
           </p:cNvPr>
@@ -1020,7 +1020,7 @@
           <p:cNvPr id="9" name="Slide Number Placeholder 8">
             <a:extLst>
               <a:ext uri="{FF2B5EF4-FFF2-40B4-BE49-F238E27FC236}">
-                <a16:creationId xmlns:a16="http://schemas.microsoft.com/office/drawing/2014/main" id="{C4AAB51D-4141-4682-9375-DAFD5FB9DD10}"/>
+                <a16:creationId xmlns="" xmlns:a16="http://schemas.microsoft.com/office/drawing/2014/main" id="{C4AAB51D-4141-4682-9375-DAFD5FB9DD10}"/>
               </a:ext>
             </a:extLst>
           </p:cNvPr>
@@ -1087,7 +1087,7 @@
           <p:cNvPr id="10" name="Rectangle 9">
             <a:extLst>
               <a:ext uri="{FF2B5EF4-FFF2-40B4-BE49-F238E27FC236}">
-                <a16:creationId xmlns:a16="http://schemas.microsoft.com/office/drawing/2014/main" id="{A585C21A-8B93-4657-B5DF-7EAEAD3BE127}"/>
+                <a16:creationId xmlns="" xmlns:a16="http://schemas.microsoft.com/office/drawing/2014/main" id="{A585C21A-8B93-4657-B5DF-7EAEAD3BE127}"/>
               </a:ext>
             </a:extLst>
           </p:cNvPr>
@@ -1295,7 +1295,7 @@
           <p:cNvPr id="9" name="Straight Connector 8">
             <a:extLst>
               <a:ext uri="{FF2B5EF4-FFF2-40B4-BE49-F238E27FC236}">
-                <a16:creationId xmlns:a16="http://schemas.microsoft.com/office/drawing/2014/main" id="{459DE2C1-4C52-40A3-8959-27B2C1BEBFF6}"/>
+                <a16:creationId xmlns="" xmlns:a16="http://schemas.microsoft.com/office/drawing/2014/main" id="{459DE2C1-4C52-40A3-8959-27B2C1BEBFF6}"/>
               </a:ext>
             </a:extLst>
           </p:cNvPr>
@@ -1339,7 +1339,7 @@
           <p:cNvPr id="7" name="Date Placeholder 6">
             <a:extLst>
               <a:ext uri="{FF2B5EF4-FFF2-40B4-BE49-F238E27FC236}">
-                <a16:creationId xmlns:a16="http://schemas.microsoft.com/office/drawing/2014/main" id="{AAF2E137-EC28-48F8-9198-1F02539029B6}"/>
+                <a16:creationId xmlns="" xmlns:a16="http://schemas.microsoft.com/office/drawing/2014/main" id="{AAF2E137-EC28-48F8-9198-1F02539029B6}"/>
               </a:ext>
             </a:extLst>
           </p:cNvPr>
@@ -1357,7 +1357,7 @@
           <a:p>
             <a:fld id="{97669AF7-7BEB-44E4-9852-375E34362B5B}" type="datetime1">
               <a:rPr lang="en-US" smtClean="0"/>
-              <a:t>10/1/2020</a:t>
+              <a:t>10/2/2020</a:t>
             </a:fld>
             <a:endParaRPr lang="en-US" dirty="0"/>
           </a:p>
@@ -1368,7 +1368,7 @@
           <p:cNvPr id="8" name="Footer Placeholder 7">
             <a:extLst>
               <a:ext uri="{FF2B5EF4-FFF2-40B4-BE49-F238E27FC236}">
-                <a16:creationId xmlns:a16="http://schemas.microsoft.com/office/drawing/2014/main" id="{189422CD-6F62-4DD6-89EF-07A60B42D219}"/>
+                <a16:creationId xmlns="" xmlns:a16="http://schemas.microsoft.com/office/drawing/2014/main" id="{189422CD-6F62-4DD6-89EF-07A60B42D219}"/>
               </a:ext>
             </a:extLst>
           </p:cNvPr>
@@ -1393,7 +1393,7 @@
           <p:cNvPr id="11" name="Slide Number Placeholder 10">
             <a:extLst>
               <a:ext uri="{FF2B5EF4-FFF2-40B4-BE49-F238E27FC236}">
-                <a16:creationId xmlns:a16="http://schemas.microsoft.com/office/drawing/2014/main" id="{69C6AFF8-42B4-4D05-969B-9F5FB3355555}"/>
+                <a16:creationId xmlns="" xmlns:a16="http://schemas.microsoft.com/office/drawing/2014/main" id="{69C6AFF8-42B4-4D05-969B-9F5FB3355555}"/>
               </a:ext>
             </a:extLst>
           </p:cNvPr>
@@ -1594,7 +1594,7 @@
           <p:cNvPr id="2" name="Date Placeholder 1">
             <a:extLst>
               <a:ext uri="{FF2B5EF4-FFF2-40B4-BE49-F238E27FC236}">
-                <a16:creationId xmlns:a16="http://schemas.microsoft.com/office/drawing/2014/main" id="{5782D47D-B0DC-4C40-BCC6-BBBA32584A38}"/>
+                <a16:creationId xmlns="" xmlns:a16="http://schemas.microsoft.com/office/drawing/2014/main" id="{5782D47D-B0DC-4C40-BCC6-BBBA32584A38}"/>
               </a:ext>
             </a:extLst>
           </p:cNvPr>
@@ -1612,7 +1612,7 @@
           <a:p>
             <a:fld id="{BAAAC38D-0552-4C82-B593-E6124DFADBE2}" type="datetime1">
               <a:rPr lang="en-US" smtClean="0"/>
-              <a:t>10/1/2020</a:t>
+              <a:t>10/2/2020</a:t>
             </a:fld>
             <a:endParaRPr lang="en-US" dirty="0"/>
           </a:p>
@@ -1623,7 +1623,7 @@
           <p:cNvPr id="9" name="Footer Placeholder 8">
             <a:extLst>
               <a:ext uri="{FF2B5EF4-FFF2-40B4-BE49-F238E27FC236}">
-                <a16:creationId xmlns:a16="http://schemas.microsoft.com/office/drawing/2014/main" id="{4690D34E-7EBD-44B2-83CA-4C126A18D7EF}"/>
+                <a16:creationId xmlns="" xmlns:a16="http://schemas.microsoft.com/office/drawing/2014/main" id="{4690D34E-7EBD-44B2-83CA-4C126A18D7EF}"/>
               </a:ext>
             </a:extLst>
           </p:cNvPr>
@@ -1648,7 +1648,7 @@
           <p:cNvPr id="10" name="Slide Number Placeholder 9">
             <a:extLst>
               <a:ext uri="{FF2B5EF4-FFF2-40B4-BE49-F238E27FC236}">
-                <a16:creationId xmlns:a16="http://schemas.microsoft.com/office/drawing/2014/main" id="{2AC511A1-9BBD-42DE-92FB-2AF44F8E97A9}"/>
+                <a16:creationId xmlns="" xmlns:a16="http://schemas.microsoft.com/office/drawing/2014/main" id="{2AC511A1-9BBD-42DE-92FB-2AF44F8E97A9}"/>
               </a:ext>
             </a:extLst>
           </p:cNvPr>
@@ -1991,7 +1991,7 @@
           <p:cNvPr id="2" name="Date Placeholder 1">
             <a:extLst>
               <a:ext uri="{FF2B5EF4-FFF2-40B4-BE49-F238E27FC236}">
-                <a16:creationId xmlns:a16="http://schemas.microsoft.com/office/drawing/2014/main" id="{8AF8A515-AA94-45D1-9223-5C2272618D85}"/>
+                <a16:creationId xmlns="" xmlns:a16="http://schemas.microsoft.com/office/drawing/2014/main" id="{8AF8A515-AA94-45D1-9223-5C2272618D85}"/>
               </a:ext>
             </a:extLst>
           </p:cNvPr>
@@ -2009,7 +2009,7 @@
           <a:p>
             <a:fld id="{D9DF0F1C-5577-4ACB-BB62-DF8F3C494C7E}" type="datetime1">
               <a:rPr lang="en-US" smtClean="0"/>
-              <a:t>10/1/2020</a:t>
+              <a:t>10/2/2020</a:t>
             </a:fld>
             <a:endParaRPr lang="en-US" dirty="0"/>
           </a:p>
@@ -2020,7 +2020,7 @@
           <p:cNvPr id="11" name="Footer Placeholder 10">
             <a:extLst>
               <a:ext uri="{FF2B5EF4-FFF2-40B4-BE49-F238E27FC236}">
-                <a16:creationId xmlns:a16="http://schemas.microsoft.com/office/drawing/2014/main" id="{D052F5BC-98E0-4D60-AD67-9547738B7DD4}"/>
+                <a16:creationId xmlns="" xmlns:a16="http://schemas.microsoft.com/office/drawing/2014/main" id="{D052F5BC-98E0-4D60-AD67-9547738B7DD4}"/>
               </a:ext>
             </a:extLst>
           </p:cNvPr>
@@ -2045,7 +2045,7 @@
           <p:cNvPr id="12" name="Slide Number Placeholder 11">
             <a:extLst>
               <a:ext uri="{FF2B5EF4-FFF2-40B4-BE49-F238E27FC236}">
-                <a16:creationId xmlns:a16="http://schemas.microsoft.com/office/drawing/2014/main" id="{A38552DC-952E-41EA-AAAF-C2187523C0B0}"/>
+                <a16:creationId xmlns="" xmlns:a16="http://schemas.microsoft.com/office/drawing/2014/main" id="{A38552DC-952E-41EA-AAAF-C2187523C0B0}"/>
               </a:ext>
             </a:extLst>
           </p:cNvPr>
@@ -2127,7 +2127,7 @@
           <p:cNvPr id="6" name="Date Placeholder 5">
             <a:extLst>
               <a:ext uri="{FF2B5EF4-FFF2-40B4-BE49-F238E27FC236}">
-                <a16:creationId xmlns:a16="http://schemas.microsoft.com/office/drawing/2014/main" id="{7392073F-158F-44A3-8913-917AFFC1BC20}"/>
+                <a16:creationId xmlns="" xmlns:a16="http://schemas.microsoft.com/office/drawing/2014/main" id="{7392073F-158F-44A3-8913-917AFFC1BC20}"/>
               </a:ext>
             </a:extLst>
           </p:cNvPr>
@@ -2145,7 +2145,7 @@
           <a:p>
             <a:fld id="{1775B394-D9F9-4F0C-B15D-605F45CB9E9F}" type="datetime1">
               <a:rPr lang="en-US" smtClean="0"/>
-              <a:t>10/1/2020</a:t>
+              <a:t>10/2/2020</a:t>
             </a:fld>
             <a:endParaRPr lang="en-US" dirty="0"/>
           </a:p>
@@ -2156,7 +2156,7 @@
           <p:cNvPr id="7" name="Footer Placeholder 6">
             <a:extLst>
               <a:ext uri="{FF2B5EF4-FFF2-40B4-BE49-F238E27FC236}">
-                <a16:creationId xmlns:a16="http://schemas.microsoft.com/office/drawing/2014/main" id="{EED72207-24CA-42B7-A975-2F8E41CBA904}"/>
+                <a16:creationId xmlns="" xmlns:a16="http://schemas.microsoft.com/office/drawing/2014/main" id="{EED72207-24CA-42B7-A975-2F8E41CBA904}"/>
               </a:ext>
             </a:extLst>
           </p:cNvPr>
@@ -2181,7 +2181,7 @@
           <p:cNvPr id="8" name="Slide Number Placeholder 7">
             <a:extLst>
               <a:ext uri="{FF2B5EF4-FFF2-40B4-BE49-F238E27FC236}">
-                <a16:creationId xmlns:a16="http://schemas.microsoft.com/office/drawing/2014/main" id="{D01080F2-251A-4B88-9A62-16F46D724F83}"/>
+                <a16:creationId xmlns="" xmlns:a16="http://schemas.microsoft.com/office/drawing/2014/main" id="{D01080F2-251A-4B88-9A62-16F46D724F83}"/>
               </a:ext>
             </a:extLst>
           </p:cNvPr>
@@ -2240,7 +2240,7 @@
           <p:cNvPr id="10" name="Rectangle 9">
             <a:extLst>
               <a:ext uri="{FF2B5EF4-FFF2-40B4-BE49-F238E27FC236}">
-                <a16:creationId xmlns:a16="http://schemas.microsoft.com/office/drawing/2014/main" id="{A8E9C91B-7EAD-4562-AB0E-DFB9663AECE3}"/>
+                <a16:creationId xmlns="" xmlns:a16="http://schemas.microsoft.com/office/drawing/2014/main" id="{A8E9C91B-7EAD-4562-AB0E-DFB9663AECE3}"/>
               </a:ext>
             </a:extLst>
           </p:cNvPr>
@@ -2284,7 +2284,7 @@
           <p:cNvPr id="2" name="Date Placeholder 1">
             <a:extLst>
               <a:ext uri="{FF2B5EF4-FFF2-40B4-BE49-F238E27FC236}">
-                <a16:creationId xmlns:a16="http://schemas.microsoft.com/office/drawing/2014/main" id="{94E9223F-721F-47BF-9FD5-0F8D12FF0DE1}"/>
+                <a16:creationId xmlns="" xmlns:a16="http://schemas.microsoft.com/office/drawing/2014/main" id="{94E9223F-721F-47BF-9FD5-0F8D12FF0DE1}"/>
               </a:ext>
             </a:extLst>
           </p:cNvPr>
@@ -2302,7 +2302,7 @@
           <a:p>
             <a:fld id="{39667345-2558-425A-8533-9BFDBCE15005}" type="datetime1">
               <a:rPr lang="en-US" smtClean="0"/>
-              <a:t>10/1/2020</a:t>
+              <a:t>10/2/2020</a:t>
             </a:fld>
             <a:endParaRPr lang="en-US" dirty="0"/>
           </a:p>
@@ -2313,7 +2313,7 @@
           <p:cNvPr id="3" name="Footer Placeholder 2">
             <a:extLst>
               <a:ext uri="{FF2B5EF4-FFF2-40B4-BE49-F238E27FC236}">
-                <a16:creationId xmlns:a16="http://schemas.microsoft.com/office/drawing/2014/main" id="{05915714-6BBA-4593-8591-4E26F7D58D9F}"/>
+                <a16:creationId xmlns="" xmlns:a16="http://schemas.microsoft.com/office/drawing/2014/main" id="{05915714-6BBA-4593-8591-4E26F7D58D9F}"/>
               </a:ext>
             </a:extLst>
           </p:cNvPr>
@@ -2338,7 +2338,7 @@
           <p:cNvPr id="4" name="Slide Number Placeholder 3">
             <a:extLst>
               <a:ext uri="{FF2B5EF4-FFF2-40B4-BE49-F238E27FC236}">
-                <a16:creationId xmlns:a16="http://schemas.microsoft.com/office/drawing/2014/main" id="{BE06F857-D2E1-44DD-ABDD-EBB739645B67}"/>
+                <a16:creationId xmlns="" xmlns:a16="http://schemas.microsoft.com/office/drawing/2014/main" id="{BE06F857-D2E1-44DD-ABDD-EBB739645B67}"/>
               </a:ext>
             </a:extLst>
           </p:cNvPr>
@@ -2397,7 +2397,7 @@
           <p:cNvPr id="8" name="Rectangle 7">
             <a:extLst>
               <a:ext uri="{FF2B5EF4-FFF2-40B4-BE49-F238E27FC236}">
-                <a16:creationId xmlns:a16="http://schemas.microsoft.com/office/drawing/2014/main" id="{16D90D66-BCB9-4229-A829-628874352AC0}"/>
+                <a16:creationId xmlns="" xmlns:a16="http://schemas.microsoft.com/office/drawing/2014/main" id="{16D90D66-BCB9-4229-A829-628874352AC0}"/>
               </a:ext>
             </a:extLst>
           </p:cNvPr>
@@ -2631,7 +2631,7 @@
           <a:p>
             <a:fld id="{92BEA474-078D-4E9B-9B14-09A87B19DC46}" type="datetime1">
               <a:rPr lang="en-US" smtClean="0"/>
-              <a:t>10/1/2020</a:t>
+              <a:t>10/2/2020</a:t>
             </a:fld>
             <a:endParaRPr lang="en-US" dirty="0"/>
           </a:p>
@@ -2736,7 +2736,7 @@
           <p:cNvPr id="8" name="Rectangle 7">
             <a:extLst>
               <a:ext uri="{FF2B5EF4-FFF2-40B4-BE49-F238E27FC236}">
-                <a16:creationId xmlns:a16="http://schemas.microsoft.com/office/drawing/2014/main" id="{DA134939-39C0-4522-A125-A13DFDA66490}"/>
+                <a16:creationId xmlns="" xmlns:a16="http://schemas.microsoft.com/office/drawing/2014/main" id="{DA134939-39C0-4522-A125-A13DFDA66490}"/>
               </a:ext>
             </a:extLst>
           </p:cNvPr>
@@ -2981,7 +2981,7 @@
           <a:p>
             <a:fld id="{4907D986-8816-4272-A432-0437A28A9828}" type="datetime1">
               <a:rPr lang="en-US" smtClean="0"/>
-              <a:t>10/1/2020</a:t>
+              <a:t>10/2/2020</a:t>
             </a:fld>
             <a:endParaRPr lang="en-US" dirty="0"/>
           </a:p>
@@ -3075,7 +3075,7 @@
           <p:cNvPr id="7" name="Rectangle 6">
             <a:extLst>
               <a:ext uri="{FF2B5EF4-FFF2-40B4-BE49-F238E27FC236}">
-                <a16:creationId xmlns:a16="http://schemas.microsoft.com/office/drawing/2014/main" id="{416A0E3C-60E6-4F39-BC55-5F7C224E1F7C}"/>
+                <a16:creationId xmlns="" xmlns:a16="http://schemas.microsoft.com/office/drawing/2014/main" id="{416A0E3C-60E6-4F39-BC55-5F7C224E1F7C}"/>
               </a:ext>
             </a:extLst>
           </p:cNvPr>
@@ -3242,7 +3242,7 @@
           <a:p>
             <a:fld id="{62D6E202-B606-4609-B914-27C9371A1F6D}" type="datetime1">
               <a:rPr lang="en-US" smtClean="0"/>
-              <a:t>10/1/2020</a:t>
+              <a:t>10/2/2020</a:t>
             </a:fld>
             <a:endParaRPr lang="en-US" dirty="0"/>
           </a:p>
@@ -3327,7 +3327,7 @@
           <p:cNvPr id="10" name="Straight Connector 9">
             <a:extLst>
               <a:ext uri="{FF2B5EF4-FFF2-40B4-BE49-F238E27FC236}">
-                <a16:creationId xmlns:a16="http://schemas.microsoft.com/office/drawing/2014/main" id="{C5025DAC-8B93-4160-B017-3A274A5828C0}"/>
+                <a16:creationId xmlns="" xmlns:a16="http://schemas.microsoft.com/office/drawing/2014/main" id="{C5025DAC-8B93-4160-B017-3A274A5828C0}"/>
               </a:ext>
             </a:extLst>
           </p:cNvPr>
@@ -3778,10 +3778,10 @@
           <p:cNvPr id="22" name="Rectangle 21">
             <a:extLst>
               <a:ext uri="{FF2B5EF4-FFF2-40B4-BE49-F238E27FC236}">
-                <a16:creationId xmlns:a16="http://schemas.microsoft.com/office/drawing/2014/main" id="{A9286AD2-18A9-4868-A4E3-7A2097A20810}"/>
+                <a16:creationId xmlns="" xmlns:a16="http://schemas.microsoft.com/office/drawing/2014/main" id="{A9286AD2-18A9-4868-A4E3-7A2097A20810}"/>
               </a:ext>
               <a:ext uri="{C183D7F6-B498-43B3-948B-1728B52AA6E4}">
-                <adec:decorative xmlns:adec="http://schemas.microsoft.com/office/drawing/2017/decorative" val="1"/>
+                <adec:decorative xmlns="" xmlns:adec="http://schemas.microsoft.com/office/drawing/2017/decorative" val="1"/>
               </a:ext>
             </a:extLst>
           </p:cNvPr>
@@ -3791,7 +3791,7 @@
           <p:nvPr>
             <p:extLst>
               <p:ext uri="{386F3935-93C4-4BCD-93E2-E3B085C9AB24}">
-                <p16:designElem xmlns:p16="http://schemas.microsoft.com/office/powerpoint/2015/main" val="1"/>
+                <p16:designElem xmlns="" xmlns:p16="http://schemas.microsoft.com/office/powerpoint/2015/main" val="1"/>
               </p:ext>
             </p:extLst>
           </p:nvPr>
@@ -3838,7 +3838,7 @@
           <p:cNvPr id="2" name="Title 1">
             <a:extLst>
               <a:ext uri="{FF2B5EF4-FFF2-40B4-BE49-F238E27FC236}">
-                <a16:creationId xmlns:a16="http://schemas.microsoft.com/office/drawing/2014/main" id="{78FD68DA-43BA-4508-8DE2-BA9BB7B2FA5B}"/>
+                <a16:creationId xmlns="" xmlns:a16="http://schemas.microsoft.com/office/drawing/2014/main" id="{78FD68DA-43BA-4508-8DE2-BA9BB7B2FA5B}"/>
               </a:ext>
             </a:extLst>
           </p:cNvPr>
@@ -3873,7 +3873,7 @@
           <p:cNvPr id="3" name="Subtitle 2">
             <a:extLst>
               <a:ext uri="{FF2B5EF4-FFF2-40B4-BE49-F238E27FC236}">
-                <a16:creationId xmlns:a16="http://schemas.microsoft.com/office/drawing/2014/main" id="{A8E9CFF2-3777-4FF4-A759-8491175B0B7C}"/>
+                <a16:creationId xmlns="" xmlns:a16="http://schemas.microsoft.com/office/drawing/2014/main" id="{A8E9CFF2-3777-4FF4-A759-8491175B0B7C}"/>
               </a:ext>
             </a:extLst>
           </p:cNvPr>
@@ -3974,7 +3974,7 @@
           <p:cNvPr id="5" name="Picture 4" descr="A picture containing building, sitting, bench, side&#10;&#10;Description automatically generated">
             <a:extLst>
               <a:ext uri="{FF2B5EF4-FFF2-40B4-BE49-F238E27FC236}">
-                <a16:creationId xmlns:a16="http://schemas.microsoft.com/office/drawing/2014/main" id="{282CF6DD-7FE8-4063-9551-1B7BBCE92ABE}"/>
+                <a16:creationId xmlns="" xmlns:a16="http://schemas.microsoft.com/office/drawing/2014/main" id="{282CF6DD-7FE8-4063-9551-1B7BBCE92ABE}"/>
               </a:ext>
             </a:extLst>
           </p:cNvPr>
@@ -3984,7 +3984,7 @@
           <p:nvPr/>
         </p:nvPicPr>
         <p:blipFill rotWithShape="1">
-          <a:blip r:embed="rId2">
+          <a:blip r:embed="rId2" cstate="print">
             <a:extLst>
               <a:ext uri="{28A0092B-C50C-407E-A947-70E740481C1C}">
                 <a14:useLocalDpi xmlns:a14="http://schemas.microsoft.com/office/drawing/2010/main" val="0"/>
@@ -4009,10 +4009,10 @@
           <p:cNvPr id="24" name="Straight Connector 23">
             <a:extLst>
               <a:ext uri="{FF2B5EF4-FFF2-40B4-BE49-F238E27FC236}">
-                <a16:creationId xmlns:a16="http://schemas.microsoft.com/office/drawing/2014/main" id="{E7A7CD63-7EC3-44F3-95D0-595C4019FF24}"/>
+                <a16:creationId xmlns="" xmlns:a16="http://schemas.microsoft.com/office/drawing/2014/main" id="{E7A7CD63-7EC3-44F3-95D0-595C4019FF24}"/>
               </a:ext>
               <a:ext uri="{C183D7F6-B498-43B3-948B-1728B52AA6E4}">
-                <adec:decorative xmlns:adec="http://schemas.microsoft.com/office/drawing/2017/decorative" val="1"/>
+                <adec:decorative xmlns="" xmlns:adec="http://schemas.microsoft.com/office/drawing/2017/decorative" val="1"/>
               </a:ext>
             </a:extLst>
           </p:cNvPr>
@@ -4022,7 +4022,7 @@
           <p:nvPr>
             <p:extLst>
               <p:ext uri="{386F3935-93C4-4BCD-93E2-E3B085C9AB24}">
-                <p16:designElem xmlns:p16="http://schemas.microsoft.com/office/powerpoint/2015/main" val="1"/>
+                <p16:designElem xmlns="" xmlns:p16="http://schemas.microsoft.com/office/powerpoint/2015/main" val="1"/>
               </p:ext>
             </p:extLst>
           </p:nvPr>
@@ -4069,6 +4069,13 @@
   <p:clrMapOvr>
     <a:masterClrMapping/>
   </p:clrMapOvr>
+  <p:timing>
+    <p:tnLst>
+      <p:par>
+        <p:cTn id="1" dur="indefinite" restart="never" nodeType="tmRoot"/>
+      </p:par>
+    </p:tnLst>
+  </p:timing>
 </p:sld>
 </file>
 
@@ -4094,7 +4101,7 @@
           <p:cNvPr id="2" name="Text Placeholder 3">
             <a:extLst>
               <a:ext uri="{FF2B5EF4-FFF2-40B4-BE49-F238E27FC236}">
-                <a16:creationId xmlns:a16="http://schemas.microsoft.com/office/drawing/2014/main" id="{30DC66C4-6C3F-45ED-A950-A55681BAC970}"/>
+                <a16:creationId xmlns="" xmlns:a16="http://schemas.microsoft.com/office/drawing/2014/main" id="{30DC66C4-6C3F-45ED-A950-A55681BAC970}"/>
               </a:ext>
             </a:extLst>
           </p:cNvPr>
@@ -4308,7 +4315,7 @@
           <p:cNvPr id="12" name="Title 7">
             <a:extLst>
               <a:ext uri="{FF2B5EF4-FFF2-40B4-BE49-F238E27FC236}">
-                <a16:creationId xmlns:a16="http://schemas.microsoft.com/office/drawing/2014/main" id="{71520384-A28C-4951-BA9F-337FAB2E7F09}"/>
+                <a16:creationId xmlns="" xmlns:a16="http://schemas.microsoft.com/office/drawing/2014/main" id="{71520384-A28C-4951-BA9F-337FAB2E7F09}"/>
               </a:ext>
             </a:extLst>
           </p:cNvPr>
@@ -4366,7 +4373,7 @@
           <p:cNvPr id="3" name="Picture 2" descr="A picture containing building, sitting, bench, side&#10;&#10;Description automatically generated">
             <a:extLst>
               <a:ext uri="{FF2B5EF4-FFF2-40B4-BE49-F238E27FC236}">
-                <a16:creationId xmlns:a16="http://schemas.microsoft.com/office/drawing/2014/main" id="{682670DB-78BF-4A59-A021-44F8A34E7B64}"/>
+                <a16:creationId xmlns="" xmlns:a16="http://schemas.microsoft.com/office/drawing/2014/main" id="{682670DB-78BF-4A59-A021-44F8A34E7B64}"/>
               </a:ext>
             </a:extLst>
           </p:cNvPr>
@@ -4376,7 +4383,7 @@
           <p:nvPr/>
         </p:nvPicPr>
         <p:blipFill rotWithShape="1">
-          <a:blip r:embed="rId2">
+          <a:blip r:embed="rId2" cstate="print">
             <a:extLst>
               <a:ext uri="{28A0092B-C50C-407E-A947-70E740481C1C}">
                 <a14:useLocalDpi xmlns:a14="http://schemas.microsoft.com/office/drawing/2010/main" val="0"/>
@@ -4401,10 +4408,10 @@
           <p:cNvPr id="7" name="Picture 6">
             <a:extLst>
               <a:ext uri="{FF2B5EF4-FFF2-40B4-BE49-F238E27FC236}">
-                <a16:creationId xmlns:a16="http://schemas.microsoft.com/office/drawing/2014/main" id="{CE529D7C-641D-4A54-B978-B48386BDE4DD}"/>
+                <a16:creationId xmlns="" xmlns:a16="http://schemas.microsoft.com/office/drawing/2014/main" id="{CE529D7C-641D-4A54-B978-B48386BDE4DD}"/>
               </a:ext>
               <a:ext uri="{C183D7F6-B498-43B3-948B-1728B52AA6E4}">
-                <adec:decorative xmlns:adec="http://schemas.microsoft.com/office/drawing/2017/decorative" val="1"/>
+                <adec:decorative xmlns="" xmlns:adec="http://schemas.microsoft.com/office/drawing/2017/decorative" val="1"/>
               </a:ext>
             </a:extLst>
           </p:cNvPr>
@@ -4414,7 +4421,7 @@
           <p:nvPr/>
         </p:nvPicPr>
         <p:blipFill rotWithShape="1">
-          <a:blip r:embed="rId3">
+          <a:blip r:embed="rId3" cstate="print">
             <a:extLst>
               <a:ext uri="{28A0092B-C50C-407E-A947-70E740481C1C}">
                 <a14:useLocalDpi xmlns:a14="http://schemas.microsoft.com/office/drawing/2010/main" val="0"/>
@@ -4439,7 +4446,7 @@
           <p:cNvPr id="6" name="Title 7">
             <a:extLst>
               <a:ext uri="{FF2B5EF4-FFF2-40B4-BE49-F238E27FC236}">
-                <a16:creationId xmlns:a16="http://schemas.microsoft.com/office/drawing/2014/main" id="{59D7F82C-E012-4FC2-B040-7AEEA04F676B}"/>
+                <a16:creationId xmlns="" xmlns:a16="http://schemas.microsoft.com/office/drawing/2014/main" id="{59D7F82C-E012-4FC2-B040-7AEEA04F676B}"/>
               </a:ext>
             </a:extLst>
           </p:cNvPr>
@@ -4760,6 +4767,13 @@
   <p:clrMapOvr>
     <a:masterClrMapping/>
   </p:clrMapOvr>
+  <p:timing>
+    <p:tnLst>
+      <p:par>
+        <p:cTn id="1" dur="indefinite" restart="never" nodeType="tmRoot"/>
+      </p:par>
+    </p:tnLst>
+  </p:timing>
 </p:sld>
 </file>
 
@@ -4785,7 +4799,7 @@
           <p:cNvPr id="3074" name="Picture 2" descr="How to Make Compelling Q&amp;A Videos to Build Trust in Your Brand">
             <a:extLst>
               <a:ext uri="{FF2B5EF4-FFF2-40B4-BE49-F238E27FC236}">
-                <a16:creationId xmlns:a16="http://schemas.microsoft.com/office/drawing/2014/main" id="{26B8D7CC-F7BF-4B94-98A2-AEEA587E5A55}"/>
+                <a16:creationId xmlns="" xmlns:a16="http://schemas.microsoft.com/office/drawing/2014/main" id="{26B8D7CC-F7BF-4B94-98A2-AEEA587E5A55}"/>
               </a:ext>
             </a:extLst>
           </p:cNvPr>
@@ -4837,6 +4851,13 @@
   <p:clrMapOvr>
     <a:masterClrMapping/>
   </p:clrMapOvr>
+  <p:timing>
+    <p:tnLst>
+      <p:par>
+        <p:cTn id="1" dur="indefinite" restart="never" nodeType="tmRoot"/>
+      </p:par>
+    </p:tnLst>
+  </p:timing>
 </p:sld>
 </file>
 
@@ -4862,7 +4883,7 @@
           <p:cNvPr id="1026" name="Picture 2" descr="Apple (Canada)">
             <a:extLst>
               <a:ext uri="{FF2B5EF4-FFF2-40B4-BE49-F238E27FC236}">
-                <a16:creationId xmlns:a16="http://schemas.microsoft.com/office/drawing/2014/main" id="{D35FB8F2-5F32-4B67-9C72-C3670493FB5F}"/>
+                <a16:creationId xmlns="" xmlns:a16="http://schemas.microsoft.com/office/drawing/2014/main" id="{D35FB8F2-5F32-4B67-9C72-C3670493FB5F}"/>
               </a:ext>
             </a:extLst>
           </p:cNvPr>
@@ -4872,7 +4893,7 @@
           <p:nvPr/>
         </p:nvPicPr>
         <p:blipFill rotWithShape="1">
-          <a:blip r:embed="rId2">
+          <a:blip r:embed="rId2" cstate="print">
             <a:extLst>
               <a:ext uri="{28A0092B-C50C-407E-A947-70E740481C1C}">
                 <a14:useLocalDpi xmlns:a14="http://schemas.microsoft.com/office/drawing/2010/main" val="0"/>
@@ -4907,7 +4928,7 @@
           <p:cNvPr id="6" name="Title 2">
             <a:extLst>
               <a:ext uri="{FF2B5EF4-FFF2-40B4-BE49-F238E27FC236}">
-                <a16:creationId xmlns:a16="http://schemas.microsoft.com/office/drawing/2014/main" id="{6C65C8B6-8DAF-49B5-8DEC-F3ABA97F9930}"/>
+                <a16:creationId xmlns="" xmlns:a16="http://schemas.microsoft.com/office/drawing/2014/main" id="{6C65C8B6-8DAF-49B5-8DEC-F3ABA97F9930}"/>
               </a:ext>
             </a:extLst>
           </p:cNvPr>
@@ -4946,7 +4967,7 @@
           <p:cNvPr id="7" name="Title 7">
             <a:extLst>
               <a:ext uri="{FF2B5EF4-FFF2-40B4-BE49-F238E27FC236}">
-                <a16:creationId xmlns:a16="http://schemas.microsoft.com/office/drawing/2014/main" id="{6CBDD581-2A66-4583-A120-EEC50F0BE572}"/>
+                <a16:creationId xmlns="" xmlns:a16="http://schemas.microsoft.com/office/drawing/2014/main" id="{6CBDD581-2A66-4583-A120-EEC50F0BE572}"/>
               </a:ext>
             </a:extLst>
           </p:cNvPr>
@@ -5001,7 +5022,7 @@
           <p:cNvPr id="8" name="Text Placeholder 3">
             <a:extLst>
               <a:ext uri="{FF2B5EF4-FFF2-40B4-BE49-F238E27FC236}">
-                <a16:creationId xmlns:a16="http://schemas.microsoft.com/office/drawing/2014/main" id="{FCFD105C-41E5-4774-AFD5-E1000D5FF6BF}"/>
+                <a16:creationId xmlns="" xmlns:a16="http://schemas.microsoft.com/office/drawing/2014/main" id="{FCFD105C-41E5-4774-AFD5-E1000D5FF6BF}"/>
               </a:ext>
             </a:extLst>
           </p:cNvPr>
@@ -5266,7 +5287,7 @@
           <p:cNvPr id="9" name="Text Placeholder 3">
             <a:extLst>
               <a:ext uri="{FF2B5EF4-FFF2-40B4-BE49-F238E27FC236}">
-                <a16:creationId xmlns:a16="http://schemas.microsoft.com/office/drawing/2014/main" id="{908F81B3-793B-48A0-92EA-E4890C09F419}"/>
+                <a16:creationId xmlns="" xmlns:a16="http://schemas.microsoft.com/office/drawing/2014/main" id="{908F81B3-793B-48A0-92EA-E4890C09F419}"/>
               </a:ext>
             </a:extLst>
           </p:cNvPr>
@@ -5489,7 +5510,7 @@
           <p:cNvPr id="11" name="Picture 10" descr="A picture containing building, sitting, bench, side&#10;&#10;Description automatically generated">
             <a:extLst>
               <a:ext uri="{FF2B5EF4-FFF2-40B4-BE49-F238E27FC236}">
-                <a16:creationId xmlns:a16="http://schemas.microsoft.com/office/drawing/2014/main" id="{F6CFD284-C3E3-48DA-8064-A6BAB0A21356}"/>
+                <a16:creationId xmlns="" xmlns:a16="http://schemas.microsoft.com/office/drawing/2014/main" id="{F6CFD284-C3E3-48DA-8064-A6BAB0A21356}"/>
               </a:ext>
             </a:extLst>
           </p:cNvPr>
@@ -5499,7 +5520,7 @@
           <p:nvPr/>
         </p:nvPicPr>
         <p:blipFill rotWithShape="1">
-          <a:blip r:embed="rId3">
+          <a:blip r:embed="rId3" cstate="print">
             <a:extLst>
               <a:ext uri="{28A0092B-C50C-407E-A947-70E740481C1C}">
                 <a14:useLocalDpi xmlns:a14="http://schemas.microsoft.com/office/drawing/2010/main" val="0"/>
@@ -5524,7 +5545,7 @@
           <p:cNvPr id="1028" name="Picture 4" descr="Twitter (@Twitter) | Twitter">
             <a:extLst>
               <a:ext uri="{FF2B5EF4-FFF2-40B4-BE49-F238E27FC236}">
-                <a16:creationId xmlns:a16="http://schemas.microsoft.com/office/drawing/2014/main" id="{D5408E74-C283-4ADC-837B-8CFBFA4A3796}"/>
+                <a16:creationId xmlns="" xmlns:a16="http://schemas.microsoft.com/office/drawing/2014/main" id="{D5408E74-C283-4ADC-837B-8CFBFA4A3796}"/>
               </a:ext>
             </a:extLst>
           </p:cNvPr>
@@ -5534,7 +5555,7 @@
           <p:nvPr/>
         </p:nvPicPr>
         <p:blipFill>
-          <a:blip r:embed="rId4">
+          <a:blip r:embed="rId4" cstate="print">
             <a:extLst>
               <a:ext uri="{28A0092B-C50C-407E-A947-70E740481C1C}">
                 <a14:useLocalDpi xmlns:a14="http://schemas.microsoft.com/office/drawing/2010/main" val="0"/>
@@ -5576,6 +5597,13 @@
   <p:clrMapOvr>
     <a:masterClrMapping/>
   </p:clrMapOvr>
+  <p:timing>
+    <p:tnLst>
+      <p:par>
+        <p:cTn id="1" dur="indefinite" restart="never" nodeType="tmRoot"/>
+      </p:par>
+    </p:tnLst>
+  </p:timing>
 </p:sld>
 </file>
 
@@ -5601,7 +5629,7 @@
           <p:cNvPr id="2" name="Text Placeholder 3">
             <a:extLst>
               <a:ext uri="{FF2B5EF4-FFF2-40B4-BE49-F238E27FC236}">
-                <a16:creationId xmlns:a16="http://schemas.microsoft.com/office/drawing/2014/main" id="{30DC66C4-6C3F-45ED-A950-A55681BAC970}"/>
+                <a16:creationId xmlns="" xmlns:a16="http://schemas.microsoft.com/office/drawing/2014/main" id="{30DC66C4-6C3F-45ED-A950-A55681BAC970}"/>
               </a:ext>
             </a:extLst>
           </p:cNvPr>
@@ -5859,6 +5887,16 @@
             </a:r>
           </a:p>
           <a:p>
+            <a:r>
+              <a:rPr lang="en-CA" spc="0" dirty="0">
+                <a:solidFill>
+                  <a:schemeClr val="tx1"/>
+                </a:solidFill>
+                <a:latin typeface="Times New Roman" panose="02020603050405020304" pitchFamily="18" charset="0"/>
+                <a:cs typeface="Times New Roman" panose="02020603050405020304" pitchFamily="18" charset="0"/>
+              </a:rPr>
+              <a:t/>
+            </a:r>
             <a:br>
               <a:rPr lang="en-CA" spc="0" dirty="0">
                 <a:solidFill>
@@ -5886,10 +5924,37 @@
                 <a:latin typeface="Times New Roman" panose="02020603050405020304" pitchFamily="18" charset="0"/>
                 <a:cs typeface="Times New Roman" panose="02020603050405020304" pitchFamily="18" charset="0"/>
               </a:rPr>
-              <a:t>Stock Price of Apple from Yahoo Finance.</a:t>
-            </a:r>
-          </a:p>
-          <a:p>
+              <a:t>Stock Price of Apple from Yahoo </a:t>
+            </a:r>
+            <a:r>
+              <a:rPr lang="en-CA" spc="0" dirty="0" smtClean="0">
+                <a:solidFill>
+                  <a:schemeClr val="tx1"/>
+                </a:solidFill>
+                <a:latin typeface="Times New Roman" panose="02020603050405020304" pitchFamily="18" charset="0"/>
+                <a:cs typeface="Times New Roman" panose="02020603050405020304" pitchFamily="18" charset="0"/>
+              </a:rPr>
+              <a:t>Finance from Jan 01, 2016 to Aug 31, 2019.</a:t>
+            </a:r>
+            <a:endParaRPr lang="en-CA" spc="0" dirty="0">
+              <a:solidFill>
+                <a:schemeClr val="tx1"/>
+              </a:solidFill>
+              <a:latin typeface="Times New Roman" panose="02020603050405020304" pitchFamily="18" charset="0"/>
+              <a:cs typeface="Times New Roman" panose="02020603050405020304" pitchFamily="18" charset="0"/>
+            </a:endParaRPr>
+          </a:p>
+          <a:p>
+            <a:r>
+              <a:rPr lang="en-CA" spc="0" dirty="0">
+                <a:solidFill>
+                  <a:schemeClr val="tx1"/>
+                </a:solidFill>
+                <a:latin typeface="Times New Roman" panose="02020603050405020304" pitchFamily="18" charset="0"/>
+                <a:cs typeface="Times New Roman" panose="02020603050405020304" pitchFamily="18" charset="0"/>
+              </a:rPr>
+              <a:t/>
+            </a:r>
             <a:br>
               <a:rPr lang="en-CA" spc="0" dirty="0">
                 <a:solidFill>
@@ -5970,10 +6035,40 @@
                 <a:latin typeface="Times New Roman" panose="02020603050405020304" pitchFamily="18" charset="0"/>
                 <a:cs typeface="Times New Roman" panose="02020603050405020304" pitchFamily="18" charset="0"/>
               </a:rPr>
-              <a:t>to fit the data and compare performance between models.</a:t>
-            </a:r>
-          </a:p>
-          <a:p>
+              <a:t>to fit the </a:t>
+            </a:r>
+            <a:r>
+              <a:rPr lang="en-CA" spc="0" dirty="0" smtClean="0">
+                <a:solidFill>
+                  <a:schemeClr val="tx1"/>
+                </a:solidFill>
+                <a:latin typeface="Times New Roman" panose="02020603050405020304" pitchFamily="18" charset="0"/>
+                <a:cs typeface="Times New Roman" panose="02020603050405020304" pitchFamily="18" charset="0"/>
+              </a:rPr>
+              <a:t>data, make predictions </a:t>
+            </a:r>
+            <a:r>
+              <a:rPr lang="en-CA" spc="0" dirty="0">
+                <a:solidFill>
+                  <a:schemeClr val="tx1"/>
+                </a:solidFill>
+                <a:latin typeface="Times New Roman" panose="02020603050405020304" pitchFamily="18" charset="0"/>
+                <a:cs typeface="Times New Roman" panose="02020603050405020304" pitchFamily="18" charset="0"/>
+              </a:rPr>
+              <a:t>and compare performance between models.</a:t>
+            </a:r>
+          </a:p>
+          <a:p>
+            <a:r>
+              <a:rPr lang="en-CA" spc="0" dirty="0">
+                <a:solidFill>
+                  <a:schemeClr val="tx1"/>
+                </a:solidFill>
+                <a:latin typeface="Times New Roman" panose="02020603050405020304" pitchFamily="18" charset="0"/>
+                <a:cs typeface="Times New Roman" panose="02020603050405020304" pitchFamily="18" charset="0"/>
+              </a:rPr>
+              <a:t/>
+            </a:r>
             <a:br>
               <a:rPr lang="en-CA" spc="0" dirty="0">
                 <a:solidFill>
@@ -6021,7 +6116,7 @@
           <p:cNvPr id="12" name="Title 7">
             <a:extLst>
               <a:ext uri="{FF2B5EF4-FFF2-40B4-BE49-F238E27FC236}">
-                <a16:creationId xmlns:a16="http://schemas.microsoft.com/office/drawing/2014/main" id="{71520384-A28C-4951-BA9F-337FAB2E7F09}"/>
+                <a16:creationId xmlns="" xmlns:a16="http://schemas.microsoft.com/office/drawing/2014/main" id="{71520384-A28C-4951-BA9F-337FAB2E7F09}"/>
               </a:ext>
             </a:extLst>
           </p:cNvPr>
@@ -6079,7 +6174,7 @@
           <p:cNvPr id="5" name="Picture 4" descr="A picture containing building, sitting, bench, side&#10;&#10;Description automatically generated">
             <a:extLst>
               <a:ext uri="{FF2B5EF4-FFF2-40B4-BE49-F238E27FC236}">
-                <a16:creationId xmlns:a16="http://schemas.microsoft.com/office/drawing/2014/main" id="{EF50BE56-9B5A-4B58-9D9C-6A37AA16177D}"/>
+                <a16:creationId xmlns="" xmlns:a16="http://schemas.microsoft.com/office/drawing/2014/main" id="{EF50BE56-9B5A-4B58-9D9C-6A37AA16177D}"/>
               </a:ext>
             </a:extLst>
           </p:cNvPr>
@@ -6089,7 +6184,7 @@
           <p:nvPr/>
         </p:nvPicPr>
         <p:blipFill rotWithShape="1">
-          <a:blip r:embed="rId3">
+          <a:blip r:embed="rId3" cstate="print">
             <a:extLst>
               <a:ext uri="{28A0092B-C50C-407E-A947-70E740481C1C}">
                 <a14:useLocalDpi xmlns:a14="http://schemas.microsoft.com/office/drawing/2010/main" val="0"/>
@@ -6114,10 +6209,10 @@
           <p:cNvPr id="15" name="Picture 14">
             <a:extLst>
               <a:ext uri="{FF2B5EF4-FFF2-40B4-BE49-F238E27FC236}">
-                <a16:creationId xmlns:a16="http://schemas.microsoft.com/office/drawing/2014/main" id="{22DE3B4E-C3D8-496C-B87F-B35CFB4D3BF2}"/>
+                <a16:creationId xmlns="" xmlns:a16="http://schemas.microsoft.com/office/drawing/2014/main" id="{22DE3B4E-C3D8-496C-B87F-B35CFB4D3BF2}"/>
               </a:ext>
               <a:ext uri="{C183D7F6-B498-43B3-948B-1728B52AA6E4}">
-                <adec:decorative xmlns:adec="http://schemas.microsoft.com/office/drawing/2017/decorative" val="1"/>
+                <adec:decorative xmlns="" xmlns:adec="http://schemas.microsoft.com/office/drawing/2017/decorative" val="1"/>
               </a:ext>
             </a:extLst>
           </p:cNvPr>
@@ -6127,7 +6222,7 @@
           <p:nvPr/>
         </p:nvPicPr>
         <p:blipFill rotWithShape="1">
-          <a:blip r:embed="rId4">
+          <a:blip r:embed="rId4" cstate="print">
             <a:extLst>
               <a:ext uri="{28A0092B-C50C-407E-A947-70E740481C1C}">
                 <a14:useLocalDpi xmlns:a14="http://schemas.microsoft.com/office/drawing/2010/main" val="0"/>
@@ -6152,7 +6247,7 @@
           <p:cNvPr id="3" name="Picture 2" descr="Apple (Canada)">
             <a:extLst>
               <a:ext uri="{FF2B5EF4-FFF2-40B4-BE49-F238E27FC236}">
-                <a16:creationId xmlns:a16="http://schemas.microsoft.com/office/drawing/2014/main" id="{BC565D91-4050-42EE-92D2-E67B06F387D6}"/>
+                <a16:creationId xmlns="" xmlns:a16="http://schemas.microsoft.com/office/drawing/2014/main" id="{BC565D91-4050-42EE-92D2-E67B06F387D6}"/>
               </a:ext>
             </a:extLst>
           </p:cNvPr>
@@ -6162,7 +6257,7 @@
           <p:nvPr/>
         </p:nvPicPr>
         <p:blipFill rotWithShape="1">
-          <a:blip r:embed="rId5">
+          <a:blip r:embed="rId5" cstate="print">
             <a:extLst>
               <a:ext uri="{28A0092B-C50C-407E-A947-70E740481C1C}">
                 <a14:useLocalDpi xmlns:a14="http://schemas.microsoft.com/office/drawing/2010/main" val="0"/>
@@ -6197,7 +6292,7 @@
           <p:cNvPr id="4" name="Picture 4" descr="Twitter (@Twitter) | Twitter">
             <a:extLst>
               <a:ext uri="{FF2B5EF4-FFF2-40B4-BE49-F238E27FC236}">
-                <a16:creationId xmlns:a16="http://schemas.microsoft.com/office/drawing/2014/main" id="{FAF52CEE-7AB9-499C-8174-EB2EA846A4CB}"/>
+                <a16:creationId xmlns="" xmlns:a16="http://schemas.microsoft.com/office/drawing/2014/main" id="{FAF52CEE-7AB9-499C-8174-EB2EA846A4CB}"/>
               </a:ext>
             </a:extLst>
           </p:cNvPr>
@@ -6207,7 +6302,7 @@
           <p:nvPr/>
         </p:nvPicPr>
         <p:blipFill>
-          <a:blip r:embed="rId6">
+          <a:blip r:embed="rId6" cstate="print">
             <a:extLst>
               <a:ext uri="{28A0092B-C50C-407E-A947-70E740481C1C}">
                 <a14:useLocalDpi xmlns:a14="http://schemas.microsoft.com/office/drawing/2010/main" val="0"/>
@@ -6244,7 +6339,7 @@
           <p:cNvPr id="2050" name="Picture 2" descr="How Machine Learning Models Fail in the Real World">
             <a:extLst>
               <a:ext uri="{FF2B5EF4-FFF2-40B4-BE49-F238E27FC236}">
-                <a16:creationId xmlns:a16="http://schemas.microsoft.com/office/drawing/2014/main" id="{8CEADF08-6AA4-4955-962D-099AA935E39E}"/>
+                <a16:creationId xmlns="" xmlns:a16="http://schemas.microsoft.com/office/drawing/2014/main" id="{8CEADF08-6AA4-4955-962D-099AA935E39E}"/>
               </a:ext>
             </a:extLst>
           </p:cNvPr>
@@ -6254,7 +6349,7 @@
           <p:nvPr/>
         </p:nvPicPr>
         <p:blipFill rotWithShape="1">
-          <a:blip r:embed="rId7">
+          <a:blip r:embed="rId7" cstate="print">
             <a:extLst>
               <a:ext uri="{28A0092B-C50C-407E-A947-70E740481C1C}">
                 <a14:useLocalDpi xmlns:a14="http://schemas.microsoft.com/office/drawing/2010/main" val="0"/>
@@ -6289,7 +6384,7 @@
           <p:cNvPr id="2052" name="Picture 4" descr="Top 5 Data Visualization Tools of 2018—And They're Free">
             <a:extLst>
               <a:ext uri="{FF2B5EF4-FFF2-40B4-BE49-F238E27FC236}">
-                <a16:creationId xmlns:a16="http://schemas.microsoft.com/office/drawing/2014/main" id="{2DAE0F3D-26B6-4FC7-B7A5-59C73C81106A}"/>
+                <a16:creationId xmlns="" xmlns:a16="http://schemas.microsoft.com/office/drawing/2014/main" id="{2DAE0F3D-26B6-4FC7-B7A5-59C73C81106A}"/>
               </a:ext>
             </a:extLst>
           </p:cNvPr>
@@ -6299,7 +6394,7 @@
           <p:nvPr/>
         </p:nvPicPr>
         <p:blipFill>
-          <a:blip r:embed="rId8">
+          <a:blip r:embed="rId8" cstate="print">
             <a:extLst>
               <a:ext uri="{28A0092B-C50C-407E-A947-70E740481C1C}">
                 <a14:useLocalDpi xmlns:a14="http://schemas.microsoft.com/office/drawing/2010/main" val="0"/>
@@ -6341,6 +6436,13 @@
   <p:clrMapOvr>
     <a:masterClrMapping/>
   </p:clrMapOvr>
+  <p:timing>
+    <p:tnLst>
+      <p:par>
+        <p:cTn id="1" dur="indefinite" restart="never" nodeType="tmRoot"/>
+      </p:par>
+    </p:tnLst>
+  </p:timing>
 </p:sld>
 </file>
 
@@ -6366,7 +6468,7 @@
           <p:cNvPr id="1026" name="Picture 2">
             <a:extLst>
               <a:ext uri="{FF2B5EF4-FFF2-40B4-BE49-F238E27FC236}">
-                <a16:creationId xmlns:a16="http://schemas.microsoft.com/office/drawing/2014/main" id="{DE02C0B7-798D-4E2B-97CF-8FF50063F3DE}"/>
+                <a16:creationId xmlns="" xmlns:a16="http://schemas.microsoft.com/office/drawing/2014/main" id="{DE02C0B7-798D-4E2B-97CF-8FF50063F3DE}"/>
               </a:ext>
             </a:extLst>
           </p:cNvPr>
@@ -6413,7 +6515,7 @@
           <p:cNvPr id="4" name="TextBox 3">
             <a:extLst>
               <a:ext uri="{FF2B5EF4-FFF2-40B4-BE49-F238E27FC236}">
-                <a16:creationId xmlns:a16="http://schemas.microsoft.com/office/drawing/2014/main" id="{8C908E06-1F0E-410D-81F2-9C99C9B0BFB9}"/>
+                <a16:creationId xmlns="" xmlns:a16="http://schemas.microsoft.com/office/drawing/2014/main" id="{8C908E06-1F0E-410D-81F2-9C99C9B0BFB9}"/>
               </a:ext>
             </a:extLst>
           </p:cNvPr>
@@ -6453,6 +6555,13 @@
   <p:clrMapOvr>
     <a:masterClrMapping/>
   </p:clrMapOvr>
+  <p:timing>
+    <p:tnLst>
+      <p:par>
+        <p:cTn id="1" dur="indefinite" restart="never" nodeType="tmRoot"/>
+      </p:par>
+    </p:tnLst>
+  </p:timing>
 </p:sld>
 </file>
 
@@ -6478,7 +6587,7 @@
           <p:cNvPr id="1026" name="Picture 2">
             <a:extLst>
               <a:ext uri="{FF2B5EF4-FFF2-40B4-BE49-F238E27FC236}">
-                <a16:creationId xmlns:a16="http://schemas.microsoft.com/office/drawing/2014/main" id="{DE02C0B7-798D-4E2B-97CF-8FF50063F3DE}"/>
+                <a16:creationId xmlns="" xmlns:a16="http://schemas.microsoft.com/office/drawing/2014/main" id="{DE02C0B7-798D-4E2B-97CF-8FF50063F3DE}"/>
               </a:ext>
             </a:extLst>
           </p:cNvPr>
@@ -6500,7 +6609,7 @@
         </p:blipFill>
         <p:spPr bwMode="auto">
           <a:xfrm>
-            <a:off x="1020666" y="712105"/>
+            <a:off x="1052324" y="318642"/>
             <a:ext cx="10150667" cy="712658"/>
           </a:xfrm>
           <a:prstGeom prst="rect">
@@ -6520,45 +6629,10 @@
       </p:pic>
       <p:sp>
         <p:nvSpPr>
-          <p:cNvPr id="4" name="TextBox 3">
+          <p:cNvPr id="5" name="Text Placeholder 3">
             <a:extLst>
               <a:ext uri="{FF2B5EF4-FFF2-40B4-BE49-F238E27FC236}">
-                <a16:creationId xmlns:a16="http://schemas.microsoft.com/office/drawing/2014/main" id="{8C908E06-1F0E-410D-81F2-9C99C9B0BFB9}"/>
-              </a:ext>
-            </a:extLst>
-          </p:cNvPr>
-          <p:cNvSpPr txBox="1"/>
-          <p:nvPr/>
-        </p:nvSpPr>
-        <p:spPr>
-          <a:xfrm>
-            <a:off x="2676747" y="5992006"/>
-            <a:ext cx="8221625" cy="307777"/>
-          </a:xfrm>
-          <a:prstGeom prst="rect">
-            <a:avLst/>
-          </a:prstGeom>
-          <a:noFill/>
-        </p:spPr>
-        <p:txBody>
-          <a:bodyPr wrap="square">
-            <a:spAutoFit/>
-          </a:bodyPr>
-          <a:lstStyle/>
-          <a:p>
-            <a:r>
-              <a:rPr lang="en-CA" sz="1400" i="1" dirty="0"/>
-              <a:t>Source : https://www.kaggle.com/anniepyim/essential-classification-algorithms-explained</a:t>
-            </a:r>
-          </a:p>
-        </p:txBody>
-      </p:sp>
-      <p:sp>
-        <p:nvSpPr>
-          <p:cNvPr id="5" name="Text Placeholder 3">
-            <a:extLst>
-              <a:ext uri="{FF2B5EF4-FFF2-40B4-BE49-F238E27FC236}">
-                <a16:creationId xmlns:a16="http://schemas.microsoft.com/office/drawing/2014/main" id="{02883CBF-EE10-499B-85F2-8E08659958C9}"/>
+                <a16:creationId xmlns="" xmlns:a16="http://schemas.microsoft.com/office/drawing/2014/main" id="{02883CBF-EE10-499B-85F2-8E08659958C9}"/>
               </a:ext>
             </a:extLst>
           </p:cNvPr>
@@ -6569,8 +6643,8 @@
         </p:nvSpPr>
         <p:spPr>
           <a:xfrm>
-            <a:off x="1274828" y="1859705"/>
-            <a:ext cx="3517567" cy="3403411"/>
+            <a:off x="1274827" y="1040850"/>
+            <a:ext cx="3517567" cy="4690250"/>
           </a:xfrm>
           <a:prstGeom prst="rect">
             <a:avLst/>
@@ -6578,7 +6652,7 @@
         </p:spPr>
         <p:txBody>
           <a:bodyPr>
-            <a:normAutofit/>
+            <a:noAutofit/>
           </a:bodyPr>
           <a:lstStyle>
             <a:lvl1pPr marL="91440" indent="-91440" algn="l" defTabSz="914400" rtl="0" eaLnBrk="1" latinLnBrk="0" hangingPunct="1">
@@ -6819,16 +6893,100 @@
             </a:lvl9pPr>
           </a:lstStyle>
           <a:p>
+            <a:pPr marL="0" indent="0">
+              <a:buNone/>
+            </a:pPr>
+            <a:r>
+              <a:rPr lang="en-CA" sz="1400" b="1" dirty="0" smtClean="0">
+                <a:latin typeface="Times New Roman" panose="02020603050405020304" pitchFamily="18" charset="0"/>
+                <a:cs typeface="Times New Roman" panose="02020603050405020304" pitchFamily="18" charset="0"/>
+              </a:rPr>
+              <a:t>Methodology:</a:t>
+            </a:r>
+          </a:p>
+          <a:p>
+            <a:pPr>
+              <a:buFont typeface="Arial" panose="020B0604020202020204" pitchFamily="34" charset="0"/>
+              <a:buChar char="•"/>
+            </a:pPr>
+            <a:r>
+              <a:rPr lang="en-CA" sz="1400" dirty="0" smtClean="0">
+                <a:latin typeface="Times New Roman" panose="02020603050405020304" pitchFamily="18" charset="0"/>
+                <a:cs typeface="Times New Roman" panose="02020603050405020304" pitchFamily="18" charset="0"/>
+              </a:rPr>
+              <a:t>A rolling windows-based regression method was used on adjusted closing prices for Apple stock.</a:t>
+            </a:r>
+          </a:p>
+          <a:p>
+            <a:pPr>
+              <a:buFont typeface="Arial" panose="020B0604020202020204" pitchFamily="34" charset="0"/>
+              <a:buChar char="•"/>
+            </a:pPr>
+            <a:r>
+              <a:rPr lang="en-CA" sz="1400" dirty="0" smtClean="0">
+                <a:latin typeface="Times New Roman" panose="02020603050405020304" pitchFamily="18" charset="0"/>
+                <a:cs typeface="Times New Roman" panose="02020603050405020304" pitchFamily="18" charset="0"/>
+              </a:rPr>
+              <a:t>The 3 previous day prices were used as features and the 4</a:t>
+            </a:r>
+            <a:r>
+              <a:rPr lang="en-CA" sz="1400" baseline="30000" dirty="0" smtClean="0">
+                <a:latin typeface="Times New Roman" panose="02020603050405020304" pitchFamily="18" charset="0"/>
+                <a:cs typeface="Times New Roman" panose="02020603050405020304" pitchFamily="18" charset="0"/>
+              </a:rPr>
+              <a:t>th</a:t>
+            </a:r>
+            <a:r>
+              <a:rPr lang="en-CA" sz="1400" dirty="0" smtClean="0">
+                <a:latin typeface="Times New Roman" panose="02020603050405020304" pitchFamily="18" charset="0"/>
+                <a:cs typeface="Times New Roman" panose="02020603050405020304" pitchFamily="18" charset="0"/>
+              </a:rPr>
+              <a:t> day price as the target vector.</a:t>
+            </a:r>
+          </a:p>
+          <a:p>
+            <a:pPr>
+              <a:buFont typeface="Arial" panose="020B0604020202020204" pitchFamily="34" charset="0"/>
+              <a:buChar char="•"/>
+            </a:pPr>
+            <a:r>
+              <a:rPr lang="en-CA" sz="1400" dirty="0" smtClean="0">
+                <a:latin typeface="Times New Roman" panose="02020603050405020304" pitchFamily="18" charset="0"/>
+                <a:cs typeface="Times New Roman" panose="02020603050405020304" pitchFamily="18" charset="0"/>
+              </a:rPr>
+              <a:t> Twitter polarity scores and volume were also used as features.</a:t>
+            </a:r>
+          </a:p>
+          <a:p>
+            <a:pPr marL="0" indent="0">
+              <a:buNone/>
+            </a:pPr>
+            <a:r>
+              <a:rPr lang="en-CA" sz="1400" b="1" dirty="0" smtClean="0">
+                <a:latin typeface="Times New Roman" panose="02020603050405020304" pitchFamily="18" charset="0"/>
+                <a:cs typeface="Times New Roman" panose="02020603050405020304" pitchFamily="18" charset="0"/>
+              </a:rPr>
+              <a:t>Models:</a:t>
+            </a:r>
+          </a:p>
+          <a:p>
             <a:pPr marL="285750" indent="-285750">
               <a:buFontTx/>
               <a:buChar char="-"/>
             </a:pPr>
             <a:r>
-              <a:rPr lang="en-CA" sz="2000" b="1" dirty="0">
+              <a:rPr lang="en-CA" sz="1400" b="1" dirty="0" smtClean="0">
                 <a:latin typeface="Times New Roman" panose="02020603050405020304" pitchFamily="18" charset="0"/>
                 <a:cs typeface="Times New Roman" panose="02020603050405020304" pitchFamily="18" charset="0"/>
               </a:rPr>
-              <a:t>LSTM RNN</a:t>
+              <a:t>LSTM </a:t>
+            </a:r>
+            <a:r>
+              <a:rPr lang="en-CA" sz="1400" b="1" dirty="0">
+                <a:latin typeface="Times New Roman" panose="02020603050405020304" pitchFamily="18" charset="0"/>
+                <a:cs typeface="Times New Roman" panose="02020603050405020304" pitchFamily="18" charset="0"/>
+              </a:rPr>
+              <a:t>RNN</a:t>
             </a:r>
           </a:p>
           <a:p>
@@ -6837,7 +6995,7 @@
               <a:buChar char="-"/>
             </a:pPr>
             <a:r>
-              <a:rPr lang="en-CA" sz="2000" b="1" dirty="0">
+              <a:rPr lang="en-CA" sz="1400" b="1" dirty="0">
                 <a:latin typeface="Times New Roman" panose="02020603050405020304" pitchFamily="18" charset="0"/>
                 <a:cs typeface="Times New Roman" panose="02020603050405020304" pitchFamily="18" charset="0"/>
               </a:rPr>
@@ -6850,7 +7008,7 @@
               <a:buChar char="-"/>
             </a:pPr>
             <a:r>
-              <a:rPr lang="en-CA" sz="2000" b="1" dirty="0">
+              <a:rPr lang="en-CA" sz="1400" b="1" dirty="0">
                 <a:latin typeface="Times New Roman" panose="02020603050405020304" pitchFamily="18" charset="0"/>
                 <a:cs typeface="Times New Roman" panose="02020603050405020304" pitchFamily="18" charset="0"/>
               </a:rPr>
@@ -6864,7 +7022,7 @@
           <p:cNvPr id="6" name="Text Placeholder 3">
             <a:extLst>
               <a:ext uri="{FF2B5EF4-FFF2-40B4-BE49-F238E27FC236}">
-                <a16:creationId xmlns:a16="http://schemas.microsoft.com/office/drawing/2014/main" id="{C8E27961-B1E2-4A89-A656-273ABE12853C}"/>
+                <a16:creationId xmlns="" xmlns:a16="http://schemas.microsoft.com/office/drawing/2014/main" id="{C8E27961-B1E2-4A89-A656-273ABE12853C}"/>
               </a:ext>
             </a:extLst>
           </p:cNvPr>
@@ -6875,8 +7033,8 @@
         </p:nvSpPr>
         <p:spPr>
           <a:xfrm>
-            <a:off x="7399607" y="1794917"/>
-            <a:ext cx="3517567" cy="3697359"/>
+            <a:off x="7342170" y="1035917"/>
+            <a:ext cx="3517567" cy="4965638"/>
           </a:xfrm>
           <a:prstGeom prst="rect">
             <a:avLst/>
@@ -6884,7 +7042,7 @@
         </p:spPr>
         <p:txBody>
           <a:bodyPr>
-            <a:normAutofit/>
+            <a:noAutofit/>
           </a:bodyPr>
           <a:lstStyle>
             <a:lvl1pPr marL="91440" indent="-91440" algn="l" defTabSz="914400" rtl="0" eaLnBrk="1" latinLnBrk="0" hangingPunct="1">
@@ -7125,29 +7283,158 @@
             </a:lvl9pPr>
           </a:lstStyle>
           <a:p>
+            <a:pPr marL="0" indent="0">
+              <a:buNone/>
+            </a:pPr>
+            <a:r>
+              <a:rPr lang="en-CA" sz="1400" b="1" dirty="0">
+                <a:latin typeface="Times New Roman" panose="02020603050405020304" pitchFamily="18" charset="0"/>
+                <a:cs typeface="Times New Roman" panose="02020603050405020304" pitchFamily="18" charset="0"/>
+              </a:rPr>
+              <a:t>Methodology</a:t>
+            </a:r>
+          </a:p>
+          <a:p>
+            <a:pPr>
+              <a:buFont typeface="Arial" panose="020B0604020202020204" pitchFamily="34" charset="0"/>
+              <a:buChar char="•"/>
+            </a:pPr>
+            <a:r>
+              <a:rPr lang="en-CA" sz="1400" dirty="0">
+                <a:latin typeface="Times New Roman" panose="02020603050405020304" pitchFamily="18" charset="0"/>
+                <a:cs typeface="Times New Roman" panose="02020603050405020304" pitchFamily="18" charset="0"/>
+              </a:rPr>
+              <a:t> The </a:t>
+            </a:r>
+            <a:r>
+              <a:rPr lang="en-CA" sz="1400" dirty="0" smtClean="0">
+                <a:latin typeface="Times New Roman" panose="02020603050405020304" pitchFamily="18" charset="0"/>
+                <a:cs typeface="Times New Roman" panose="02020603050405020304" pitchFamily="18" charset="0"/>
+              </a:rPr>
+              <a:t>adjusted </a:t>
+            </a:r>
+            <a:r>
+              <a:rPr lang="en-CA" sz="1400" dirty="0">
+                <a:latin typeface="Times New Roman" panose="02020603050405020304" pitchFamily="18" charset="0"/>
+                <a:cs typeface="Times New Roman" panose="02020603050405020304" pitchFamily="18" charset="0"/>
+              </a:rPr>
+              <a:t>closing price for Apple </a:t>
+            </a:r>
+            <a:r>
+              <a:rPr lang="en-CA" sz="1400" dirty="0" smtClean="0">
+                <a:latin typeface="Times New Roman" panose="02020603050405020304" pitchFamily="18" charset="0"/>
+                <a:cs typeface="Times New Roman" panose="02020603050405020304" pitchFamily="18" charset="0"/>
+              </a:rPr>
+              <a:t>stock was converted into binary form based on the difference in current price vs previous day price. </a:t>
+            </a:r>
+          </a:p>
+          <a:p>
+            <a:pPr>
+              <a:buFont typeface="Arial" panose="020B0604020202020204" pitchFamily="34" charset="0"/>
+              <a:buChar char="•"/>
+            </a:pPr>
+            <a:r>
+              <a:rPr lang="en-CA" sz="1400" dirty="0" smtClean="0">
+                <a:latin typeface="Times New Roman" panose="02020603050405020304" pitchFamily="18" charset="0"/>
+                <a:cs typeface="Times New Roman" panose="02020603050405020304" pitchFamily="18" charset="0"/>
+              </a:rPr>
+              <a:t>This was done to analyze the trend in the market with a rise represented as 1 and a fall in price represented as 0. </a:t>
+            </a:r>
+          </a:p>
+          <a:p>
+            <a:pPr>
+              <a:buFont typeface="Arial" panose="020B0604020202020204" pitchFamily="34" charset="0"/>
+              <a:buChar char="•"/>
+            </a:pPr>
+            <a:r>
+              <a:rPr lang="en-CA" sz="1400" dirty="0" smtClean="0">
+                <a:latin typeface="Times New Roman" panose="02020603050405020304" pitchFamily="18" charset="0"/>
+                <a:cs typeface="Times New Roman" panose="02020603050405020304" pitchFamily="18" charset="0"/>
+              </a:rPr>
+              <a:t>Twitter </a:t>
+            </a:r>
+            <a:r>
+              <a:rPr lang="en-CA" sz="1400" dirty="0">
+                <a:latin typeface="Times New Roman" panose="02020603050405020304" pitchFamily="18" charset="0"/>
+                <a:cs typeface="Times New Roman" panose="02020603050405020304" pitchFamily="18" charset="0"/>
+              </a:rPr>
+              <a:t>polarity scores </a:t>
+            </a:r>
+            <a:r>
+              <a:rPr lang="en-CA" sz="1400" dirty="0" smtClean="0">
+                <a:latin typeface="Times New Roman" panose="02020603050405020304" pitchFamily="18" charset="0"/>
+                <a:cs typeface="Times New Roman" panose="02020603050405020304" pitchFamily="18" charset="0"/>
+              </a:rPr>
+              <a:t>were used to classify tweets into positive, negative and neutral sentiments. Binary encoding of these sentiments was used to run the classifier models.</a:t>
+            </a:r>
+          </a:p>
+          <a:p>
+            <a:pPr marL="0" indent="0">
+              <a:buNone/>
+            </a:pPr>
+            <a:r>
+              <a:rPr lang="en-CA" sz="1400" b="1" dirty="0" smtClean="0">
+                <a:latin typeface="Times New Roman" panose="02020603050405020304" pitchFamily="18" charset="0"/>
+                <a:cs typeface="Times New Roman" panose="02020603050405020304" pitchFamily="18" charset="0"/>
+              </a:rPr>
+              <a:t>Models:</a:t>
+            </a:r>
+            <a:endParaRPr lang="en-CA" sz="1400" b="1" dirty="0">
+              <a:latin typeface="Times New Roman" panose="02020603050405020304" pitchFamily="18" charset="0"/>
+              <a:cs typeface="Times New Roman" panose="02020603050405020304" pitchFamily="18" charset="0"/>
+            </a:endParaRPr>
+          </a:p>
+          <a:p>
             <a:pPr marL="285750" indent="-285750">
+              <a:lnSpc>
+                <a:spcPct val="100000"/>
+              </a:lnSpc>
               <a:buFontTx/>
               <a:buChar char="-"/>
             </a:pPr>
             <a:r>
-              <a:rPr lang="en-CA" sz="2000" b="1" dirty="0">
+              <a:rPr lang="en-CA" sz="1400" b="1" dirty="0" smtClean="0">
                 <a:latin typeface="Times New Roman" panose="02020603050405020304" pitchFamily="18" charset="0"/>
                 <a:cs typeface="Times New Roman" panose="02020603050405020304" pitchFamily="18" charset="0"/>
               </a:rPr>
-              <a:t>Random Forest Classifier</a:t>
+              <a:t>Random </a:t>
+            </a:r>
+            <a:r>
+              <a:rPr lang="en-CA" sz="1400" b="1" dirty="0">
+                <a:latin typeface="Times New Roman" panose="02020603050405020304" pitchFamily="18" charset="0"/>
+                <a:cs typeface="Times New Roman" panose="02020603050405020304" pitchFamily="18" charset="0"/>
+              </a:rPr>
+              <a:t>Forest </a:t>
+            </a:r>
+            <a:r>
+              <a:rPr lang="en-CA" sz="1400" b="1" dirty="0" smtClean="0">
+                <a:latin typeface="Times New Roman" panose="02020603050405020304" pitchFamily="18" charset="0"/>
+                <a:cs typeface="Times New Roman" panose="02020603050405020304" pitchFamily="18" charset="0"/>
+              </a:rPr>
+              <a:t>Classifier</a:t>
             </a:r>
           </a:p>
           <a:p>
             <a:pPr marL="285750" indent="-285750">
+              <a:lnSpc>
+                <a:spcPct val="100000"/>
+              </a:lnSpc>
               <a:buFontTx/>
               <a:buChar char="-"/>
             </a:pPr>
             <a:r>
-              <a:rPr lang="en-CA" sz="2000" b="1" dirty="0">
+              <a:rPr lang="en-CA" sz="1400" b="1" dirty="0" smtClean="0">
                 <a:latin typeface="Times New Roman" panose="02020603050405020304" pitchFamily="18" charset="0"/>
                 <a:cs typeface="Times New Roman" panose="02020603050405020304" pitchFamily="18" charset="0"/>
               </a:rPr>
-              <a:t>Gradient Booster</a:t>
+              <a:t>Gradient </a:t>
+            </a:r>
+            <a:r>
+              <a:rPr lang="en-CA" sz="1400" b="1" dirty="0">
+                <a:latin typeface="Times New Roman" panose="02020603050405020304" pitchFamily="18" charset="0"/>
+                <a:cs typeface="Times New Roman" panose="02020603050405020304" pitchFamily="18" charset="0"/>
+              </a:rPr>
+              <a:t>Booster</a:t>
             </a:r>
           </a:p>
         </p:txBody>
@@ -7157,7 +7444,7 @@
           <p:cNvPr id="2" name="Rectangle: Rounded Corners 1">
             <a:extLst>
               <a:ext uri="{FF2B5EF4-FFF2-40B4-BE49-F238E27FC236}">
-                <a16:creationId xmlns:a16="http://schemas.microsoft.com/office/drawing/2014/main" id="{0515E248-0D46-4D69-A34C-8DB93DF6B370}"/>
+                <a16:creationId xmlns="" xmlns:a16="http://schemas.microsoft.com/office/drawing/2014/main" id="{0515E248-0D46-4D69-A34C-8DB93DF6B370}"/>
               </a:ext>
             </a:extLst>
           </p:cNvPr>
@@ -7166,8 +7453,8 @@
         </p:nvSpPr>
         <p:spPr>
           <a:xfrm>
-            <a:off x="901783" y="467833"/>
-            <a:ext cx="4263656" cy="5209953"/>
+            <a:off x="901783" y="309093"/>
+            <a:ext cx="4263656" cy="5692462"/>
           </a:xfrm>
           <a:prstGeom prst="roundRect">
             <a:avLst/>
@@ -7209,7 +7496,7 @@
           <p:cNvPr id="7" name="Rectangle: Rounded Corners 6">
             <a:extLst>
               <a:ext uri="{FF2B5EF4-FFF2-40B4-BE49-F238E27FC236}">
-                <a16:creationId xmlns:a16="http://schemas.microsoft.com/office/drawing/2014/main" id="{812BF3BC-4761-41CD-9A74-6CDF2E7C7A03}"/>
+                <a16:creationId xmlns="" xmlns:a16="http://schemas.microsoft.com/office/drawing/2014/main" id="{812BF3BC-4761-41CD-9A74-6CDF2E7C7A03}"/>
               </a:ext>
             </a:extLst>
           </p:cNvPr>
@@ -7218,8 +7505,8 @@
         </p:nvSpPr>
         <p:spPr>
           <a:xfrm>
-            <a:off x="7089875" y="467833"/>
-            <a:ext cx="4263656" cy="5209953"/>
+            <a:off x="7089875" y="309093"/>
+            <a:ext cx="4263656" cy="5692462"/>
           </a:xfrm>
           <a:prstGeom prst="roundRect">
             <a:avLst/>
@@ -7266,6 +7553,13 @@
   <p:clrMapOvr>
     <a:masterClrMapping/>
   </p:clrMapOvr>
+  <p:timing>
+    <p:tnLst>
+      <p:par>
+        <p:cTn id="1" dur="indefinite" restart="never" nodeType="tmRoot"/>
+      </p:par>
+    </p:tnLst>
+  </p:timing>
 </p:sld>
 </file>
 
@@ -7291,7 +7585,7 @@
           <p:cNvPr id="4" name="Text Placeholder 3">
             <a:extLst>
               <a:ext uri="{FF2B5EF4-FFF2-40B4-BE49-F238E27FC236}">
-                <a16:creationId xmlns:a16="http://schemas.microsoft.com/office/drawing/2014/main" id="{77C772A2-1719-4DB2-B52A-3DEB9EDE685E}"/>
+                <a16:creationId xmlns="" xmlns:a16="http://schemas.microsoft.com/office/drawing/2014/main" id="{77C772A2-1719-4DB2-B52A-3DEB9EDE685E}"/>
               </a:ext>
             </a:extLst>
           </p:cNvPr>
@@ -7359,7 +7653,7 @@
           <p:cNvPr id="5" name="Title 2">
             <a:extLst>
               <a:ext uri="{FF2B5EF4-FFF2-40B4-BE49-F238E27FC236}">
-                <a16:creationId xmlns:a16="http://schemas.microsoft.com/office/drawing/2014/main" id="{CEB7A092-682E-4FA5-A15C-1BFB6C6706DA}"/>
+                <a16:creationId xmlns="" xmlns:a16="http://schemas.microsoft.com/office/drawing/2014/main" id="{CEB7A092-682E-4FA5-A15C-1BFB6C6706DA}"/>
               </a:ext>
             </a:extLst>
           </p:cNvPr>
@@ -7414,7 +7708,7 @@
           <p:cNvPr id="7" name="Picture 6">
             <a:extLst>
               <a:ext uri="{FF2B5EF4-FFF2-40B4-BE49-F238E27FC236}">
-                <a16:creationId xmlns:a16="http://schemas.microsoft.com/office/drawing/2014/main" id="{FE7F4F54-F15B-47B3-B8DC-51929CE80D26}"/>
+                <a16:creationId xmlns="" xmlns:a16="http://schemas.microsoft.com/office/drawing/2014/main" id="{FE7F4F54-F15B-47B3-B8DC-51929CE80D26}"/>
               </a:ext>
             </a:extLst>
           </p:cNvPr>
@@ -7449,7 +7743,7 @@
           <p:cNvPr id="9" name="Picture 8">
             <a:extLst>
               <a:ext uri="{FF2B5EF4-FFF2-40B4-BE49-F238E27FC236}">
-                <a16:creationId xmlns:a16="http://schemas.microsoft.com/office/drawing/2014/main" id="{CE9A210C-9782-4475-A42E-3F28030B0CFB}"/>
+                <a16:creationId xmlns="" xmlns:a16="http://schemas.microsoft.com/office/drawing/2014/main" id="{CE9A210C-9782-4475-A42E-3F28030B0CFB}"/>
               </a:ext>
             </a:extLst>
           </p:cNvPr>
@@ -7484,7 +7778,7 @@
           <p:cNvPr id="11" name="Picture 10">
             <a:extLst>
               <a:ext uri="{FF2B5EF4-FFF2-40B4-BE49-F238E27FC236}">
-                <a16:creationId xmlns:a16="http://schemas.microsoft.com/office/drawing/2014/main" id="{05E9590C-45AE-45EC-83B9-A4263781992E}"/>
+                <a16:creationId xmlns="" xmlns:a16="http://schemas.microsoft.com/office/drawing/2014/main" id="{05E9590C-45AE-45EC-83B9-A4263781992E}"/>
               </a:ext>
             </a:extLst>
           </p:cNvPr>
@@ -7519,7 +7813,7 @@
           <p:cNvPr id="13" name="Rectangle: Rounded Corners 12">
             <a:extLst>
               <a:ext uri="{FF2B5EF4-FFF2-40B4-BE49-F238E27FC236}">
-                <a16:creationId xmlns:a16="http://schemas.microsoft.com/office/drawing/2014/main" id="{A0DF0249-1BAC-446B-8F40-07A273B0B734}"/>
+                <a16:creationId xmlns="" xmlns:a16="http://schemas.microsoft.com/office/drawing/2014/main" id="{A0DF0249-1BAC-446B-8F40-07A273B0B734}"/>
               </a:ext>
             </a:extLst>
           </p:cNvPr>
@@ -7568,7 +7862,7 @@
           <p:cNvPr id="15" name="Rectangle: Rounded Corners 14">
             <a:extLst>
               <a:ext uri="{FF2B5EF4-FFF2-40B4-BE49-F238E27FC236}">
-                <a16:creationId xmlns:a16="http://schemas.microsoft.com/office/drawing/2014/main" id="{62D53B84-F555-41E6-AFAE-CB7AF94F6842}"/>
+                <a16:creationId xmlns="" xmlns:a16="http://schemas.microsoft.com/office/drawing/2014/main" id="{62D53B84-F555-41E6-AFAE-CB7AF94F6842}"/>
               </a:ext>
             </a:extLst>
           </p:cNvPr>
@@ -7617,7 +7911,7 @@
           <p:cNvPr id="17" name="Rectangle: Rounded Corners 16">
             <a:extLst>
               <a:ext uri="{FF2B5EF4-FFF2-40B4-BE49-F238E27FC236}">
-                <a16:creationId xmlns:a16="http://schemas.microsoft.com/office/drawing/2014/main" id="{2CC559C2-5898-40C3-AED3-D359CCB5A7AD}"/>
+                <a16:creationId xmlns="" xmlns:a16="http://schemas.microsoft.com/office/drawing/2014/main" id="{2CC559C2-5898-40C3-AED3-D359CCB5A7AD}"/>
               </a:ext>
             </a:extLst>
           </p:cNvPr>
@@ -7666,7 +7960,7 @@
           <p:cNvPr id="22" name="Title 1">
             <a:extLst>
               <a:ext uri="{FF2B5EF4-FFF2-40B4-BE49-F238E27FC236}">
-                <a16:creationId xmlns:a16="http://schemas.microsoft.com/office/drawing/2014/main" id="{14D99E45-BAE0-4C5B-ABA8-C4F54F3434E4}"/>
+                <a16:creationId xmlns="" xmlns:a16="http://schemas.microsoft.com/office/drawing/2014/main" id="{14D99E45-BAE0-4C5B-ABA8-C4F54F3434E4}"/>
               </a:ext>
             </a:extLst>
           </p:cNvPr>
@@ -7701,9 +7995,17 @@
               <a:rPr lang="en-CA" sz="2400" b="1" dirty="0"/>
               <a:t>&lt;Regression Approach&gt;</a:t>
             </a:r>
+            <a:r>
+              <a:rPr lang="en-CA" sz="4000" b="1" dirty="0"/>
+              <a:t/>
+            </a:r>
             <a:br>
               <a:rPr lang="en-CA" sz="4000" b="1" dirty="0"/>
             </a:br>
+            <a:r>
+              <a:rPr lang="en-CA" sz="4000" dirty="0"/>
+              <a:t/>
+            </a:r>
             <a:br>
               <a:rPr lang="en-CA" sz="4000" dirty="0"/>
             </a:br>
@@ -7716,7 +8018,7 @@
           <p:cNvPr id="2" name="Rectangle: Rounded Corners 1">
             <a:extLst>
               <a:ext uri="{FF2B5EF4-FFF2-40B4-BE49-F238E27FC236}">
-                <a16:creationId xmlns:a16="http://schemas.microsoft.com/office/drawing/2014/main" id="{E2BC299D-D7DA-45F3-9E90-F814EA9A4A32}"/>
+                <a16:creationId xmlns="" xmlns:a16="http://schemas.microsoft.com/office/drawing/2014/main" id="{E2BC299D-D7DA-45F3-9E90-F814EA9A4A32}"/>
               </a:ext>
             </a:extLst>
           </p:cNvPr>
@@ -7764,8 +8066,13 @@
             <a:pPr algn="ctr"/>
             <a:r>
               <a:rPr lang="en-CA" sz="1200" dirty="0"/>
-              <a:t>R-Squared : 80.05%</a:t>
-            </a:r>
+              <a:t>R-Squared : </a:t>
+            </a:r>
+            <a:r>
+              <a:rPr lang="en-CA" sz="1200" dirty="0" smtClean="0"/>
+              <a:t>80.06%</a:t>
+            </a:r>
+            <a:endParaRPr lang="en-CA" sz="1200" dirty="0"/>
           </a:p>
           <a:p>
             <a:pPr algn="ctr"/>
@@ -7781,7 +8088,7 @@
           <p:cNvPr id="14" name="Rectangle: Rounded Corners 13">
             <a:extLst>
               <a:ext uri="{FF2B5EF4-FFF2-40B4-BE49-F238E27FC236}">
-                <a16:creationId xmlns:a16="http://schemas.microsoft.com/office/drawing/2014/main" id="{F578D8C1-94E7-45BB-9955-21C6F31F6ED9}"/>
+                <a16:creationId xmlns="" xmlns:a16="http://schemas.microsoft.com/office/drawing/2014/main" id="{F578D8C1-94E7-45BB-9955-21C6F31F6ED9}"/>
               </a:ext>
             </a:extLst>
           </p:cNvPr>
@@ -7846,7 +8153,7 @@
           <p:cNvPr id="16" name="Rectangle: Rounded Corners 15">
             <a:extLst>
               <a:ext uri="{FF2B5EF4-FFF2-40B4-BE49-F238E27FC236}">
-                <a16:creationId xmlns:a16="http://schemas.microsoft.com/office/drawing/2014/main" id="{4F30A195-A7CD-4835-B7F1-61CAD16EB53B}"/>
+                <a16:creationId xmlns="" xmlns:a16="http://schemas.microsoft.com/office/drawing/2014/main" id="{4F30A195-A7CD-4835-B7F1-61CAD16EB53B}"/>
               </a:ext>
             </a:extLst>
           </p:cNvPr>
@@ -7916,6 +8223,13 @@
   <p:clrMapOvr>
     <a:masterClrMapping/>
   </p:clrMapOvr>
+  <p:timing>
+    <p:tnLst>
+      <p:par>
+        <p:cTn id="1" dur="indefinite" restart="never" nodeType="tmRoot"/>
+      </p:par>
+    </p:tnLst>
+  </p:timing>
 </p:sld>
 </file>
 
@@ -7941,7 +8255,7 @@
           <p:cNvPr id="2" name="Title 1">
             <a:extLst>
               <a:ext uri="{FF2B5EF4-FFF2-40B4-BE49-F238E27FC236}">
-                <a16:creationId xmlns:a16="http://schemas.microsoft.com/office/drawing/2014/main" id="{66C66C3D-D740-442D-8E05-7FA499A836C1}"/>
+                <a16:creationId xmlns="" xmlns:a16="http://schemas.microsoft.com/office/drawing/2014/main" id="{66C66C3D-D740-442D-8E05-7FA499A836C1}"/>
               </a:ext>
             </a:extLst>
           </p:cNvPr>
@@ -7976,9 +8290,17 @@
               <a:rPr lang="en-CA" sz="2400" b="1" dirty="0"/>
               <a:t>&lt;Classification Approach&gt;</a:t>
             </a:r>
+            <a:r>
+              <a:rPr lang="en-CA" sz="4000" b="1" dirty="0"/>
+              <a:t/>
+            </a:r>
             <a:br>
               <a:rPr lang="en-CA" sz="4000" b="1" dirty="0"/>
             </a:br>
+            <a:r>
+              <a:rPr lang="en-CA" sz="4000" dirty="0"/>
+              <a:t/>
+            </a:r>
             <a:br>
               <a:rPr lang="en-CA" sz="4000" dirty="0"/>
             </a:br>
@@ -7991,7 +8313,7 @@
           <p:cNvPr id="4" name="Text Placeholder 3">
             <a:extLst>
               <a:ext uri="{FF2B5EF4-FFF2-40B4-BE49-F238E27FC236}">
-                <a16:creationId xmlns:a16="http://schemas.microsoft.com/office/drawing/2014/main" id="{77C772A2-1719-4DB2-B52A-3DEB9EDE685E}"/>
+                <a16:creationId xmlns="" xmlns:a16="http://schemas.microsoft.com/office/drawing/2014/main" id="{77C772A2-1719-4DB2-B52A-3DEB9EDE685E}"/>
               </a:ext>
             </a:extLst>
           </p:cNvPr>
@@ -8046,7 +8368,7 @@
           <p:cNvPr id="5" name="Title 2">
             <a:extLst>
               <a:ext uri="{FF2B5EF4-FFF2-40B4-BE49-F238E27FC236}">
-                <a16:creationId xmlns:a16="http://schemas.microsoft.com/office/drawing/2014/main" id="{CEB7A092-682E-4FA5-A15C-1BFB6C6706DA}"/>
+                <a16:creationId xmlns="" xmlns:a16="http://schemas.microsoft.com/office/drawing/2014/main" id="{CEB7A092-682E-4FA5-A15C-1BFB6C6706DA}"/>
               </a:ext>
             </a:extLst>
           </p:cNvPr>
@@ -8101,7 +8423,7 @@
           <p:cNvPr id="6" name="Picture 5">
             <a:extLst>
               <a:ext uri="{FF2B5EF4-FFF2-40B4-BE49-F238E27FC236}">
-                <a16:creationId xmlns:a16="http://schemas.microsoft.com/office/drawing/2014/main" id="{8AFF7F27-CC2C-4F1C-B834-F8DF066E1139}"/>
+                <a16:creationId xmlns="" xmlns:a16="http://schemas.microsoft.com/office/drawing/2014/main" id="{8AFF7F27-CC2C-4F1C-B834-F8DF066E1139}"/>
               </a:ext>
             </a:extLst>
           </p:cNvPr>
@@ -8131,7 +8453,7 @@
           <p:cNvPr id="8" name="Rectangle: Rounded Corners 7">
             <a:extLst>
               <a:ext uri="{FF2B5EF4-FFF2-40B4-BE49-F238E27FC236}">
-                <a16:creationId xmlns:a16="http://schemas.microsoft.com/office/drawing/2014/main" id="{9A206776-BEA9-4043-B9ED-44860CB0041F}"/>
+                <a16:creationId xmlns="" xmlns:a16="http://schemas.microsoft.com/office/drawing/2014/main" id="{9A206776-BEA9-4043-B9ED-44860CB0041F}"/>
               </a:ext>
             </a:extLst>
           </p:cNvPr>
@@ -8188,7 +8510,7 @@
           <p:cNvPr id="10" name="Rectangle: Rounded Corners 9">
             <a:extLst>
               <a:ext uri="{FF2B5EF4-FFF2-40B4-BE49-F238E27FC236}">
-                <a16:creationId xmlns:a16="http://schemas.microsoft.com/office/drawing/2014/main" id="{72FB6A26-7B97-47B9-9704-B96EB326FA91}"/>
+                <a16:creationId xmlns="" xmlns:a16="http://schemas.microsoft.com/office/drawing/2014/main" id="{72FB6A26-7B97-47B9-9704-B96EB326FA91}"/>
               </a:ext>
             </a:extLst>
           </p:cNvPr>
@@ -8245,7 +8567,7 @@
           <p:cNvPr id="12" name="Picture 11">
             <a:extLst>
               <a:ext uri="{FF2B5EF4-FFF2-40B4-BE49-F238E27FC236}">
-                <a16:creationId xmlns:a16="http://schemas.microsoft.com/office/drawing/2014/main" id="{3B2A146F-C143-417F-8A94-99D06E63587B}"/>
+                <a16:creationId xmlns="" xmlns:a16="http://schemas.microsoft.com/office/drawing/2014/main" id="{3B2A146F-C143-417F-8A94-99D06E63587B}"/>
               </a:ext>
             </a:extLst>
           </p:cNvPr>
@@ -8275,7 +8597,7 @@
           <p:cNvPr id="3" name="Rectangle: Rounded Corners 2">
             <a:extLst>
               <a:ext uri="{FF2B5EF4-FFF2-40B4-BE49-F238E27FC236}">
-                <a16:creationId xmlns:a16="http://schemas.microsoft.com/office/drawing/2014/main" id="{3396D9A3-66CF-4A5D-83F9-F67F7096A242}"/>
+                <a16:creationId xmlns="" xmlns:a16="http://schemas.microsoft.com/office/drawing/2014/main" id="{3396D9A3-66CF-4A5D-83F9-F67F7096A242}"/>
               </a:ext>
             </a:extLst>
           </p:cNvPr>
@@ -8327,7 +8649,7 @@
           <p:cNvPr id="11" name="Rectangle: Rounded Corners 10">
             <a:extLst>
               <a:ext uri="{FF2B5EF4-FFF2-40B4-BE49-F238E27FC236}">
-                <a16:creationId xmlns:a16="http://schemas.microsoft.com/office/drawing/2014/main" id="{902B5FBD-CDA3-4BEF-87C0-73610DC1FC7B}"/>
+                <a16:creationId xmlns="" xmlns:a16="http://schemas.microsoft.com/office/drawing/2014/main" id="{902B5FBD-CDA3-4BEF-87C0-73610DC1FC7B}"/>
               </a:ext>
             </a:extLst>
           </p:cNvPr>
@@ -8384,6 +8706,13 @@
   <p:clrMapOvr>
     <a:masterClrMapping/>
   </p:clrMapOvr>
+  <p:timing>
+    <p:tnLst>
+      <p:par>
+        <p:cTn id="1" dur="indefinite" restart="never" nodeType="tmRoot"/>
+      </p:par>
+    </p:tnLst>
+  </p:timing>
 </p:sld>
 </file>
 
@@ -8406,10 +8735,10 @@
       </p:grpSpPr>
       <p:sp>
         <p:nvSpPr>
-          <p:cNvPr id="2" name="Text Placeholder 3">
+          <p:cNvPr id="12" name="Title 7">
             <a:extLst>
               <a:ext uri="{FF2B5EF4-FFF2-40B4-BE49-F238E27FC236}">
-                <a16:creationId xmlns:a16="http://schemas.microsoft.com/office/drawing/2014/main" id="{30DC66C4-6C3F-45ED-A950-A55681BAC970}"/>
+                <a16:creationId xmlns="" xmlns:a16="http://schemas.microsoft.com/office/drawing/2014/main" id="{71520384-A28C-4951-BA9F-337FAB2E7F09}"/>
               </a:ext>
             </a:extLst>
           </p:cNvPr>
@@ -8420,221 +8749,7 @@
         </p:nvSpPr>
         <p:spPr>
           <a:xfrm>
-            <a:off x="5767754" y="1243259"/>
-            <a:ext cx="5897218" cy="5074498"/>
-          </a:xfrm>
-          <a:prstGeom prst="rect">
-            <a:avLst/>
-          </a:prstGeom>
-        </p:spPr>
-        <p:txBody>
-          <a:bodyPr vert="horz" lIns="91440" tIns="45720" rIns="91440" bIns="45720" rtlCol="0" anchor="ctr">
-            <a:normAutofit/>
-          </a:bodyPr>
-          <a:lstStyle>
-            <a:lvl1pPr marL="0" indent="0" algn="l" defTabSz="914400" rtl="0" eaLnBrk="1" latinLnBrk="0" hangingPunct="1">
-              <a:lnSpc>
-                <a:spcPct val="100000"/>
-              </a:lnSpc>
-              <a:spcBef>
-                <a:spcPts val="1000"/>
-              </a:spcBef>
-              <a:buFont typeface="Arial" panose="020B0604020202020204" pitchFamily="34" charset="0"/>
-              <a:buNone/>
-              <a:defRPr sz="2400" kern="1200" spc="600">
-                <a:solidFill>
-                  <a:schemeClr val="tx1">
-                    <a:tint val="75000"/>
-                  </a:schemeClr>
-                </a:solidFill>
-                <a:latin typeface="+mn-lt"/>
-                <a:ea typeface="+mn-ea"/>
-                <a:cs typeface="+mn-cs"/>
-              </a:defRPr>
-            </a:lvl1pPr>
-            <a:lvl2pPr marL="457200" indent="0" algn="l" defTabSz="914400" rtl="0" eaLnBrk="1" latinLnBrk="0" hangingPunct="1">
-              <a:lnSpc>
-                <a:spcPct val="150000"/>
-              </a:lnSpc>
-              <a:spcBef>
-                <a:spcPts val="500"/>
-              </a:spcBef>
-              <a:buFont typeface="Arial" panose="020B0604020202020204" pitchFamily="34" charset="0"/>
-              <a:buNone/>
-              <a:defRPr sz="2000" kern="1200">
-                <a:solidFill>
-                  <a:schemeClr val="tx1">
-                    <a:tint val="75000"/>
-                  </a:schemeClr>
-                </a:solidFill>
-                <a:latin typeface="+mn-lt"/>
-                <a:ea typeface="+mn-ea"/>
-                <a:cs typeface="+mn-cs"/>
-              </a:defRPr>
-            </a:lvl2pPr>
-            <a:lvl3pPr marL="914400" indent="0" algn="l" defTabSz="914400" rtl="0" eaLnBrk="1" latinLnBrk="0" hangingPunct="1">
-              <a:lnSpc>
-                <a:spcPct val="150000"/>
-              </a:lnSpc>
-              <a:spcBef>
-                <a:spcPts val="500"/>
-              </a:spcBef>
-              <a:buFont typeface="Arial" panose="020B0604020202020204" pitchFamily="34" charset="0"/>
-              <a:buNone/>
-              <a:defRPr sz="1800" kern="1200">
-                <a:solidFill>
-                  <a:schemeClr val="tx1">
-                    <a:tint val="75000"/>
-                  </a:schemeClr>
-                </a:solidFill>
-                <a:latin typeface="+mn-lt"/>
-                <a:ea typeface="+mn-ea"/>
-                <a:cs typeface="+mn-cs"/>
-              </a:defRPr>
-            </a:lvl3pPr>
-            <a:lvl4pPr marL="1371600" indent="0" algn="l" defTabSz="914400" rtl="0" eaLnBrk="1" latinLnBrk="0" hangingPunct="1">
-              <a:lnSpc>
-                <a:spcPct val="150000"/>
-              </a:lnSpc>
-              <a:spcBef>
-                <a:spcPts val="500"/>
-              </a:spcBef>
-              <a:buFont typeface="Arial" panose="020B0604020202020204" pitchFamily="34" charset="0"/>
-              <a:buNone/>
-              <a:defRPr sz="1600" kern="1200">
-                <a:solidFill>
-                  <a:schemeClr val="tx1">
-                    <a:tint val="75000"/>
-                  </a:schemeClr>
-                </a:solidFill>
-                <a:latin typeface="+mn-lt"/>
-                <a:ea typeface="+mn-ea"/>
-                <a:cs typeface="+mn-cs"/>
-              </a:defRPr>
-            </a:lvl4pPr>
-            <a:lvl5pPr marL="1828800" indent="0" algn="l" defTabSz="914400" rtl="0" eaLnBrk="1" latinLnBrk="0" hangingPunct="1">
-              <a:lnSpc>
-                <a:spcPct val="150000"/>
-              </a:lnSpc>
-              <a:spcBef>
-                <a:spcPts val="500"/>
-              </a:spcBef>
-              <a:buFont typeface="Arial" panose="020B0604020202020204" pitchFamily="34" charset="0"/>
-              <a:buNone/>
-              <a:defRPr sz="1600" kern="1200">
-                <a:solidFill>
-                  <a:schemeClr val="tx1">
-                    <a:tint val="75000"/>
-                  </a:schemeClr>
-                </a:solidFill>
-                <a:latin typeface="+mn-lt"/>
-                <a:ea typeface="+mn-ea"/>
-                <a:cs typeface="+mn-cs"/>
-              </a:defRPr>
-            </a:lvl5pPr>
-            <a:lvl6pPr marL="2286000" indent="0" algn="l" defTabSz="914400" rtl="0" eaLnBrk="1" latinLnBrk="0" hangingPunct="1">
-              <a:lnSpc>
-                <a:spcPct val="90000"/>
-              </a:lnSpc>
-              <a:spcBef>
-                <a:spcPts val="500"/>
-              </a:spcBef>
-              <a:buFont typeface="Arial" panose="020B0604020202020204" pitchFamily="34" charset="0"/>
-              <a:buNone/>
-              <a:defRPr sz="1600" kern="1200">
-                <a:solidFill>
-                  <a:schemeClr val="tx1">
-                    <a:tint val="75000"/>
-                  </a:schemeClr>
-                </a:solidFill>
-                <a:latin typeface="+mn-lt"/>
-                <a:ea typeface="+mn-ea"/>
-                <a:cs typeface="+mn-cs"/>
-              </a:defRPr>
-            </a:lvl6pPr>
-            <a:lvl7pPr marL="2743200" indent="0" algn="l" defTabSz="914400" rtl="0" eaLnBrk="1" latinLnBrk="0" hangingPunct="1">
-              <a:lnSpc>
-                <a:spcPct val="90000"/>
-              </a:lnSpc>
-              <a:spcBef>
-                <a:spcPts val="500"/>
-              </a:spcBef>
-              <a:buFont typeface="Arial" panose="020B0604020202020204" pitchFamily="34" charset="0"/>
-              <a:buNone/>
-              <a:defRPr sz="1600" kern="1200">
-                <a:solidFill>
-                  <a:schemeClr val="tx1">
-                    <a:tint val="75000"/>
-                  </a:schemeClr>
-                </a:solidFill>
-                <a:latin typeface="+mn-lt"/>
-                <a:ea typeface="+mn-ea"/>
-                <a:cs typeface="+mn-cs"/>
-              </a:defRPr>
-            </a:lvl7pPr>
-            <a:lvl8pPr marL="3200400" indent="0" algn="l" defTabSz="914400" rtl="0" eaLnBrk="1" latinLnBrk="0" hangingPunct="1">
-              <a:lnSpc>
-                <a:spcPct val="90000"/>
-              </a:lnSpc>
-              <a:spcBef>
-                <a:spcPts val="500"/>
-              </a:spcBef>
-              <a:buFont typeface="Arial" panose="020B0604020202020204" pitchFamily="34" charset="0"/>
-              <a:buNone/>
-              <a:defRPr sz="1600" kern="1200">
-                <a:solidFill>
-                  <a:schemeClr val="tx1">
-                    <a:tint val="75000"/>
-                  </a:schemeClr>
-                </a:solidFill>
-                <a:latin typeface="+mn-lt"/>
-                <a:ea typeface="+mn-ea"/>
-                <a:cs typeface="+mn-cs"/>
-              </a:defRPr>
-            </a:lvl8pPr>
-            <a:lvl9pPr marL="3657600" indent="0" algn="l" defTabSz="914400" rtl="0" eaLnBrk="1" latinLnBrk="0" hangingPunct="1">
-              <a:lnSpc>
-                <a:spcPct val="90000"/>
-              </a:lnSpc>
-              <a:spcBef>
-                <a:spcPts val="500"/>
-              </a:spcBef>
-              <a:buFont typeface="Arial" panose="020B0604020202020204" pitchFamily="34" charset="0"/>
-              <a:buNone/>
-              <a:defRPr sz="1600" kern="1200">
-                <a:solidFill>
-                  <a:schemeClr val="tx1">
-                    <a:tint val="75000"/>
-                  </a:schemeClr>
-                </a:solidFill>
-                <a:latin typeface="+mn-lt"/>
-                <a:ea typeface="+mn-ea"/>
-                <a:cs typeface="+mn-cs"/>
-              </a:defRPr>
-            </a:lvl9pPr>
-          </a:lstStyle>
-          <a:p>
-            <a:endParaRPr lang="en-CA" dirty="0"/>
-          </a:p>
-        </p:txBody>
-      </p:sp>
-      <p:sp>
-        <p:nvSpPr>
-          <p:cNvPr id="12" name="Title 7">
-            <a:extLst>
-              <a:ext uri="{FF2B5EF4-FFF2-40B4-BE49-F238E27FC236}">
-                <a16:creationId xmlns:a16="http://schemas.microsoft.com/office/drawing/2014/main" id="{71520384-A28C-4951-BA9F-337FAB2E7F09}"/>
-              </a:ext>
-            </a:extLst>
-          </p:cNvPr>
-          <p:cNvSpPr txBox="1">
-            <a:spLocks/>
-          </p:cNvSpPr>
-          <p:nvPr/>
-        </p:nvSpPr>
-        <p:spPr>
-          <a:xfrm>
-            <a:off x="5767754" y="371841"/>
+            <a:off x="5690481" y="105567"/>
             <a:ext cx="6043246" cy="575555"/>
           </a:xfrm>
           <a:prstGeom prst="rect">
@@ -8681,7 +8796,7 @@
           <p:cNvPr id="3" name="Picture 2" descr="A picture containing building, sitting, bench, side&#10;&#10;Description automatically generated">
             <a:extLst>
               <a:ext uri="{FF2B5EF4-FFF2-40B4-BE49-F238E27FC236}">
-                <a16:creationId xmlns:a16="http://schemas.microsoft.com/office/drawing/2014/main" id="{DAFFDFD8-67E9-4196-B37D-AA4BF9DA9420}"/>
+                <a16:creationId xmlns="" xmlns:a16="http://schemas.microsoft.com/office/drawing/2014/main" id="{DAFFDFD8-67E9-4196-B37D-AA4BF9DA9420}"/>
               </a:ext>
             </a:extLst>
           </p:cNvPr>
@@ -8691,7 +8806,7 @@
           <p:nvPr/>
         </p:nvPicPr>
         <p:blipFill rotWithShape="1">
-          <a:blip r:embed="rId2">
+          <a:blip r:embed="rId2" cstate="print">
             <a:extLst>
               <a:ext uri="{28A0092B-C50C-407E-A947-70E740481C1C}">
                 <a14:useLocalDpi xmlns:a14="http://schemas.microsoft.com/office/drawing/2010/main" val="0"/>
@@ -8716,10 +8831,10 @@
           <p:cNvPr id="5" name="Picture 4">
             <a:extLst>
               <a:ext uri="{FF2B5EF4-FFF2-40B4-BE49-F238E27FC236}">
-                <a16:creationId xmlns:a16="http://schemas.microsoft.com/office/drawing/2014/main" id="{FB3CF1FB-3253-49D1-B031-65D3E4C4CF66}"/>
+                <a16:creationId xmlns="" xmlns:a16="http://schemas.microsoft.com/office/drawing/2014/main" id="{FB3CF1FB-3253-49D1-B031-65D3E4C4CF66}"/>
               </a:ext>
               <a:ext uri="{C183D7F6-B498-43B3-948B-1728B52AA6E4}">
-                <adec:decorative xmlns:adec="http://schemas.microsoft.com/office/drawing/2017/decorative" val="1"/>
+                <adec:decorative xmlns="" xmlns:adec="http://schemas.microsoft.com/office/drawing/2017/decorative" val="1"/>
               </a:ext>
             </a:extLst>
           </p:cNvPr>
@@ -8729,7 +8844,7 @@
           <p:nvPr/>
         </p:nvPicPr>
         <p:blipFill rotWithShape="1">
-          <a:blip r:embed="rId3">
+          <a:blip r:embed="rId3" cstate="print">
             <a:extLst>
               <a:ext uri="{28A0092B-C50C-407E-A947-70E740481C1C}">
                 <a14:useLocalDpi xmlns:a14="http://schemas.microsoft.com/office/drawing/2010/main" val="0"/>
@@ -8749,105 +8864,12 @@
           </a:prstGeom>
         </p:spPr>
       </p:pic>
-      <p:sp>
-        <p:nvSpPr>
-          <p:cNvPr id="6" name="Title 7">
-            <a:extLst>
-              <a:ext uri="{FF2B5EF4-FFF2-40B4-BE49-F238E27FC236}">
-                <a16:creationId xmlns:a16="http://schemas.microsoft.com/office/drawing/2014/main" id="{734C553F-1313-4473-9256-A5C64163FAB3}"/>
-              </a:ext>
-            </a:extLst>
-          </p:cNvPr>
-          <p:cNvSpPr txBox="1">
-            <a:spLocks/>
-          </p:cNvSpPr>
-          <p:nvPr/>
-        </p:nvSpPr>
-        <p:spPr>
-          <a:xfrm>
-            <a:off x="5495735" y="4476181"/>
-            <a:ext cx="6043246" cy="1841576"/>
-          </a:xfrm>
-          <a:prstGeom prst="rect">
-            <a:avLst/>
-          </a:prstGeom>
-        </p:spPr>
-        <p:txBody>
-          <a:bodyPr vert="horz" lIns="91440" tIns="45720" rIns="91440" bIns="45720" rtlCol="0" anchor="b">
-            <a:noAutofit/>
-          </a:bodyPr>
-          <a:lstStyle>
-            <a:lvl1pPr algn="l" defTabSz="914400" rtl="0" eaLnBrk="1" latinLnBrk="0" hangingPunct="1">
-              <a:lnSpc>
-                <a:spcPct val="90000"/>
-              </a:lnSpc>
-              <a:spcBef>
-                <a:spcPct val="0"/>
-              </a:spcBef>
-              <a:buNone/>
-              <a:defRPr sz="3600" b="0" i="0" kern="1200" spc="-50" baseline="0">
-                <a:solidFill>
-                  <a:srgbClr val="FFFFFF"/>
-                </a:solidFill>
-                <a:latin typeface="+mj-lt"/>
-                <a:ea typeface="+mj-ea"/>
-                <a:cs typeface="+mj-cs"/>
-              </a:defRPr>
-            </a:lvl1pPr>
-          </a:lstStyle>
-          <a:p>
-            <a:r>
-              <a:rPr lang="en-US" sz="2400" b="0" i="0" dirty="0">
-                <a:solidFill>
-                  <a:schemeClr val="tx1"/>
-                </a:solidFill>
-                <a:effectLst/>
-                <a:latin typeface="Times New Roman" panose="02020603050405020304" pitchFamily="18" charset="0"/>
-                <a:cs typeface="Times New Roman" panose="02020603050405020304" pitchFamily="18" charset="0"/>
-              </a:rPr>
-              <a:t>Regression approach is a better approach for predicting stock price as opposed to classification approach</a:t>
-            </a:r>
-          </a:p>
-          <a:p>
-            <a:endParaRPr lang="en-US" sz="2400" dirty="0">
-              <a:solidFill>
-                <a:schemeClr val="tx1"/>
-              </a:solidFill>
-              <a:latin typeface="Times New Roman" panose="02020603050405020304" pitchFamily="18" charset="0"/>
-              <a:cs typeface="Times New Roman" panose="02020603050405020304" pitchFamily="18" charset="0"/>
-            </a:endParaRPr>
-          </a:p>
-          <a:p>
-            <a:r>
-              <a:rPr lang="en-US" sz="2400" b="0" i="0" dirty="0">
-                <a:solidFill>
-                  <a:schemeClr val="tx1"/>
-                </a:solidFill>
-                <a:effectLst/>
-                <a:latin typeface="Times New Roman" panose="02020603050405020304" pitchFamily="18" charset="0"/>
-                <a:cs typeface="Times New Roman" panose="02020603050405020304" pitchFamily="18" charset="0"/>
-              </a:rPr>
-              <a:t>However, </a:t>
-            </a:r>
-            <a:r>
-              <a:rPr lang="en-US" sz="2400" dirty="0">
-                <a:solidFill>
-                  <a:schemeClr val="tx1"/>
-                </a:solidFill>
-                <a:latin typeface="Times New Roman" panose="02020603050405020304" pitchFamily="18" charset="0"/>
-                <a:cs typeface="Times New Roman" panose="02020603050405020304" pitchFamily="18" charset="0"/>
-              </a:rPr>
-              <a:t>it is only applicable for APPL stock</a:t>
-            </a:r>
-          </a:p>
-        </p:txBody>
-      </p:sp>
       <p:grpSp>
         <p:nvGrpSpPr>
           <p:cNvPr id="11" name="Group 10">
             <a:extLst>
               <a:ext uri="{FF2B5EF4-FFF2-40B4-BE49-F238E27FC236}">
-                <a16:creationId xmlns:a16="http://schemas.microsoft.com/office/drawing/2014/main" id="{556F508C-F008-423A-BCD6-6DB476A15266}"/>
+                <a16:creationId xmlns="" xmlns:a16="http://schemas.microsoft.com/office/drawing/2014/main" id="{556F508C-F008-423A-BCD6-6DB476A15266}"/>
               </a:ext>
             </a:extLst>
           </p:cNvPr>
@@ -8856,7 +8878,7 @@
         </p:nvGrpSpPr>
         <p:grpSpPr>
           <a:xfrm>
-            <a:off x="5469246" y="1214310"/>
+            <a:off x="5469246" y="978359"/>
             <a:ext cx="6096223" cy="3028600"/>
             <a:chOff x="5496974" y="3314192"/>
             <a:chExt cx="6096223" cy="3028600"/>
@@ -8867,7 +8889,7 @@
             <p:cNvPr id="4" name="Picture 2">
               <a:extLst>
                 <a:ext uri="{FF2B5EF4-FFF2-40B4-BE49-F238E27FC236}">
-                  <a16:creationId xmlns:a16="http://schemas.microsoft.com/office/drawing/2014/main" id="{BEFADC68-FF50-4853-91FC-0A5C4CD385FE}"/>
+                  <a16:creationId xmlns="" xmlns:a16="http://schemas.microsoft.com/office/drawing/2014/main" id="{BEFADC68-FF50-4853-91FC-0A5C4CD385FE}"/>
                 </a:ext>
               </a:extLst>
             </p:cNvPr>
@@ -8914,7 +8936,7 @@
             <p:cNvPr id="9" name="Cross 8">
               <a:extLst>
                 <a:ext uri="{FF2B5EF4-FFF2-40B4-BE49-F238E27FC236}">
-                  <a16:creationId xmlns:a16="http://schemas.microsoft.com/office/drawing/2014/main" id="{6C30F640-9CF5-4554-B934-C3D78AEEB207}"/>
+                  <a16:creationId xmlns="" xmlns:a16="http://schemas.microsoft.com/office/drawing/2014/main" id="{6C30F640-9CF5-4554-B934-C3D78AEEB207}"/>
                 </a:ext>
               </a:extLst>
             </p:cNvPr>
@@ -8968,7 +8990,7 @@
             <p:cNvPr id="10" name="L-Shape 9">
               <a:extLst>
                 <a:ext uri="{FF2B5EF4-FFF2-40B4-BE49-F238E27FC236}">
-                  <a16:creationId xmlns:a16="http://schemas.microsoft.com/office/drawing/2014/main" id="{DD397B94-11FD-488F-B6D8-E139E639A2E5}"/>
+                  <a16:creationId xmlns="" xmlns:a16="http://schemas.microsoft.com/office/drawing/2014/main" id="{DD397B94-11FD-488F-B6D8-E139E639A2E5}"/>
                 </a:ext>
               </a:extLst>
             </p:cNvPr>
@@ -9016,6 +9038,132 @@
           </p:txBody>
         </p:sp>
       </p:grpSp>
+      <p:sp>
+        <p:nvSpPr>
+          <p:cNvPr id="7" name="Rectangle 6"/>
+          <p:cNvSpPr/>
+          <p:nvPr/>
+        </p:nvSpPr>
+        <p:spPr>
+          <a:xfrm>
+            <a:off x="5469246" y="4098889"/>
+            <a:ext cx="6096000" cy="2862322"/>
+          </a:xfrm>
+          <a:prstGeom prst="rect">
+            <a:avLst/>
+          </a:prstGeom>
+        </p:spPr>
+        <p:txBody>
+          <a:bodyPr>
+            <a:spAutoFit/>
+          </a:bodyPr>
+          <a:lstStyle/>
+          <a:p>
+            <a:pPr marL="285750" indent="-285750">
+              <a:buFont typeface="Arial" panose="020B0604020202020204" pitchFamily="34" charset="0"/>
+              <a:buChar char="•"/>
+            </a:pPr>
+            <a:r>
+              <a:rPr lang="en-US" dirty="0" smtClean="0">
+                <a:latin typeface="Times New Roman" panose="02020603050405020304" pitchFamily="18" charset="0"/>
+                <a:cs typeface="Times New Roman" panose="02020603050405020304" pitchFamily="18" charset="0"/>
+              </a:rPr>
+              <a:t>The regression </a:t>
+            </a:r>
+            <a:r>
+              <a:rPr lang="en-US" dirty="0">
+                <a:latin typeface="Times New Roman" panose="02020603050405020304" pitchFamily="18" charset="0"/>
+                <a:cs typeface="Times New Roman" panose="02020603050405020304" pitchFamily="18" charset="0"/>
+              </a:rPr>
+              <a:t>approach </a:t>
+            </a:r>
+            <a:r>
+              <a:rPr lang="en-US" dirty="0" smtClean="0">
+                <a:latin typeface="Times New Roman" panose="02020603050405020304" pitchFamily="18" charset="0"/>
+                <a:cs typeface="Times New Roman" panose="02020603050405020304" pitchFamily="18" charset="0"/>
+              </a:rPr>
+              <a:t>turned out to be a better </a:t>
+            </a:r>
+            <a:r>
+              <a:rPr lang="en-US" dirty="0">
+                <a:latin typeface="Times New Roman" panose="02020603050405020304" pitchFamily="18" charset="0"/>
+                <a:cs typeface="Times New Roman" panose="02020603050405020304" pitchFamily="18" charset="0"/>
+              </a:rPr>
+              <a:t>approach for predicting </a:t>
+            </a:r>
+            <a:r>
+              <a:rPr lang="en-US" dirty="0" smtClean="0">
+                <a:latin typeface="Times New Roman" panose="02020603050405020304" pitchFamily="18" charset="0"/>
+                <a:cs typeface="Times New Roman" panose="02020603050405020304" pitchFamily="18" charset="0"/>
+              </a:rPr>
+              <a:t>apple stock </a:t>
+            </a:r>
+            <a:r>
+              <a:rPr lang="en-US" dirty="0">
+                <a:latin typeface="Times New Roman" panose="02020603050405020304" pitchFamily="18" charset="0"/>
+                <a:cs typeface="Times New Roman" panose="02020603050405020304" pitchFamily="18" charset="0"/>
+              </a:rPr>
+              <a:t>price as opposed to </a:t>
+            </a:r>
+            <a:r>
+              <a:rPr lang="en-US" dirty="0" smtClean="0">
+                <a:latin typeface="Times New Roman" panose="02020603050405020304" pitchFamily="18" charset="0"/>
+                <a:cs typeface="Times New Roman" panose="02020603050405020304" pitchFamily="18" charset="0"/>
+              </a:rPr>
+              <a:t>the classification approach.</a:t>
+            </a:r>
+          </a:p>
+          <a:p>
+            <a:pPr marL="285750" indent="-285750">
+              <a:buFont typeface="Arial" panose="020B0604020202020204" pitchFamily="34" charset="0"/>
+              <a:buChar char="•"/>
+            </a:pPr>
+            <a:r>
+              <a:rPr lang="en-US" dirty="0">
+                <a:latin typeface="Times New Roman" panose="02020603050405020304" pitchFamily="18" charset="0"/>
+                <a:cs typeface="Times New Roman" panose="02020603050405020304" pitchFamily="18" charset="0"/>
+              </a:rPr>
+              <a:t>T</a:t>
+            </a:r>
+            <a:r>
+              <a:rPr lang="en-US" dirty="0" smtClean="0">
+                <a:latin typeface="Times New Roman" panose="02020603050405020304" pitchFamily="18" charset="0"/>
+                <a:cs typeface="Times New Roman" panose="02020603050405020304" pitchFamily="18" charset="0"/>
+              </a:rPr>
+              <a:t>his project shows that there is evidence of dependence between stock price and twitter sentiment.</a:t>
+            </a:r>
+          </a:p>
+          <a:p>
+            <a:pPr marL="285750" indent="-285750">
+              <a:buFont typeface="Arial" panose="020B0604020202020204" pitchFamily="34" charset="0"/>
+              <a:buChar char="•"/>
+            </a:pPr>
+            <a:r>
+              <a:rPr lang="en-US" dirty="0" smtClean="0">
+                <a:latin typeface="Times New Roman" panose="02020603050405020304" pitchFamily="18" charset="0"/>
+                <a:cs typeface="Times New Roman" panose="02020603050405020304" pitchFamily="18" charset="0"/>
+              </a:rPr>
+              <a:t>However, this needs to be further investigated to accurately forecast a connection between social media and market behavior.</a:t>
+            </a:r>
+            <a:endParaRPr lang="en-US" dirty="0">
+              <a:latin typeface="Times New Roman" panose="02020603050405020304" pitchFamily="18" charset="0"/>
+              <a:cs typeface="Times New Roman" panose="02020603050405020304" pitchFamily="18" charset="0"/>
+            </a:endParaRPr>
+          </a:p>
+          <a:p>
+            <a:endParaRPr lang="en-US" dirty="0" smtClean="0">
+              <a:latin typeface="Times New Roman" panose="02020603050405020304" pitchFamily="18" charset="0"/>
+              <a:cs typeface="Times New Roman" panose="02020603050405020304" pitchFamily="18" charset="0"/>
+            </a:endParaRPr>
+          </a:p>
+          <a:p>
+            <a:endParaRPr lang="en-US" dirty="0">
+              <a:latin typeface="Times New Roman" panose="02020603050405020304" pitchFamily="18" charset="0"/>
+              <a:cs typeface="Times New Roman" panose="02020603050405020304" pitchFamily="18" charset="0"/>
+            </a:endParaRPr>
+          </a:p>
+        </p:txBody>
+      </p:sp>
     </p:spTree>
     <p:extLst>
       <p:ext uri="{BB962C8B-B14F-4D97-AF65-F5344CB8AC3E}">
@@ -9026,6 +9174,13 @@
   <p:clrMapOvr>
     <a:masterClrMapping/>
   </p:clrMapOvr>
+  <p:timing>
+    <p:tnLst>
+      <p:par>
+        <p:cTn id="1" dur="indefinite" restart="never" nodeType="tmRoot"/>
+      </p:par>
+    </p:tnLst>
+  </p:timing>
 </p:sld>
 </file>
 
@@ -9051,7 +9206,7 @@
           <p:cNvPr id="2" name="Text Placeholder 3">
             <a:extLst>
               <a:ext uri="{FF2B5EF4-FFF2-40B4-BE49-F238E27FC236}">
-                <a16:creationId xmlns:a16="http://schemas.microsoft.com/office/drawing/2014/main" id="{30DC66C4-6C3F-45ED-A950-A55681BAC970}"/>
+                <a16:creationId xmlns="" xmlns:a16="http://schemas.microsoft.com/office/drawing/2014/main" id="{30DC66C4-6C3F-45ED-A950-A55681BAC970}"/>
               </a:ext>
             </a:extLst>
           </p:cNvPr>
@@ -9265,7 +9420,7 @@
           <p:cNvPr id="12" name="Title 7">
             <a:extLst>
               <a:ext uri="{FF2B5EF4-FFF2-40B4-BE49-F238E27FC236}">
-                <a16:creationId xmlns:a16="http://schemas.microsoft.com/office/drawing/2014/main" id="{71520384-A28C-4951-BA9F-337FAB2E7F09}"/>
+                <a16:creationId xmlns="" xmlns:a16="http://schemas.microsoft.com/office/drawing/2014/main" id="{71520384-A28C-4951-BA9F-337FAB2E7F09}"/>
               </a:ext>
             </a:extLst>
           </p:cNvPr>
@@ -9323,7 +9478,7 @@
           <p:cNvPr id="3" name="Picture 2" descr="A picture containing building, sitting, bench, side&#10;&#10;Description automatically generated">
             <a:extLst>
               <a:ext uri="{FF2B5EF4-FFF2-40B4-BE49-F238E27FC236}">
-                <a16:creationId xmlns:a16="http://schemas.microsoft.com/office/drawing/2014/main" id="{788E7E6C-7BAB-4265-984D-EB6A24770407}"/>
+                <a16:creationId xmlns="" xmlns:a16="http://schemas.microsoft.com/office/drawing/2014/main" id="{788E7E6C-7BAB-4265-984D-EB6A24770407}"/>
               </a:ext>
             </a:extLst>
           </p:cNvPr>
@@ -9333,7 +9488,7 @@
           <p:nvPr/>
         </p:nvPicPr>
         <p:blipFill rotWithShape="1">
-          <a:blip r:embed="rId2">
+          <a:blip r:embed="rId2" cstate="print">
             <a:extLst>
               <a:ext uri="{28A0092B-C50C-407E-A947-70E740481C1C}">
                 <a14:useLocalDpi xmlns:a14="http://schemas.microsoft.com/office/drawing/2010/main" val="0"/>
@@ -9358,7 +9513,7 @@
           <p:cNvPr id="5" name="Content Placeholder 2">
             <a:extLst>
               <a:ext uri="{FF2B5EF4-FFF2-40B4-BE49-F238E27FC236}">
-                <a16:creationId xmlns:a16="http://schemas.microsoft.com/office/drawing/2014/main" id="{9396B28C-E282-4965-8115-657015BD3054}"/>
+                <a16:creationId xmlns="" xmlns:a16="http://schemas.microsoft.com/office/drawing/2014/main" id="{9396B28C-E282-4965-8115-657015BD3054}"/>
               </a:ext>
             </a:extLst>
           </p:cNvPr>
@@ -9550,7 +9705,7 @@
           <p:cNvPr id="1026" name="Picture 2" descr="THUMBS-UP (noun) definition and synonyms | Macmillan Dictionary">
             <a:extLst>
               <a:ext uri="{FF2B5EF4-FFF2-40B4-BE49-F238E27FC236}">
-                <a16:creationId xmlns:a16="http://schemas.microsoft.com/office/drawing/2014/main" id="{53E0F85B-0440-4319-AEDD-25F30BB63251}"/>
+                <a16:creationId xmlns="" xmlns:a16="http://schemas.microsoft.com/office/drawing/2014/main" id="{53E0F85B-0440-4319-AEDD-25F30BB63251}"/>
               </a:ext>
             </a:extLst>
           </p:cNvPr>
@@ -9560,7 +9715,7 @@
           <p:nvPr/>
         </p:nvPicPr>
         <p:blipFill rotWithShape="1">
-          <a:blip r:embed="rId3">
+          <a:blip r:embed="rId3" cstate="print">
             <a:extLst>
               <a:ext uri="{28A0092B-C50C-407E-A947-70E740481C1C}">
                 <a14:useLocalDpi xmlns:a14="http://schemas.microsoft.com/office/drawing/2010/main" val="0"/>
@@ -9595,7 +9750,7 @@
           <p:cNvPr id="7" name="Picture 2" descr="THUMBS-UP (noun) definition and synonyms | Macmillan Dictionary">
             <a:extLst>
               <a:ext uri="{FF2B5EF4-FFF2-40B4-BE49-F238E27FC236}">
-                <a16:creationId xmlns:a16="http://schemas.microsoft.com/office/drawing/2014/main" id="{6D0921AB-6D98-4DA0-90E0-836B63AB2805}"/>
+                <a16:creationId xmlns="" xmlns:a16="http://schemas.microsoft.com/office/drawing/2014/main" id="{6D0921AB-6D98-4DA0-90E0-836B63AB2805}"/>
               </a:ext>
             </a:extLst>
           </p:cNvPr>
@@ -9605,7 +9760,7 @@
           <p:nvPr/>
         </p:nvPicPr>
         <p:blipFill rotWithShape="1">
-          <a:blip r:embed="rId3">
+          <a:blip r:embed="rId4" cstate="print">
             <a:extLst>
               <a:ext uri="{28A0092B-C50C-407E-A947-70E740481C1C}">
                 <a14:useLocalDpi xmlns:a14="http://schemas.microsoft.com/office/drawing/2010/main" val="0"/>
@@ -9640,7 +9795,7 @@
           <p:cNvPr id="8" name="Picture 2" descr="THUMBS-UP (noun) definition and synonyms | Macmillan Dictionary">
             <a:extLst>
               <a:ext uri="{FF2B5EF4-FFF2-40B4-BE49-F238E27FC236}">
-                <a16:creationId xmlns:a16="http://schemas.microsoft.com/office/drawing/2014/main" id="{B3431708-0C28-4CCE-BB65-09990EA0A9EC}"/>
+                <a16:creationId xmlns="" xmlns:a16="http://schemas.microsoft.com/office/drawing/2014/main" id="{B3431708-0C28-4CCE-BB65-09990EA0A9EC}"/>
               </a:ext>
             </a:extLst>
           </p:cNvPr>
@@ -9650,7 +9805,7 @@
           <p:nvPr/>
         </p:nvPicPr>
         <p:blipFill rotWithShape="1">
-          <a:blip r:embed="rId3">
+          <a:blip r:embed="rId3" cstate="print">
             <a:extLst>
               <a:ext uri="{28A0092B-C50C-407E-A947-70E740481C1C}">
                 <a14:useLocalDpi xmlns:a14="http://schemas.microsoft.com/office/drawing/2010/main" val="0"/>
@@ -9690,6 +9845,13 @@
   <p:clrMapOvr>
     <a:masterClrMapping/>
   </p:clrMapOvr>
+  <p:timing>
+    <p:tnLst>
+      <p:par>
+        <p:cTn id="1" dur="indefinite" restart="never" nodeType="tmRoot"/>
+      </p:par>
+    </p:tnLst>
+  </p:timing>
 </p:sld>
 </file>
 

</xml_diff>

<commit_message>
Updated notebook - Final version
</commit_message>
<xml_diff>
--- a/Project 2 - Group 4.pptx
+++ b/Project 2 - Group 4.pptx
@@ -11818,13 +11818,13 @@
   <p:clrMapOvr>
     <a:masterClrMapping/>
   </p:clrMapOvr>
-  <mc:AlternateContent xmlns:mc="http://schemas.openxmlformats.org/markup-compatibility/2006">
-    <mc:Choice xmlns:p15="http://schemas.microsoft.com/office/powerpoint/2012/main" Requires="p15">
+  <mc:AlternateContent xmlns:mc="http://schemas.openxmlformats.org/markup-compatibility/2006" xmlns:p15="http://schemas.microsoft.com/office/powerpoint/2012/main">
+    <mc:Choice Requires="p15">
       <p:transition xmlns:p14="http://schemas.microsoft.com/office/powerpoint/2010/main" spd="slow" p14:dur="6000">
         <p15:prstTrans prst="curtains"/>
       </p:transition>
     </mc:Choice>
-    <mc:Fallback>
+    <mc:Fallback xmlns="">
       <p:transition spd="slow">
         <p:fade/>
       </p:transition>
@@ -12138,8 +12138,8 @@
         </p:nvSpPr>
         <p:spPr>
           <a:xfrm>
-            <a:off x="5694740" y="1086678"/>
-            <a:ext cx="6043246" cy="5594171"/>
+            <a:off x="5418293" y="1008557"/>
+            <a:ext cx="6043246" cy="5074498"/>
           </a:xfrm>
           <a:prstGeom prst="rect">
             <a:avLst/>
@@ -12147,7 +12147,7 @@
         </p:spPr>
         <p:txBody>
           <a:bodyPr vert="horz" lIns="91440" tIns="45720" rIns="91440" bIns="45720" rtlCol="0" anchor="b">
-            <a:normAutofit fontScale="92500" lnSpcReduction="10000"/>
+            <a:normAutofit lnSpcReduction="10000"/>
           </a:bodyPr>
           <a:lstStyle>
             <a:lvl1pPr algn="l" defTabSz="914400" rtl="0" eaLnBrk="1" latinLnBrk="0" hangingPunct="1">
@@ -12169,109 +12169,10 @@
             </a:lvl1pPr>
           </a:lstStyle>
           <a:p>
-            <a:pPr algn="l"/>
-            <a:endParaRPr lang="en-US" sz="2800" b="1" dirty="0">
-              <a:solidFill>
-                <a:schemeClr val="tx1"/>
-              </a:solidFill>
-              <a:latin typeface="Times New Roman" panose="02020603050405020304" pitchFamily="18" charset="0"/>
-              <a:cs typeface="Times New Roman" panose="02020603050405020304" pitchFamily="18" charset="0"/>
-            </a:endParaRPr>
-          </a:p>
-          <a:p>
-            <a:pPr algn="l"/>
-            <a:r>
-              <a:rPr lang="en-US" sz="2800" b="1" dirty="0">
-                <a:solidFill>
-                  <a:schemeClr val="tx1"/>
-                </a:solidFill>
-                <a:latin typeface="Times New Roman" panose="02020603050405020304" pitchFamily="18" charset="0"/>
-                <a:cs typeface="Times New Roman" panose="02020603050405020304" pitchFamily="18" charset="0"/>
-              </a:rPr>
-              <a:t>Any Difficulties?</a:t>
-            </a:r>
-          </a:p>
-          <a:p>
             <a:pPr algn="l">
               <a:spcBef>
                 <a:spcPts val="600"/>
               </a:spcBef>
-            </a:pPr>
-            <a:endParaRPr lang="en-US" sz="2800" dirty="0">
-              <a:solidFill>
-                <a:schemeClr val="tx1"/>
-              </a:solidFill>
-              <a:latin typeface="Times New Roman" panose="02020603050405020304" pitchFamily="18" charset="0"/>
-              <a:cs typeface="Times New Roman" panose="02020603050405020304" pitchFamily="18" charset="0"/>
-            </a:endParaRPr>
-          </a:p>
-          <a:p>
-            <a:pPr marL="457200" indent="-457200" algn="l">
-              <a:spcBef>
-                <a:spcPts val="600"/>
-              </a:spcBef>
-              <a:buFontTx/>
-              <a:buChar char="-"/>
-            </a:pPr>
-            <a:r>
-              <a:rPr lang="en-US" sz="2200" b="0" i="0" dirty="0">
-                <a:solidFill>
-                  <a:schemeClr val="tx1"/>
-                </a:solidFill>
-                <a:effectLst/>
-                <a:latin typeface="Times New Roman" panose="02020603050405020304" pitchFamily="18" charset="0"/>
-                <a:cs typeface="Times New Roman" panose="02020603050405020304" pitchFamily="18" charset="0"/>
-              </a:rPr>
-              <a:t>Finding Twitter Data</a:t>
-            </a:r>
-          </a:p>
-          <a:p>
-            <a:pPr marL="457200" indent="-457200" algn="l">
-              <a:spcBef>
-                <a:spcPts val="600"/>
-              </a:spcBef>
-              <a:buFontTx/>
-              <a:buChar char="-"/>
-            </a:pPr>
-            <a:r>
-              <a:rPr lang="en-US" sz="2200" b="0" i="0" dirty="0">
-                <a:solidFill>
-                  <a:schemeClr val="tx1"/>
-                </a:solidFill>
-                <a:effectLst/>
-                <a:latin typeface="Times New Roman" panose="02020603050405020304" pitchFamily="18" charset="0"/>
-                <a:cs typeface="Times New Roman" panose="02020603050405020304" pitchFamily="18" charset="0"/>
-              </a:rPr>
-              <a:t>Machine Learning Models</a:t>
-            </a:r>
-          </a:p>
-          <a:p>
-            <a:pPr marL="457200" indent="-457200" algn="l">
-              <a:spcBef>
-                <a:spcPts val="600"/>
-              </a:spcBef>
-              <a:buFontTx/>
-              <a:buChar char="-"/>
-            </a:pPr>
-            <a:r>
-              <a:rPr lang="en-US" sz="2200" b="0" i="0" dirty="0">
-                <a:solidFill>
-                  <a:schemeClr val="tx1"/>
-                </a:solidFill>
-                <a:effectLst/>
-                <a:latin typeface="Times New Roman" panose="02020603050405020304" pitchFamily="18" charset="0"/>
-                <a:cs typeface="Times New Roman" panose="02020603050405020304" pitchFamily="18" charset="0"/>
-              </a:rPr>
-              <a:t>Visualization</a:t>
-            </a:r>
-          </a:p>
-          <a:p>
-            <a:pPr marL="457200" indent="-457200" algn="l">
-              <a:spcBef>
-                <a:spcPts val="600"/>
-              </a:spcBef>
-              <a:buFontTx/>
-              <a:buChar char="-"/>
             </a:pPr>
             <a:endParaRPr lang="en-US" sz="1500" b="0" i="0" dirty="0">
               <a:solidFill>
@@ -12323,7 +12224,7 @@
           <a:p>
             <a:pPr marL="457200" indent="-457200" algn="l">
               <a:spcBef>
-                <a:spcPts val="600"/>
+                <a:spcPts val="2400"/>
               </a:spcBef>
               <a:buFontTx/>
               <a:buChar char="-"/>
@@ -12342,7 +12243,7 @@
           <a:p>
             <a:pPr marL="457200" indent="-457200" algn="l">
               <a:spcBef>
-                <a:spcPts val="600"/>
+                <a:spcPts val="2400"/>
               </a:spcBef>
               <a:buFontTx/>
               <a:buChar char="-"/>
@@ -12361,7 +12262,7 @@
           <a:p>
             <a:pPr marL="457200" indent="-457200" algn="l">
               <a:spcBef>
-                <a:spcPts val="600"/>
+                <a:spcPts val="2400"/>
               </a:spcBef>
               <a:buFontTx/>
               <a:buChar char="-"/>
@@ -12380,7 +12281,7 @@
           <a:p>
             <a:pPr marL="457200" indent="-457200" algn="l">
               <a:spcBef>
-                <a:spcPts val="600"/>
+                <a:spcPts val="2400"/>
               </a:spcBef>
               <a:buFontTx/>
               <a:buChar char="-"/>
@@ -12399,7 +12300,7 @@
           <a:p>
             <a:pPr marL="457200" indent="-457200" algn="l">
               <a:spcBef>
-                <a:spcPts val="600"/>
+                <a:spcPts val="2400"/>
               </a:spcBef>
               <a:buFontTx/>
               <a:buChar char="-"/>
@@ -12418,7 +12319,7 @@
           <a:p>
             <a:pPr marL="457200" indent="-457200" algn="l">
               <a:spcBef>
-                <a:spcPts val="600"/>
+                <a:spcPts val="2400"/>
               </a:spcBef>
               <a:buFontTx/>
               <a:buChar char="-"/>
@@ -12505,13 +12406,13 @@
   <p:clrMapOvr>
     <a:masterClrMapping/>
   </p:clrMapOvr>
-  <mc:AlternateContent xmlns:mc="http://schemas.openxmlformats.org/markup-compatibility/2006">
-    <mc:Choice xmlns:p14="http://schemas.microsoft.com/office/powerpoint/2010/main" Requires="p14">
+  <mc:AlternateContent xmlns:mc="http://schemas.openxmlformats.org/markup-compatibility/2006" xmlns:p14="http://schemas.microsoft.com/office/powerpoint/2010/main">
+    <mc:Choice Requires="p14">
       <p:transition spd="slow" p14:dur="2000">
         <p14:ferris dir="l"/>
       </p:transition>
     </mc:Choice>
-    <mc:Fallback>
+    <mc:Fallback xmlns="">
       <p:transition spd="slow">
         <p:fade/>
       </p:transition>
@@ -12594,13 +12495,13 @@
   <p:clrMapOvr>
     <a:masterClrMapping/>
   </p:clrMapOvr>
-  <mc:AlternateContent xmlns:mc="http://schemas.openxmlformats.org/markup-compatibility/2006">
-    <mc:Choice xmlns:p14="http://schemas.microsoft.com/office/powerpoint/2010/main" Requires="p14">
+  <mc:AlternateContent xmlns:mc="http://schemas.openxmlformats.org/markup-compatibility/2006" xmlns:p14="http://schemas.microsoft.com/office/powerpoint/2010/main">
+    <mc:Choice Requires="p14">
       <p:transition spd="slow" p14:dur="1500">
         <p14:window dir="vert"/>
       </p:transition>
     </mc:Choice>
-    <mc:Fallback>
+    <mc:Fallback xmlns="">
       <p:transition spd="slow">
         <p:fade/>
       </p:transition>
@@ -13375,13 +13276,13 @@
   <p:clrMapOvr>
     <a:masterClrMapping/>
   </p:clrMapOvr>
-  <mc:AlternateContent xmlns:mc="http://schemas.openxmlformats.org/markup-compatibility/2006">
-    <mc:Choice xmlns:p14="http://schemas.microsoft.com/office/powerpoint/2010/main" Requires="p14">
+  <mc:AlternateContent xmlns:mc="http://schemas.openxmlformats.org/markup-compatibility/2006" xmlns:p14="http://schemas.microsoft.com/office/powerpoint/2010/main">
+    <mc:Choice Requires="p14">
       <p:transition spd="slow" p14:dur="2000">
         <p14:ferris dir="l"/>
       </p:transition>
     </mc:Choice>
-    <mc:Fallback>
+    <mc:Fallback xmlns="">
       <p:transition spd="slow">
         <p:fade/>
       </p:transition>
@@ -13667,7 +13568,7 @@
         </p:spPr>
         <p:txBody>
           <a:bodyPr vert="horz" lIns="91440" tIns="45720" rIns="91440" bIns="45720" rtlCol="0" anchor="ctr">
-            <a:normAutofit lnSpcReduction="10000"/>
+            <a:normAutofit/>
           </a:bodyPr>
           <a:lstStyle>
             <a:lvl1pPr marL="0" indent="0" algn="l" defTabSz="914400" rtl="0" eaLnBrk="1" latinLnBrk="0" hangingPunct="1">
@@ -13955,68 +13856,15 @@
               </a:rPr>
               <a:t>Machine Learning Models: </a:t>
             </a:r>
-          </a:p>
-          <a:p>
-            <a:r>
-              <a:rPr lang="en-CA" b="1" spc="0" dirty="0">
+            <a:r>
+              <a:rPr lang="en-CA" spc="0" dirty="0">
                 <a:solidFill>
                   <a:schemeClr val="tx1"/>
                 </a:solidFill>
                 <a:latin typeface="Times New Roman" panose="02020603050405020304" pitchFamily="18" charset="0"/>
                 <a:cs typeface="Times New Roman" panose="02020603050405020304" pitchFamily="18" charset="0"/>
               </a:rPr>
-              <a:t>Regression:</a:t>
-            </a:r>
-            <a:r>
-              <a:rPr lang="en-CA" spc="0" dirty="0">
-                <a:solidFill>
-                  <a:schemeClr val="tx1"/>
-                </a:solidFill>
-                <a:latin typeface="Times New Roman" panose="02020603050405020304" pitchFamily="18" charset="0"/>
-                <a:cs typeface="Times New Roman" panose="02020603050405020304" pitchFamily="18" charset="0"/>
-              </a:rPr>
-              <a:t> LSTM, RF and XG Boost </a:t>
-            </a:r>
-            <a:endParaRPr lang="en-CA" b="1" spc="0" dirty="0">
-              <a:solidFill>
-                <a:schemeClr val="tx1"/>
-              </a:solidFill>
-              <a:latin typeface="Times New Roman" panose="02020603050405020304" pitchFamily="18" charset="0"/>
-              <a:cs typeface="Times New Roman" panose="02020603050405020304" pitchFamily="18" charset="0"/>
-            </a:endParaRPr>
-          </a:p>
-          <a:p>
-            <a:r>
-              <a:rPr lang="en-CA" b="1" spc="0" dirty="0">
-                <a:solidFill>
-                  <a:schemeClr val="tx1"/>
-                </a:solidFill>
-                <a:latin typeface="Times New Roman" panose="02020603050405020304" pitchFamily="18" charset="0"/>
-                <a:cs typeface="Times New Roman" panose="02020603050405020304" pitchFamily="18" charset="0"/>
-              </a:rPr>
-              <a:t>Classification: </a:t>
-            </a:r>
-            <a:r>
-              <a:rPr lang="en-CA" spc="0" dirty="0">
-                <a:solidFill>
-                  <a:schemeClr val="tx1"/>
-                </a:solidFill>
-                <a:latin typeface="Times New Roman" panose="02020603050405020304" pitchFamily="18" charset="0"/>
-                <a:cs typeface="Times New Roman" panose="02020603050405020304" pitchFamily="18" charset="0"/>
-              </a:rPr>
-              <a:t>RF and Gradient Boost</a:t>
-            </a:r>
-          </a:p>
-          <a:p>
-            <a:r>
-              <a:rPr lang="en-CA" spc="0" dirty="0">
-                <a:solidFill>
-                  <a:schemeClr val="tx1"/>
-                </a:solidFill>
-                <a:latin typeface="Times New Roman" panose="02020603050405020304" pitchFamily="18" charset="0"/>
-                <a:cs typeface="Times New Roman" panose="02020603050405020304" pitchFamily="18" charset="0"/>
-              </a:rPr>
-              <a:t>to fit the data, make predictions and compare performance between models.</a:t>
+              <a:t>LSTM, Random Forest, XG Boost and Gradient Boost to fit the data, make predictions and compare performance between models.</a:t>
             </a:r>
           </a:p>
           <a:p>
@@ -14220,7 +14068,7 @@
         </p:blipFill>
         <p:spPr bwMode="auto">
           <a:xfrm>
-            <a:off x="4912398" y="2391458"/>
+            <a:off x="4926066" y="2724057"/>
             <a:ext cx="469450" cy="503188"/>
           </a:xfrm>
           <a:prstGeom prst="rect">
@@ -14267,7 +14115,7 @@
         </p:blipFill>
         <p:spPr bwMode="auto">
           <a:xfrm>
-            <a:off x="5005275" y="1467344"/>
+            <a:off x="5005275" y="1593886"/>
             <a:ext cx="311032" cy="311032"/>
           </a:xfrm>
           <a:prstGeom prst="rect">
@@ -14312,7 +14160,7 @@
         </p:blipFill>
         <p:spPr bwMode="auto">
           <a:xfrm>
-            <a:off x="5005275" y="3608810"/>
+            <a:off x="5005275" y="4046384"/>
             <a:ext cx="317645" cy="353399"/>
           </a:xfrm>
           <a:prstGeom prst="rect">
@@ -14359,7 +14207,7 @@
         </p:blipFill>
         <p:spPr bwMode="auto">
           <a:xfrm>
-            <a:off x="4958256" y="6103675"/>
+            <a:off x="4997912" y="5933554"/>
             <a:ext cx="349824" cy="389200"/>
           </a:xfrm>
           <a:prstGeom prst="rect">
@@ -14387,13 +14235,13 @@
   <p:clrMapOvr>
     <a:masterClrMapping/>
   </p:clrMapOvr>
-  <mc:AlternateContent xmlns:mc="http://schemas.openxmlformats.org/markup-compatibility/2006">
-    <mc:Choice xmlns:p14="http://schemas.microsoft.com/office/powerpoint/2010/main" Requires="p14">
+  <mc:AlternateContent xmlns:mc="http://schemas.openxmlformats.org/markup-compatibility/2006" xmlns:p14="http://schemas.microsoft.com/office/powerpoint/2010/main">
+    <mc:Choice Requires="p14">
       <p:transition spd="slow" p14:dur="2000">
         <p14:ferris dir="l"/>
       </p:transition>
     </mc:Choice>
-    <mc:Fallback>
+    <mc:Fallback xmlns="">
       <p:transition spd="slow">
         <p:fade/>
       </p:transition>
@@ -14511,13 +14359,13 @@
   <p:clrMapOvr>
     <a:masterClrMapping/>
   </p:clrMapOvr>
-  <mc:AlternateContent xmlns:mc="http://schemas.openxmlformats.org/markup-compatibility/2006">
-    <mc:Choice xmlns:p14="http://schemas.microsoft.com/office/powerpoint/2010/main" Requires="p14">
+  <mc:AlternateContent xmlns:mc="http://schemas.openxmlformats.org/markup-compatibility/2006" xmlns:p14="http://schemas.microsoft.com/office/powerpoint/2010/main">
+    <mc:Choice Requires="p14">
       <p:transition spd="slow" p14:dur="3400">
         <p14:reveal/>
       </p:transition>
     </mc:Choice>
-    <mc:Fallback>
+    <mc:Fallback xmlns="">
       <p:transition spd="slow">
         <p:fade/>
       </p:transition>
@@ -16106,13 +15954,13 @@
   <p:clrMapOvr>
     <a:masterClrMapping/>
   </p:clrMapOvr>
-  <mc:AlternateContent xmlns:mc="http://schemas.openxmlformats.org/markup-compatibility/2006">
-    <mc:Choice xmlns:p14="http://schemas.microsoft.com/office/powerpoint/2010/main" Requires="p14">
+  <mc:AlternateContent xmlns:mc="http://schemas.openxmlformats.org/markup-compatibility/2006" xmlns:p14="http://schemas.microsoft.com/office/powerpoint/2010/main">
+    <mc:Choice Requires="p14">
       <p:transition spd="slow" p14:dur="2000">
         <p14:ferris dir="l"/>
       </p:transition>
     </mc:Choice>
-    <mc:Fallback>
+    <mc:Fallback xmlns="">
       <p:transition spd="slow">
         <p:fade/>
       </p:transition>
@@ -16323,7 +16171,7 @@
         </p:blipFill>
         <p:spPr>
           <a:xfrm>
-            <a:off x="6812967" y="625079"/>
+            <a:off x="6812967" y="2846686"/>
             <a:ext cx="4837297" cy="1738659"/>
           </a:xfrm>
           <a:prstGeom prst="rect">
@@ -16358,7 +16206,7 @@
         </p:blipFill>
         <p:spPr>
           <a:xfrm>
-            <a:off x="6668901" y="2863444"/>
+            <a:off x="6677849" y="508612"/>
             <a:ext cx="5152039" cy="1847669"/>
           </a:xfrm>
           <a:prstGeom prst="rect">
@@ -16429,7 +16277,7 @@
         </p:nvSpPr>
         <p:spPr>
           <a:xfrm>
-            <a:off x="5108424" y="190908"/>
+            <a:off x="5108424" y="2412515"/>
             <a:ext cx="6758829" cy="354888"/>
           </a:xfrm>
           <a:prstGeom prst="roundRect">
@@ -16478,7 +16326,7 @@
         </p:nvSpPr>
         <p:spPr>
           <a:xfrm>
-            <a:off x="5178542" y="2456075"/>
+            <a:off x="5187490" y="101243"/>
             <a:ext cx="6642397" cy="335984"/>
           </a:xfrm>
           <a:prstGeom prst="roundRect">
@@ -16577,7 +16425,7 @@
         </p:nvSpPr>
         <p:spPr>
           <a:xfrm>
-            <a:off x="5108424" y="884495"/>
+            <a:off x="5108424" y="3106102"/>
             <a:ext cx="1704543" cy="1047539"/>
           </a:xfrm>
           <a:prstGeom prst="roundRect">
@@ -16616,14 +16464,14 @@
             <a:pPr algn="ctr"/>
             <a:r>
               <a:rPr lang="en-CA" sz="1200" dirty="0"/>
-              <a:t>R-Squared : 80.06%</a:t>
+              <a:t>R-Squared : 82.27%</a:t>
             </a:r>
           </a:p>
           <a:p>
             <a:pPr algn="ctr"/>
             <a:r>
               <a:rPr lang="en-CA" sz="1200" dirty="0"/>
-              <a:t>RMSE : 0.1053</a:t>
+              <a:t>RMSE : 0.0993</a:t>
             </a:r>
           </a:p>
         </p:txBody>
@@ -16642,7 +16490,7 @@
         </p:nvSpPr>
         <p:spPr>
           <a:xfrm>
-            <a:off x="5108424" y="3163868"/>
+            <a:off x="5117372" y="809036"/>
             <a:ext cx="1704543" cy="1047539"/>
           </a:xfrm>
           <a:prstGeom prst="roundRect">
@@ -16768,13 +16616,13 @@
   <p:clrMapOvr>
     <a:masterClrMapping/>
   </p:clrMapOvr>
-  <mc:AlternateContent xmlns:mc="http://schemas.openxmlformats.org/markup-compatibility/2006">
-    <mc:Choice xmlns:p14="http://schemas.microsoft.com/office/powerpoint/2010/main" Requires="p14">
+  <mc:AlternateContent xmlns:mc="http://schemas.openxmlformats.org/markup-compatibility/2006" xmlns:p14="http://schemas.microsoft.com/office/powerpoint/2010/main">
+    <mc:Choice Requires="p14">
       <p:transition spd="slow" p14:dur="3400">
         <p14:reveal/>
       </p:transition>
     </mc:Choice>
-    <mc:Fallback>
+    <mc:Fallback xmlns="">
       <p:transition spd="slow">
         <p:fade/>
       </p:transition>
@@ -17248,13 +17096,13 @@
   <p:clrMapOvr>
     <a:masterClrMapping/>
   </p:clrMapOvr>
-  <mc:AlternateContent xmlns:mc="http://schemas.openxmlformats.org/markup-compatibility/2006">
-    <mc:Choice xmlns:p14="http://schemas.microsoft.com/office/powerpoint/2010/main" Requires="p14">
+  <mc:AlternateContent xmlns:mc="http://schemas.openxmlformats.org/markup-compatibility/2006" xmlns:p14="http://schemas.microsoft.com/office/powerpoint/2010/main">
+    <mc:Choice Requires="p14">
       <p:transition spd="slow" p14:dur="2000">
         <p14:ferris dir="l"/>
       </p:transition>
     </mc:Choice>
-    <mc:Fallback>
+    <mc:Fallback xmlns="">
       <p:transition spd="slow">
         <p:fade/>
       </p:transition>
@@ -17338,180 +17186,159 @@
           </a:p>
         </p:txBody>
       </p:sp>
-      <p:grpSp>
-        <p:nvGrpSpPr>
-          <p:cNvPr id="11" name="Group 10">
+      <p:pic>
+        <p:nvPicPr>
+          <p:cNvPr id="4" name="Picture 2">
             <a:extLst>
               <a:ext uri="{FF2B5EF4-FFF2-40B4-BE49-F238E27FC236}">
-                <a16:creationId xmlns:a16="http://schemas.microsoft.com/office/drawing/2014/main" id="{556F508C-F008-423A-BCD6-6DB476A15266}"/>
+                <a16:creationId xmlns:a16="http://schemas.microsoft.com/office/drawing/2014/main" id="{BEFADC68-FF50-4853-91FC-0A5C4CD385FE}"/>
               </a:ext>
             </a:extLst>
           </p:cNvPr>
-          <p:cNvGrpSpPr/>
+          <p:cNvPicPr>
+            <a:picLocks noChangeAspect="1" noChangeArrowheads="1"/>
+          </p:cNvPicPr>
           <p:nvPr/>
-        </p:nvGrpSpPr>
-        <p:grpSpPr>
+        </p:nvPicPr>
+        <p:blipFill>
+          <a:blip r:embed="rId2">
+            <a:extLst>
+              <a:ext uri="{28A0092B-C50C-407E-A947-70E740481C1C}">
+                <a14:useLocalDpi xmlns:a14="http://schemas.microsoft.com/office/drawing/2010/main" val="0"/>
+              </a:ext>
+            </a:extLst>
+          </a:blip>
+          <a:srcRect/>
+          <a:stretch>
+            <a:fillRect/>
+          </a:stretch>
+        </p:blipFill>
+        <p:spPr bwMode="auto">
           <a:xfrm>
             <a:off x="5469246" y="978359"/>
-            <a:ext cx="6096223" cy="3028600"/>
-            <a:chOff x="5496974" y="3314192"/>
-            <a:chExt cx="6096223" cy="3028600"/>
-          </a:xfrm>
-        </p:grpSpPr>
-        <p:pic>
-          <p:nvPicPr>
-            <p:cNvPr id="4" name="Picture 2">
-              <a:extLst>
-                <a:ext uri="{FF2B5EF4-FFF2-40B4-BE49-F238E27FC236}">
-                  <a16:creationId xmlns:a16="http://schemas.microsoft.com/office/drawing/2014/main" id="{BEFADC68-FF50-4853-91FC-0A5C4CD385FE}"/>
-                </a:ext>
-              </a:extLst>
-            </p:cNvPr>
-            <p:cNvPicPr>
-              <a:picLocks noChangeAspect="1" noChangeArrowheads="1"/>
-            </p:cNvPicPr>
-            <p:nvPr/>
-          </p:nvPicPr>
-          <p:blipFill>
-            <a:blip r:embed="rId2">
-              <a:extLst>
-                <a:ext uri="{28A0092B-C50C-407E-A947-70E740481C1C}">
-                  <a14:useLocalDpi xmlns:a14="http://schemas.microsoft.com/office/drawing/2010/main" val="0"/>
-                </a:ext>
-              </a:extLst>
-            </a:blip>
-            <a:srcRect/>
-            <a:stretch>
-              <a:fillRect/>
-            </a:stretch>
-          </p:blipFill>
-          <p:spPr bwMode="auto">
-            <a:xfrm>
-              <a:off x="5496974" y="3314192"/>
-              <a:ext cx="5897218" cy="2823293"/>
-            </a:xfrm>
-            <a:prstGeom prst="rect">
-              <a:avLst/>
-            </a:prstGeom>
-            <a:noFill/>
+            <a:ext cx="5897218" cy="2823293"/>
+          </a:xfrm>
+          <a:prstGeom prst="rect">
+            <a:avLst/>
+          </a:prstGeom>
+          <a:noFill/>
+          <a:extLst>
+            <a:ext uri="{909E8E84-426E-40DD-AFC4-6F175D3DCCD1}">
+              <a14:hiddenFill xmlns:a14="http://schemas.microsoft.com/office/drawing/2010/main">
+                <a:solidFill>
+                  <a:srgbClr val="FFFFFF"/>
+                </a:solidFill>
+              </a14:hiddenFill>
+            </a:ext>
+          </a:extLst>
+        </p:spPr>
+      </p:pic>
+      <p:sp>
+        <p:nvSpPr>
+          <p:cNvPr id="9" name="Cross 8">
             <a:extLst>
-              <a:ext uri="{909E8E84-426E-40DD-AFC4-6F175D3DCCD1}">
-                <a14:hiddenFill xmlns:a14="http://schemas.microsoft.com/office/drawing/2010/main">
-                  <a:solidFill>
-                    <a:srgbClr val="FFFFFF"/>
-                  </a:solidFill>
-                </a14:hiddenFill>
+              <a:ext uri="{FF2B5EF4-FFF2-40B4-BE49-F238E27FC236}">
+                <a16:creationId xmlns:a16="http://schemas.microsoft.com/office/drawing/2014/main" id="{6C30F640-9CF5-4554-B934-C3D78AEEB207}"/>
               </a:ext>
             </a:extLst>
-          </p:spPr>
-        </p:pic>
-        <p:sp>
-          <p:nvSpPr>
-            <p:cNvPr id="9" name="Cross 8">
-              <a:extLst>
-                <a:ext uri="{FF2B5EF4-FFF2-40B4-BE49-F238E27FC236}">
-                  <a16:creationId xmlns:a16="http://schemas.microsoft.com/office/drawing/2014/main" id="{6C30F640-9CF5-4554-B934-C3D78AEEB207}"/>
-                </a:ext>
-              </a:extLst>
-            </p:cNvPr>
-            <p:cNvSpPr/>
-            <p:nvPr/>
-          </p:nvSpPr>
-          <p:spPr>
-            <a:xfrm rot="18841502">
-              <a:off x="8863138" y="3612733"/>
-              <a:ext cx="2730059" cy="2730059"/>
-            </a:xfrm>
-            <a:prstGeom prst="plus">
-              <a:avLst>
-                <a:gd name="adj" fmla="val 44837"/>
-              </a:avLst>
-            </a:prstGeom>
-            <a:noFill/>
-            <a:ln w="76200">
-              <a:solidFill>
-                <a:srgbClr val="FF0000"/>
-              </a:solidFill>
-            </a:ln>
-          </p:spPr>
-          <p:style>
-            <a:lnRef idx="2">
-              <a:schemeClr val="accent1">
-                <a:shade val="50000"/>
-              </a:schemeClr>
-            </a:lnRef>
-            <a:fillRef idx="1">
-              <a:schemeClr val="accent1"/>
-            </a:fillRef>
-            <a:effectRef idx="0">
-              <a:schemeClr val="accent1"/>
-            </a:effectRef>
-            <a:fontRef idx="minor">
-              <a:schemeClr val="lt1"/>
-            </a:fontRef>
-          </p:style>
-          <p:txBody>
-            <a:bodyPr rtlCol="0" anchor="ctr"/>
-            <a:lstStyle/>
-            <a:p>
-              <a:pPr algn="ctr"/>
-              <a:endParaRPr lang="en-CA"/>
-            </a:p>
-          </p:txBody>
-        </p:sp>
-        <p:sp>
-          <p:nvSpPr>
-            <p:cNvPr id="10" name="L-Shape 9">
-              <a:extLst>
-                <a:ext uri="{FF2B5EF4-FFF2-40B4-BE49-F238E27FC236}">
-                  <a16:creationId xmlns:a16="http://schemas.microsoft.com/office/drawing/2014/main" id="{DD397B94-11FD-488F-B6D8-E139E639A2E5}"/>
-                </a:ext>
-              </a:extLst>
-            </p:cNvPr>
-            <p:cNvSpPr/>
-            <p:nvPr/>
-          </p:nvSpPr>
-          <p:spPr>
-            <a:xfrm rot="19362530">
-              <a:off x="5585426" y="4155924"/>
-              <a:ext cx="2543187" cy="1062673"/>
-            </a:xfrm>
-            <a:prstGeom prst="corner">
-              <a:avLst/>
-            </a:prstGeom>
-            <a:noFill/>
-            <a:ln w="76200">
-              <a:solidFill>
-                <a:srgbClr val="00B050"/>
-              </a:solidFill>
-            </a:ln>
-          </p:spPr>
-          <p:style>
-            <a:lnRef idx="2">
-              <a:schemeClr val="accent1">
-                <a:shade val="50000"/>
-              </a:schemeClr>
-            </a:lnRef>
-            <a:fillRef idx="1">
-              <a:schemeClr val="accent1"/>
-            </a:fillRef>
-            <a:effectRef idx="0">
-              <a:schemeClr val="accent1"/>
-            </a:effectRef>
-            <a:fontRef idx="minor">
-              <a:schemeClr val="lt1"/>
-            </a:fontRef>
-          </p:style>
-          <p:txBody>
-            <a:bodyPr rtlCol="0" anchor="ctr"/>
-            <a:lstStyle/>
-            <a:p>
-              <a:pPr algn="ctr"/>
-              <a:endParaRPr lang="en-CA"/>
-            </a:p>
-          </p:txBody>
-        </p:sp>
-      </p:grpSp>
+          </p:cNvPr>
+          <p:cNvSpPr/>
+          <p:nvPr/>
+        </p:nvSpPr>
+        <p:spPr>
+          <a:xfrm rot="18841502">
+            <a:off x="8835410" y="1276900"/>
+            <a:ext cx="2730059" cy="2730059"/>
+          </a:xfrm>
+          <a:prstGeom prst="plus">
+            <a:avLst>
+              <a:gd name="adj" fmla="val 44837"/>
+            </a:avLst>
+          </a:prstGeom>
+          <a:noFill/>
+          <a:ln w="76200">
+            <a:solidFill>
+              <a:srgbClr val="FF0000"/>
+            </a:solidFill>
+          </a:ln>
+        </p:spPr>
+        <p:style>
+          <a:lnRef idx="2">
+            <a:schemeClr val="accent1">
+              <a:shade val="50000"/>
+            </a:schemeClr>
+          </a:lnRef>
+          <a:fillRef idx="1">
+            <a:schemeClr val="accent1"/>
+          </a:fillRef>
+          <a:effectRef idx="0">
+            <a:schemeClr val="accent1"/>
+          </a:effectRef>
+          <a:fontRef idx="minor">
+            <a:schemeClr val="lt1"/>
+          </a:fontRef>
+        </p:style>
+        <p:txBody>
+          <a:bodyPr rtlCol="0" anchor="ctr"/>
+          <a:lstStyle/>
+          <a:p>
+            <a:pPr algn="ctr"/>
+            <a:endParaRPr lang="en-CA"/>
+          </a:p>
+        </p:txBody>
+      </p:sp>
+      <p:sp>
+        <p:nvSpPr>
+          <p:cNvPr id="10" name="L-Shape 9">
+            <a:extLst>
+              <a:ext uri="{FF2B5EF4-FFF2-40B4-BE49-F238E27FC236}">
+                <a16:creationId xmlns:a16="http://schemas.microsoft.com/office/drawing/2014/main" id="{DD397B94-11FD-488F-B6D8-E139E639A2E5}"/>
+              </a:ext>
+            </a:extLst>
+          </p:cNvPr>
+          <p:cNvSpPr/>
+          <p:nvPr/>
+        </p:nvSpPr>
+        <p:spPr>
+          <a:xfrm rot="19362530">
+            <a:off x="5557698" y="1820091"/>
+            <a:ext cx="2543187" cy="1062673"/>
+          </a:xfrm>
+          <a:prstGeom prst="corner">
+            <a:avLst/>
+          </a:prstGeom>
+          <a:noFill/>
+          <a:ln w="76200">
+            <a:solidFill>
+              <a:srgbClr val="00B050"/>
+            </a:solidFill>
+          </a:ln>
+        </p:spPr>
+        <p:style>
+          <a:lnRef idx="2">
+            <a:schemeClr val="accent1">
+              <a:shade val="50000"/>
+            </a:schemeClr>
+          </a:lnRef>
+          <a:fillRef idx="1">
+            <a:schemeClr val="accent1"/>
+          </a:fillRef>
+          <a:effectRef idx="0">
+            <a:schemeClr val="accent1"/>
+          </a:effectRef>
+          <a:fontRef idx="minor">
+            <a:schemeClr val="lt1"/>
+          </a:fontRef>
+        </p:style>
+        <p:txBody>
+          <a:bodyPr rtlCol="0" anchor="ctr"/>
+          <a:lstStyle/>
+          <a:p>
+            <a:pPr algn="ctr"/>
+            <a:endParaRPr lang="en-CA"/>
+          </a:p>
+        </p:txBody>
+      </p:sp>
       <p:sp>
         <p:nvSpPr>
           <p:cNvPr id="7" name="Rectangle 6"/>
@@ -17642,18 +17469,232 @@
   <p:clrMapOvr>
     <a:masterClrMapping/>
   </p:clrMapOvr>
-  <mc:AlternateContent xmlns:mc="http://schemas.openxmlformats.org/markup-compatibility/2006">
-    <mc:Choice xmlns:p14="http://schemas.microsoft.com/office/powerpoint/2010/main" Requires="p14">
+  <mc:AlternateContent xmlns:mc="http://schemas.openxmlformats.org/markup-compatibility/2006" xmlns:p14="http://schemas.microsoft.com/office/powerpoint/2010/main">
+    <mc:Choice Requires="p14">
       <p:transition spd="slow" p14:dur="2000">
         <p14:ferris dir="l"/>
       </p:transition>
     </mc:Choice>
-    <mc:Fallback>
+    <mc:Fallback xmlns="">
       <p:transition spd="slow">
         <p:fade/>
       </p:transition>
     </mc:Fallback>
   </mc:AlternateContent>
+  <p:timing>
+    <p:tnLst>
+      <p:par>
+        <p:cTn id="1" dur="indefinite" restart="never" nodeType="tmRoot">
+          <p:childTnLst>
+            <p:seq concurrent="1" nextAc="seek">
+              <p:cTn id="2" dur="indefinite" nodeType="mainSeq">
+                <p:childTnLst>
+                  <p:par>
+                    <p:cTn id="3" fill="hold">
+                      <p:stCondLst>
+                        <p:cond delay="indefinite"/>
+                      </p:stCondLst>
+                      <p:childTnLst>
+                        <p:par>
+                          <p:cTn id="4" fill="hold">
+                            <p:stCondLst>
+                              <p:cond delay="0"/>
+                            </p:stCondLst>
+                            <p:childTnLst>
+                              <p:par>
+                                <p:cTn id="5" presetID="53" presetClass="entr" presetSubtype="16" fill="hold" grpId="0" nodeType="clickEffect">
+                                  <p:stCondLst>
+                                    <p:cond delay="0"/>
+                                  </p:stCondLst>
+                                  <p:childTnLst>
+                                    <p:set>
+                                      <p:cBhvr>
+                                        <p:cTn id="6" dur="1" fill="hold">
+                                          <p:stCondLst>
+                                            <p:cond delay="0"/>
+                                          </p:stCondLst>
+                                        </p:cTn>
+                                        <p:tgtEl>
+                                          <p:spTgt spid="10"/>
+                                        </p:tgtEl>
+                                        <p:attrNameLst>
+                                          <p:attrName>style.visibility</p:attrName>
+                                        </p:attrNameLst>
+                                      </p:cBhvr>
+                                      <p:to>
+                                        <p:strVal val="visible"/>
+                                      </p:to>
+                                    </p:set>
+                                    <p:anim calcmode="lin" valueType="num">
+                                      <p:cBhvr>
+                                        <p:cTn id="7" dur="500" fill="hold"/>
+                                        <p:tgtEl>
+                                          <p:spTgt spid="10"/>
+                                        </p:tgtEl>
+                                        <p:attrNameLst>
+                                          <p:attrName>ppt_w</p:attrName>
+                                        </p:attrNameLst>
+                                      </p:cBhvr>
+                                      <p:tavLst>
+                                        <p:tav tm="0">
+                                          <p:val>
+                                            <p:fltVal val="0"/>
+                                          </p:val>
+                                        </p:tav>
+                                        <p:tav tm="100000">
+                                          <p:val>
+                                            <p:strVal val="#ppt_w"/>
+                                          </p:val>
+                                        </p:tav>
+                                      </p:tavLst>
+                                    </p:anim>
+                                    <p:anim calcmode="lin" valueType="num">
+                                      <p:cBhvr>
+                                        <p:cTn id="8" dur="500" fill="hold"/>
+                                        <p:tgtEl>
+                                          <p:spTgt spid="10"/>
+                                        </p:tgtEl>
+                                        <p:attrNameLst>
+                                          <p:attrName>ppt_h</p:attrName>
+                                        </p:attrNameLst>
+                                      </p:cBhvr>
+                                      <p:tavLst>
+                                        <p:tav tm="0">
+                                          <p:val>
+                                            <p:fltVal val="0"/>
+                                          </p:val>
+                                        </p:tav>
+                                        <p:tav tm="100000">
+                                          <p:val>
+                                            <p:strVal val="#ppt_h"/>
+                                          </p:val>
+                                        </p:tav>
+                                      </p:tavLst>
+                                    </p:anim>
+                                    <p:animEffect transition="in" filter="fade">
+                                      <p:cBhvr>
+                                        <p:cTn id="9" dur="500"/>
+                                        <p:tgtEl>
+                                          <p:spTgt spid="10"/>
+                                        </p:tgtEl>
+                                      </p:cBhvr>
+                                    </p:animEffect>
+                                  </p:childTnLst>
+                                </p:cTn>
+                              </p:par>
+                              <p:par>
+                                <p:cTn id="10" presetID="53" presetClass="entr" presetSubtype="16" fill="hold" grpId="0" nodeType="withEffect">
+                                  <p:stCondLst>
+                                    <p:cond delay="0"/>
+                                  </p:stCondLst>
+                                  <p:childTnLst>
+                                    <p:set>
+                                      <p:cBhvr>
+                                        <p:cTn id="11" dur="1" fill="hold">
+                                          <p:stCondLst>
+                                            <p:cond delay="0"/>
+                                          </p:stCondLst>
+                                        </p:cTn>
+                                        <p:tgtEl>
+                                          <p:spTgt spid="9"/>
+                                        </p:tgtEl>
+                                        <p:attrNameLst>
+                                          <p:attrName>style.visibility</p:attrName>
+                                        </p:attrNameLst>
+                                      </p:cBhvr>
+                                      <p:to>
+                                        <p:strVal val="visible"/>
+                                      </p:to>
+                                    </p:set>
+                                    <p:anim calcmode="lin" valueType="num">
+                                      <p:cBhvr>
+                                        <p:cTn id="12" dur="500" fill="hold"/>
+                                        <p:tgtEl>
+                                          <p:spTgt spid="9"/>
+                                        </p:tgtEl>
+                                        <p:attrNameLst>
+                                          <p:attrName>ppt_w</p:attrName>
+                                        </p:attrNameLst>
+                                      </p:cBhvr>
+                                      <p:tavLst>
+                                        <p:tav tm="0">
+                                          <p:val>
+                                            <p:fltVal val="0"/>
+                                          </p:val>
+                                        </p:tav>
+                                        <p:tav tm="100000">
+                                          <p:val>
+                                            <p:strVal val="#ppt_w"/>
+                                          </p:val>
+                                        </p:tav>
+                                      </p:tavLst>
+                                    </p:anim>
+                                    <p:anim calcmode="lin" valueType="num">
+                                      <p:cBhvr>
+                                        <p:cTn id="13" dur="500" fill="hold"/>
+                                        <p:tgtEl>
+                                          <p:spTgt spid="9"/>
+                                        </p:tgtEl>
+                                        <p:attrNameLst>
+                                          <p:attrName>ppt_h</p:attrName>
+                                        </p:attrNameLst>
+                                      </p:cBhvr>
+                                      <p:tavLst>
+                                        <p:tav tm="0">
+                                          <p:val>
+                                            <p:fltVal val="0"/>
+                                          </p:val>
+                                        </p:tav>
+                                        <p:tav tm="100000">
+                                          <p:val>
+                                            <p:strVal val="#ppt_h"/>
+                                          </p:val>
+                                        </p:tav>
+                                      </p:tavLst>
+                                    </p:anim>
+                                    <p:animEffect transition="in" filter="fade">
+                                      <p:cBhvr>
+                                        <p:cTn id="14" dur="500"/>
+                                        <p:tgtEl>
+                                          <p:spTgt spid="9"/>
+                                        </p:tgtEl>
+                                      </p:cBhvr>
+                                    </p:animEffect>
+                                  </p:childTnLst>
+                                </p:cTn>
+                              </p:par>
+                            </p:childTnLst>
+                          </p:cTn>
+                        </p:par>
+                      </p:childTnLst>
+                    </p:cTn>
+                  </p:par>
+                </p:childTnLst>
+              </p:cTn>
+              <p:prevCondLst>
+                <p:cond evt="onPrev" delay="0">
+                  <p:tgtEl>
+                    <p:sldTgt/>
+                  </p:tgtEl>
+                </p:cond>
+              </p:prevCondLst>
+              <p:nextCondLst>
+                <p:cond evt="onNext" delay="0">
+                  <p:tgtEl>
+                    <p:sldTgt/>
+                  </p:tgtEl>
+                </p:cond>
+              </p:nextCondLst>
+            </p:seq>
+          </p:childTnLst>
+        </p:cTn>
+      </p:par>
+    </p:tnLst>
+    <p:bldLst>
+      <p:bldP spid="9" grpId="0" animBg="1"/>
+      <p:bldP spid="10" grpId="0" animBg="1"/>
+    </p:bldLst>
+  </p:timing>
 </p:sld>
 </file>
 
@@ -18330,13 +18371,13 @@
   <p:clrMapOvr>
     <a:masterClrMapping/>
   </p:clrMapOvr>
-  <mc:AlternateContent xmlns:mc="http://schemas.openxmlformats.org/markup-compatibility/2006">
-    <mc:Choice xmlns:p14="http://schemas.microsoft.com/office/powerpoint/2010/main" Requires="p14">
+  <mc:AlternateContent xmlns:mc="http://schemas.openxmlformats.org/markup-compatibility/2006" xmlns:p14="http://schemas.microsoft.com/office/powerpoint/2010/main">
+    <mc:Choice Requires="p14">
       <p:transition spd="slow" p14:dur="3400">
         <p14:reveal/>
       </p:transition>
     </mc:Choice>
-    <mc:Fallback>
+    <mc:Fallback xmlns="">
       <p:transition spd="slow">
         <p:fade/>
       </p:transition>

</xml_diff>